<commit_message>
fix #26: add time constraint to deposit in complex read 2
</commit_message>
<xml_diff>
--- a/patterns/transaction-complex-read.pptx
+++ b/patterns/transaction-complex-read.pptx
@@ -252,7 +252,7 @@
           <a:p>
             <a:fld id="{CAD4BD24-A097-4F9D-85E9-6A2A24CA2D98}" type="datetimeFigureOut">
               <a:rPr lang="zh-CN" altLang="en-US" smtClean="0"/>
-              <a:t>2022/3/30</a:t>
+              <a:t>2022/9/21</a:t>
             </a:fld>
             <a:endParaRPr lang="zh-CN" altLang="en-US"/>
           </a:p>
@@ -21299,15 +21299,13 @@
           </p:nvSpPr>
           <p:spPr>
             <a:xfrm>
-              <a:off x="9708447" y="3415443"/>
-              <a:ext cx="1436233" cy="393831"/>
+              <a:off x="7856463" y="3326741"/>
+              <a:ext cx="2404033" cy="505147"/>
             </a:xfrm>
             <a:prstGeom prst="rect">
               <a:avLst/>
             </a:prstGeom>
-            <a:solidFill>
-              <a:schemeClr val="bg1"/>
-            </a:solidFill>
+            <a:noFill/>
             <a:ln w="28575">
               <a:noFill/>
               <a:prstDash val="dash"/>
@@ -21333,10 +21331,11 @@
             <a:bodyPr rtlCol="0" anchor="ctr"/>
             <a:lstStyle/>
             <a:p>
+              <a:pPr algn="ctr"/>
               <a:r>
                 <a:rPr kumimoji="1" lang="en-US" altLang="zh-CN" sz="1200" b="1" i="1" dirty="0">
                   <a:solidFill>
-                    <a:sysClr val="windowText" lastClr="000000"/>
+                    <a:schemeClr val="tx1"/>
                   </a:solidFill>
                   <a:latin typeface="DengXian" panose="02010600030101010101" pitchFamily="2" charset="-122"/>
                   <a:ea typeface="DengXian" panose="02010600030101010101" pitchFamily="2" charset="-122"/>
@@ -21344,9 +21343,9 @@
                 <a:t>edge3</a:t>
               </a:r>
               <a:r>
-                <a:rPr kumimoji="1" lang="zh-CN" altLang="en-US" sz="1200" b="1" i="1" dirty="0">
-                  <a:solidFill>
-                    <a:sysClr val="windowText" lastClr="000000"/>
+                <a:rPr kumimoji="1" lang="zh-CN" altLang="en-US" sz="1200" i="1" dirty="0">
+                  <a:solidFill>
+                    <a:schemeClr val="tx1"/>
                   </a:solidFill>
                   <a:latin typeface="DengXian" panose="02010600030101010101" pitchFamily="2" charset="-122"/>
                   <a:ea typeface="DengXian" panose="02010600030101010101" pitchFamily="2" charset="-122"/>
@@ -21356,7 +21355,7 @@
               <a:r>
                 <a:rPr kumimoji="1" lang="en-US" altLang="zh-CN" sz="1200" dirty="0">
                   <a:solidFill>
-                    <a:sysClr val="windowText" lastClr="000000"/>
+                    <a:schemeClr val="tx1"/>
                   </a:solidFill>
                   <a:latin typeface="DengXian" panose="02010600030101010101" pitchFamily="2" charset="-122"/>
                   <a:ea typeface="DengXian" panose="02010600030101010101" pitchFamily="2" charset="-122"/>
@@ -21366,7 +21365,7 @@
               <a:r>
                 <a:rPr kumimoji="1" lang="zh-CN" altLang="en-US" sz="1200" dirty="0">
                   <a:solidFill>
-                    <a:sysClr val="windowText" lastClr="000000"/>
+                    <a:schemeClr val="tx1"/>
                   </a:solidFill>
                   <a:latin typeface="DengXian" panose="02010600030101010101" pitchFamily="2" charset="-122"/>
                   <a:ea typeface="DengXian" panose="02010600030101010101" pitchFamily="2" charset="-122"/>
@@ -21376,12 +21375,176 @@
               <a:r>
                 <a:rPr kumimoji="1" lang="en-US" altLang="zh-CN" sz="1200" dirty="0">
                   <a:solidFill>
-                    <a:sysClr val="windowText" lastClr="000000"/>
+                    <a:schemeClr val="tx1"/>
                   </a:solidFill>
                   <a:latin typeface="DengXian" panose="02010600030101010101" pitchFamily="2" charset="-122"/>
                   <a:ea typeface="DengXian" panose="02010600030101010101" pitchFamily="2" charset="-122"/>
                 </a:rPr>
                 <a:t>deposit</a:t>
+              </a:r>
+            </a:p>
+            <a:p>
+              <a:r>
+                <a:rPr kumimoji="1" lang="en-US" altLang="zh-CN" sz="1200" b="1" i="1" dirty="0">
+                  <a:solidFill>
+                    <a:schemeClr val="tx1"/>
+                  </a:solidFill>
+                  <a:latin typeface="DengXian" panose="02010600030101010101" pitchFamily="2" charset="-122"/>
+                  <a:ea typeface="DengXian" panose="02010600030101010101" pitchFamily="2" charset="-122"/>
+                </a:rPr>
+                <a:t>edge3</a:t>
+              </a:r>
+              <a:r>
+                <a:rPr kumimoji="1" lang="en-US" altLang="zh-CN" sz="1200" dirty="0">
+                  <a:solidFill>
+                    <a:schemeClr val="tx1"/>
+                  </a:solidFill>
+                  <a:latin typeface="DengXian" panose="02010600030101010101" pitchFamily="2" charset="-122"/>
+                  <a:ea typeface="DengXian" panose="02010600030101010101" pitchFamily="2" charset="-122"/>
+                </a:rPr>
+                <a:t>.timestamp</a:t>
+              </a:r>
+              <a:r>
+                <a:rPr kumimoji="1" lang="zh-CN" altLang="en-US" sz="1200" dirty="0">
+                  <a:solidFill>
+                    <a:schemeClr val="tx1"/>
+                  </a:solidFill>
+                  <a:latin typeface="DengXian" panose="02010600030101010101" pitchFamily="2" charset="-122"/>
+                  <a:ea typeface="DengXian" panose="02010600030101010101" pitchFamily="2" charset="-122"/>
+                </a:rPr>
+                <a:t> </a:t>
+              </a:r>
+              <a:r>
+                <a:rPr kumimoji="1" lang="en-US" altLang="zh-CN" sz="1200" dirty="0">
+                  <a:solidFill>
+                    <a:schemeClr val="tx1"/>
+                  </a:solidFill>
+                  <a:latin typeface="DengXian" panose="02010600030101010101" pitchFamily="2" charset="-122"/>
+                  <a:ea typeface="DengXian" panose="02010600030101010101" pitchFamily="2" charset="-122"/>
+                </a:rPr>
+                <a:t>&gt;</a:t>
+              </a:r>
+              <a:r>
+                <a:rPr kumimoji="1" lang="zh-CN" altLang="en-US" sz="1200" dirty="0">
+                  <a:solidFill>
+                    <a:schemeClr val="tx1"/>
+                  </a:solidFill>
+                  <a:latin typeface="DengXian" panose="02010600030101010101" pitchFamily="2" charset="-122"/>
+                  <a:ea typeface="DengXian" panose="02010600030101010101" pitchFamily="2" charset="-122"/>
+                </a:rPr>
+                <a:t> </a:t>
+              </a:r>
+              <a:r>
+                <a:rPr kumimoji="1" lang="en-US" altLang="zh-CN" sz="1200" dirty="0">
+                  <a:solidFill>
+                    <a:schemeClr val="tx1"/>
+                  </a:solidFill>
+                  <a:latin typeface="DengXian" panose="02010600030101010101" pitchFamily="2" charset="-122"/>
+                  <a:ea typeface="DengXian" panose="02010600030101010101" pitchFamily="2" charset="-122"/>
+                </a:rPr>
+                <a:t>${</a:t>
+              </a:r>
+              <a:r>
+                <a:rPr kumimoji="1" lang="en-US" altLang="zh-CN" sz="1200" dirty="0" err="1">
+                  <a:solidFill>
+                    <a:schemeClr val="tx1"/>
+                  </a:solidFill>
+                  <a:latin typeface="DengXian" panose="02010600030101010101" pitchFamily="2" charset="-122"/>
+                  <a:ea typeface="DengXian" panose="02010600030101010101" pitchFamily="2" charset="-122"/>
+                </a:rPr>
+                <a:t>start_time</a:t>
+              </a:r>
+              <a:r>
+                <a:rPr kumimoji="1" lang="en-US" altLang="zh-CN" sz="1200" dirty="0">
+                  <a:solidFill>
+                    <a:schemeClr val="tx1"/>
+                  </a:solidFill>
+                  <a:latin typeface="DengXian" panose="02010600030101010101" pitchFamily="2" charset="-122"/>
+                  <a:ea typeface="DengXian" panose="02010600030101010101" pitchFamily="2" charset="-122"/>
+                </a:rPr>
+                <a:t>}</a:t>
+              </a:r>
+            </a:p>
+            <a:p>
+              <a:r>
+                <a:rPr kumimoji="1" lang="en-US" altLang="zh-CN" sz="1200" b="1" i="1" dirty="0">
+                  <a:solidFill>
+                    <a:schemeClr val="tx1"/>
+                  </a:solidFill>
+                  <a:latin typeface="DengXian" panose="02010600030101010101" pitchFamily="2" charset="-122"/>
+                  <a:ea typeface="DengXian" panose="02010600030101010101" pitchFamily="2" charset="-122"/>
+                </a:rPr>
+                <a:t>edge3</a:t>
+              </a:r>
+              <a:r>
+                <a:rPr kumimoji="1" lang="en-US" altLang="zh-CN" sz="1200" dirty="0">
+                  <a:solidFill>
+                    <a:schemeClr val="tx1"/>
+                  </a:solidFill>
+                  <a:latin typeface="DengXian" panose="02010600030101010101" pitchFamily="2" charset="-122"/>
+                  <a:ea typeface="DengXian" panose="02010600030101010101" pitchFamily="2" charset="-122"/>
+                </a:rPr>
+                <a:t>.timestamp</a:t>
+              </a:r>
+              <a:r>
+                <a:rPr kumimoji="1" lang="zh-CN" altLang="en-US" sz="1200" dirty="0">
+                  <a:solidFill>
+                    <a:schemeClr val="tx1"/>
+                  </a:solidFill>
+                  <a:latin typeface="DengXian" panose="02010600030101010101" pitchFamily="2" charset="-122"/>
+                  <a:ea typeface="DengXian" panose="02010600030101010101" pitchFamily="2" charset="-122"/>
+                </a:rPr>
+                <a:t> </a:t>
+              </a:r>
+              <a:r>
+                <a:rPr kumimoji="1" lang="en-US" altLang="zh-CN" sz="1200" dirty="0">
+                  <a:solidFill>
+                    <a:schemeClr val="tx1"/>
+                  </a:solidFill>
+                  <a:latin typeface="DengXian" panose="02010600030101010101" pitchFamily="2" charset="-122"/>
+                  <a:ea typeface="DengXian" panose="02010600030101010101" pitchFamily="2" charset="-122"/>
+                </a:rPr>
+                <a:t>&lt;</a:t>
+              </a:r>
+              <a:r>
+                <a:rPr kumimoji="1" lang="zh-CN" altLang="en-US" sz="1200" dirty="0">
+                  <a:solidFill>
+                    <a:schemeClr val="tx1"/>
+                  </a:solidFill>
+                  <a:latin typeface="DengXian" panose="02010600030101010101" pitchFamily="2" charset="-122"/>
+                  <a:ea typeface="DengXian" panose="02010600030101010101" pitchFamily="2" charset="-122"/>
+                </a:rPr>
+                <a:t> </a:t>
+              </a:r>
+              <a:r>
+                <a:rPr kumimoji="1" lang="en-US" altLang="zh-CN" sz="1200" dirty="0">
+                  <a:solidFill>
+                    <a:schemeClr val="tx1"/>
+                  </a:solidFill>
+                  <a:latin typeface="DengXian" panose="02010600030101010101" pitchFamily="2" charset="-122"/>
+                  <a:ea typeface="DengXian" panose="02010600030101010101" pitchFamily="2" charset="-122"/>
+                </a:rPr>
+                <a:t>${</a:t>
+              </a:r>
+              <a:r>
+                <a:rPr kumimoji="1" lang="en-US" altLang="zh-CN" sz="1200" dirty="0" err="1">
+                  <a:solidFill>
+                    <a:schemeClr val="tx1"/>
+                  </a:solidFill>
+                  <a:latin typeface="DengXian" panose="02010600030101010101" pitchFamily="2" charset="-122"/>
+                  <a:ea typeface="DengXian" panose="02010600030101010101" pitchFamily="2" charset="-122"/>
+                </a:rPr>
+                <a:t>end_time</a:t>
+              </a:r>
+              <a:r>
+                <a:rPr kumimoji="1" lang="en-US" altLang="zh-CN" sz="1200" dirty="0">
+                  <a:solidFill>
+                    <a:schemeClr val="tx1"/>
+                  </a:solidFill>
+                  <a:latin typeface="DengXian" panose="02010600030101010101" pitchFamily="2" charset="-122"/>
+                  <a:ea typeface="DengXian" panose="02010600030101010101" pitchFamily="2" charset="-122"/>
+                </a:rPr>
+                <a:t>}</a:t>
               </a:r>
             </a:p>
           </p:txBody>

</xml_diff>

<commit_message>
fix #21: add a new compound type Path to data types
</commit_message>
<xml_diff>
--- a/patterns/transaction-complex-read.pptx
+++ b/patterns/transaction-complex-read.pptx
@@ -32639,7 +32639,7 @@
                     <a:sysClr val="windowText" lastClr="000000"/>
                   </a:solidFill>
                 </a:rPr>
-                <a:t>dst</a:t>
+                <a:t>dstAccount</a:t>
               </a:r>
               <a:r>
                 <a:rPr kumimoji="1" lang="zh-CN" altLang="en-US" sz="1200" dirty="0">
@@ -32803,7 +32803,7 @@
                   <a:latin typeface="DengXian" panose="02010600030101010101" pitchFamily="2" charset="-122"/>
                   <a:ea typeface="DengXian" panose="02010600030101010101" pitchFamily="2" charset="-122"/>
                 </a:rPr>
-                <a:t>1..5</a:t>
+                <a:t>1..3</a:t>
               </a:r>
             </a:p>
             <a:p>

</xml_diff>

<commit_message>
fix #20: specify the ratio in complex read query 9
</commit_message>
<xml_diff>
--- a/patterns/transaction-complex-read.pptx
+++ b/patterns/transaction-complex-read.pptx
@@ -34887,9 +34887,9 @@
         <p:grpSpPr>
           <a:xfrm>
             <a:off x="2222320" y="1748017"/>
-            <a:ext cx="7942086" cy="3780179"/>
+            <a:ext cx="8518556" cy="3943567"/>
             <a:chOff x="2222320" y="1748017"/>
-            <a:chExt cx="7942086" cy="3780179"/>
+            <a:chExt cx="8518556" cy="3943567"/>
           </a:xfrm>
         </p:grpSpPr>
         <p:grpSp>
@@ -35144,8 +35144,8 @@
           </p:nvSpPr>
           <p:spPr>
             <a:xfrm>
-              <a:off x="3627203" y="1771227"/>
-              <a:ext cx="2232340" cy="523220"/>
+              <a:off x="3349487" y="1771227"/>
+              <a:ext cx="2510056" cy="523220"/>
             </a:xfrm>
             <a:prstGeom prst="rect">
               <a:avLst/>
@@ -35163,7 +35163,7 @@
                   <a:latin typeface="DengXian" panose="02010600030101010101" pitchFamily="2" charset="-122"/>
                   <a:ea typeface="DengXian" panose="02010600030101010101" pitchFamily="2" charset="-122"/>
                 </a:rPr>
-                <a:t>x</a:t>
+                <a:t>edge1</a:t>
               </a:r>
               <a:r>
                 <a:rPr kumimoji="1" lang="zh-CN" altLang="en-US" sz="1400" dirty="0">
@@ -35196,14 +35196,14 @@
             </a:p>
             <a:p>
               <a:r>
-                <a:rPr kumimoji="1" lang="en-US" altLang="zh-CN" sz="1400" b="1" i="1" dirty="0" err="1">
-                  <a:latin typeface="DengXian" panose="02010600030101010101" pitchFamily="2" charset="-122"/>
-                  <a:ea typeface="DengXian" panose="02010600030101010101" pitchFamily="2" charset="-122"/>
-                </a:rPr>
-                <a:t>x</a:t>
-              </a:r>
-              <a:r>
-                <a:rPr kumimoji="1" lang="en-US" altLang="zh-CN" sz="1400" dirty="0" err="1">
+                <a:rPr kumimoji="1" lang="en-US" altLang="zh-CN" sz="1400" b="1" i="1" dirty="0">
+                  <a:latin typeface="DengXian" panose="02010600030101010101" pitchFamily="2" charset="-122"/>
+                  <a:ea typeface="DengXian" panose="02010600030101010101" pitchFamily="2" charset="-122"/>
+                </a:rPr>
+                <a:t>edge1</a:t>
+              </a:r>
+              <a:r>
+                <a:rPr kumimoji="1" lang="en-US" altLang="zh-CN" sz="1400" dirty="0">
                   <a:latin typeface="DengXian" panose="02010600030101010101" pitchFamily="2" charset="-122"/>
                   <a:ea typeface="DengXian" panose="02010600030101010101" pitchFamily="2" charset="-122"/>
                 </a:rPr>
@@ -35254,8 +35254,8 @@
           </p:nvSpPr>
           <p:spPr>
             <a:xfrm>
-              <a:off x="3678576" y="4946664"/>
-              <a:ext cx="1456252" cy="516578"/>
+              <a:off x="3233856" y="4946664"/>
+              <a:ext cx="1900972" cy="744920"/>
             </a:xfrm>
             <a:prstGeom prst="rect">
               <a:avLst/>
@@ -35304,6 +35304,19 @@
                 </a:rPr>
                 <a:t>RESULT</a:t>
               </a:r>
+            </a:p>
+            <a:p>
+              <a:pPr algn="ctr"/>
+              <a:r>
+                <a:rPr kumimoji="1" lang="en-US" altLang="zh-CN" sz="1200" b="1" dirty="0">
+                  <a:solidFill>
+                    <a:sysClr val="windowText" lastClr="000000"/>
+                  </a:solidFill>
+                  <a:latin typeface="DengXian" panose="02010600030101010101" pitchFamily="2" charset="-122"/>
+                  <a:ea typeface="DengXian" panose="02010600030101010101" pitchFamily="2" charset="-122"/>
+                </a:rPr>
+                <a:t>ratio1</a:t>
+              </a:r>
               <a:r>
                 <a:rPr kumimoji="1" lang="zh-CN" altLang="en-US" sz="1200" b="1" dirty="0">
                   <a:solidFill>
@@ -35322,7 +35335,67 @@
                   <a:latin typeface="DengXian" panose="02010600030101010101" pitchFamily="2" charset="-122"/>
                   <a:ea typeface="DengXian" panose="02010600030101010101" pitchFamily="2" charset="-122"/>
                 </a:rPr>
-                <a:t>ratio1</a:t>
+                <a:t>=</a:t>
+              </a:r>
+              <a:r>
+                <a:rPr kumimoji="1" lang="zh-CN" altLang="en-US" sz="1200" b="1" dirty="0">
+                  <a:solidFill>
+                    <a:sysClr val="windowText" lastClr="000000"/>
+                  </a:solidFill>
+                  <a:latin typeface="DengXian" panose="02010600030101010101" pitchFamily="2" charset="-122"/>
+                  <a:ea typeface="DengXian" panose="02010600030101010101" pitchFamily="2" charset="-122"/>
+                </a:rPr>
+                <a:t> </a:t>
+              </a:r>
+              <a:r>
+                <a:rPr kumimoji="1" lang="en-US" altLang="zh-CN" sz="1200" b="1" dirty="0">
+                  <a:solidFill>
+                    <a:sysClr val="windowText" lastClr="000000"/>
+                  </a:solidFill>
+                  <a:latin typeface="DengXian" panose="02010600030101010101" pitchFamily="2" charset="-122"/>
+                  <a:ea typeface="DengXian" panose="02010600030101010101" pitchFamily="2" charset="-122"/>
+                </a:rPr>
+                <a:t>edge1.amount</a:t>
+              </a:r>
+              <a:r>
+                <a:rPr kumimoji="1" lang="zh-CN" altLang="en-US" sz="1200" b="1" dirty="0">
+                  <a:solidFill>
+                    <a:sysClr val="windowText" lastClr="000000"/>
+                  </a:solidFill>
+                  <a:latin typeface="DengXian" panose="02010600030101010101" pitchFamily="2" charset="-122"/>
+                  <a:ea typeface="DengXian" panose="02010600030101010101" pitchFamily="2" charset="-122"/>
+                </a:rPr>
+                <a:t> </a:t>
+              </a:r>
+              <a:r>
+                <a:rPr kumimoji="1" lang="en-US" altLang="zh-CN" sz="1200" b="1" dirty="0">
+                  <a:solidFill>
+                    <a:sysClr val="windowText" lastClr="000000"/>
+                  </a:solidFill>
+                  <a:latin typeface="DengXian" panose="02010600030101010101" pitchFamily="2" charset="-122"/>
+                  <a:ea typeface="DengXian" panose="02010600030101010101" pitchFamily="2" charset="-122"/>
+                </a:rPr>
+                <a:t>/</a:t>
+              </a:r>
+              <a:r>
+                <a:rPr kumimoji="1" lang="zh-CN" altLang="en-US" sz="1200" b="1" dirty="0">
+                  <a:solidFill>
+                    <a:sysClr val="windowText" lastClr="000000"/>
+                  </a:solidFill>
+                  <a:latin typeface="DengXian" panose="02010600030101010101" pitchFamily="2" charset="-122"/>
+                  <a:ea typeface="DengXian" panose="02010600030101010101" pitchFamily="2" charset="-122"/>
+                </a:rPr>
+                <a:t> </a:t>
+              </a:r>
+              <a:r>
+                <a:rPr kumimoji="1" lang="en-US" altLang="zh-CN" sz="1200" b="1" dirty="0">
+                  <a:solidFill>
+                    <a:sysClr val="windowText" lastClr="000000"/>
+                  </a:solidFill>
+                  <a:latin typeface="DengXian" panose="02010600030101010101" pitchFamily="2" charset="-122"/>
+                  <a:ea typeface="DengXian" panose="02010600030101010101" pitchFamily="2" charset="-122"/>
+                </a:rPr>
+                <a:t>SUM(edge1.amount)</a:t>
               </a:r>
               <a:endParaRPr kumimoji="1" lang="en-US" altLang="zh-CN" sz="1200" dirty="0">
                 <a:solidFill>
@@ -35393,7 +35466,7 @@
                     <a:sysClr val="windowText" lastClr="000000"/>
                   </a:solidFill>
                 </a:rPr>
-                <a:t>d</a:t>
+                <a:t>b</a:t>
               </a:r>
               <a:r>
                 <a:rPr kumimoji="1" lang="zh-CN" altLang="en-US" sz="1200" dirty="0">
@@ -35494,7 +35567,7 @@
                     <a:sysClr val="windowText" lastClr="000000"/>
                   </a:solidFill>
                 </a:rPr>
-                <a:t>d</a:t>
+                <a:t>b</a:t>
               </a:r>
               <a:r>
                 <a:rPr kumimoji="1" lang="zh-CN" altLang="en-US" sz="1200" dirty="0">
@@ -35595,10 +35668,10 @@
                     <a:sysClr val="windowText" lastClr="000000"/>
                   </a:solidFill>
                 </a:rPr>
-                <a:t>d</a:t>
-              </a:r>
-              <a:r>
-                <a:rPr kumimoji="1" lang="zh-CN" altLang="en-US" sz="1200" dirty="0">
+                <a:t>b</a:t>
+              </a:r>
+              <a:r>
+                <a:rPr kumimoji="1" lang="zh-CN" altLang="en-US" sz="1200" b="1" i="1" dirty="0">
                   <a:solidFill>
                     <a:sysClr val="windowText" lastClr="000000"/>
                   </a:solidFill>
@@ -35696,7 +35769,7 @@
                     <a:sysClr val="windowText" lastClr="000000"/>
                   </a:solidFill>
                 </a:rPr>
-                <a:t>d</a:t>
+                <a:t>b</a:t>
               </a:r>
               <a:r>
                 <a:rPr kumimoji="1" lang="zh-CN" altLang="en-US" sz="1200" dirty="0">
@@ -35940,7 +36013,7 @@
           </p:nvSpPr>
           <p:spPr>
             <a:xfrm>
-              <a:off x="8708154" y="2294328"/>
+              <a:off x="9284624" y="2294328"/>
               <a:ext cx="1456252" cy="505147"/>
             </a:xfrm>
             <a:prstGeom prst="rect">
@@ -36041,7 +36114,7 @@
           </p:nvSpPr>
           <p:spPr>
             <a:xfrm>
-              <a:off x="8708154" y="3098059"/>
+              <a:off x="9284624" y="3098059"/>
               <a:ext cx="1456252" cy="505147"/>
             </a:xfrm>
             <a:prstGeom prst="rect">
@@ -36142,7 +36215,7 @@
           </p:nvSpPr>
           <p:spPr>
             <a:xfrm>
-              <a:off x="8708154" y="3901790"/>
+              <a:off x="9284624" y="3901790"/>
               <a:ext cx="1456252" cy="505147"/>
             </a:xfrm>
             <a:prstGeom prst="rect">
@@ -36243,7 +36316,7 @@
           </p:nvSpPr>
           <p:spPr>
             <a:xfrm>
-              <a:off x="8708154" y="4705521"/>
+              <a:off x="9284624" y="4705521"/>
               <a:ext cx="1456252" cy="505147"/>
             </a:xfrm>
             <a:prstGeom prst="rect">
@@ -36349,7 +36422,7 @@
           <p:spPr>
             <a:xfrm>
               <a:off x="7035801" y="3350633"/>
-              <a:ext cx="1672353" cy="0"/>
+              <a:ext cx="2248823" cy="0"/>
             </a:xfrm>
             <a:prstGeom prst="straightConnector1">
               <a:avLst/>
@@ -36396,7 +36469,7 @@
           <p:spPr>
             <a:xfrm flipV="1">
               <a:off x="7035801" y="2546902"/>
-              <a:ext cx="1672353" cy="803731"/>
+              <a:ext cx="2248823" cy="803731"/>
             </a:xfrm>
             <a:prstGeom prst="straightConnector1">
               <a:avLst/>
@@ -36443,7 +36516,7 @@
           <p:spPr>
             <a:xfrm>
               <a:off x="7035801" y="3350633"/>
-              <a:ext cx="1672353" cy="1607462"/>
+              <a:ext cx="2248823" cy="1607462"/>
             </a:xfrm>
             <a:prstGeom prst="straightConnector1">
               <a:avLst/>
@@ -36490,7 +36563,7 @@
           <p:spPr>
             <a:xfrm>
               <a:off x="7035801" y="3350633"/>
-              <a:ext cx="1672353" cy="803731"/>
+              <a:ext cx="2248823" cy="803731"/>
             </a:xfrm>
             <a:prstGeom prst="straightConnector1">
               <a:avLst/>
@@ -36532,8 +36605,8 @@
           </p:nvSpPr>
           <p:spPr>
             <a:xfrm>
-              <a:off x="7035801" y="1748017"/>
-              <a:ext cx="2232340" cy="523220"/>
+              <a:off x="7035800" y="1748017"/>
+              <a:ext cx="2510055" cy="523220"/>
             </a:xfrm>
             <a:prstGeom prst="rect">
               <a:avLst/>
@@ -36551,7 +36624,7 @@
                   <a:latin typeface="DengXian" panose="02010600030101010101" pitchFamily="2" charset="-122"/>
                   <a:ea typeface="DengXian" panose="02010600030101010101" pitchFamily="2" charset="-122"/>
                 </a:rPr>
-                <a:t>y</a:t>
+                <a:t>edge2</a:t>
               </a:r>
               <a:r>
                 <a:rPr kumimoji="1" lang="zh-CN" altLang="en-US" sz="1400" dirty="0">
@@ -36584,14 +36657,14 @@
             </a:p>
             <a:p>
               <a:r>
-                <a:rPr kumimoji="1" lang="en-US" altLang="zh-CN" sz="1400" b="1" i="1" dirty="0" err="1">
-                  <a:latin typeface="DengXian" panose="02010600030101010101" pitchFamily="2" charset="-122"/>
-                  <a:ea typeface="DengXian" panose="02010600030101010101" pitchFamily="2" charset="-122"/>
-                </a:rPr>
-                <a:t>y</a:t>
-              </a:r>
-              <a:r>
-                <a:rPr kumimoji="1" lang="en-US" altLang="zh-CN" sz="1400" dirty="0" err="1">
+                <a:rPr kumimoji="1" lang="en-US" altLang="zh-CN" sz="1400" b="1" i="1" dirty="0">
+                  <a:latin typeface="DengXian" panose="02010600030101010101" pitchFamily="2" charset="-122"/>
+                  <a:ea typeface="DengXian" panose="02010600030101010101" pitchFamily="2" charset="-122"/>
+                </a:rPr>
+                <a:t>edge2</a:t>
+              </a:r>
+              <a:r>
+                <a:rPr kumimoji="1" lang="en-US" altLang="zh-CN" sz="1400" dirty="0">
                   <a:latin typeface="DengXian" panose="02010600030101010101" pitchFamily="2" charset="-122"/>
                   <a:ea typeface="DengXian" panose="02010600030101010101" pitchFamily="2" charset="-122"/>
                 </a:rPr>
@@ -36642,8 +36715,8 @@
           </p:nvSpPr>
           <p:spPr>
             <a:xfrm>
-              <a:off x="7143851" y="5011618"/>
-              <a:ext cx="1456252" cy="516578"/>
+              <a:off x="7143850" y="4958095"/>
+              <a:ext cx="1900973" cy="733489"/>
             </a:xfrm>
             <a:prstGeom prst="rect">
               <a:avLst/>
@@ -36692,6 +36765,19 @@
                 </a:rPr>
                 <a:t>RESULT</a:t>
               </a:r>
+            </a:p>
+            <a:p>
+              <a:pPr algn="ctr"/>
+              <a:r>
+                <a:rPr kumimoji="1" lang="en-US" altLang="zh-CN" sz="1200" b="1" dirty="0">
+                  <a:solidFill>
+                    <a:sysClr val="windowText" lastClr="000000"/>
+                  </a:solidFill>
+                  <a:latin typeface="DengXian" panose="02010600030101010101" pitchFamily="2" charset="-122"/>
+                  <a:ea typeface="DengXian" panose="02010600030101010101" pitchFamily="2" charset="-122"/>
+                </a:rPr>
+                <a:t>ratio2</a:t>
+              </a:r>
               <a:r>
                 <a:rPr kumimoji="1" lang="zh-CN" altLang="en-US" sz="1200" b="1" dirty="0">
                   <a:solidFill>
@@ -36710,7 +36796,87 @@
                   <a:latin typeface="DengXian" panose="02010600030101010101" pitchFamily="2" charset="-122"/>
                   <a:ea typeface="DengXian" panose="02010600030101010101" pitchFamily="2" charset="-122"/>
                 </a:rPr>
-                <a:t>ratio2</a:t>
+                <a:t>=</a:t>
+              </a:r>
+              <a:r>
+                <a:rPr kumimoji="1" lang="zh-CN" altLang="en-US" sz="1200" b="1" dirty="0">
+                  <a:solidFill>
+                    <a:sysClr val="windowText" lastClr="000000"/>
+                  </a:solidFill>
+                  <a:latin typeface="DengXian" panose="02010600030101010101" pitchFamily="2" charset="-122"/>
+                  <a:ea typeface="DengXian" panose="02010600030101010101" pitchFamily="2" charset="-122"/>
+                </a:rPr>
+                <a:t> </a:t>
+              </a:r>
+              <a:r>
+                <a:rPr kumimoji="1" lang="en-US" altLang="zh-CN" sz="1200" b="1" dirty="0">
+                  <a:solidFill>
+                    <a:sysClr val="windowText" lastClr="000000"/>
+                  </a:solidFill>
+                  <a:latin typeface="DengXian" panose="02010600030101010101" pitchFamily="2" charset="-122"/>
+                  <a:ea typeface="DengXian" panose="02010600030101010101" pitchFamily="2" charset="-122"/>
+                </a:rPr>
+                <a:t>edge2.amount</a:t>
+              </a:r>
+              <a:r>
+                <a:rPr kumimoji="1" lang="zh-CN" altLang="en-US" sz="1200" b="1" dirty="0">
+                  <a:solidFill>
+                    <a:sysClr val="windowText" lastClr="000000"/>
+                  </a:solidFill>
+                  <a:latin typeface="DengXian" panose="02010600030101010101" pitchFamily="2" charset="-122"/>
+                  <a:ea typeface="DengXian" panose="02010600030101010101" pitchFamily="2" charset="-122"/>
+                </a:rPr>
+                <a:t> </a:t>
+              </a:r>
+              <a:r>
+                <a:rPr kumimoji="1" lang="en-US" altLang="zh-CN" sz="1200" b="1" dirty="0">
+                  <a:solidFill>
+                    <a:sysClr val="windowText" lastClr="000000"/>
+                  </a:solidFill>
+                  <a:latin typeface="DengXian" panose="02010600030101010101" pitchFamily="2" charset="-122"/>
+                  <a:ea typeface="DengXian" panose="02010600030101010101" pitchFamily="2" charset="-122"/>
+                </a:rPr>
+                <a:t>/</a:t>
+              </a:r>
+              <a:r>
+                <a:rPr kumimoji="1" lang="zh-CN" altLang="en-US" sz="1200" b="1" dirty="0">
+                  <a:solidFill>
+                    <a:sysClr val="windowText" lastClr="000000"/>
+                  </a:solidFill>
+                  <a:latin typeface="DengXian" panose="02010600030101010101" pitchFamily="2" charset="-122"/>
+                  <a:ea typeface="DengXian" panose="02010600030101010101" pitchFamily="2" charset="-122"/>
+                </a:rPr>
+                <a:t> </a:t>
+              </a:r>
+              <a:r>
+                <a:rPr kumimoji="1" lang="en-US" altLang="zh-CN" sz="1200" b="1" dirty="0">
+                  <a:solidFill>
+                    <a:sysClr val="windowText" lastClr="000000"/>
+                  </a:solidFill>
+                  <a:latin typeface="DengXian" panose="02010600030101010101" pitchFamily="2" charset="-122"/>
+                  <a:ea typeface="DengXian" panose="02010600030101010101" pitchFamily="2" charset="-122"/>
+                </a:rPr>
+                <a:t>SUM(upstream</a:t>
+              </a:r>
+              <a:r>
+                <a:rPr kumimoji="1" lang="zh-CN" altLang="en-US" sz="1200" b="1" dirty="0">
+                  <a:solidFill>
+                    <a:sysClr val="windowText" lastClr="000000"/>
+                  </a:solidFill>
+                  <a:latin typeface="DengXian" panose="02010600030101010101" pitchFamily="2" charset="-122"/>
+                  <a:ea typeface="DengXian" panose="02010600030101010101" pitchFamily="2" charset="-122"/>
+                </a:rPr>
+                <a:t> </a:t>
+              </a:r>
+              <a:r>
+                <a:rPr kumimoji="1" lang="en-US" altLang="zh-CN" sz="1200" b="1" dirty="0">
+                  <a:solidFill>
+                    <a:sysClr val="windowText" lastClr="000000"/>
+                  </a:solidFill>
+                  <a:latin typeface="DengXian" panose="02010600030101010101" pitchFamily="2" charset="-122"/>
+                  <a:ea typeface="DengXian" panose="02010600030101010101" pitchFamily="2" charset="-122"/>
+                </a:rPr>
+                <a:t>edge1)</a:t>
               </a:r>
               <a:endParaRPr kumimoji="1" lang="en-US" altLang="zh-CN" sz="1200" dirty="0">
                 <a:solidFill>

</xml_diff>

<commit_message>
Fix the typo errors in #41 (#42)
</commit_message>
<xml_diff>
--- a/patterns/transaction-complex-read.pptx
+++ b/patterns/transaction-complex-read.pptx
@@ -211,7 +211,7 @@
           <a:p>
             <a:fld id="{CAD4BD24-A097-4F9D-85E9-6A2A24CA2D98}" type="datetimeFigureOut">
               <a:rPr lang="zh-CN" altLang="en-US" smtClean="0"/>
-              <a:t>2022/11/20</a:t>
+              <a:t>2023/1/2</a:t>
             </a:fld>
             <a:endParaRPr lang="zh-CN" altLang="en-US"/>
           </a:p>
@@ -32947,7 +32947,7 @@
                   <a:latin typeface="DengXian" panose="02010600030101010101" pitchFamily="2" charset="-122"/>
                   <a:ea typeface="DengXian" panose="02010600030101010101" pitchFamily="2" charset="-122"/>
                 </a:rPr>
-                <a:t>SUM(edge3.amount)/SUM(edge4.amount),</a:t>
+                <a:t>SUM(edge1.amount)/SUM(edge2.amount),</a:t>
               </a:r>
             </a:p>
             <a:p>
@@ -32960,7 +32960,7 @@
                   <a:latin typeface="DengXian" panose="02010600030101010101" pitchFamily="2" charset="-122"/>
                   <a:ea typeface="DengXian" panose="02010600030101010101" pitchFamily="2" charset="-122"/>
                 </a:rPr>
-                <a:t>SUM(edge1 .amount)/SUM(edge2 .amount),</a:t>
+                <a:t>SUM(edge1.amount)/SUM(edge4.amount),</a:t>
               </a:r>
             </a:p>
             <a:p>
@@ -32973,45 +32973,8 @@
                   <a:latin typeface="DengXian" panose="02010600030101010101" pitchFamily="2" charset="-122"/>
                   <a:ea typeface="DengXian" panose="02010600030101010101" pitchFamily="2" charset="-122"/>
                 </a:rPr>
-                <a:t>SUM</a:t>
-              </a:r>
-              <a:r>
-                <a:rPr kumimoji="1" lang="en-US" altLang="zh-CN" sz="1200">
-                  <a:solidFill>
-                    <a:schemeClr val="tx1"/>
-                  </a:solidFill>
-                  <a:latin typeface="DengXian" panose="02010600030101010101" pitchFamily="2" charset="-122"/>
-                  <a:ea typeface="DengXian" panose="02010600030101010101" pitchFamily="2" charset="-122"/>
-                </a:rPr>
-                <a:t>(edge1 .amount)/</a:t>
-              </a:r>
-              <a:r>
-                <a:rPr kumimoji="1" lang="en-US" altLang="zh-CN" sz="1200" dirty="0">
-                  <a:solidFill>
-                    <a:schemeClr val="tx1"/>
-                  </a:solidFill>
-                  <a:latin typeface="DengXian" panose="02010600030101010101" pitchFamily="2" charset="-122"/>
-                  <a:ea typeface="DengXian" panose="02010600030101010101" pitchFamily="2" charset="-122"/>
-                </a:rPr>
-                <a:t>SUM</a:t>
-              </a:r>
-              <a:r>
-                <a:rPr kumimoji="1" lang="en-US" altLang="zh-CN" sz="1200">
-                  <a:solidFill>
-                    <a:schemeClr val="tx1"/>
-                  </a:solidFill>
-                  <a:latin typeface="DengXian" panose="02010600030101010101" pitchFamily="2" charset="-122"/>
-                  <a:ea typeface="DengXian" panose="02010600030101010101" pitchFamily="2" charset="-122"/>
-                </a:rPr>
-                <a:t>(edge4 .amount)</a:t>
-              </a:r>
-              <a:endParaRPr kumimoji="1" lang="en-US" altLang="zh-CN" sz="1200" dirty="0">
-                <a:solidFill>
-                  <a:schemeClr val="tx1"/>
-                </a:solidFill>
-                <a:latin typeface="DengXian" panose="02010600030101010101" pitchFamily="2" charset="-122"/>
-                <a:ea typeface="DengXian" panose="02010600030101010101" pitchFamily="2" charset="-122"/>
-              </a:endParaRPr>
+                <a:t>SUM(edge3.amount)/SUM(edge4.amount)</a:t>
+              </a:r>
             </a:p>
           </p:txBody>
         </p:sp>

</xml_diff>

<commit_message>
fix #46: renaming in Camel-Case
</commit_message>
<xml_diff>
--- a/patterns/transaction-complex-read.pptx
+++ b/patterns/transaction-complex-read.pptx
@@ -211,7 +211,7 @@
           <a:p>
             <a:fld id="{CAD4BD24-A097-4F9D-85E9-6A2A24CA2D98}" type="datetimeFigureOut">
               <a:rPr lang="zh-CN" altLang="en-US" smtClean="0"/>
-              <a:t>2023/1/2</a:t>
+              <a:t>2023/1/12</a:t>
             </a:fld>
             <a:endParaRPr lang="zh-CN" altLang="en-US"/>
           </a:p>
@@ -27332,8 +27332,8 @@
           </p:nvSpPr>
           <p:spPr>
             <a:xfrm>
-              <a:off x="6327086" y="1268150"/>
-              <a:ext cx="2453498" cy="954107"/>
+              <a:off x="6096000" y="1268150"/>
+              <a:ext cx="2684584" cy="954107"/>
             </a:xfrm>
             <a:prstGeom prst="rect">
               <a:avLst/>
@@ -27351,7 +27351,7 @@
                   <a:latin typeface="DengXian" panose="02010600030101010101" pitchFamily="2" charset="-122"/>
                   <a:ea typeface="DengXian" panose="02010600030101010101" pitchFamily="2" charset="-122"/>
                 </a:rPr>
-                <a:t>e2</a:t>
+                <a:t>edge2</a:t>
               </a:r>
               <a:r>
                 <a:rPr kumimoji="1" lang="zh-CN" altLang="en-US" sz="1400" b="1" dirty="0">
@@ -27402,7 +27402,7 @@
                   <a:latin typeface="DengXian" panose="02010600030101010101" pitchFamily="2" charset="-122"/>
                   <a:ea typeface="DengXian" panose="02010600030101010101" pitchFamily="2" charset="-122"/>
                 </a:rPr>
-                <a:t>e2</a:t>
+                <a:t>edge2</a:t>
               </a:r>
               <a:r>
                 <a:rPr kumimoji="1" lang="en-US" altLang="zh-CN" sz="1400" dirty="0">
@@ -27460,7 +27460,7 @@
                   <a:latin typeface="DengXian" panose="02010600030101010101" pitchFamily="2" charset="-122"/>
                   <a:ea typeface="DengXian" panose="02010600030101010101" pitchFamily="2" charset="-122"/>
                 </a:rPr>
-                <a:t>e2</a:t>
+                <a:t>edge2</a:t>
               </a:r>
               <a:r>
                 <a:rPr kumimoji="1" lang="en-US" altLang="zh-CN" sz="1400" dirty="0">
@@ -27518,7 +27518,7 @@
                   <a:latin typeface="DengXian" panose="02010600030101010101" pitchFamily="2" charset="-122"/>
                   <a:ea typeface="DengXian" panose="02010600030101010101" pitchFamily="2" charset="-122"/>
                 </a:rPr>
-                <a:t>e2</a:t>
+                <a:t>edge2</a:t>
               </a:r>
               <a:r>
                 <a:rPr kumimoji="1" lang="en-US" altLang="zh-CN" sz="1400" dirty="0">
@@ -28554,8 +28554,8 @@
           </p:nvSpPr>
           <p:spPr>
             <a:xfrm>
-              <a:off x="3532723" y="1270166"/>
-              <a:ext cx="2606915" cy="954107"/>
+              <a:off x="3411417" y="1270166"/>
+              <a:ext cx="2728221" cy="954107"/>
             </a:xfrm>
             <a:prstGeom prst="rect">
               <a:avLst/>
@@ -28573,7 +28573,7 @@
                   <a:latin typeface="DengXian" panose="02010600030101010101" pitchFamily="2" charset="-122"/>
                   <a:ea typeface="DengXian" panose="02010600030101010101" pitchFamily="2" charset="-122"/>
                 </a:rPr>
-                <a:t>e1</a:t>
+                <a:t>edge1</a:t>
               </a:r>
               <a:r>
                 <a:rPr kumimoji="1" lang="zh-CN" altLang="en-US" sz="1400" b="1" dirty="0">
@@ -28624,7 +28624,7 @@
                   <a:latin typeface="DengXian" panose="02010600030101010101" pitchFamily="2" charset="-122"/>
                   <a:ea typeface="DengXian" panose="02010600030101010101" pitchFamily="2" charset="-122"/>
                 </a:rPr>
-                <a:t>e1</a:t>
+                <a:t>edge1</a:t>
               </a:r>
               <a:r>
                 <a:rPr kumimoji="1" lang="en-US" altLang="zh-CN" sz="1400" dirty="0">
@@ -28682,7 +28682,7 @@
                   <a:latin typeface="DengXian" panose="02010600030101010101" pitchFamily="2" charset="-122"/>
                   <a:ea typeface="DengXian" panose="02010600030101010101" pitchFamily="2" charset="-122"/>
                 </a:rPr>
-                <a:t>e1</a:t>
+                <a:t>edge1</a:t>
               </a:r>
               <a:r>
                 <a:rPr kumimoji="1" lang="en-US" altLang="zh-CN" sz="1400" dirty="0">
@@ -28740,7 +28740,7 @@
                   <a:latin typeface="DengXian" panose="02010600030101010101" pitchFamily="2" charset="-122"/>
                   <a:ea typeface="DengXian" panose="02010600030101010101" pitchFamily="2" charset="-122"/>
                 </a:rPr>
-                <a:t>e1</a:t>
+                <a:t>edge1</a:t>
               </a:r>
               <a:r>
                 <a:rPr kumimoji="1" lang="en-US" altLang="zh-CN" sz="1400" dirty="0">
@@ -28936,7 +28936,7 @@
                   <a:latin typeface="DengXian" panose="02010600030101010101" pitchFamily="2" charset="-122"/>
                   <a:ea typeface="DengXian" panose="02010600030101010101" pitchFamily="2" charset="-122"/>
                 </a:rPr>
-                <a:t>SUM(e1.amount)/SUM(e2.amount)</a:t>
+                <a:t>SUM(edge1.amount)/SUM(edge2.amount)</a:t>
               </a:r>
             </a:p>
           </p:txBody>
@@ -29080,7 +29080,7 @@
           <p:spPr>
             <a:xfrm>
               <a:off x="3808167" y="3100103"/>
-              <a:ext cx="658669" cy="505147"/>
+              <a:ext cx="809100" cy="505147"/>
             </a:xfrm>
             <a:prstGeom prst="rect">
               <a:avLst/>
@@ -29117,7 +29117,7 @@
                     <a:sysClr val="windowText" lastClr="000000"/>
                   </a:solidFill>
                 </a:rPr>
-                <a:t>e1</a:t>
+                <a:t>edge1</a:t>
               </a:r>
               <a:endParaRPr kumimoji="1" lang="zh-CN" altLang="en-US" sz="1400" dirty="0">
                 <a:solidFill>
@@ -29142,7 +29142,7 @@
           <p:spPr>
             <a:xfrm>
               <a:off x="7752392" y="3100103"/>
-              <a:ext cx="658669" cy="505147"/>
+              <a:ext cx="812403" cy="505147"/>
             </a:xfrm>
             <a:prstGeom prst="rect">
               <a:avLst/>
@@ -29179,7 +29179,7 @@
                     <a:sysClr val="windowText" lastClr="000000"/>
                   </a:solidFill>
                 </a:rPr>
-                <a:t>e2</a:t>
+                <a:t>edge2</a:t>
               </a:r>
               <a:endParaRPr kumimoji="1" lang="zh-CN" altLang="en-US" sz="1400" dirty="0">
                 <a:solidFill>

</xml_diff>

<commit_message>
fix part of #53 with some TBDs
</commit_message>
<xml_diff>
--- a/patterns/transaction-complex-read.pptx
+++ b/patterns/transaction-complex-read.pptx
@@ -211,7 +211,7 @@
           <a:p>
             <a:fld id="{CAD4BD24-A097-4F9D-85E9-6A2A24CA2D98}" type="datetimeFigureOut">
               <a:rPr lang="zh-CN" altLang="en-US" smtClean="0"/>
-              <a:t>2023/1/12</a:t>
+              <a:t>2023/2/23</a:t>
             </a:fld>
             <a:endParaRPr lang="zh-CN" altLang="en-US"/>
           </a:p>
@@ -3164,46 +3164,6 @@
                   <a:ea typeface="DengXian" panose="02010600030101010101" pitchFamily="2" charset="-122"/>
                 </a:rPr>
                 <a:t>RESULT</a:t>
-              </a:r>
-            </a:p>
-            <a:p>
-              <a:r>
-                <a:rPr kumimoji="1" lang="en-US" altLang="zh-CN" sz="1200" dirty="0">
-                  <a:solidFill>
-                    <a:sysClr val="windowText" lastClr="000000"/>
-                  </a:solidFill>
-                  <a:latin typeface="DengXian" panose="02010600030101010101" pitchFamily="2" charset="-122"/>
-                  <a:ea typeface="DengXian" panose="02010600030101010101" pitchFamily="2" charset="-122"/>
-                </a:rPr>
-                <a:t>COUNT(DISTINCT</a:t>
-              </a:r>
-              <a:r>
-                <a:rPr kumimoji="1" lang="zh-CN" altLang="en-US" sz="1200" dirty="0">
-                  <a:solidFill>
-                    <a:sysClr val="windowText" lastClr="000000"/>
-                  </a:solidFill>
-                  <a:latin typeface="DengXian" panose="02010600030101010101" pitchFamily="2" charset="-122"/>
-                  <a:ea typeface="DengXian" panose="02010600030101010101" pitchFamily="2" charset="-122"/>
-                </a:rPr>
-                <a:t> </a:t>
-              </a:r>
-              <a:r>
-                <a:rPr kumimoji="1" lang="en-US" altLang="zh-CN" sz="1200" b="1" dirty="0">
-                  <a:solidFill>
-                    <a:sysClr val="windowText" lastClr="000000"/>
-                  </a:solidFill>
-                </a:rPr>
-                <a:t>medium</a:t>
-              </a:r>
-              <a:r>
-                <a:rPr kumimoji="1" lang="en-US" altLang="zh-CN" sz="1200" dirty="0">
-                  <a:solidFill>
-                    <a:sysClr val="windowText" lastClr="000000"/>
-                  </a:solidFill>
-                  <a:latin typeface="DengXian" panose="02010600030101010101" pitchFamily="2" charset="-122"/>
-                  <a:ea typeface="DengXian" panose="02010600030101010101" pitchFamily="2" charset="-122"/>
-                </a:rPr>
-                <a:t>),</a:t>
               </a:r>
             </a:p>
             <a:p>

</xml_diff>

<commit_message>
fix gurantee typo error and accounts type error in diagrams
</commit_message>
<xml_diff>
--- a/patterns/transaction-complex-read.pptx
+++ b/patterns/transaction-complex-read.pptx
@@ -211,7 +211,7 @@
           <a:p>
             <a:fld id="{CAD4BD24-A097-4F9D-85E9-6A2A24CA2D98}" type="datetimeFigureOut">
               <a:rPr lang="zh-CN" altLang="en-US" smtClean="0"/>
-              <a:t>2023/3/1</a:t>
+              <a:t>2023/4/27</a:t>
             </a:fld>
             <a:endParaRPr lang="zh-CN" altLang="en-US"/>
           </a:p>
@@ -2638,7 +2638,7 @@
                   <a:latin typeface="DengXian" panose="02010600030101010101" pitchFamily="2" charset="-122"/>
                   <a:ea typeface="DengXian" panose="02010600030101010101" pitchFamily="2" charset="-122"/>
                 </a:rPr>
-                <a:t>start_time</a:t>
+                <a:t>startTime</a:t>
               </a:r>
               <a:r>
                 <a:rPr kumimoji="1" lang="en-US" altLang="zh-CN" sz="1200" dirty="0">
@@ -2697,7 +2697,7 @@
                   <a:latin typeface="DengXian" panose="02010600030101010101" pitchFamily="2" charset="-122"/>
                   <a:ea typeface="DengXian" panose="02010600030101010101" pitchFamily="2" charset="-122"/>
                 </a:rPr>
-                <a:t>end_time</a:t>
+                <a:t>endTime</a:t>
               </a:r>
               <a:r>
                 <a:rPr kumimoji="1" lang="en-US" altLang="zh-CN" sz="1200" dirty="0">
@@ -2841,7 +2841,7 @@
                   <a:latin typeface="DengXian" panose="02010600030101010101" pitchFamily="2" charset="-122"/>
                   <a:ea typeface="DengXian" panose="02010600030101010101" pitchFamily="2" charset="-122"/>
                 </a:rPr>
-                <a:t>start_time</a:t>
+                <a:t>startTime</a:t>
               </a:r>
               <a:r>
                 <a:rPr kumimoji="1" lang="en-US" altLang="zh-CN" sz="1200" dirty="0">
@@ -2900,7 +2900,7 @@
                   <a:latin typeface="DengXian" panose="02010600030101010101" pitchFamily="2" charset="-122"/>
                   <a:ea typeface="DengXian" panose="02010600030101010101" pitchFamily="2" charset="-122"/>
                 </a:rPr>
-                <a:t>end_time</a:t>
+                <a:t>endTime</a:t>
               </a:r>
               <a:r>
                 <a:rPr kumimoji="1" lang="en-US" altLang="zh-CN" sz="1200" dirty="0">
@@ -6430,7 +6430,7 @@
                   <a:latin typeface="DengXian" panose="02010600030101010101" pitchFamily="2" charset="-122"/>
                   <a:ea typeface="DengXian" panose="02010600030101010101" pitchFamily="2" charset="-122"/>
                 </a:rPr>
-                <a:t>start_time</a:t>
+                <a:t>startTime</a:t>
               </a:r>
               <a:r>
                 <a:rPr kumimoji="1" lang="en-US" altLang="zh-CN" sz="1200" dirty="0">
@@ -6488,7 +6488,7 @@
                   <a:latin typeface="DengXian" panose="02010600030101010101" pitchFamily="2" charset="-122"/>
                   <a:ea typeface="DengXian" panose="02010600030101010101" pitchFamily="2" charset="-122"/>
                 </a:rPr>
-                <a:t>end_time</a:t>
+                <a:t>endTime</a:t>
               </a:r>
               <a:r>
                 <a:rPr kumimoji="1" lang="en-US" altLang="zh-CN" sz="1200" dirty="0">
@@ -6575,7 +6575,7 @@
                   <a:latin typeface="DengXian" panose="02010600030101010101" pitchFamily="2" charset="-122"/>
                   <a:ea typeface="DengXian" panose="02010600030101010101" pitchFamily="2" charset="-122"/>
                 </a:rPr>
-                <a:t>start_time</a:t>
+                <a:t>startTime</a:t>
               </a:r>
               <a:r>
                 <a:rPr kumimoji="1" lang="en-US" altLang="zh-CN" sz="1200" dirty="0">
@@ -6633,7 +6633,7 @@
                   <a:latin typeface="DengXian" panose="02010600030101010101" pitchFamily="2" charset="-122"/>
                   <a:ea typeface="DengXian" panose="02010600030101010101" pitchFamily="2" charset="-122"/>
                 </a:rPr>
-                <a:t>end_time</a:t>
+                <a:t>endTime</a:t>
               </a:r>
               <a:r>
                 <a:rPr kumimoji="1" lang="en-US" altLang="zh-CN" sz="1200" dirty="0">
@@ -9330,10 +9330,10 @@
       </p:grpSpPr>
       <p:grpSp>
         <p:nvGrpSpPr>
-          <p:cNvPr id="17" name="Group 16">
+          <p:cNvPr id="24" name="Group 23">
             <a:extLst>
               <a:ext uri="{FF2B5EF4-FFF2-40B4-BE49-F238E27FC236}">
-                <a16:creationId xmlns:a16="http://schemas.microsoft.com/office/drawing/2014/main" id="{0883B488-BAF6-8FF0-196C-6B326EDD5D7E}"/>
+                <a16:creationId xmlns:a16="http://schemas.microsoft.com/office/drawing/2014/main" id="{FF91DE77-D9F7-9D73-DEE2-738AEBDCC70F}"/>
               </a:ext>
             </a:extLst>
           </p:cNvPr>
@@ -9342,10 +9342,10 @@
         </p:nvGrpSpPr>
         <p:grpSpPr>
           <a:xfrm>
-            <a:off x="1992999" y="2447434"/>
-            <a:ext cx="8206001" cy="2943767"/>
-            <a:chOff x="1992999" y="2447434"/>
-            <a:chExt cx="8206001" cy="2943767"/>
+            <a:off x="1921279" y="2447434"/>
+            <a:ext cx="8277721" cy="2943767"/>
+            <a:chOff x="1921279" y="2447434"/>
+            <a:chExt cx="8277721" cy="2943767"/>
           </a:xfrm>
         </p:grpSpPr>
         <p:sp>
@@ -9362,7 +9362,7 @@
           </p:nvSpPr>
           <p:spPr>
             <a:xfrm>
-              <a:off x="1992999" y="3880994"/>
+              <a:off x="1921279" y="3880994"/>
               <a:ext cx="1428081" cy="505147"/>
             </a:xfrm>
             <a:prstGeom prst="rect">
@@ -9467,8 +9467,8 @@
           </p:nvCxnSpPr>
           <p:spPr>
             <a:xfrm>
-              <a:off x="3421080" y="4133568"/>
-              <a:ext cx="735170" cy="0"/>
+              <a:off x="3349360" y="4133568"/>
+              <a:ext cx="806890" cy="0"/>
             </a:xfrm>
             <a:prstGeom prst="straightConnector1">
               <a:avLst/>
@@ -9775,8 +9775,8 @@
           </p:nvSpPr>
           <p:spPr>
             <a:xfrm>
-              <a:off x="6319500" y="3880994"/>
-              <a:ext cx="1428080" cy="505147"/>
+              <a:off x="6444776" y="3880994"/>
+              <a:ext cx="1167443" cy="505147"/>
             </a:xfrm>
             <a:prstGeom prst="rect">
               <a:avLst/>
@@ -9943,7 +9943,7 @@
           <p:spPr>
             <a:xfrm>
               <a:off x="5584330" y="4133568"/>
-              <a:ext cx="735170" cy="0"/>
+              <a:ext cx="860446" cy="0"/>
             </a:xfrm>
             <a:prstGeom prst="straightConnector1">
               <a:avLst/>
@@ -9989,8 +9989,8 @@
           </p:nvCxnSpPr>
           <p:spPr>
             <a:xfrm>
-              <a:off x="7747580" y="4133568"/>
-              <a:ext cx="735170" cy="0"/>
+              <a:off x="7612219" y="4133568"/>
+              <a:ext cx="870531" cy="0"/>
             </a:xfrm>
             <a:prstGeom prst="straightConnector1">
               <a:avLst/>
@@ -10032,8 +10032,8 @@
           </p:nvSpPr>
           <p:spPr>
             <a:xfrm>
-              <a:off x="3388984" y="4133567"/>
-              <a:ext cx="799362" cy="276999"/>
+              <a:off x="3313734" y="4133567"/>
+              <a:ext cx="892542" cy="276999"/>
             </a:xfrm>
             <a:prstGeom prst="rect">
               <a:avLst/>
@@ -10048,16 +10048,12 @@
             <a:p>
               <a:pPr algn="ctr"/>
               <a:r>
-                <a:rPr kumimoji="1" lang="en-US" altLang="zh-CN" sz="1200" dirty="0" err="1">
-                  <a:latin typeface="DengXian" panose="02010600030101010101" pitchFamily="2" charset="-122"/>
-                  <a:ea typeface="DengXian" panose="02010600030101010101" pitchFamily="2" charset="-122"/>
-                </a:rPr>
-                <a:t>gurantee</a:t>
-              </a:r>
-              <a:endParaRPr kumimoji="1" lang="en-US" altLang="zh-CN" sz="1200" dirty="0">
-                <a:latin typeface="DengXian" panose="02010600030101010101" pitchFamily="2" charset="-122"/>
-                <a:ea typeface="DengXian" panose="02010600030101010101" pitchFamily="2" charset="-122"/>
-              </a:endParaRPr>
+                <a:rPr kumimoji="1" lang="en-US" altLang="zh-CN" sz="1200" dirty="0">
+                  <a:latin typeface="DengXian" panose="02010600030101010101" pitchFamily="2" charset="-122"/>
+                  <a:ea typeface="DengXian" panose="02010600030101010101" pitchFamily="2" charset="-122"/>
+                </a:rPr>
+                <a:t>guarantee</a:t>
+              </a:r>
             </a:p>
           </p:txBody>
         </p:sp>
@@ -10457,8 +10453,8 @@
           </p:nvSpPr>
           <p:spPr>
             <a:xfrm>
-              <a:off x="5552234" y="4133566"/>
-              <a:ext cx="799362" cy="276999"/>
+              <a:off x="5552233" y="4133566"/>
+              <a:ext cx="902627" cy="276999"/>
             </a:xfrm>
             <a:prstGeom prst="rect">
               <a:avLst/>
@@ -10473,16 +10469,12 @@
             <a:p>
               <a:pPr algn="ctr"/>
               <a:r>
-                <a:rPr kumimoji="1" lang="en-US" altLang="zh-CN" sz="1200" dirty="0" err="1">
-                  <a:latin typeface="DengXian" panose="02010600030101010101" pitchFamily="2" charset="-122"/>
-                  <a:ea typeface="DengXian" panose="02010600030101010101" pitchFamily="2" charset="-122"/>
-                </a:rPr>
-                <a:t>gurantee</a:t>
-              </a:r>
-              <a:endParaRPr kumimoji="1" lang="en-US" altLang="zh-CN" sz="1200" dirty="0">
-                <a:latin typeface="DengXian" panose="02010600030101010101" pitchFamily="2" charset="-122"/>
-                <a:ea typeface="DengXian" panose="02010600030101010101" pitchFamily="2" charset="-122"/>
-              </a:endParaRPr>
+                <a:rPr kumimoji="1" lang="en-US" altLang="zh-CN" sz="1200" dirty="0">
+                  <a:latin typeface="DengXian" panose="02010600030101010101" pitchFamily="2" charset="-122"/>
+                  <a:ea typeface="DengXian" panose="02010600030101010101" pitchFamily="2" charset="-122"/>
+                </a:rPr>
+                <a:t>guarantee</a:t>
+              </a:r>
             </a:p>
           </p:txBody>
         </p:sp>
@@ -10500,8 +10492,8 @@
           </p:nvSpPr>
           <p:spPr>
             <a:xfrm>
-              <a:off x="7717519" y="4131131"/>
-              <a:ext cx="799362" cy="276999"/>
+              <a:off x="7612219" y="4131131"/>
+              <a:ext cx="904662" cy="276999"/>
             </a:xfrm>
             <a:prstGeom prst="rect">
               <a:avLst/>
@@ -10516,16 +10508,12 @@
             <a:p>
               <a:pPr algn="ctr"/>
               <a:r>
-                <a:rPr kumimoji="1" lang="en-US" altLang="zh-CN" sz="1200" dirty="0" err="1">
-                  <a:latin typeface="DengXian" panose="02010600030101010101" pitchFamily="2" charset="-122"/>
-                  <a:ea typeface="DengXian" panose="02010600030101010101" pitchFamily="2" charset="-122"/>
-                </a:rPr>
-                <a:t>gurantee</a:t>
-              </a:r>
-              <a:endParaRPr kumimoji="1" lang="en-US" altLang="zh-CN" sz="1200" dirty="0">
-                <a:latin typeface="DengXian" panose="02010600030101010101" pitchFamily="2" charset="-122"/>
-                <a:ea typeface="DengXian" panose="02010600030101010101" pitchFamily="2" charset="-122"/>
-              </a:endParaRPr>
+                <a:rPr kumimoji="1" lang="en-US" altLang="zh-CN" sz="1200" dirty="0">
+                  <a:latin typeface="DengXian" panose="02010600030101010101" pitchFamily="2" charset="-122"/>
+                  <a:ea typeface="DengXian" panose="02010600030101010101" pitchFamily="2" charset="-122"/>
+                </a:rPr>
+                <a:t>guarantee</a:t>
+              </a:r>
             </a:p>
           </p:txBody>
         </p:sp>
@@ -10543,7 +10531,7 @@
           </p:nvSpPr>
           <p:spPr>
             <a:xfrm>
-              <a:off x="1992999" y="4390024"/>
+              <a:off x="1921279" y="4390024"/>
               <a:ext cx="1428081" cy="338392"/>
             </a:xfrm>
             <a:prstGeom prst="rect">
@@ -10690,16 +10678,12 @@
                 <a:t> </a:t>
               </a:r>
               <a:r>
-                <a:rPr kumimoji="1" lang="en-US" altLang="zh-CN" sz="1200" dirty="0" err="1">
-                  <a:latin typeface="DengXian" panose="02010600030101010101" pitchFamily="2" charset="-122"/>
-                  <a:ea typeface="DengXian" panose="02010600030101010101" pitchFamily="2" charset="-122"/>
-                </a:rPr>
-                <a:t>gurantee</a:t>
-              </a:r>
-              <a:endParaRPr kumimoji="1" lang="en-US" altLang="zh-CN" sz="1200" dirty="0">
-                <a:latin typeface="DengXian" panose="02010600030101010101" pitchFamily="2" charset="-122"/>
-                <a:ea typeface="DengXian" panose="02010600030101010101" pitchFamily="2" charset="-122"/>
-              </a:endParaRPr>
+                <a:rPr kumimoji="1" lang="en-US" altLang="zh-CN" sz="1200" dirty="0">
+                  <a:latin typeface="DengXian" panose="02010600030101010101" pitchFamily="2" charset="-122"/>
+                  <a:ea typeface="DengXian" panose="02010600030101010101" pitchFamily="2" charset="-122"/>
+                </a:rPr>
+                <a:t>guarantee</a:t>
+              </a:r>
             </a:p>
             <a:p>
               <a:r>
@@ -10749,7 +10733,7 @@
                   <a:latin typeface="DengXian" panose="02010600030101010101" pitchFamily="2" charset="-122"/>
                   <a:ea typeface="DengXian" panose="02010600030101010101" pitchFamily="2" charset="-122"/>
                 </a:rPr>
-                <a:t>start_time</a:t>
+                <a:t>startTime</a:t>
               </a:r>
               <a:r>
                 <a:rPr kumimoji="1" lang="en-US" altLang="zh-CN" sz="1200" dirty="0">
@@ -10807,7 +10791,7 @@
                   <a:latin typeface="DengXian" panose="02010600030101010101" pitchFamily="2" charset="-122"/>
                   <a:ea typeface="DengXian" panose="02010600030101010101" pitchFamily="2" charset="-122"/>
                 </a:rPr>
-                <a:t>end_time</a:t>
+                <a:t>endTime</a:t>
               </a:r>
               <a:r>
                 <a:rPr kumimoji="1" lang="en-US" altLang="zh-CN" sz="1200" dirty="0">
@@ -10844,16 +10828,12 @@
                 <a:t> </a:t>
               </a:r>
               <a:r>
-                <a:rPr kumimoji="1" lang="en-US" altLang="zh-CN" sz="1200" dirty="0" err="1">
-                  <a:latin typeface="DengXian" panose="02010600030101010101" pitchFamily="2" charset="-122"/>
-                  <a:ea typeface="DengXian" panose="02010600030101010101" pitchFamily="2" charset="-122"/>
-                </a:rPr>
-                <a:t>gurantee</a:t>
-              </a:r>
-              <a:endParaRPr kumimoji="1" lang="en-US" altLang="zh-CN" sz="1200" dirty="0">
-                <a:latin typeface="DengXian" panose="02010600030101010101" pitchFamily="2" charset="-122"/>
-                <a:ea typeface="DengXian" panose="02010600030101010101" pitchFamily="2" charset="-122"/>
-              </a:endParaRPr>
+                <a:rPr kumimoji="1" lang="en-US" altLang="zh-CN" sz="1200" dirty="0">
+                  <a:latin typeface="DengXian" panose="02010600030101010101" pitchFamily="2" charset="-122"/>
+                  <a:ea typeface="DengXian" panose="02010600030101010101" pitchFamily="2" charset="-122"/>
+                </a:rPr>
+                <a:t>guarantee</a:t>
+              </a:r>
             </a:p>
             <a:p>
               <a:r>
@@ -10903,7 +10883,7 @@
                   <a:latin typeface="DengXian" panose="02010600030101010101" pitchFamily="2" charset="-122"/>
                   <a:ea typeface="DengXian" panose="02010600030101010101" pitchFamily="2" charset="-122"/>
                 </a:rPr>
-                <a:t>start_time</a:t>
+                <a:t>startTime</a:t>
               </a:r>
               <a:r>
                 <a:rPr kumimoji="1" lang="en-US" altLang="zh-CN" sz="1200" dirty="0">
@@ -10961,7 +10941,7 @@
                   <a:latin typeface="DengXian" panose="02010600030101010101" pitchFamily="2" charset="-122"/>
                   <a:ea typeface="DengXian" panose="02010600030101010101" pitchFamily="2" charset="-122"/>
                 </a:rPr>
-                <a:t>end_time</a:t>
+                <a:t>endTime</a:t>
               </a:r>
               <a:r>
                 <a:rPr kumimoji="1" lang="en-US" altLang="zh-CN" sz="1200" dirty="0">
@@ -11416,7 +11396,7 @@
                   <a:latin typeface="DengXian" panose="02010600030101010101" pitchFamily="2" charset="-122"/>
                   <a:ea typeface="DengXian" panose="02010600030101010101" pitchFamily="2" charset="-122"/>
                 </a:rPr>
-                <a:t>start_time</a:t>
+                <a:t>startTime</a:t>
               </a:r>
               <a:r>
                 <a:rPr kumimoji="1" lang="en-US" altLang="zh-CN" sz="1200" dirty="0">
@@ -11474,7 +11454,7 @@
                   <a:latin typeface="DengXian" panose="02010600030101010101" pitchFamily="2" charset="-122"/>
                   <a:ea typeface="DengXian" panose="02010600030101010101" pitchFamily="2" charset="-122"/>
                 </a:rPr>
-                <a:t>end_time</a:t>
+                <a:t>endTime</a:t>
               </a:r>
               <a:r>
                 <a:rPr kumimoji="1" lang="en-US" altLang="zh-CN" sz="1200" dirty="0">
@@ -13961,7 +13941,7 @@
                 <a:latin typeface="DengXian" panose="02010600030101010101" pitchFamily="2" charset="-122"/>
                 <a:ea typeface="DengXian" panose="02010600030101010101" pitchFamily="2" charset="-122"/>
               </a:rPr>
-              <a:t>start_time</a:t>
+              <a:t>startTime</a:t>
             </a:r>
             <a:r>
               <a:rPr kumimoji="1" lang="en-US" altLang="zh-CN" sz="1400" dirty="0">
@@ -14020,7 +14000,7 @@
                 <a:latin typeface="DengXian" panose="02010600030101010101" pitchFamily="2" charset="-122"/>
                 <a:ea typeface="DengXian" panose="02010600030101010101" pitchFamily="2" charset="-122"/>
               </a:rPr>
-              <a:t>end_time</a:t>
+              <a:t>endTime</a:t>
             </a:r>
             <a:r>
               <a:rPr kumimoji="1" lang="en-US" altLang="zh-CN" sz="1400" dirty="0">
@@ -15731,7 +15711,7 @@
                 <a:latin typeface="DengXian" panose="02010600030101010101" pitchFamily="2" charset="-122"/>
                 <a:ea typeface="DengXian" panose="02010600030101010101" pitchFamily="2" charset="-122"/>
               </a:rPr>
-              <a:t>start_time</a:t>
+              <a:t>startTime</a:t>
             </a:r>
             <a:r>
               <a:rPr kumimoji="1" lang="en-US" altLang="zh-CN" sz="1400" dirty="0">
@@ -15790,7 +15770,7 @@
                 <a:latin typeface="DengXian" panose="02010600030101010101" pitchFamily="2" charset="-122"/>
                 <a:ea typeface="DengXian" panose="02010600030101010101" pitchFamily="2" charset="-122"/>
               </a:rPr>
-              <a:t>end_time</a:t>
+              <a:t>endTime</a:t>
             </a:r>
             <a:r>
               <a:rPr kumimoji="1" lang="en-US" altLang="zh-CN" sz="1400" dirty="0">
@@ -16687,7 +16667,7 @@
                     <a:sysClr val="windowText" lastClr="000000"/>
                   </a:solidFill>
                 </a:rPr>
-                <a:t>accounts</a:t>
+                <a:t>account</a:t>
               </a:r>
               <a:r>
                 <a:rPr kumimoji="1" lang="zh-CN" altLang="en-US" sz="1200" dirty="0">
@@ -17029,7 +17009,7 @@
                   <a:latin typeface="DengXian" panose="02010600030101010101" pitchFamily="2" charset="-122"/>
                   <a:ea typeface="DengXian" panose="02010600030101010101" pitchFamily="2" charset="-122"/>
                 </a:rPr>
-                <a:t>start_time</a:t>
+                <a:t>startTime</a:t>
               </a:r>
               <a:r>
                 <a:rPr kumimoji="1" lang="en-US" altLang="zh-CN" sz="1200" dirty="0">
@@ -17087,7 +17067,7 @@
                   <a:latin typeface="DengXian" panose="02010600030101010101" pitchFamily="2" charset="-122"/>
                   <a:ea typeface="DengXian" panose="02010600030101010101" pitchFamily="2" charset="-122"/>
                 </a:rPr>
-                <a:t>end_time</a:t>
+                <a:t>endTime</a:t>
               </a:r>
               <a:r>
                 <a:rPr kumimoji="1" lang="en-US" altLang="zh-CN" sz="1200" dirty="0">
@@ -17214,7 +17194,7 @@
                   <a:latin typeface="DengXian" panose="02010600030101010101" pitchFamily="2" charset="-122"/>
                   <a:ea typeface="DengXian" panose="02010600030101010101" pitchFamily="2" charset="-122"/>
                 </a:rPr>
-                <a:t>start_time</a:t>
+                <a:t>startTime</a:t>
               </a:r>
               <a:r>
                 <a:rPr kumimoji="1" lang="en-US" altLang="zh-CN" sz="1200" dirty="0">
@@ -17296,7 +17276,7 @@
                   <a:latin typeface="DengXian" panose="02010600030101010101" pitchFamily="2" charset="-122"/>
                   <a:ea typeface="DengXian" panose="02010600030101010101" pitchFamily="2" charset="-122"/>
                 </a:rPr>
-                <a:t>end_time</a:t>
+                <a:t>endTime</a:t>
               </a:r>
               <a:r>
                 <a:rPr kumimoji="1" lang="en-US" altLang="zh-CN" sz="1200" dirty="0">
@@ -17518,7 +17498,7 @@
                     <a:sysClr val="windowText" lastClr="000000"/>
                   </a:solidFill>
                 </a:rPr>
-                <a:t>accounts</a:t>
+                <a:t>account</a:t>
               </a:r>
               <a:r>
                 <a:rPr kumimoji="1" lang="zh-CN" altLang="en-US" sz="1200" dirty="0">
@@ -17915,7 +17895,7 @@
                     <a:sysClr val="windowText" lastClr="000000"/>
                   </a:solidFill>
                 </a:rPr>
-                <a:t>accounts</a:t>
+                <a:t>account</a:t>
               </a:r>
               <a:r>
                 <a:rPr kumimoji="1" lang="zh-CN" altLang="en-US" sz="1200" dirty="0">
@@ -18694,7 +18674,7 @@
                 <a:latin typeface="DengXian" panose="02010600030101010101" pitchFamily="2" charset="-122"/>
                 <a:ea typeface="DengXian" panose="02010600030101010101" pitchFamily="2" charset="-122"/>
               </a:rPr>
-              <a:t>start_time</a:t>
+              <a:t>startTime</a:t>
             </a:r>
             <a:r>
               <a:rPr kumimoji="1" lang="en-US" altLang="zh-CN" sz="1200" dirty="0">
@@ -18752,7 +18732,7 @@
                 <a:latin typeface="DengXian" panose="02010600030101010101" pitchFamily="2" charset="-122"/>
                 <a:ea typeface="DengXian" panose="02010600030101010101" pitchFamily="2" charset="-122"/>
               </a:rPr>
-              <a:t>end_time</a:t>
+              <a:t>endTime</a:t>
             </a:r>
             <a:r>
               <a:rPr kumimoji="1" lang="en-US" altLang="zh-CN" sz="1200" dirty="0">
@@ -21174,7 +21154,7 @@
                   <a:latin typeface="DengXian" panose="02010600030101010101" pitchFamily="2" charset="-122"/>
                   <a:ea typeface="DengXian" panose="02010600030101010101" pitchFamily="2" charset="-122"/>
                 </a:rPr>
-                <a:t>start_time</a:t>
+                <a:t>startTime</a:t>
               </a:r>
               <a:r>
                 <a:rPr kumimoji="1" lang="en-US" altLang="zh-CN" sz="1200" dirty="0">
@@ -21233,7 +21213,7 @@
                   <a:latin typeface="DengXian" panose="02010600030101010101" pitchFamily="2" charset="-122"/>
                   <a:ea typeface="DengXian" panose="02010600030101010101" pitchFamily="2" charset="-122"/>
                 </a:rPr>
-                <a:t>end_time</a:t>
+                <a:t>endTime</a:t>
               </a:r>
               <a:r>
                 <a:rPr kumimoji="1" lang="en-US" altLang="zh-CN" sz="1200" dirty="0">
@@ -22012,7 +21992,7 @@
                   <a:latin typeface="DengXian" panose="02010600030101010101" pitchFamily="2" charset="-122"/>
                   <a:ea typeface="DengXian" panose="02010600030101010101" pitchFamily="2" charset="-122"/>
                 </a:rPr>
-                <a:t>start_time</a:t>
+                <a:t>startTime</a:t>
               </a:r>
               <a:r>
                 <a:rPr kumimoji="1" lang="en-US" altLang="zh-CN" sz="1200" dirty="0">
@@ -22071,7 +22051,7 @@
                   <a:latin typeface="DengXian" panose="02010600030101010101" pitchFamily="2" charset="-122"/>
                   <a:ea typeface="DengXian" panose="02010600030101010101" pitchFamily="2" charset="-122"/>
                 </a:rPr>
-                <a:t>end_time</a:t>
+                <a:t>endTime</a:t>
               </a:r>
               <a:r>
                 <a:rPr kumimoji="1" lang="en-US" altLang="zh-CN" sz="1200" dirty="0">
@@ -22298,7 +22278,7 @@
                   <a:latin typeface="DengXian" panose="02010600030101010101" pitchFamily="2" charset="-122"/>
                   <a:ea typeface="DengXian" panose="02010600030101010101" pitchFamily="2" charset="-122"/>
                 </a:rPr>
-                <a:t>start_time</a:t>
+                <a:t>startTime</a:t>
               </a:r>
               <a:r>
                 <a:rPr kumimoji="1" lang="en-US" altLang="zh-CN" sz="1200" dirty="0">
@@ -22357,7 +22337,7 @@
                   <a:latin typeface="DengXian" panose="02010600030101010101" pitchFamily="2" charset="-122"/>
                   <a:ea typeface="DengXian" panose="02010600030101010101" pitchFamily="2" charset="-122"/>
                 </a:rPr>
-                <a:t>end_time</a:t>
+                <a:t>endTime</a:t>
               </a:r>
               <a:r>
                 <a:rPr kumimoji="1" lang="en-US" altLang="zh-CN" sz="1200" dirty="0">
@@ -23512,7 +23492,7 @@
                   <a:latin typeface="DengXian" panose="02010600030101010101" pitchFamily="2" charset="-122"/>
                   <a:ea typeface="DengXian" panose="02010600030101010101" pitchFamily="2" charset="-122"/>
                 </a:rPr>
-                <a:t>start_time</a:t>
+                <a:t>startTime</a:t>
               </a:r>
               <a:r>
                 <a:rPr kumimoji="1" lang="en-US" altLang="zh-CN" sz="1200" dirty="0">
@@ -23570,7 +23550,7 @@
                   <a:latin typeface="DengXian" panose="02010600030101010101" pitchFamily="2" charset="-122"/>
                   <a:ea typeface="DengXian" panose="02010600030101010101" pitchFamily="2" charset="-122"/>
                 </a:rPr>
-                <a:t>end_time</a:t>
+                <a:t>endTime</a:t>
               </a:r>
               <a:r>
                 <a:rPr kumimoji="1" lang="en-US" altLang="zh-CN" sz="1200" dirty="0">
@@ -25289,7 +25269,7 @@
                   <a:latin typeface="DengXian" panose="02010600030101010101" pitchFamily="2" charset="-122"/>
                   <a:ea typeface="DengXian" panose="02010600030101010101" pitchFamily="2" charset="-122"/>
                 </a:rPr>
-                <a:t>start_time</a:t>
+                <a:t>startTime</a:t>
               </a:r>
               <a:r>
                 <a:rPr kumimoji="1" lang="en-US" altLang="zh-CN" sz="1200" dirty="0">
@@ -25347,7 +25327,7 @@
                   <a:latin typeface="DengXian" panose="02010600030101010101" pitchFamily="2" charset="-122"/>
                   <a:ea typeface="DengXian" panose="02010600030101010101" pitchFamily="2" charset="-122"/>
                 </a:rPr>
-                <a:t>end_time</a:t>
+                <a:t>endTime</a:t>
               </a:r>
               <a:r>
                 <a:rPr kumimoji="1" lang="en-US" altLang="zh-CN" sz="1200" dirty="0">
@@ -26086,7 +26066,7 @@
                   <a:latin typeface="DengXian" panose="02010600030101010101" pitchFamily="2" charset="-122"/>
                   <a:ea typeface="DengXian" panose="02010600030101010101" pitchFamily="2" charset="-122"/>
                 </a:rPr>
-                <a:t>start_time</a:t>
+                <a:t>startTime</a:t>
               </a:r>
               <a:r>
                 <a:rPr kumimoji="1" lang="en-US" altLang="zh-CN" sz="1200" dirty="0">
@@ -26144,7 +26124,7 @@
                   <a:latin typeface="DengXian" panose="02010600030101010101" pitchFamily="2" charset="-122"/>
                   <a:ea typeface="DengXian" panose="02010600030101010101" pitchFamily="2" charset="-122"/>
                 </a:rPr>
-                <a:t>end_time</a:t>
+                <a:t>endTime</a:t>
               </a:r>
               <a:r>
                 <a:rPr kumimoji="1" lang="en-US" altLang="zh-CN" sz="1200" dirty="0">
@@ -27428,7 +27408,7 @@
                   <a:latin typeface="DengXian" panose="02010600030101010101" pitchFamily="2" charset="-122"/>
                   <a:ea typeface="DengXian" panose="02010600030101010101" pitchFamily="2" charset="-122"/>
                 </a:rPr>
-                <a:t>start_time</a:t>
+                <a:t>startTime</a:t>
               </a:r>
               <a:r>
                 <a:rPr kumimoji="1" lang="en-US" altLang="zh-CN" sz="1400" dirty="0">
@@ -27486,7 +27466,7 @@
                   <a:latin typeface="DengXian" panose="02010600030101010101" pitchFamily="2" charset="-122"/>
                   <a:ea typeface="DengXian" panose="02010600030101010101" pitchFamily="2" charset="-122"/>
                 </a:rPr>
-                <a:t>end_time</a:t>
+                <a:t>endTime</a:t>
               </a:r>
               <a:r>
                 <a:rPr kumimoji="1" lang="en-US" altLang="zh-CN" sz="1400" dirty="0">
@@ -28650,7 +28630,7 @@
                   <a:latin typeface="DengXian" panose="02010600030101010101" pitchFamily="2" charset="-122"/>
                   <a:ea typeface="DengXian" panose="02010600030101010101" pitchFamily="2" charset="-122"/>
                 </a:rPr>
-                <a:t>start_time</a:t>
+                <a:t>startTime</a:t>
               </a:r>
               <a:r>
                 <a:rPr kumimoji="1" lang="en-US" altLang="zh-CN" sz="1400" dirty="0">
@@ -28708,7 +28688,7 @@
                   <a:latin typeface="DengXian" panose="02010600030101010101" pitchFamily="2" charset="-122"/>
                   <a:ea typeface="DengXian" panose="02010600030101010101" pitchFamily="2" charset="-122"/>
                 </a:rPr>
-                <a:t>end_time</a:t>
+                <a:t>endTime</a:t>
               </a:r>
               <a:r>
                 <a:rPr kumimoji="1" lang="en-US" altLang="zh-CN" sz="1400" dirty="0">
@@ -29444,7 +29424,7 @@
                   <a:latin typeface="DengXian" panose="02010600030101010101" pitchFamily="2" charset="-122"/>
                   <a:ea typeface="DengXian" panose="02010600030101010101" pitchFamily="2" charset="-122"/>
                 </a:rPr>
-                <a:t>end_time</a:t>
+                <a:t>endTime</a:t>
               </a:r>
               <a:r>
                 <a:rPr kumimoji="1" lang="en-US" altLang="zh-CN" sz="1200" dirty="0">
@@ -29638,7 +29618,7 @@
                   <a:latin typeface="DengXian" panose="02010600030101010101" pitchFamily="2" charset="-122"/>
                   <a:ea typeface="DengXian" panose="02010600030101010101" pitchFamily="2" charset="-122"/>
                 </a:rPr>
-                <a:t>end_time</a:t>
+                <a:t>endTime</a:t>
               </a:r>
               <a:r>
                 <a:rPr kumimoji="1" lang="en-US" altLang="zh-CN" sz="1200" dirty="0">
@@ -29832,7 +29812,7 @@
                   <a:latin typeface="DengXian" panose="02010600030101010101" pitchFamily="2" charset="-122"/>
                   <a:ea typeface="DengXian" panose="02010600030101010101" pitchFamily="2" charset="-122"/>
                 </a:rPr>
-                <a:t>end_time</a:t>
+                <a:t>endTime</a:t>
               </a:r>
               <a:r>
                 <a:rPr kumimoji="1" lang="en-US" altLang="zh-CN" sz="1200" dirty="0">
@@ -30026,7 +30006,7 @@
                   <a:latin typeface="DengXian" panose="02010600030101010101" pitchFamily="2" charset="-122"/>
                   <a:ea typeface="DengXian" panose="02010600030101010101" pitchFamily="2" charset="-122"/>
                 </a:rPr>
-                <a:t>end_time</a:t>
+                <a:t>endTime</a:t>
               </a:r>
               <a:r>
                 <a:rPr kumimoji="1" lang="en-US" altLang="zh-CN" sz="1200" dirty="0">
@@ -33276,7 +33256,7 @@
                   <a:latin typeface="DengXian" panose="02010600030101010101" pitchFamily="2" charset="-122"/>
                   <a:ea typeface="DengXian" panose="02010600030101010101" pitchFamily="2" charset="-122"/>
                 </a:rPr>
-                <a:t>start_time</a:t>
+                <a:t>startTime</a:t>
               </a:r>
               <a:r>
                 <a:rPr kumimoji="1" lang="en-US" altLang="zh-CN" sz="1200" dirty="0">
@@ -33334,7 +33314,7 @@
                   <a:latin typeface="DengXian" panose="02010600030101010101" pitchFamily="2" charset="-122"/>
                   <a:ea typeface="DengXian" panose="02010600030101010101" pitchFamily="2" charset="-122"/>
                 </a:rPr>
-                <a:t>end_time</a:t>
+                <a:t>endTime</a:t>
               </a:r>
               <a:r>
                 <a:rPr kumimoji="1" lang="en-US" altLang="zh-CN" sz="1200" dirty="0">
@@ -33465,7 +33445,7 @@
                   <a:latin typeface="DengXian" panose="02010600030101010101" pitchFamily="2" charset="-122"/>
                   <a:ea typeface="DengXian" panose="02010600030101010101" pitchFamily="2" charset="-122"/>
                 </a:rPr>
-                <a:t>start_time</a:t>
+                <a:t>startTime</a:t>
               </a:r>
               <a:r>
                 <a:rPr kumimoji="1" lang="en-US" altLang="zh-CN" sz="1200" dirty="0">
@@ -33523,7 +33503,7 @@
                   <a:latin typeface="DengXian" panose="02010600030101010101" pitchFamily="2" charset="-122"/>
                   <a:ea typeface="DengXian" panose="02010600030101010101" pitchFamily="2" charset="-122"/>
                 </a:rPr>
-                <a:t>end_time</a:t>
+                <a:t>endTime</a:t>
               </a:r>
               <a:r>
                 <a:rPr kumimoji="1" lang="en-US" altLang="zh-CN" sz="1200" dirty="0">
@@ -33769,7 +33749,7 @@
                   <a:latin typeface="DengXian" panose="02010600030101010101" pitchFamily="2" charset="-122"/>
                   <a:ea typeface="DengXian" panose="02010600030101010101" pitchFamily="2" charset="-122"/>
                 </a:rPr>
-                <a:t>start_time</a:t>
+                <a:t>startTime</a:t>
               </a:r>
               <a:r>
                 <a:rPr kumimoji="1" lang="en-US" altLang="zh-CN" sz="1200" dirty="0">
@@ -33827,7 +33807,7 @@
                   <a:latin typeface="DengXian" panose="02010600030101010101" pitchFamily="2" charset="-122"/>
                   <a:ea typeface="DengXian" panose="02010600030101010101" pitchFamily="2" charset="-122"/>
                 </a:rPr>
-                <a:t>end_time</a:t>
+                <a:t>endTime</a:t>
               </a:r>
               <a:r>
                 <a:rPr kumimoji="1" lang="en-US" altLang="zh-CN" sz="1200" dirty="0">
@@ -33958,7 +33938,7 @@
                   <a:latin typeface="DengXian" panose="02010600030101010101" pitchFamily="2" charset="-122"/>
                   <a:ea typeface="DengXian" panose="02010600030101010101" pitchFamily="2" charset="-122"/>
                 </a:rPr>
-                <a:t>start_time</a:t>
+                <a:t>startTime</a:t>
               </a:r>
               <a:r>
                 <a:rPr kumimoji="1" lang="en-US" altLang="zh-CN" sz="1200" dirty="0">
@@ -34016,7 +33996,7 @@
                   <a:latin typeface="DengXian" panose="02010600030101010101" pitchFamily="2" charset="-122"/>
                   <a:ea typeface="DengXian" panose="02010600030101010101" pitchFamily="2" charset="-122"/>
                 </a:rPr>
-                <a:t>end_time</a:t>
+                <a:t>endTime</a:t>
               </a:r>
               <a:r>
                 <a:rPr kumimoji="1" lang="en-US" altLang="zh-CN" sz="1200" dirty="0">

</xml_diff>

<commit_message>
update readwrite pattern,desc and remove cr7 edge type
</commit_message>
<xml_diff>
--- a/patterns/transaction-complex-read.pptx
+++ b/patterns/transaction-complex-read.pptx
@@ -5,29 +5,29 @@
     <p:sldMasterId id="2147483648" r:id="rId1"/>
   </p:sldMasterIdLst>
   <p:notesMasterIdLst>
-    <p:notesMasterId r:id="rId17"/>
+    <p:notesMasterId r:id="rId18"/>
   </p:notesMasterIdLst>
   <p:sldIdLst>
-    <p:sldId id="374" r:id="rId2"/>
-    <p:sldId id="375" r:id="rId3"/>
-    <p:sldId id="416" r:id="rId4"/>
-    <p:sldId id="371" r:id="rId5"/>
-    <p:sldId id="389" r:id="rId6"/>
-    <p:sldId id="390" r:id="rId7"/>
-    <p:sldId id="392" r:id="rId8"/>
-    <p:sldId id="393" r:id="rId9"/>
-    <p:sldId id="396" r:id="rId10"/>
-    <p:sldId id="397" r:id="rId11"/>
-    <p:sldId id="401" r:id="rId12"/>
-    <p:sldId id="415" r:id="rId13"/>
-    <p:sldId id="417" r:id="rId14"/>
-    <p:sldId id="399" r:id="rId15"/>
-    <p:sldId id="395" r:id="rId16"/>
+    <p:sldId id="374" r:id="rId3"/>
+    <p:sldId id="375" r:id="rId4"/>
+    <p:sldId id="416" r:id="rId5"/>
+    <p:sldId id="371" r:id="rId6"/>
+    <p:sldId id="389" r:id="rId7"/>
+    <p:sldId id="390" r:id="rId8"/>
+    <p:sldId id="392" r:id="rId9"/>
+    <p:sldId id="393" r:id="rId10"/>
+    <p:sldId id="396" r:id="rId11"/>
+    <p:sldId id="397" r:id="rId12"/>
+    <p:sldId id="401" r:id="rId13"/>
+    <p:sldId id="415" r:id="rId14"/>
+    <p:sldId id="417" r:id="rId15"/>
+    <p:sldId id="399" r:id="rId16"/>
+    <p:sldId id="395" r:id="rId17"/>
   </p:sldIdLst>
   <p:sldSz cx="12192000" cy="6858000"/>
   <p:notesSz cx="6858000" cy="9144000"/>
   <p:custDataLst>
-    <p:tags r:id="rId18"/>
+    <p:tags r:id="rId22"/>
   </p:custDataLst>
   <p:defaultTextStyle>
     <a:defPPr>
@@ -124,11 +124,6 @@
       </a:defRPr>
     </a:lvl9pPr>
   </p:defaultTextStyle>
-  <p:extLst>
-    <p:ext uri="{EFAFB233-063F-42B5-8137-9DF3F51BA10A}">
-      <p15:sldGuideLst xmlns:p15="http://schemas.microsoft.com/office/powerpoint/2012/main"/>
-    </p:ext>
-  </p:extLst>
 </p:presentation>
 </file>
 
@@ -214,7 +209,6 @@
           <a:p>
             <a:fld id="{CAD4BD24-A097-4F9D-85E9-6A2A24CA2D98}" type="datetimeFigureOut">
               <a:rPr lang="zh-CN" altLang="en-US" smtClean="0"/>
-              <a:t>2023/5/9</a:t>
             </a:fld>
             <a:endParaRPr lang="zh-CN" altLang="en-US"/>
           </a:p>
@@ -281,6 +275,7 @@
               <a:rPr lang="zh-CN" altLang="en-US"/>
               <a:t>单击此处编辑母版文本样式</a:t>
             </a:r>
+            <a:endParaRPr lang="zh-CN" altLang="en-US"/>
           </a:p>
           <a:p>
             <a:pPr lvl="1"/>
@@ -288,6 +283,7 @@
               <a:rPr lang="zh-CN" altLang="en-US"/>
               <a:t>第二级</a:t>
             </a:r>
+            <a:endParaRPr lang="zh-CN" altLang="en-US"/>
           </a:p>
           <a:p>
             <a:pPr lvl="2"/>
@@ -295,6 +291,7 @@
               <a:rPr lang="zh-CN" altLang="en-US"/>
               <a:t>第三级</a:t>
             </a:r>
+            <a:endParaRPr lang="zh-CN" altLang="en-US"/>
           </a:p>
           <a:p>
             <a:pPr lvl="3"/>
@@ -302,6 +299,7 @@
               <a:rPr lang="zh-CN" altLang="en-US"/>
               <a:t>第四级</a:t>
             </a:r>
+            <a:endParaRPr lang="zh-CN" altLang="en-US"/>
           </a:p>
           <a:p>
             <a:pPr lvl="4"/>
@@ -309,6 +307,7 @@
               <a:rPr lang="zh-CN" altLang="en-US"/>
               <a:t>第五级</a:t>
             </a:r>
+            <a:endParaRPr lang="zh-CN" altLang="en-US"/>
           </a:p>
         </p:txBody>
       </p:sp>
@@ -372,7 +371,6 @@
           <a:p>
             <a:fld id="{4F292EE1-EB42-416D-BE21-6D6219010E5F}" type="slidenum">
               <a:rPr lang="zh-CN" altLang="en-US" smtClean="0"/>
-              <a:t>‹#›</a:t>
             </a:fld>
             <a:endParaRPr lang="zh-CN" altLang="en-US"/>
           </a:p>
@@ -521,6 +519,7 @@
               <a:rPr lang="zh-CN" altLang="en-US"/>
               <a:t>单击此处编辑母版标题样式</a:t>
             </a:r>
+            <a:endParaRPr lang="zh-CN" altLang="en-US"/>
           </a:p>
         </p:txBody>
       </p:sp>
@@ -585,6 +584,7 @@
               <a:rPr lang="zh-CN" altLang="en-US"/>
               <a:t>单击此处编辑母版副标题样式</a:t>
             </a:r>
+            <a:endParaRPr lang="zh-CN" altLang="en-US"/>
           </a:p>
         </p:txBody>
       </p:sp>
@@ -632,6 +632,7 @@
               <a:rPr lang="zh-CN" altLang="en-US"/>
               <a:t>单击此处编辑母版标题样式</a:t>
             </a:r>
+            <a:endParaRPr lang="zh-CN" altLang="en-US"/>
           </a:p>
         </p:txBody>
       </p:sp>
@@ -655,6 +656,7 @@
               <a:rPr lang="zh-CN" altLang="en-US"/>
               <a:t>编辑母版文本样式</a:t>
             </a:r>
+            <a:endParaRPr lang="zh-CN" altLang="en-US"/>
           </a:p>
           <a:p>
             <a:pPr lvl="1"/>
@@ -662,6 +664,7 @@
               <a:rPr lang="zh-CN" altLang="en-US"/>
               <a:t>第二级</a:t>
             </a:r>
+            <a:endParaRPr lang="zh-CN" altLang="en-US"/>
           </a:p>
           <a:p>
             <a:pPr lvl="2"/>
@@ -669,6 +672,7 @@
               <a:rPr lang="zh-CN" altLang="en-US"/>
               <a:t>第三级</a:t>
             </a:r>
+            <a:endParaRPr lang="zh-CN" altLang="en-US"/>
           </a:p>
           <a:p>
             <a:pPr lvl="3"/>
@@ -676,6 +680,7 @@
               <a:rPr lang="zh-CN" altLang="en-US"/>
               <a:t>第四级</a:t>
             </a:r>
+            <a:endParaRPr lang="zh-CN" altLang="en-US"/>
           </a:p>
           <a:p>
             <a:pPr lvl="4"/>
@@ -683,6 +688,7 @@
               <a:rPr lang="zh-CN" altLang="en-US"/>
               <a:t>第五级</a:t>
             </a:r>
+            <a:endParaRPr lang="zh-CN" altLang="en-US"/>
           </a:p>
         </p:txBody>
       </p:sp>
@@ -735,6 +741,7 @@
               <a:rPr lang="zh-CN" altLang="en-US"/>
               <a:t>单击此处编辑母版标题样式</a:t>
             </a:r>
+            <a:endParaRPr lang="zh-CN" altLang="en-US"/>
           </a:p>
         </p:txBody>
       </p:sp>
@@ -763,6 +770,7 @@
               <a:rPr lang="zh-CN" altLang="en-US"/>
               <a:t>编辑母版文本样式</a:t>
             </a:r>
+            <a:endParaRPr lang="zh-CN" altLang="en-US"/>
           </a:p>
           <a:p>
             <a:pPr lvl="1"/>
@@ -770,6 +778,7 @@
               <a:rPr lang="zh-CN" altLang="en-US"/>
               <a:t>第二级</a:t>
             </a:r>
+            <a:endParaRPr lang="zh-CN" altLang="en-US"/>
           </a:p>
           <a:p>
             <a:pPr lvl="2"/>
@@ -777,6 +786,7 @@
               <a:rPr lang="zh-CN" altLang="en-US"/>
               <a:t>第三级</a:t>
             </a:r>
+            <a:endParaRPr lang="zh-CN" altLang="en-US"/>
           </a:p>
           <a:p>
             <a:pPr lvl="3"/>
@@ -784,6 +794,7 @@
               <a:rPr lang="zh-CN" altLang="en-US"/>
               <a:t>第四级</a:t>
             </a:r>
+            <a:endParaRPr lang="zh-CN" altLang="en-US"/>
           </a:p>
           <a:p>
             <a:pPr lvl="4"/>
@@ -791,6 +802,7 @@
               <a:rPr lang="zh-CN" altLang="en-US"/>
               <a:t>第五级</a:t>
             </a:r>
+            <a:endParaRPr lang="zh-CN" altLang="en-US"/>
           </a:p>
         </p:txBody>
       </p:sp>
@@ -838,6 +850,7 @@
               <a:rPr lang="zh-CN" altLang="en-US"/>
               <a:t>单击此处编辑母版标题样式</a:t>
             </a:r>
+            <a:endParaRPr lang="zh-CN" altLang="en-US"/>
           </a:p>
         </p:txBody>
       </p:sp>
@@ -861,6 +874,7 @@
               <a:rPr lang="zh-CN" altLang="en-US"/>
               <a:t>编辑母版文本样式</a:t>
             </a:r>
+            <a:endParaRPr lang="zh-CN" altLang="en-US"/>
           </a:p>
           <a:p>
             <a:pPr lvl="1"/>
@@ -868,6 +882,7 @@
               <a:rPr lang="zh-CN" altLang="en-US"/>
               <a:t>第二级</a:t>
             </a:r>
+            <a:endParaRPr lang="zh-CN" altLang="en-US"/>
           </a:p>
           <a:p>
             <a:pPr lvl="2"/>
@@ -875,6 +890,7 @@
               <a:rPr lang="zh-CN" altLang="en-US"/>
               <a:t>第三级</a:t>
             </a:r>
+            <a:endParaRPr lang="zh-CN" altLang="en-US"/>
           </a:p>
           <a:p>
             <a:pPr lvl="3"/>
@@ -882,6 +898,7 @@
               <a:rPr lang="zh-CN" altLang="en-US"/>
               <a:t>第四级</a:t>
             </a:r>
+            <a:endParaRPr lang="zh-CN" altLang="en-US"/>
           </a:p>
           <a:p>
             <a:pPr lvl="4"/>
@@ -889,6 +906,7 @@
               <a:rPr lang="zh-CN" altLang="en-US"/>
               <a:t>第五级</a:t>
             </a:r>
+            <a:endParaRPr lang="zh-CN" altLang="en-US"/>
           </a:p>
         </p:txBody>
       </p:sp>
@@ -945,6 +963,7 @@
               <a:rPr lang="zh-CN" altLang="en-US"/>
               <a:t>单击此处编辑母版标题样式</a:t>
             </a:r>
+            <a:endParaRPr lang="zh-CN" altLang="en-US"/>
           </a:p>
         </p:txBody>
       </p:sp>
@@ -1064,6 +1083,7 @@
               <a:rPr lang="zh-CN" altLang="en-US"/>
               <a:t>编辑母版文本样式</a:t>
             </a:r>
+            <a:endParaRPr lang="zh-CN" altLang="en-US"/>
           </a:p>
         </p:txBody>
       </p:sp>
@@ -1111,6 +1131,7 @@
               <a:rPr lang="zh-CN" altLang="en-US"/>
               <a:t>单击此处编辑母版标题样式</a:t>
             </a:r>
+            <a:endParaRPr lang="zh-CN" altLang="en-US"/>
           </a:p>
         </p:txBody>
       </p:sp>
@@ -1139,6 +1160,7 @@
               <a:rPr lang="zh-CN" altLang="en-US"/>
               <a:t>编辑母版文本样式</a:t>
             </a:r>
+            <a:endParaRPr lang="zh-CN" altLang="en-US"/>
           </a:p>
           <a:p>
             <a:pPr lvl="1"/>
@@ -1146,6 +1168,7 @@
               <a:rPr lang="zh-CN" altLang="en-US"/>
               <a:t>第二级</a:t>
             </a:r>
+            <a:endParaRPr lang="zh-CN" altLang="en-US"/>
           </a:p>
           <a:p>
             <a:pPr lvl="2"/>
@@ -1153,6 +1176,7 @@
               <a:rPr lang="zh-CN" altLang="en-US"/>
               <a:t>第三级</a:t>
             </a:r>
+            <a:endParaRPr lang="zh-CN" altLang="en-US"/>
           </a:p>
           <a:p>
             <a:pPr lvl="3"/>
@@ -1160,6 +1184,7 @@
               <a:rPr lang="zh-CN" altLang="en-US"/>
               <a:t>第四级</a:t>
             </a:r>
+            <a:endParaRPr lang="zh-CN" altLang="en-US"/>
           </a:p>
           <a:p>
             <a:pPr lvl="4"/>
@@ -1167,6 +1192,7 @@
               <a:rPr lang="zh-CN" altLang="en-US"/>
               <a:t>第五级</a:t>
             </a:r>
+            <a:endParaRPr lang="zh-CN" altLang="en-US"/>
           </a:p>
         </p:txBody>
       </p:sp>
@@ -1195,6 +1221,7 @@
               <a:rPr lang="zh-CN" altLang="en-US"/>
               <a:t>编辑母版文本样式</a:t>
             </a:r>
+            <a:endParaRPr lang="zh-CN" altLang="en-US"/>
           </a:p>
           <a:p>
             <a:pPr lvl="1"/>
@@ -1202,6 +1229,7 @@
               <a:rPr lang="zh-CN" altLang="en-US"/>
               <a:t>第二级</a:t>
             </a:r>
+            <a:endParaRPr lang="zh-CN" altLang="en-US"/>
           </a:p>
           <a:p>
             <a:pPr lvl="2"/>
@@ -1209,6 +1237,7 @@
               <a:rPr lang="zh-CN" altLang="en-US"/>
               <a:t>第三级</a:t>
             </a:r>
+            <a:endParaRPr lang="zh-CN" altLang="en-US"/>
           </a:p>
           <a:p>
             <a:pPr lvl="3"/>
@@ -1216,6 +1245,7 @@
               <a:rPr lang="zh-CN" altLang="en-US"/>
               <a:t>第四级</a:t>
             </a:r>
+            <a:endParaRPr lang="zh-CN" altLang="en-US"/>
           </a:p>
           <a:p>
             <a:pPr lvl="4"/>
@@ -1223,6 +1253,7 @@
               <a:rPr lang="zh-CN" altLang="en-US"/>
               <a:t>第五级</a:t>
             </a:r>
+            <a:endParaRPr lang="zh-CN" altLang="en-US"/>
           </a:p>
         </p:txBody>
       </p:sp>
@@ -1275,6 +1306,7 @@
               <a:rPr lang="zh-CN" altLang="en-US"/>
               <a:t>单击此处编辑母版标题样式</a:t>
             </a:r>
+            <a:endParaRPr lang="zh-CN" altLang="en-US"/>
           </a:p>
         </p:txBody>
       </p:sp>
@@ -1340,6 +1372,7 @@
               <a:rPr lang="zh-CN" altLang="en-US"/>
               <a:t>编辑母版文本样式</a:t>
             </a:r>
+            <a:endParaRPr lang="zh-CN" altLang="en-US"/>
           </a:p>
         </p:txBody>
       </p:sp>
@@ -1368,6 +1401,7 @@
               <a:rPr lang="zh-CN" altLang="en-US"/>
               <a:t>编辑母版文本样式</a:t>
             </a:r>
+            <a:endParaRPr lang="zh-CN" altLang="en-US"/>
           </a:p>
           <a:p>
             <a:pPr lvl="1"/>
@@ -1375,6 +1409,7 @@
               <a:rPr lang="zh-CN" altLang="en-US"/>
               <a:t>第二级</a:t>
             </a:r>
+            <a:endParaRPr lang="zh-CN" altLang="en-US"/>
           </a:p>
           <a:p>
             <a:pPr lvl="2"/>
@@ -1382,6 +1417,7 @@
               <a:rPr lang="zh-CN" altLang="en-US"/>
               <a:t>第三级</a:t>
             </a:r>
+            <a:endParaRPr lang="zh-CN" altLang="en-US"/>
           </a:p>
           <a:p>
             <a:pPr lvl="3"/>
@@ -1389,6 +1425,7 @@
               <a:rPr lang="zh-CN" altLang="en-US"/>
               <a:t>第四级</a:t>
             </a:r>
+            <a:endParaRPr lang="zh-CN" altLang="en-US"/>
           </a:p>
           <a:p>
             <a:pPr lvl="4"/>
@@ -1396,6 +1433,7 @@
               <a:rPr lang="zh-CN" altLang="en-US"/>
               <a:t>第五级</a:t>
             </a:r>
+            <a:endParaRPr lang="zh-CN" altLang="en-US"/>
           </a:p>
         </p:txBody>
       </p:sp>
@@ -1461,6 +1499,7 @@
               <a:rPr lang="zh-CN" altLang="en-US"/>
               <a:t>编辑母版文本样式</a:t>
             </a:r>
+            <a:endParaRPr lang="zh-CN" altLang="en-US"/>
           </a:p>
         </p:txBody>
       </p:sp>
@@ -1489,6 +1528,7 @@
               <a:rPr lang="zh-CN" altLang="en-US"/>
               <a:t>编辑母版文本样式</a:t>
             </a:r>
+            <a:endParaRPr lang="zh-CN" altLang="en-US"/>
           </a:p>
           <a:p>
             <a:pPr lvl="1"/>
@@ -1496,6 +1536,7 @@
               <a:rPr lang="zh-CN" altLang="en-US"/>
               <a:t>第二级</a:t>
             </a:r>
+            <a:endParaRPr lang="zh-CN" altLang="en-US"/>
           </a:p>
           <a:p>
             <a:pPr lvl="2"/>
@@ -1503,6 +1544,7 @@
               <a:rPr lang="zh-CN" altLang="en-US"/>
               <a:t>第三级</a:t>
             </a:r>
+            <a:endParaRPr lang="zh-CN" altLang="en-US"/>
           </a:p>
           <a:p>
             <a:pPr lvl="3"/>
@@ -1510,6 +1552,7 @@
               <a:rPr lang="zh-CN" altLang="en-US"/>
               <a:t>第四级</a:t>
             </a:r>
+            <a:endParaRPr lang="zh-CN" altLang="en-US"/>
           </a:p>
           <a:p>
             <a:pPr lvl="4"/>
@@ -1517,6 +1560,7 @@
               <a:rPr lang="zh-CN" altLang="en-US"/>
               <a:t>第五级</a:t>
             </a:r>
+            <a:endParaRPr lang="zh-CN" altLang="en-US"/>
           </a:p>
         </p:txBody>
       </p:sp>
@@ -1564,6 +1608,7 @@
               <a:rPr lang="zh-CN" altLang="en-US"/>
               <a:t>单击此处编辑母版标题样式</a:t>
             </a:r>
+            <a:endParaRPr lang="zh-CN" altLang="en-US"/>
           </a:p>
         </p:txBody>
       </p:sp>
@@ -1645,6 +1690,7 @@
               <a:rPr lang="zh-CN" altLang="en-US"/>
               <a:t>单击此处编辑母版标题样式</a:t>
             </a:r>
+            <a:endParaRPr lang="zh-CN" altLang="en-US"/>
           </a:p>
         </p:txBody>
       </p:sp>
@@ -1701,6 +1747,7 @@
               <a:rPr lang="zh-CN" altLang="en-US"/>
               <a:t>编辑母版文本样式</a:t>
             </a:r>
+            <a:endParaRPr lang="zh-CN" altLang="en-US"/>
           </a:p>
           <a:p>
             <a:pPr lvl="1"/>
@@ -1708,6 +1755,7 @@
               <a:rPr lang="zh-CN" altLang="en-US"/>
               <a:t>第二级</a:t>
             </a:r>
+            <a:endParaRPr lang="zh-CN" altLang="en-US"/>
           </a:p>
           <a:p>
             <a:pPr lvl="2"/>
@@ -1715,6 +1763,7 @@
               <a:rPr lang="zh-CN" altLang="en-US"/>
               <a:t>第三级</a:t>
             </a:r>
+            <a:endParaRPr lang="zh-CN" altLang="en-US"/>
           </a:p>
           <a:p>
             <a:pPr lvl="3"/>
@@ -1722,6 +1771,7 @@
               <a:rPr lang="zh-CN" altLang="en-US"/>
               <a:t>第四级</a:t>
             </a:r>
+            <a:endParaRPr lang="zh-CN" altLang="en-US"/>
           </a:p>
           <a:p>
             <a:pPr lvl="4"/>
@@ -1729,6 +1779,7 @@
               <a:rPr lang="zh-CN" altLang="en-US"/>
               <a:t>第五级</a:t>
             </a:r>
+            <a:endParaRPr lang="zh-CN" altLang="en-US"/>
           </a:p>
         </p:txBody>
       </p:sp>
@@ -1794,6 +1845,7 @@
               <a:rPr lang="zh-CN" altLang="en-US"/>
               <a:t>编辑母版文本样式</a:t>
             </a:r>
+            <a:endParaRPr lang="zh-CN" altLang="en-US"/>
           </a:p>
         </p:txBody>
       </p:sp>
@@ -1850,6 +1902,7 @@
               <a:rPr lang="zh-CN" altLang="en-US"/>
               <a:t>单击此处编辑母版标题样式</a:t>
             </a:r>
+            <a:endParaRPr lang="zh-CN" altLang="en-US"/>
           </a:p>
         </p:txBody>
       </p:sp>
@@ -1914,6 +1967,7 @@
               <a:rPr lang="zh-CN" altLang="en-US"/>
               <a:t>单击图标添加图片</a:t>
             </a:r>
+            <a:endParaRPr lang="zh-CN" altLang="en-US"/>
           </a:p>
         </p:txBody>
       </p:sp>
@@ -1979,6 +2033,7 @@
               <a:rPr lang="zh-CN" altLang="en-US"/>
               <a:t>编辑母版文本样式</a:t>
             </a:r>
+            <a:endParaRPr lang="zh-CN" altLang="en-US"/>
           </a:p>
         </p:txBody>
       </p:sp>
@@ -2041,6 +2096,7 @@
               <a:rPr lang="zh-CN" altLang="en-US"/>
               <a:t>单击此处编辑母版标题样式</a:t>
             </a:r>
+            <a:endParaRPr lang="zh-CN" altLang="en-US"/>
           </a:p>
         </p:txBody>
       </p:sp>
@@ -2074,6 +2130,7 @@
               <a:rPr lang="zh-CN" altLang="en-US" dirty="0"/>
               <a:t>编辑母版文本样式</a:t>
             </a:r>
+            <a:endParaRPr lang="zh-CN" altLang="en-US" dirty="0"/>
           </a:p>
           <a:p>
             <a:pPr lvl="1"/>
@@ -2081,6 +2138,7 @@
               <a:rPr lang="zh-CN" altLang="en-US" dirty="0"/>
               <a:t>第二级</a:t>
             </a:r>
+            <a:endParaRPr lang="zh-CN" altLang="en-US" dirty="0"/>
           </a:p>
           <a:p>
             <a:pPr lvl="2"/>
@@ -2088,6 +2146,7 @@
               <a:rPr lang="zh-CN" altLang="en-US" dirty="0"/>
               <a:t>第三级</a:t>
             </a:r>
+            <a:endParaRPr lang="zh-CN" altLang="en-US" dirty="0"/>
           </a:p>
           <a:p>
             <a:pPr lvl="3"/>
@@ -2095,6 +2154,7 @@
               <a:rPr lang="zh-CN" altLang="en-US" dirty="0"/>
               <a:t>第四级</a:t>
             </a:r>
+            <a:endParaRPr lang="zh-CN" altLang="en-US" dirty="0"/>
           </a:p>
           <a:p>
             <a:pPr lvl="4"/>
@@ -2102,6 +2162,7 @@
               <a:rPr lang="zh-CN" altLang="en-US" dirty="0"/>
               <a:t>第五级</a:t>
             </a:r>
+            <a:endParaRPr lang="zh-CN" altLang="en-US" dirty="0"/>
           </a:p>
         </p:txBody>
       </p:sp>
@@ -2557,6 +2618,10 @@
                 </a:rPr>
                 <a:t>}</a:t>
               </a:r>
+              <a:endParaRPr kumimoji="1" lang="en-US" altLang="zh-CN" sz="1200" dirty="0">
+                <a:latin typeface="等线" panose="02010600030101010101" pitchFamily="2" charset="-122"/>
+                <a:ea typeface="等线" panose="02010600030101010101" pitchFamily="2" charset="-122"/>
+              </a:endParaRPr>
             </a:p>
             <a:p>
               <a:pPr algn="ctr"/>
@@ -2616,6 +2681,10 @@
                 </a:rPr>
                 <a:t>}</a:t>
               </a:r>
+              <a:endParaRPr kumimoji="1" lang="en-US" altLang="zh-CN" sz="1200" dirty="0">
+                <a:latin typeface="等线" panose="02010600030101010101" pitchFamily="2" charset="-122"/>
+                <a:ea typeface="等线" panose="02010600030101010101" pitchFamily="2" charset="-122"/>
+              </a:endParaRPr>
             </a:p>
           </p:txBody>
         </p:sp>
@@ -2754,6 +2823,10 @@
                 </a:rPr>
                 <a:t>}</a:t>
               </a:r>
+              <a:endParaRPr kumimoji="1" lang="en-US" altLang="zh-CN" sz="1200" dirty="0">
+                <a:latin typeface="等线" panose="02010600030101010101" pitchFamily="2" charset="-122"/>
+                <a:ea typeface="等线" panose="02010600030101010101" pitchFamily="2" charset="-122"/>
+              </a:endParaRPr>
             </a:p>
             <a:p>
               <a:pPr algn="ctr"/>
@@ -2813,6 +2886,10 @@
                 </a:rPr>
                 <a:t>}</a:t>
               </a:r>
+              <a:endParaRPr kumimoji="1" lang="en-US" altLang="zh-CN" sz="1200" dirty="0">
+                <a:latin typeface="等线" panose="02010600030101010101" pitchFamily="2" charset="-122"/>
+                <a:ea typeface="等线" panose="02010600030101010101" pitchFamily="2" charset="-122"/>
+              </a:endParaRPr>
             </a:p>
           </p:txBody>
         </p:sp>
@@ -3044,6 +3121,13 @@
                 </a:rPr>
                 <a:t>RESULT</a:t>
               </a:r>
+              <a:endParaRPr kumimoji="1" lang="en-US" altLang="zh-CN" sz="1200" b="1" dirty="0">
+                <a:solidFill>
+                  <a:srgbClr val="FF0000"/>
+                </a:solidFill>
+                <a:latin typeface="等线" panose="02010600030101010101" pitchFamily="2" charset="-122"/>
+                <a:ea typeface="等线" panose="02010600030101010101" pitchFamily="2" charset="-122"/>
+              </a:endParaRPr>
             </a:p>
             <a:p>
               <a:r>
@@ -5939,6 +6023,10 @@
               </a:rPr>
               <a:t>invest</a:t>
             </a:r>
+            <a:endParaRPr kumimoji="1" lang="en-US" altLang="zh-CN" sz="1200" dirty="0">
+              <a:latin typeface="等线" panose="02010600030101010101" pitchFamily="2" charset="-122"/>
+              <a:ea typeface="等线" panose="02010600030101010101" pitchFamily="2" charset="-122"/>
+            </a:endParaRPr>
           </a:p>
           <a:p>
             <a:r>
@@ -5997,6 +6085,10 @@
               </a:rPr>
               <a:t>}</a:t>
             </a:r>
+            <a:endParaRPr kumimoji="1" lang="en-US" altLang="zh-CN" sz="1200" dirty="0">
+              <a:latin typeface="等线" panose="02010600030101010101" pitchFamily="2" charset="-122"/>
+              <a:ea typeface="等线" panose="02010600030101010101" pitchFamily="2" charset="-122"/>
+            </a:endParaRPr>
           </a:p>
           <a:p>
             <a:r>
@@ -6055,6 +6147,10 @@
               </a:rPr>
               <a:t>}</a:t>
             </a:r>
+            <a:endParaRPr kumimoji="1" lang="en-US" altLang="zh-CN" sz="1200" dirty="0">
+              <a:latin typeface="等线" panose="02010600030101010101" pitchFamily="2" charset="-122"/>
+              <a:ea typeface="等线" panose="02010600030101010101" pitchFamily="2" charset="-122"/>
+            </a:endParaRPr>
           </a:p>
           <a:p>
             <a:endParaRPr kumimoji="1" lang="en-US" altLang="zh-CN" sz="1200" b="1" dirty="0">
@@ -6084,6 +6180,10 @@
               </a:rPr>
               <a:t>invest</a:t>
             </a:r>
+            <a:endParaRPr kumimoji="1" lang="en-US" altLang="zh-CN" sz="1200" dirty="0">
+              <a:latin typeface="等线" panose="02010600030101010101" pitchFamily="2" charset="-122"/>
+              <a:ea typeface="等线" panose="02010600030101010101" pitchFamily="2" charset="-122"/>
+            </a:endParaRPr>
           </a:p>
           <a:p>
             <a:r>
@@ -6142,6 +6242,10 @@
               </a:rPr>
               <a:t>}</a:t>
             </a:r>
+            <a:endParaRPr kumimoji="1" lang="en-US" altLang="zh-CN" sz="1200" dirty="0">
+              <a:latin typeface="等线" panose="02010600030101010101" pitchFamily="2" charset="-122"/>
+              <a:ea typeface="等线" panose="02010600030101010101" pitchFamily="2" charset="-122"/>
+            </a:endParaRPr>
           </a:p>
           <a:p>
             <a:r>
@@ -6200,6 +6304,10 @@
               </a:rPr>
               <a:t>}</a:t>
             </a:r>
+            <a:endParaRPr kumimoji="1" lang="en-US" altLang="zh-CN" sz="1200" dirty="0">
+              <a:latin typeface="等线" panose="02010600030101010101" pitchFamily="2" charset="-122"/>
+              <a:ea typeface="等线" panose="02010600030101010101" pitchFamily="2" charset="-122"/>
+            </a:endParaRPr>
           </a:p>
         </p:txBody>
       </p:sp>
@@ -6513,6 +6621,13 @@
               </a:rPr>
               <a:t>COUNT(loan)</a:t>
             </a:r>
+            <a:endParaRPr kumimoji="1" lang="en-US" altLang="zh-CN" sz="1200" dirty="0">
+              <a:solidFill>
+                <a:sysClr val="windowText" lastClr="000000"/>
+              </a:solidFill>
+              <a:latin typeface="等线" panose="02010600030101010101" pitchFamily="2" charset="-122"/>
+              <a:ea typeface="等线" panose="02010600030101010101" pitchFamily="2" charset="-122"/>
+            </a:endParaRPr>
           </a:p>
         </p:txBody>
       </p:sp>
@@ -6874,6 +6989,10 @@
               </a:rPr>
               <a:t>guarantee</a:t>
             </a:r>
+            <a:endParaRPr kumimoji="1" lang="en-US" altLang="zh-CN" sz="1200" dirty="0">
+              <a:latin typeface="等线" panose="02010600030101010101" pitchFamily="2" charset="-122"/>
+              <a:ea typeface="等线" panose="02010600030101010101" pitchFamily="2" charset="-122"/>
+            </a:endParaRPr>
           </a:p>
         </p:txBody>
       </p:sp>
@@ -7251,6 +7370,10 @@
               </a:rPr>
               <a:t>guarantee</a:t>
             </a:r>
+            <a:endParaRPr kumimoji="1" lang="en-US" altLang="zh-CN" sz="1200" dirty="0">
+              <a:latin typeface="等线" panose="02010600030101010101" pitchFamily="2" charset="-122"/>
+              <a:ea typeface="等线" panose="02010600030101010101" pitchFamily="2" charset="-122"/>
+            </a:endParaRPr>
           </a:p>
         </p:txBody>
       </p:sp>
@@ -7284,6 +7407,10 @@
               </a:rPr>
               <a:t>guarantee</a:t>
             </a:r>
+            <a:endParaRPr kumimoji="1" lang="en-US" altLang="zh-CN" sz="1200" dirty="0">
+              <a:latin typeface="等线" panose="02010600030101010101" pitchFamily="2" charset="-122"/>
+              <a:ea typeface="等线" panose="02010600030101010101" pitchFamily="2" charset="-122"/>
+            </a:endParaRPr>
           </a:p>
         </p:txBody>
       </p:sp>
@@ -7442,6 +7569,10 @@
               </a:rPr>
               <a:t>guarantee</a:t>
             </a:r>
+            <a:endParaRPr kumimoji="1" lang="en-US" altLang="zh-CN" sz="1100" dirty="0">
+              <a:latin typeface="等线" panose="02010600030101010101" pitchFamily="2" charset="-122"/>
+              <a:ea typeface="等线" panose="02010600030101010101" pitchFamily="2" charset="-122"/>
+            </a:endParaRPr>
           </a:p>
           <a:p>
             <a:r>
@@ -7500,6 +7631,10 @@
               </a:rPr>
               <a:t>}</a:t>
             </a:r>
+            <a:endParaRPr kumimoji="1" lang="en-US" altLang="zh-CN" sz="1100" dirty="0">
+              <a:latin typeface="等线" panose="02010600030101010101" pitchFamily="2" charset="-122"/>
+              <a:ea typeface="等线" panose="02010600030101010101" pitchFamily="2" charset="-122"/>
+            </a:endParaRPr>
           </a:p>
           <a:p>
             <a:r>
@@ -7558,6 +7693,10 @@
               </a:rPr>
               <a:t>}</a:t>
             </a:r>
+            <a:endParaRPr kumimoji="1" lang="en-US" altLang="zh-CN" sz="1100" dirty="0">
+              <a:latin typeface="等线" panose="02010600030101010101" pitchFamily="2" charset="-122"/>
+              <a:ea typeface="等线" panose="02010600030101010101" pitchFamily="2" charset="-122"/>
+            </a:endParaRPr>
           </a:p>
           <a:p>
             <a:r>
@@ -7581,6 +7720,10 @@
               </a:rPr>
               <a:t>guarantee</a:t>
             </a:r>
+            <a:endParaRPr kumimoji="1" lang="en-US" altLang="zh-CN" sz="1100" dirty="0">
+              <a:latin typeface="等线" panose="02010600030101010101" pitchFamily="2" charset="-122"/>
+              <a:ea typeface="等线" panose="02010600030101010101" pitchFamily="2" charset="-122"/>
+            </a:endParaRPr>
           </a:p>
           <a:p>
             <a:r>
@@ -7639,6 +7782,10 @@
               </a:rPr>
               <a:t>}</a:t>
             </a:r>
+            <a:endParaRPr kumimoji="1" lang="en-US" altLang="zh-CN" sz="1100" dirty="0">
+              <a:latin typeface="等线" panose="02010600030101010101" pitchFamily="2" charset="-122"/>
+              <a:ea typeface="等线" panose="02010600030101010101" pitchFamily="2" charset="-122"/>
+            </a:endParaRPr>
           </a:p>
           <a:p>
             <a:r>
@@ -7697,6 +7844,10 @@
               </a:rPr>
               <a:t>}</a:t>
             </a:r>
+            <a:endParaRPr kumimoji="1" lang="en-US" altLang="zh-CN" sz="1100" dirty="0">
+              <a:latin typeface="等线" panose="02010600030101010101" pitchFamily="2" charset="-122"/>
+              <a:ea typeface="等线" panose="02010600030101010101" pitchFamily="2" charset="-122"/>
+            </a:endParaRPr>
           </a:p>
           <a:p>
             <a:r>
@@ -7727,6 +7878,10 @@
               </a:rPr>
               <a:t>guarantee</a:t>
             </a:r>
+            <a:endParaRPr kumimoji="1" lang="en-US" altLang="zh-CN" sz="1100" dirty="0">
+              <a:latin typeface="等线" panose="02010600030101010101" pitchFamily="2" charset="-122"/>
+              <a:ea typeface="等线" panose="02010600030101010101" pitchFamily="2" charset="-122"/>
+            </a:endParaRPr>
           </a:p>
           <a:p>
             <a:r>
@@ -7785,6 +7940,10 @@
               </a:rPr>
               <a:t>}</a:t>
             </a:r>
+            <a:endParaRPr kumimoji="1" lang="en-US" altLang="zh-CN" sz="1100" dirty="0">
+              <a:latin typeface="等线" panose="02010600030101010101" pitchFamily="2" charset="-122"/>
+              <a:ea typeface="等线" panose="02010600030101010101" pitchFamily="2" charset="-122"/>
+            </a:endParaRPr>
           </a:p>
           <a:p>
             <a:r>
@@ -7843,6 +8002,10 @@
               </a:rPr>
               <a:t>}</a:t>
             </a:r>
+            <a:endParaRPr kumimoji="1" lang="en-US" altLang="zh-CN" sz="1100" dirty="0">
+              <a:latin typeface="等线" panose="02010600030101010101" pitchFamily="2" charset="-122"/>
+              <a:ea typeface="等线" panose="02010600030101010101" pitchFamily="2" charset="-122"/>
+            </a:endParaRPr>
           </a:p>
         </p:txBody>
       </p:sp>
@@ -8319,6 +8482,10 @@
               </a:rPr>
               <a:t>transfer</a:t>
             </a:r>
+            <a:endParaRPr kumimoji="1" lang="en-US" altLang="zh-CN" sz="1200" dirty="0">
+              <a:latin typeface="等线" panose="02010600030101010101" pitchFamily="2" charset="-122"/>
+              <a:ea typeface="等线" panose="02010600030101010101" pitchFamily="2" charset="-122"/>
+            </a:endParaRPr>
           </a:p>
           <a:p>
             <a:r>
@@ -8377,6 +8544,10 @@
               </a:rPr>
               <a:t>}</a:t>
             </a:r>
+            <a:endParaRPr kumimoji="1" lang="en-US" altLang="zh-CN" sz="1200" dirty="0">
+              <a:latin typeface="等线" panose="02010600030101010101" pitchFamily="2" charset="-122"/>
+              <a:ea typeface="等线" panose="02010600030101010101" pitchFamily="2" charset="-122"/>
+            </a:endParaRPr>
           </a:p>
           <a:p>
             <a:r>
@@ -8435,6 +8606,10 @@
               </a:rPr>
               <a:t>}</a:t>
             </a:r>
+            <a:endParaRPr kumimoji="1" lang="en-US" altLang="zh-CN" sz="1200" dirty="0">
+              <a:latin typeface="等线" panose="02010600030101010101" pitchFamily="2" charset="-122"/>
+              <a:ea typeface="等线" panose="02010600030101010101" pitchFamily="2" charset="-122"/>
+            </a:endParaRPr>
           </a:p>
         </p:txBody>
       </p:sp>
@@ -8490,6 +8665,13 @@
               </a:rPr>
               <a:t>RESULT</a:t>
             </a:r>
+            <a:endParaRPr kumimoji="1" lang="en-US" altLang="zh-CN" sz="1200" b="1" dirty="0">
+              <a:solidFill>
+                <a:srgbClr val="FF0000"/>
+              </a:solidFill>
+              <a:latin typeface="等线" panose="02010600030101010101" pitchFamily="2" charset="-122"/>
+              <a:ea typeface="等线" panose="02010600030101010101" pitchFamily="2" charset="-122"/>
+            </a:endParaRPr>
           </a:p>
           <a:p>
             <a:r>
@@ -8532,6 +8714,13 @@
               </a:rPr>
               <a:t>SUM(edge2.amount)</a:t>
             </a:r>
+            <a:endParaRPr kumimoji="1" lang="en-US" altLang="zh-CN" sz="1200" dirty="0">
+              <a:solidFill>
+                <a:sysClr val="windowText" lastClr="000000"/>
+              </a:solidFill>
+              <a:latin typeface="等线" panose="02010600030101010101" pitchFamily="2" charset="-122"/>
+              <a:ea typeface="等线" panose="02010600030101010101" pitchFamily="2" charset="-122"/>
+            </a:endParaRPr>
           </a:p>
         </p:txBody>
       </p:sp>
@@ -9501,6 +9690,10 @@
               </a:rPr>
               <a:t>own</a:t>
             </a:r>
+            <a:endParaRPr kumimoji="1" lang="en-US" altLang="zh-CN" sz="1200" dirty="0">
+              <a:latin typeface="等线" panose="02010600030101010101" pitchFamily="2" charset="-122"/>
+              <a:ea typeface="等线" panose="02010600030101010101" pitchFamily="2" charset="-122"/>
+            </a:endParaRPr>
           </a:p>
         </p:txBody>
       </p:sp>
@@ -9562,6 +9755,10 @@
               </a:rPr>
               <a:t>own</a:t>
             </a:r>
+            <a:endParaRPr kumimoji="1" lang="en-US" altLang="zh-CN" sz="1200" dirty="0">
+              <a:latin typeface="等线" panose="02010600030101010101" pitchFamily="2" charset="-122"/>
+              <a:ea typeface="等线" panose="02010600030101010101" pitchFamily="2" charset="-122"/>
+            </a:endParaRPr>
           </a:p>
         </p:txBody>
       </p:sp>
@@ -10331,6 +10528,10 @@
               </a:rPr>
               <a:t>above</a:t>
             </a:r>
+            <a:endParaRPr kumimoji="1" lang="en-US" altLang="zh-CN" sz="1200" b="1" dirty="0">
+              <a:latin typeface="等线" panose="02010600030101010101" pitchFamily="2" charset="-122"/>
+              <a:ea typeface="等线" panose="02010600030101010101" pitchFamily="2" charset="-122"/>
+            </a:endParaRPr>
           </a:p>
           <a:p>
             <a:r>
@@ -10368,6 +10569,10 @@
               </a:rPr>
               <a:t>12</a:t>
             </a:r>
+            <a:endParaRPr kumimoji="1" lang="en-US" altLang="zh-CN" sz="1200" b="1" dirty="0">
+              <a:latin typeface="等线" panose="02010600030101010101" pitchFamily="2" charset="-122"/>
+              <a:ea typeface="等线" panose="02010600030101010101" pitchFamily="2" charset="-122"/>
+            </a:endParaRPr>
           </a:p>
           <a:p>
             <a:r>
@@ -10405,6 +10610,10 @@
               </a:rPr>
               <a:t>2pt</a:t>
             </a:r>
+            <a:endParaRPr kumimoji="1" lang="en-US" altLang="zh-CN" sz="1200" b="1" dirty="0">
+              <a:latin typeface="等线" panose="02010600030101010101" pitchFamily="2" charset="-122"/>
+              <a:ea typeface="等线" panose="02010600030101010101" pitchFamily="2" charset="-122"/>
+            </a:endParaRPr>
           </a:p>
           <a:p>
             <a:r>
@@ -10470,6 +10679,10 @@
               </a:rPr>
               <a:t>bold</a:t>
             </a:r>
+            <a:endParaRPr kumimoji="1" lang="en-US" altLang="zh-CN" sz="1200" b="1" dirty="0">
+              <a:latin typeface="等线" panose="02010600030101010101" pitchFamily="2" charset="-122"/>
+              <a:ea typeface="等线" panose="02010600030101010101" pitchFamily="2" charset="-122"/>
+            </a:endParaRPr>
           </a:p>
           <a:p>
             <a:r>
@@ -10542,6 +10755,10 @@
               </a:rPr>
               <a:t>bold</a:t>
             </a:r>
+            <a:endParaRPr kumimoji="1" lang="en-US" altLang="zh-CN" sz="1200" b="1" dirty="0">
+              <a:latin typeface="等线" panose="02010600030101010101" pitchFamily="2" charset="-122"/>
+              <a:ea typeface="等线" panose="02010600030101010101" pitchFamily="2" charset="-122"/>
+            </a:endParaRPr>
           </a:p>
         </p:txBody>
       </p:sp>
@@ -12272,6 +12489,10 @@
                 </a:rPr>
                 <a:t>invest</a:t>
               </a:r>
+              <a:endParaRPr kumimoji="1" lang="en-US" altLang="zh-CN" sz="1200" dirty="0">
+                <a:latin typeface="等线" panose="02010600030101010101" pitchFamily="2" charset="-122"/>
+                <a:ea typeface="等线" panose="02010600030101010101" pitchFamily="2" charset="-122"/>
+              </a:endParaRPr>
             </a:p>
             <a:p>
               <a:r>
@@ -12295,6 +12516,10 @@
                 </a:rPr>
                 <a:t>invest</a:t>
               </a:r>
+              <a:endParaRPr kumimoji="1" lang="en-US" altLang="zh-CN" sz="1200" dirty="0">
+                <a:latin typeface="等线" panose="02010600030101010101" pitchFamily="2" charset="-122"/>
+                <a:ea typeface="等线" panose="02010600030101010101" pitchFamily="2" charset="-122"/>
+              </a:endParaRPr>
             </a:p>
           </p:txBody>
         </p:sp>
@@ -13066,6 +13291,10 @@
               </a:rPr>
               <a:t>transfer</a:t>
             </a:r>
+            <a:endParaRPr kumimoji="1" lang="en-US" altLang="zh-CN" sz="1400" dirty="0">
+              <a:latin typeface="等线" panose="02010600030101010101" pitchFamily="2" charset="-122"/>
+              <a:ea typeface="等线" panose="02010600030101010101" pitchFamily="2" charset="-122"/>
+            </a:endParaRPr>
           </a:p>
           <a:p>
             <a:pPr algn="ctr"/>
@@ -13125,6 +13354,10 @@
               </a:rPr>
               <a:t>}</a:t>
             </a:r>
+            <a:endParaRPr kumimoji="1" lang="en-US" altLang="zh-CN" sz="1400" dirty="0">
+              <a:latin typeface="等线" panose="02010600030101010101" pitchFamily="2" charset="-122"/>
+              <a:ea typeface="等线" panose="02010600030101010101" pitchFamily="2" charset="-122"/>
+            </a:endParaRPr>
           </a:p>
           <a:p>
             <a:pPr algn="ctr"/>
@@ -13184,6 +13417,10 @@
               </a:rPr>
               <a:t>}</a:t>
             </a:r>
+            <a:endParaRPr kumimoji="1" lang="en-US" altLang="zh-CN" sz="1400" dirty="0">
+              <a:latin typeface="等线" panose="02010600030101010101" pitchFamily="2" charset="-122"/>
+              <a:ea typeface="等线" panose="02010600030101010101" pitchFamily="2" charset="-122"/>
+            </a:endParaRPr>
           </a:p>
           <a:p>
             <a:pPr algn="ctr"/>
@@ -13229,6 +13466,10 @@
               </a:rPr>
               <a:t>${threshold}</a:t>
             </a:r>
+            <a:endParaRPr kumimoji="1" lang="en-US" altLang="zh-CN" sz="1400" dirty="0">
+              <a:latin typeface="等线" panose="02010600030101010101" pitchFamily="2" charset="-122"/>
+              <a:ea typeface="等线" panose="02010600030101010101" pitchFamily="2" charset="-122"/>
+            </a:endParaRPr>
           </a:p>
         </p:txBody>
       </p:sp>
@@ -14588,6 +14829,13 @@
               </a:rPr>
               <a:t>$n2</a:t>
             </a:r>
+            <a:endParaRPr kumimoji="1" lang="en-US" altLang="zh-CN" sz="1200" b="1" dirty="0">
+              <a:solidFill>
+                <a:sysClr val="windowText" lastClr="000000"/>
+              </a:solidFill>
+              <a:latin typeface="等线" panose="02010600030101010101" pitchFamily="2" charset="-122"/>
+              <a:ea typeface="等线" panose="02010600030101010101" pitchFamily="2" charset="-122"/>
+            </a:endParaRPr>
           </a:p>
           <a:p>
             <a:r>
@@ -14701,6 +14949,10 @@
               </a:rPr>
               <a:t>transfer</a:t>
             </a:r>
+            <a:endParaRPr kumimoji="1" lang="en-US" altLang="zh-CN" sz="1400" dirty="0">
+              <a:latin typeface="等线" panose="02010600030101010101" pitchFamily="2" charset="-122"/>
+              <a:ea typeface="等线" panose="02010600030101010101" pitchFamily="2" charset="-122"/>
+            </a:endParaRPr>
           </a:p>
           <a:p>
             <a:pPr algn="ctr"/>
@@ -14760,6 +15012,10 @@
               </a:rPr>
               <a:t>}</a:t>
             </a:r>
+            <a:endParaRPr kumimoji="1" lang="en-US" altLang="zh-CN" sz="1400" dirty="0">
+              <a:latin typeface="等线" panose="02010600030101010101" pitchFamily="2" charset="-122"/>
+              <a:ea typeface="等线" panose="02010600030101010101" pitchFamily="2" charset="-122"/>
+            </a:endParaRPr>
           </a:p>
           <a:p>
             <a:pPr algn="ctr"/>
@@ -14819,6 +15075,10 @@
               </a:rPr>
               <a:t>}</a:t>
             </a:r>
+            <a:endParaRPr kumimoji="1" lang="en-US" altLang="zh-CN" sz="1400" dirty="0">
+              <a:latin typeface="等线" panose="02010600030101010101" pitchFamily="2" charset="-122"/>
+              <a:ea typeface="等线" panose="02010600030101010101" pitchFamily="2" charset="-122"/>
+            </a:endParaRPr>
           </a:p>
           <a:p>
             <a:pPr algn="ctr"/>
@@ -14864,6 +15124,10 @@
               </a:rPr>
               <a:t>${threshold}</a:t>
             </a:r>
+            <a:endParaRPr kumimoji="1" lang="en-US" altLang="zh-CN" sz="1400" dirty="0">
+              <a:latin typeface="等线" panose="02010600030101010101" pitchFamily="2" charset="-122"/>
+              <a:ea typeface="等线" panose="02010600030101010101" pitchFamily="2" charset="-122"/>
+            </a:endParaRPr>
           </a:p>
         </p:txBody>
       </p:sp>
@@ -15165,6 +15429,13 @@
               </a:rPr>
               <a:t>RESULT</a:t>
             </a:r>
+            <a:endParaRPr kumimoji="1" lang="en-US" altLang="zh-CN" sz="1200" b="1" dirty="0">
+              <a:solidFill>
+                <a:srgbClr val="FF0000"/>
+              </a:solidFill>
+              <a:latin typeface="等线" panose="02010600030101010101" pitchFamily="2" charset="-122"/>
+              <a:ea typeface="等线" panose="02010600030101010101" pitchFamily="2" charset="-122"/>
+            </a:endParaRPr>
           </a:p>
           <a:p>
             <a:r>
@@ -15267,6 +15538,13 @@
               </a:rPr>
               <a:t>)</a:t>
             </a:r>
+            <a:endParaRPr kumimoji="1" lang="en-US" altLang="zh-CN" sz="1200" dirty="0">
+              <a:solidFill>
+                <a:sysClr val="windowText" lastClr="000000"/>
+              </a:solidFill>
+              <a:latin typeface="等线" panose="02010600030101010101" pitchFamily="2" charset="-122"/>
+              <a:ea typeface="等线" panose="02010600030101010101" pitchFamily="2" charset="-122"/>
+            </a:endParaRPr>
           </a:p>
         </p:txBody>
       </p:sp>
@@ -15843,6 +16121,10 @@
               </a:rPr>
               <a:t>own</a:t>
             </a:r>
+            <a:endParaRPr kumimoji="1" lang="en-US" altLang="zh-CN" sz="1200" dirty="0">
+              <a:latin typeface="等线" panose="02010600030101010101" pitchFamily="2" charset="-122"/>
+              <a:ea typeface="等线" panose="02010600030101010101" pitchFamily="2" charset="-122"/>
+            </a:endParaRPr>
           </a:p>
           <a:p>
             <a:endParaRPr kumimoji="1" lang="en-US" altLang="zh-CN" sz="1200" dirty="0">
@@ -15955,6 +16237,10 @@
               </a:rPr>
               <a:t>}</a:t>
             </a:r>
+            <a:endParaRPr kumimoji="1" lang="en-US" altLang="zh-CN" sz="1200" dirty="0">
+              <a:latin typeface="等线" panose="02010600030101010101" pitchFamily="2" charset="-122"/>
+              <a:ea typeface="等线" panose="02010600030101010101" pitchFamily="2" charset="-122"/>
+            </a:endParaRPr>
           </a:p>
           <a:p>
             <a:r>
@@ -16013,6 +16299,10 @@
               </a:rPr>
               <a:t>}</a:t>
             </a:r>
+            <a:endParaRPr kumimoji="1" lang="en-US" altLang="zh-CN" sz="1200" dirty="0">
+              <a:latin typeface="等线" panose="02010600030101010101" pitchFamily="2" charset="-122"/>
+              <a:ea typeface="等线" panose="02010600030101010101" pitchFamily="2" charset="-122"/>
+            </a:endParaRPr>
           </a:p>
           <a:p>
             <a:endParaRPr kumimoji="1" lang="en-US" altLang="zh-CN" sz="1200" dirty="0">
@@ -16061,6 +16351,13 @@
               </a:rPr>
               <a:t>deposit</a:t>
             </a:r>
+            <a:endParaRPr kumimoji="1" lang="en-US" altLang="zh-CN" sz="1200" dirty="0">
+              <a:solidFill>
+                <a:schemeClr val="tx1"/>
+              </a:solidFill>
+              <a:latin typeface="等线" panose="02010600030101010101" pitchFamily="2" charset="-122"/>
+              <a:ea typeface="等线" panose="02010600030101010101" pitchFamily="2" charset="-122"/>
+            </a:endParaRPr>
           </a:p>
           <a:p>
             <a:r>
@@ -16143,6 +16440,13 @@
               </a:rPr>
               <a:t>}</a:t>
             </a:r>
+            <a:endParaRPr kumimoji="1" lang="en-US" altLang="zh-CN" sz="1200" dirty="0">
+              <a:solidFill>
+                <a:schemeClr val="tx1"/>
+              </a:solidFill>
+              <a:latin typeface="等线" panose="02010600030101010101" pitchFamily="2" charset="-122"/>
+              <a:ea typeface="等线" panose="02010600030101010101" pitchFamily="2" charset="-122"/>
+            </a:endParaRPr>
           </a:p>
           <a:p>
             <a:r>
@@ -16225,6 +16529,13 @@
               </a:rPr>
               <a:t>}</a:t>
             </a:r>
+            <a:endParaRPr kumimoji="1" lang="en-US" altLang="zh-CN" sz="1200" dirty="0">
+              <a:solidFill>
+                <a:schemeClr val="tx1"/>
+              </a:solidFill>
+              <a:latin typeface="等线" panose="02010600030101010101" pitchFamily="2" charset="-122"/>
+              <a:ea typeface="等线" panose="02010600030101010101" pitchFamily="2" charset="-122"/>
+            </a:endParaRPr>
           </a:p>
         </p:txBody>
       </p:sp>
@@ -17460,6 +17771,10 @@
                 </a:rPr>
                 <a:t>transfer</a:t>
               </a:r>
+              <a:endParaRPr kumimoji="1" lang="en-US" altLang="zh-CN" sz="1200" dirty="0">
+                <a:latin typeface="等线" panose="02010600030101010101" pitchFamily="2" charset="-122"/>
+                <a:ea typeface="等线" panose="02010600030101010101" pitchFamily="2" charset="-122"/>
+              </a:endParaRPr>
             </a:p>
             <a:p>
               <a:r>
@@ -17518,6 +17833,10 @@
                 </a:rPr>
                 <a:t>}</a:t>
               </a:r>
+              <a:endParaRPr kumimoji="1" lang="en-US" altLang="zh-CN" sz="1200" dirty="0">
+                <a:latin typeface="等线" panose="02010600030101010101" pitchFamily="2" charset="-122"/>
+                <a:ea typeface="等线" panose="02010600030101010101" pitchFamily="2" charset="-122"/>
+              </a:endParaRPr>
             </a:p>
             <a:p>
               <a:r>
@@ -17576,6 +17895,10 @@
                 </a:rPr>
                 <a:t>}</a:t>
               </a:r>
+              <a:endParaRPr kumimoji="1" lang="en-US" altLang="zh-CN" sz="1200" dirty="0">
+                <a:latin typeface="等线" panose="02010600030101010101" pitchFamily="2" charset="-122"/>
+                <a:ea typeface="等线" panose="02010600030101010101" pitchFamily="2" charset="-122"/>
+              </a:endParaRPr>
             </a:p>
           </p:txBody>
         </p:sp>
@@ -18433,6 +18756,13 @@
                 </a:rPr>
                 <a:t>)</a:t>
               </a:r>
+              <a:endParaRPr kumimoji="1" lang="en-US" altLang="zh-CN" sz="1400" dirty="0">
+                <a:solidFill>
+                  <a:sysClr val="windowText" lastClr="000000"/>
+                </a:solidFill>
+                <a:latin typeface="等线" panose="02010600030101010101" pitchFamily="2" charset="-122"/>
+                <a:ea typeface="等线" panose="02010600030101010101" pitchFamily="2" charset="-122"/>
+              </a:endParaRPr>
             </a:p>
           </p:txBody>
         </p:sp>
@@ -19192,6 +19522,13 @@
                 </a:rPr>
                 <a:t>1</a:t>
               </a:r>
+              <a:endParaRPr kumimoji="1" lang="en-US" altLang="zh-CN" sz="1200" b="1" dirty="0">
+                <a:solidFill>
+                  <a:sysClr val="windowText" lastClr="000000"/>
+                </a:solidFill>
+                <a:latin typeface="等线" panose="02010600030101010101" pitchFamily="2" charset="-122"/>
+                <a:ea typeface="等线" panose="02010600030101010101" pitchFamily="2" charset="-122"/>
+              </a:endParaRPr>
             </a:p>
           </p:txBody>
         </p:sp>
@@ -19267,6 +19604,13 @@
                 </a:rPr>
                 <a:t>N</a:t>
               </a:r>
+              <a:endParaRPr kumimoji="1" lang="en-US" altLang="zh-CN" sz="1200" b="1" dirty="0">
+                <a:solidFill>
+                  <a:sysClr val="windowText" lastClr="000000"/>
+                </a:solidFill>
+                <a:latin typeface="等线" panose="02010600030101010101" pitchFamily="2" charset="-122"/>
+                <a:ea typeface="等线" panose="02010600030101010101" pitchFamily="2" charset="-122"/>
+              </a:endParaRPr>
             </a:p>
           </p:txBody>
         </p:sp>
@@ -19711,6 +20055,10 @@
                 </a:rPr>
                 <a:t>transfer</a:t>
               </a:r>
+              <a:endParaRPr kumimoji="1" lang="en-US" altLang="zh-CN" sz="1200" dirty="0">
+                <a:latin typeface="等线" panose="02010600030101010101" pitchFamily="2" charset="-122"/>
+                <a:ea typeface="等线" panose="02010600030101010101" pitchFamily="2" charset="-122"/>
+              </a:endParaRPr>
             </a:p>
             <a:p>
               <a:pPr algn="ctr"/>
@@ -19770,6 +20118,10 @@
                 </a:rPr>
                 <a:t>}</a:t>
               </a:r>
+              <a:endParaRPr kumimoji="1" lang="en-US" altLang="zh-CN" sz="1200" dirty="0">
+                <a:latin typeface="等线" panose="02010600030101010101" pitchFamily="2" charset="-122"/>
+                <a:ea typeface="等线" panose="02010600030101010101" pitchFamily="2" charset="-122"/>
+              </a:endParaRPr>
             </a:p>
             <a:p>
               <a:pPr algn="ctr"/>
@@ -19829,6 +20181,10 @@
                 </a:rPr>
                 <a:t>}</a:t>
               </a:r>
+              <a:endParaRPr kumimoji="1" lang="en-US" altLang="zh-CN" sz="1200" dirty="0">
+                <a:latin typeface="等线" panose="02010600030101010101" pitchFamily="2" charset="-122"/>
+                <a:ea typeface="等线" panose="02010600030101010101" pitchFamily="2" charset="-122"/>
+              </a:endParaRPr>
             </a:p>
           </p:txBody>
         </p:sp>
@@ -20033,6 +20389,13 @@
                 </a:rPr>
                 <a:t>MAX(edge3.amount)</a:t>
               </a:r>
+              <a:endParaRPr kumimoji="1" lang="en-US" altLang="zh-CN" sz="1200" dirty="0">
+                <a:solidFill>
+                  <a:sysClr val="windowText" lastClr="000000"/>
+                </a:solidFill>
+                <a:latin typeface="等线" panose="02010600030101010101" pitchFamily="2" charset="-122"/>
+                <a:ea typeface="等线" panose="02010600030101010101" pitchFamily="2" charset="-122"/>
+              </a:endParaRPr>
             </a:p>
           </p:txBody>
         </p:sp>
@@ -20486,6 +20849,10 @@
                 </a:rPr>
                 <a:t>transfer</a:t>
               </a:r>
+              <a:endParaRPr kumimoji="1" lang="en-US" altLang="zh-CN" sz="1200" dirty="0">
+                <a:latin typeface="等线" panose="02010600030101010101" pitchFamily="2" charset="-122"/>
+                <a:ea typeface="等线" panose="02010600030101010101" pitchFamily="2" charset="-122"/>
+              </a:endParaRPr>
             </a:p>
             <a:p>
               <a:pPr algn="ctr"/>
@@ -20545,6 +20912,10 @@
                 </a:rPr>
                 <a:t>}</a:t>
               </a:r>
+              <a:endParaRPr kumimoji="1" lang="en-US" altLang="zh-CN" sz="1200" dirty="0">
+                <a:latin typeface="等线" panose="02010600030101010101" pitchFamily="2" charset="-122"/>
+                <a:ea typeface="等线" panose="02010600030101010101" pitchFamily="2" charset="-122"/>
+              </a:endParaRPr>
             </a:p>
             <a:p>
               <a:pPr algn="ctr"/>
@@ -20604,6 +20975,10 @@
                 </a:rPr>
                 <a:t>}</a:t>
               </a:r>
+              <a:endParaRPr kumimoji="1" lang="en-US" altLang="zh-CN" sz="1200" dirty="0">
+                <a:latin typeface="等线" panose="02010600030101010101" pitchFamily="2" charset="-122"/>
+                <a:ea typeface="等线" panose="02010600030101010101" pitchFamily="2" charset="-122"/>
+              </a:endParaRPr>
             </a:p>
           </p:txBody>
         </p:sp>
@@ -20760,6 +21135,10 @@
                 </a:rPr>
                 <a:t>transfer</a:t>
               </a:r>
+              <a:endParaRPr kumimoji="1" lang="en-US" altLang="zh-CN" sz="1200" dirty="0">
+                <a:latin typeface="等线" panose="02010600030101010101" pitchFamily="2" charset="-122"/>
+                <a:ea typeface="等线" panose="02010600030101010101" pitchFamily="2" charset="-122"/>
+              </a:endParaRPr>
             </a:p>
             <a:p>
               <a:pPr algn="ctr"/>
@@ -20819,6 +21198,10 @@
                 </a:rPr>
                 <a:t>}</a:t>
               </a:r>
+              <a:endParaRPr kumimoji="1" lang="en-US" altLang="zh-CN" sz="1200" dirty="0">
+                <a:latin typeface="等线" panose="02010600030101010101" pitchFamily="2" charset="-122"/>
+                <a:ea typeface="等线" panose="02010600030101010101" pitchFamily="2" charset="-122"/>
+              </a:endParaRPr>
             </a:p>
             <a:p>
               <a:pPr algn="ctr"/>
@@ -20878,6 +21261,10 @@
                 </a:rPr>
                 <a:t>}</a:t>
               </a:r>
+              <a:endParaRPr kumimoji="1" lang="en-US" altLang="zh-CN" sz="1200" dirty="0">
+                <a:latin typeface="等线" panose="02010600030101010101" pitchFamily="2" charset="-122"/>
+                <a:ea typeface="等线" panose="02010600030101010101" pitchFamily="2" charset="-122"/>
+              </a:endParaRPr>
             </a:p>
           </p:txBody>
         </p:sp>
@@ -21565,6 +21952,10 @@
                 </a:rPr>
                 <a:t>own</a:t>
               </a:r>
+              <a:endParaRPr kumimoji="1" lang="en-US" altLang="zh-CN" sz="1200" dirty="0">
+                <a:latin typeface="等线" panose="02010600030101010101" pitchFamily="2" charset="-122"/>
+                <a:ea typeface="等线" panose="02010600030101010101" pitchFamily="2" charset="-122"/>
+              </a:endParaRPr>
             </a:p>
           </p:txBody>
         </p:sp>
@@ -21860,6 +22251,10 @@
                 </a:rPr>
                 <a:t>}</a:t>
               </a:r>
+              <a:endParaRPr kumimoji="1" lang="en-US" altLang="zh-CN" sz="1200" dirty="0">
+                <a:latin typeface="等线" panose="02010600030101010101" pitchFamily="2" charset="-122"/>
+                <a:ea typeface="等线" panose="02010600030101010101" pitchFamily="2" charset="-122"/>
+              </a:endParaRPr>
             </a:p>
             <a:p>
               <a:r>
@@ -21918,6 +22313,10 @@
                 </a:rPr>
                 <a:t>}</a:t>
               </a:r>
+              <a:endParaRPr kumimoji="1" lang="en-US" altLang="zh-CN" sz="1200" dirty="0">
+                <a:latin typeface="等线" panose="02010600030101010101" pitchFamily="2" charset="-122"/>
+                <a:ea typeface="等线" panose="02010600030101010101" pitchFamily="2" charset="-122"/>
+              </a:endParaRPr>
             </a:p>
           </p:txBody>
         </p:sp>
@@ -21994,6 +22393,13 @@
                 </a:rPr>
                 <a:t>paths</a:t>
               </a:r>
+              <a:endParaRPr kumimoji="1" lang="en-US" altLang="zh-CN" sz="1200" dirty="0">
+                <a:solidFill>
+                  <a:sysClr val="windowText" lastClr="000000"/>
+                </a:solidFill>
+                <a:latin typeface="等线" panose="02010600030101010101" pitchFamily="2" charset="-122"/>
+                <a:ea typeface="等线" panose="02010600030101010101" pitchFamily="2" charset="-122"/>
+              </a:endParaRPr>
             </a:p>
           </p:txBody>
         </p:sp>
@@ -22069,6 +22475,13 @@
                 </a:rPr>
                 <a:t>1</a:t>
               </a:r>
+              <a:endParaRPr kumimoji="1" lang="en-US" altLang="zh-CN" sz="1200" b="1" dirty="0">
+                <a:solidFill>
+                  <a:sysClr val="windowText" lastClr="000000"/>
+                </a:solidFill>
+                <a:latin typeface="等线" panose="02010600030101010101" pitchFamily="2" charset="-122"/>
+                <a:ea typeface="等线" panose="02010600030101010101" pitchFamily="2" charset="-122"/>
+              </a:endParaRPr>
             </a:p>
           </p:txBody>
         </p:sp>
@@ -22310,6 +22723,13 @@
                 </a:rPr>
                 <a:t>N</a:t>
               </a:r>
+              <a:endParaRPr kumimoji="1" lang="en-US" altLang="zh-CN" sz="1200" b="1" dirty="0">
+                <a:solidFill>
+                  <a:sysClr val="windowText" lastClr="000000"/>
+                </a:solidFill>
+                <a:latin typeface="等线" panose="02010600030101010101" pitchFamily="2" charset="-122"/>
+                <a:ea typeface="等线" panose="02010600030101010101" pitchFamily="2" charset="-122"/>
+              </a:endParaRPr>
             </a:p>
           </p:txBody>
         </p:sp>
@@ -23076,6 +23496,13 @@
                 </a:rPr>
                 <a:t>2</a:t>
               </a:r>
+              <a:endParaRPr kumimoji="1" lang="en-US" altLang="zh-CN" sz="1200" b="1" dirty="0">
+                <a:solidFill>
+                  <a:sysClr val="windowText" lastClr="000000"/>
+                </a:solidFill>
+                <a:latin typeface="等线" panose="02010600030101010101" pitchFamily="2" charset="-122"/>
+                <a:ea typeface="等线" panose="02010600030101010101" pitchFamily="2" charset="-122"/>
+              </a:endParaRPr>
             </a:p>
           </p:txBody>
         </p:sp>
@@ -23229,6 +23656,10 @@
               </a:rPr>
               <a:t>transfer</a:t>
             </a:r>
+            <a:endParaRPr kumimoji="1" lang="en-US" altLang="zh-CN" sz="1200" dirty="0">
+              <a:latin typeface="等线" panose="02010600030101010101" pitchFamily="2" charset="-122"/>
+              <a:ea typeface="等线" panose="02010600030101010101" pitchFamily="2" charset="-122"/>
+            </a:endParaRPr>
           </a:p>
           <a:p>
             <a:r>
@@ -23287,6 +23718,10 @@
               </a:rPr>
               <a:t>}</a:t>
             </a:r>
+            <a:endParaRPr kumimoji="1" lang="en-US" altLang="zh-CN" sz="1200" dirty="0">
+              <a:latin typeface="等线" panose="02010600030101010101" pitchFamily="2" charset="-122"/>
+              <a:ea typeface="等线" panose="02010600030101010101" pitchFamily="2" charset="-122"/>
+            </a:endParaRPr>
           </a:p>
           <a:p>
             <a:r>
@@ -23345,6 +23780,10 @@
               </a:rPr>
               <a:t>}</a:t>
             </a:r>
+            <a:endParaRPr kumimoji="1" lang="en-US" altLang="zh-CN" sz="1200" dirty="0">
+              <a:latin typeface="等线" panose="02010600030101010101" pitchFamily="2" charset="-122"/>
+              <a:ea typeface="等线" panose="02010600030101010101" pitchFamily="2" charset="-122"/>
+            </a:endParaRPr>
           </a:p>
           <a:p>
             <a:r>
@@ -23389,6 +23828,10 @@
               </a:rPr>
               <a:t>${threshold1}</a:t>
             </a:r>
+            <a:endParaRPr kumimoji="1" lang="en-US" altLang="zh-CN" sz="1200" dirty="0">
+              <a:latin typeface="等线" panose="02010600030101010101" pitchFamily="2" charset="-122"/>
+              <a:ea typeface="等线" panose="02010600030101010101" pitchFamily="2" charset="-122"/>
+            </a:endParaRPr>
           </a:p>
         </p:txBody>
       </p:sp>
@@ -23619,6 +24062,13 @@
               </a:rPr>
               <a:t>edge2.amount)</a:t>
             </a:r>
+            <a:endParaRPr kumimoji="1" lang="en-US" altLang="zh-CN" sz="1200" dirty="0">
+              <a:solidFill>
+                <a:sysClr val="windowText" lastClr="000000"/>
+              </a:solidFill>
+              <a:latin typeface="等线" panose="02010600030101010101" pitchFamily="2" charset="-122"/>
+              <a:ea typeface="等线" panose="02010600030101010101" pitchFamily="2" charset="-122"/>
+            </a:endParaRPr>
           </a:p>
         </p:txBody>
       </p:sp>
@@ -23975,6 +24425,10 @@
               </a:rPr>
               <a:t>withdraw</a:t>
             </a:r>
+            <a:endParaRPr kumimoji="1" lang="en-US" altLang="zh-CN" sz="1200" dirty="0">
+              <a:latin typeface="等线" panose="02010600030101010101" pitchFamily="2" charset="-122"/>
+              <a:ea typeface="等线" panose="02010600030101010101" pitchFamily="2" charset="-122"/>
+            </a:endParaRPr>
           </a:p>
           <a:p>
             <a:r>
@@ -24033,6 +24487,10 @@
               </a:rPr>
               <a:t>}</a:t>
             </a:r>
+            <a:endParaRPr kumimoji="1" lang="en-US" altLang="zh-CN" sz="1200" dirty="0">
+              <a:latin typeface="等线" panose="02010600030101010101" pitchFamily="2" charset="-122"/>
+              <a:ea typeface="等线" panose="02010600030101010101" pitchFamily="2" charset="-122"/>
+            </a:endParaRPr>
           </a:p>
           <a:p>
             <a:r>
@@ -24091,6 +24549,10 @@
               </a:rPr>
               <a:t>}</a:t>
             </a:r>
+            <a:endParaRPr kumimoji="1" lang="en-US" altLang="zh-CN" sz="1200" dirty="0">
+              <a:latin typeface="等线" panose="02010600030101010101" pitchFamily="2" charset="-122"/>
+              <a:ea typeface="等线" panose="02010600030101010101" pitchFamily="2" charset="-122"/>
+            </a:endParaRPr>
           </a:p>
           <a:p>
             <a:r>
@@ -24135,6 +24597,10 @@
               </a:rPr>
               <a:t>${threshold2}</a:t>
             </a:r>
+            <a:endParaRPr kumimoji="1" lang="en-US" altLang="zh-CN" sz="1200" dirty="0">
+              <a:latin typeface="等线" panose="02010600030101010101" pitchFamily="2" charset="-122"/>
+              <a:ea typeface="等线" panose="02010600030101010101" pitchFamily="2" charset="-122"/>
+            </a:endParaRPr>
           </a:p>
         </p:txBody>
       </p:sp>
@@ -24405,6 +24871,11 @@
                 </a:rPr>
                 <a:t>card</a:t>
               </a:r>
+              <a:endParaRPr kumimoji="1" lang="en-US" altLang="zh-CN" sz="1200" dirty="0">
+                <a:solidFill>
+                  <a:sysClr val="windowText" lastClr="000000"/>
+                </a:solidFill>
+              </a:endParaRPr>
             </a:p>
           </p:txBody>
         </p:sp>
@@ -24899,7 +25370,7 @@
           <p:nvPr/>
         </p:nvGrpSpPr>
         <p:grpSpPr>
-          <a:xfrm>
+          <a:xfrm rot="0">
             <a:off x="5384800" y="3100070"/>
             <a:ext cx="1456055" cy="904240"/>
             <a:chOff x="1058491" y="2051323"/>
@@ -25123,7 +25594,7 @@
         <p:spPr>
           <a:xfrm>
             <a:off x="6096000" y="1268095"/>
-            <a:ext cx="2684780" cy="954405"/>
+            <a:ext cx="2684780" cy="953135"/>
           </a:xfrm>
           <a:prstGeom prst="rect">
             <a:avLst/>
@@ -25144,47 +25615,17 @@
               <a:t>edge2</a:t>
             </a:r>
             <a:r>
-              <a:rPr kumimoji="1" lang="zh-CN" altLang="en-US" sz="1400" b="1" dirty="0">
-                <a:latin typeface="等线" panose="02010600030101010101" pitchFamily="2" charset="-122"/>
-                <a:ea typeface="等线" panose="02010600030101010101" pitchFamily="2" charset="-122"/>
-              </a:rPr>
-              <a:t> </a:t>
-            </a:r>
-            <a:r>
               <a:rPr kumimoji="1" lang="en-US" altLang="zh-CN" sz="1400" dirty="0">
                 <a:latin typeface="等线" panose="02010600030101010101" pitchFamily="2" charset="-122"/>
                 <a:ea typeface="等线" panose="02010600030101010101" pitchFamily="2" charset="-122"/>
-              </a:rPr>
-              <a:t>in</a:t>
-            </a:r>
-            <a:r>
-              <a:rPr kumimoji="1" lang="zh-CN" altLang="en-US" sz="1400" dirty="0">
-                <a:latin typeface="等线" panose="02010600030101010101" pitchFamily="2" charset="-122"/>
-                <a:ea typeface="等线" panose="02010600030101010101" pitchFamily="2" charset="-122"/>
-              </a:rPr>
-              <a:t> </a:t>
-            </a:r>
-            <a:r>
-              <a:rPr kumimoji="1" lang="en-US" altLang="zh-CN" sz="1400" dirty="0">
-                <a:latin typeface="等线" panose="02010600030101010101" pitchFamily="2" charset="-122"/>
-                <a:ea typeface="等线" panose="02010600030101010101" pitchFamily="2" charset="-122"/>
-              </a:rPr>
-              <a:t>[transfer,</a:t>
-            </a:r>
-            <a:r>
-              <a:rPr kumimoji="1" lang="zh-CN" altLang="en-US" sz="1400" dirty="0">
-                <a:latin typeface="等线" panose="02010600030101010101" pitchFamily="2" charset="-122"/>
-                <a:ea typeface="等线" panose="02010600030101010101" pitchFamily="2" charset="-122"/>
-              </a:rPr>
-              <a:t> </a:t>
-            </a:r>
-            <a:r>
-              <a:rPr kumimoji="1" lang="en-US" altLang="zh-CN" sz="1400" dirty="0">
-                <a:latin typeface="等线" panose="02010600030101010101" pitchFamily="2" charset="-122"/>
-                <a:ea typeface="等线" panose="02010600030101010101" pitchFamily="2" charset="-122"/>
-              </a:rPr>
-              <a:t>withdraw]</a:t>
-            </a:r>
+                <a:sym typeface="+mn-ea"/>
+              </a:rPr>
+              <a:t>: transfer</a:t>
+            </a:r>
+            <a:endParaRPr kumimoji="1" lang="en-US" altLang="zh-CN" sz="1400" dirty="0">
+              <a:latin typeface="等线" panose="02010600030101010101" pitchFamily="2" charset="-122"/>
+              <a:ea typeface="等线" panose="02010600030101010101" pitchFamily="2" charset="-122"/>
+            </a:endParaRPr>
           </a:p>
           <a:p>
             <a:r>
@@ -25243,6 +25684,10 @@
               </a:rPr>
               <a:t>}</a:t>
             </a:r>
+            <a:endParaRPr kumimoji="1" lang="en-US" altLang="zh-CN" sz="1400" dirty="0">
+              <a:latin typeface="等线" panose="02010600030101010101" pitchFamily="2" charset="-122"/>
+              <a:ea typeface="等线" panose="02010600030101010101" pitchFamily="2" charset="-122"/>
+            </a:endParaRPr>
           </a:p>
           <a:p>
             <a:r>
@@ -25301,6 +25746,10 @@
               </a:rPr>
               <a:t>}</a:t>
             </a:r>
+            <a:endParaRPr kumimoji="1" lang="en-US" altLang="zh-CN" sz="1400" dirty="0">
+              <a:latin typeface="等线" panose="02010600030101010101" pitchFamily="2" charset="-122"/>
+              <a:ea typeface="等线" panose="02010600030101010101" pitchFamily="2" charset="-122"/>
+            </a:endParaRPr>
           </a:p>
           <a:p>
             <a:r>
@@ -25345,6 +25794,10 @@
               </a:rPr>
               <a:t>${threshold}</a:t>
             </a:r>
+            <a:endParaRPr kumimoji="1" lang="en-US" altLang="zh-CN" sz="1400" dirty="0">
+              <a:latin typeface="等线" panose="02010600030101010101" pitchFamily="2" charset="-122"/>
+              <a:ea typeface="等线" panose="02010600030101010101" pitchFamily="2" charset="-122"/>
+            </a:endParaRPr>
           </a:p>
         </p:txBody>
       </p:sp>
@@ -26247,7 +26700,7 @@
         <p:spPr>
           <a:xfrm>
             <a:off x="3411220" y="1270000"/>
-            <a:ext cx="2727960" cy="954405"/>
+            <a:ext cx="2727960" cy="953135"/>
           </a:xfrm>
           <a:prstGeom prst="rect">
             <a:avLst/>
@@ -26268,47 +26721,16 @@
               <a:t>edge1</a:t>
             </a:r>
             <a:r>
-              <a:rPr kumimoji="1" lang="zh-CN" altLang="en-US" sz="1400" b="1" dirty="0">
-                <a:latin typeface="等线" panose="02010600030101010101" pitchFamily="2" charset="-122"/>
-                <a:ea typeface="等线" panose="02010600030101010101" pitchFamily="2" charset="-122"/>
-              </a:rPr>
-              <a:t> </a:t>
-            </a:r>
-            <a:r>
               <a:rPr kumimoji="1" lang="en-US" altLang="zh-CN" sz="1400" dirty="0">
                 <a:latin typeface="等线" panose="02010600030101010101" pitchFamily="2" charset="-122"/>
                 <a:ea typeface="等线" panose="02010600030101010101" pitchFamily="2" charset="-122"/>
               </a:rPr>
-              <a:t>in</a:t>
-            </a:r>
-            <a:r>
-              <a:rPr kumimoji="1" lang="zh-CN" altLang="en-US" sz="1400" b="1" dirty="0">
-                <a:latin typeface="等线" panose="02010600030101010101" pitchFamily="2" charset="-122"/>
-                <a:ea typeface="等线" panose="02010600030101010101" pitchFamily="2" charset="-122"/>
-              </a:rPr>
-              <a:t> </a:t>
-            </a:r>
-            <a:r>
-              <a:rPr kumimoji="1" lang="en-US" altLang="zh-CN" sz="1400" dirty="0">
-                <a:latin typeface="等线" panose="02010600030101010101" pitchFamily="2" charset="-122"/>
-                <a:ea typeface="等线" panose="02010600030101010101" pitchFamily="2" charset="-122"/>
-              </a:rPr>
-              <a:t>[transfer,</a:t>
-            </a:r>
-            <a:r>
-              <a:rPr kumimoji="1" lang="zh-CN" altLang="en-US" sz="1400" dirty="0">
-                <a:latin typeface="等线" panose="02010600030101010101" pitchFamily="2" charset="-122"/>
-                <a:ea typeface="等线" panose="02010600030101010101" pitchFamily="2" charset="-122"/>
-              </a:rPr>
-              <a:t> </a:t>
-            </a:r>
-            <a:r>
-              <a:rPr kumimoji="1" lang="en-US" altLang="zh-CN" sz="1400" dirty="0">
-                <a:latin typeface="等线" panose="02010600030101010101" pitchFamily="2" charset="-122"/>
-                <a:ea typeface="等线" panose="02010600030101010101" pitchFamily="2" charset="-122"/>
-              </a:rPr>
-              <a:t>withdraw]</a:t>
-            </a:r>
+              <a:t>: transfer</a:t>
+            </a:r>
+            <a:endParaRPr kumimoji="1" lang="en-US" altLang="zh-CN" sz="1400" dirty="0">
+              <a:latin typeface="等线" panose="02010600030101010101" pitchFamily="2" charset="-122"/>
+              <a:ea typeface="等线" panose="02010600030101010101" pitchFamily="2" charset="-122"/>
+            </a:endParaRPr>
           </a:p>
           <a:p>
             <a:r>
@@ -26367,6 +26789,10 @@
               </a:rPr>
               <a:t>}</a:t>
             </a:r>
+            <a:endParaRPr kumimoji="1" lang="en-US" altLang="zh-CN" sz="1400" dirty="0">
+              <a:latin typeface="等线" panose="02010600030101010101" pitchFamily="2" charset="-122"/>
+              <a:ea typeface="等线" panose="02010600030101010101" pitchFamily="2" charset="-122"/>
+            </a:endParaRPr>
           </a:p>
           <a:p>
             <a:r>
@@ -26425,6 +26851,10 @@
               </a:rPr>
               <a:t>}</a:t>
             </a:r>
+            <a:endParaRPr kumimoji="1" lang="en-US" altLang="zh-CN" sz="1400" dirty="0">
+              <a:latin typeface="等线" panose="02010600030101010101" pitchFamily="2" charset="-122"/>
+              <a:ea typeface="等线" panose="02010600030101010101" pitchFamily="2" charset="-122"/>
+            </a:endParaRPr>
           </a:p>
           <a:p>
             <a:r>
@@ -26469,6 +26899,10 @@
               </a:rPr>
               <a:t>${threshold}</a:t>
             </a:r>
+            <a:endParaRPr kumimoji="1" lang="en-US" altLang="zh-CN" sz="1400" dirty="0">
+              <a:latin typeface="等线" panose="02010600030101010101" pitchFamily="2" charset="-122"/>
+              <a:ea typeface="等线" panose="02010600030101010101" pitchFamily="2" charset="-122"/>
+            </a:endParaRPr>
           </a:p>
         </p:txBody>
       </p:sp>
@@ -26624,6 +27058,13 @@
               </a:rPr>
               <a:t>SUM(edge1.amount)/SUM(edge2.amount)</a:t>
             </a:r>
+            <a:endParaRPr kumimoji="1" lang="en-US" altLang="zh-CN" sz="1400" dirty="0">
+              <a:solidFill>
+                <a:sysClr val="windowText" lastClr="000000"/>
+              </a:solidFill>
+              <a:latin typeface="等线" panose="02010600030101010101" pitchFamily="2" charset="-122"/>
+              <a:ea typeface="等线" panose="02010600030101010101" pitchFamily="2" charset="-122"/>
+            </a:endParaRPr>
           </a:p>
         </p:txBody>
       </p:sp>
@@ -27014,6 +27455,10 @@
               </a:rPr>
               <a:t>deposit</a:t>
             </a:r>
+            <a:endParaRPr kumimoji="1" lang="en-US" altLang="zh-CN" sz="1200" dirty="0">
+              <a:latin typeface="等线" panose="02010600030101010101" pitchFamily="2" charset="-122"/>
+              <a:ea typeface="等线" panose="02010600030101010101" pitchFamily="2" charset="-122"/>
+            </a:endParaRPr>
           </a:p>
           <a:p>
             <a:r>
@@ -27107,6 +27552,10 @@
               </a:rPr>
               <a:t>}</a:t>
             </a:r>
+            <a:endParaRPr kumimoji="1" lang="en-US" altLang="zh-CN" sz="1200" dirty="0">
+              <a:latin typeface="等线" panose="02010600030101010101" pitchFamily="2" charset="-122"/>
+              <a:ea typeface="等线" panose="02010600030101010101" pitchFamily="2" charset="-122"/>
+            </a:endParaRPr>
           </a:p>
           <a:p>
             <a:endParaRPr kumimoji="1" lang="en-US" altLang="zh-CN" sz="1200" b="1" dirty="0">
@@ -27164,6 +27613,10 @@
               </a:rPr>
               <a:t>withdraw]</a:t>
             </a:r>
+            <a:endParaRPr kumimoji="1" lang="en-US" altLang="zh-CN" sz="1200" dirty="0">
+              <a:latin typeface="等线" panose="02010600030101010101" pitchFamily="2" charset="-122"/>
+              <a:ea typeface="等线" panose="02010600030101010101" pitchFamily="2" charset="-122"/>
+            </a:endParaRPr>
           </a:p>
           <a:p>
             <a:r>
@@ -27222,6 +27675,10 @@
               </a:rPr>
               <a:t>${threshold}</a:t>
             </a:r>
+            <a:endParaRPr kumimoji="1" lang="en-US" altLang="zh-CN" sz="1200" dirty="0">
+              <a:latin typeface="等线" panose="02010600030101010101" pitchFamily="2" charset="-122"/>
+              <a:ea typeface="等线" panose="02010600030101010101" pitchFamily="2" charset="-122"/>
+            </a:endParaRPr>
           </a:p>
           <a:p>
             <a:r>
@@ -27315,6 +27772,10 @@
               </a:rPr>
               <a:t>}</a:t>
             </a:r>
+            <a:endParaRPr kumimoji="1" lang="en-US" altLang="zh-CN" sz="1200" dirty="0">
+              <a:latin typeface="等线" panose="02010600030101010101" pitchFamily="2" charset="-122"/>
+              <a:ea typeface="等线" panose="02010600030101010101" pitchFamily="2" charset="-122"/>
+            </a:endParaRPr>
           </a:p>
           <a:p>
             <a:endParaRPr kumimoji="1" lang="en-US" altLang="zh-CN" sz="1200" b="1" dirty="0">
@@ -27372,6 +27833,10 @@
               </a:rPr>
               <a:t>withdraw]</a:t>
             </a:r>
+            <a:endParaRPr kumimoji="1" lang="en-US" altLang="zh-CN" sz="1200" dirty="0">
+              <a:latin typeface="等线" panose="02010600030101010101" pitchFamily="2" charset="-122"/>
+              <a:ea typeface="等线" panose="02010600030101010101" pitchFamily="2" charset="-122"/>
+            </a:endParaRPr>
           </a:p>
           <a:p>
             <a:r>
@@ -27430,6 +27895,10 @@
               </a:rPr>
               <a:t>${threshold}</a:t>
             </a:r>
+            <a:endParaRPr kumimoji="1" lang="en-US" altLang="zh-CN" sz="1200" dirty="0">
+              <a:latin typeface="等线" panose="02010600030101010101" pitchFamily="2" charset="-122"/>
+              <a:ea typeface="等线" panose="02010600030101010101" pitchFamily="2" charset="-122"/>
+            </a:endParaRPr>
           </a:p>
           <a:p>
             <a:r>
@@ -27523,6 +27992,10 @@
               </a:rPr>
               <a:t>}</a:t>
             </a:r>
+            <a:endParaRPr kumimoji="1" lang="en-US" altLang="zh-CN" sz="1200" dirty="0">
+              <a:latin typeface="等线" panose="02010600030101010101" pitchFamily="2" charset="-122"/>
+              <a:ea typeface="等线" panose="02010600030101010101" pitchFamily="2" charset="-122"/>
+            </a:endParaRPr>
           </a:p>
           <a:p>
             <a:endParaRPr kumimoji="1" lang="en-US" altLang="zh-CN" sz="1200" dirty="0">
@@ -27580,6 +28053,10 @@
               </a:rPr>
               <a:t>withdraw]</a:t>
             </a:r>
+            <a:endParaRPr kumimoji="1" lang="en-US" altLang="zh-CN" sz="1200" dirty="0">
+              <a:latin typeface="等线" panose="02010600030101010101" pitchFamily="2" charset="-122"/>
+              <a:ea typeface="等线" panose="02010600030101010101" pitchFamily="2" charset="-122"/>
+            </a:endParaRPr>
           </a:p>
           <a:p>
             <a:r>
@@ -27638,6 +28115,10 @@
               </a:rPr>
               <a:t>${threshold}</a:t>
             </a:r>
+            <a:endParaRPr kumimoji="1" lang="en-US" altLang="zh-CN" sz="1200" dirty="0">
+              <a:latin typeface="等线" panose="02010600030101010101" pitchFamily="2" charset="-122"/>
+              <a:ea typeface="等线" panose="02010600030101010101" pitchFamily="2" charset="-122"/>
+            </a:endParaRPr>
           </a:p>
           <a:p>
             <a:r>
@@ -27731,6 +28212,10 @@
               </a:rPr>
               <a:t>}</a:t>
             </a:r>
+            <a:endParaRPr kumimoji="1" lang="en-US" altLang="zh-CN" sz="1200" dirty="0">
+              <a:latin typeface="等线" panose="02010600030101010101" pitchFamily="2" charset="-122"/>
+              <a:ea typeface="等线" panose="02010600030101010101" pitchFamily="2" charset="-122"/>
+            </a:endParaRPr>
           </a:p>
         </p:txBody>
       </p:sp>
@@ -29805,13 +30290,7 @@
       </p:grpSpPr>
       <p:grpSp>
         <p:nvGrpSpPr>
-          <p:cNvPr id="3" name="Group 2">
-            <a:extLst>
-              <a:ext uri="{FF2B5EF4-FFF2-40B4-BE49-F238E27FC236}">
-                <a16:creationId xmlns:a16="http://schemas.microsoft.com/office/drawing/2014/main" id="{CF2900DA-C291-4C59-4B17-936A724A092D}"/>
-              </a:ext>
-            </a:extLst>
-          </p:cNvPr>
+          <p:cNvPr id="3" name="Group 2"/>
           <p:cNvGrpSpPr/>
           <p:nvPr/>
         </p:nvGrpSpPr>
@@ -29896,6 +30375,13 @@
                 </a:rPr>
                 <a:t>SUM(edge1.amount)/SUM(edge2.amount),</a:t>
               </a:r>
+              <a:endParaRPr kumimoji="1" lang="en-US" altLang="zh-CN" sz="1200" dirty="0">
+                <a:solidFill>
+                  <a:schemeClr val="tx1"/>
+                </a:solidFill>
+                <a:latin typeface="等线" panose="02010600030101010101" pitchFamily="2" charset="-122"/>
+                <a:ea typeface="等线" panose="02010600030101010101" pitchFamily="2" charset="-122"/>
+              </a:endParaRPr>
             </a:p>
             <a:p>
               <a:pPr algn="r"/>
@@ -29909,6 +30395,13 @@
                 </a:rPr>
                 <a:t>SUM(edge1.amount)/SUM(edge4.amount),</a:t>
               </a:r>
+              <a:endParaRPr kumimoji="1" lang="en-US" altLang="zh-CN" sz="1200" dirty="0">
+                <a:solidFill>
+                  <a:schemeClr val="tx1"/>
+                </a:solidFill>
+                <a:latin typeface="等线" panose="02010600030101010101" pitchFamily="2" charset="-122"/>
+                <a:ea typeface="等线" panose="02010600030101010101" pitchFamily="2" charset="-122"/>
+              </a:endParaRPr>
             </a:p>
             <a:p>
               <a:pPr algn="r"/>
@@ -29922,6 +30415,13 @@
                 </a:rPr>
                 <a:t>SUM(edge3.amount)/SUM(edge4.amount)</a:t>
               </a:r>
+              <a:endParaRPr kumimoji="1" lang="en-US" altLang="zh-CN" sz="1200" dirty="0">
+                <a:solidFill>
+                  <a:schemeClr val="tx1"/>
+                </a:solidFill>
+                <a:latin typeface="等线" panose="02010600030101010101" pitchFamily="2" charset="-122"/>
+                <a:ea typeface="等线" panose="02010600030101010101" pitchFamily="2" charset="-122"/>
+              </a:endParaRPr>
             </a:p>
           </p:txBody>
         </p:sp>
@@ -30560,169 +31060,7 @@
                 </a:rPr>
                 <a:t>deposit</a:t>
               </a:r>
-            </a:p>
-            <a:p>
-              <a:r>
-                <a:rPr kumimoji="1" lang="en-US" altLang="zh-CN" sz="1200" b="1" dirty="0">
-                  <a:latin typeface="等线" panose="02010600030101010101" pitchFamily="2" charset="-122"/>
-                  <a:ea typeface="等线" panose="02010600030101010101" pitchFamily="2" charset="-122"/>
-                </a:rPr>
-                <a:t>edge1</a:t>
-              </a:r>
-              <a:r>
-                <a:rPr kumimoji="1" lang="en-US" altLang="zh-CN" sz="1200" dirty="0">
-                  <a:latin typeface="等线" panose="02010600030101010101" pitchFamily="2" charset="-122"/>
-                  <a:ea typeface="等线" panose="02010600030101010101" pitchFamily="2" charset="-122"/>
-                </a:rPr>
-                <a:t>.amount</a:t>
-              </a:r>
-              <a:r>
-                <a:rPr kumimoji="1" lang="zh-CN" altLang="en-US" sz="1200" dirty="0">
-                  <a:latin typeface="等线" panose="02010600030101010101" pitchFamily="2" charset="-122"/>
-                  <a:ea typeface="等线" panose="02010600030101010101" pitchFamily="2" charset="-122"/>
-                </a:rPr>
-                <a:t> </a:t>
-              </a:r>
-              <a:r>
-                <a:rPr kumimoji="1" lang="en-US" altLang="zh-CN" sz="1200" dirty="0">
-                  <a:latin typeface="等线" panose="02010600030101010101" pitchFamily="2" charset="-122"/>
-                  <a:ea typeface="等线" panose="02010600030101010101" pitchFamily="2" charset="-122"/>
-                </a:rPr>
-                <a:t>&gt;</a:t>
-              </a:r>
-              <a:r>
-                <a:rPr kumimoji="1" lang="zh-CN" altLang="en-US" sz="1200" dirty="0">
-                  <a:latin typeface="等线" panose="02010600030101010101" pitchFamily="2" charset="-122"/>
-                  <a:ea typeface="等线" panose="02010600030101010101" pitchFamily="2" charset="-122"/>
-                </a:rPr>
-                <a:t> </a:t>
-              </a:r>
-              <a:r>
-                <a:rPr kumimoji="1" lang="en-US" altLang="zh-CN" sz="1200" dirty="0">
-                  <a:latin typeface="等线" panose="02010600030101010101" pitchFamily="2" charset="-122"/>
-                  <a:ea typeface="等线" panose="02010600030101010101" pitchFamily="2" charset="-122"/>
-                </a:rPr>
-                <a:t>${threshold}</a:t>
-              </a:r>
-            </a:p>
-            <a:p>
-              <a:r>
-                <a:rPr kumimoji="1" lang="en-US" altLang="zh-CN" sz="1200" b="1" dirty="0">
-                  <a:latin typeface="等线" panose="02010600030101010101" pitchFamily="2" charset="-122"/>
-                  <a:ea typeface="等线" panose="02010600030101010101" pitchFamily="2" charset="-122"/>
-                </a:rPr>
-                <a:t>edge1</a:t>
-              </a:r>
-              <a:r>
-                <a:rPr kumimoji="1" lang="en-US" altLang="zh-CN" sz="1200" dirty="0">
-                  <a:latin typeface="等线" panose="02010600030101010101" pitchFamily="2" charset="-122"/>
-                  <a:ea typeface="等线" panose="02010600030101010101" pitchFamily="2" charset="-122"/>
-                </a:rPr>
-                <a:t>.timestamp</a:t>
-              </a:r>
-              <a:r>
-                <a:rPr kumimoji="1" lang="zh-CN" altLang="en-US" sz="1200" dirty="0">
-                  <a:latin typeface="等线" panose="02010600030101010101" pitchFamily="2" charset="-122"/>
-                  <a:ea typeface="等线" panose="02010600030101010101" pitchFamily="2" charset="-122"/>
-                </a:rPr>
-                <a:t> </a:t>
-              </a:r>
-              <a:r>
-                <a:rPr kumimoji="1" lang="en-US" altLang="zh-CN" sz="1200" dirty="0">
-                  <a:latin typeface="等线" panose="02010600030101010101" pitchFamily="2" charset="-122"/>
-                  <a:ea typeface="等线" panose="02010600030101010101" pitchFamily="2" charset="-122"/>
-                </a:rPr>
-                <a:t>&gt;</a:t>
-              </a:r>
-              <a:r>
-                <a:rPr kumimoji="1" lang="zh-CN" altLang="en-US" sz="1200" dirty="0">
-                  <a:latin typeface="等线" panose="02010600030101010101" pitchFamily="2" charset="-122"/>
-                  <a:ea typeface="等线" panose="02010600030101010101" pitchFamily="2" charset="-122"/>
-                </a:rPr>
-                <a:t> </a:t>
-              </a:r>
-              <a:r>
-                <a:rPr kumimoji="1" lang="en-US" altLang="zh-CN" sz="1200" dirty="0">
-                  <a:latin typeface="等线" panose="02010600030101010101" pitchFamily="2" charset="-122"/>
-                  <a:ea typeface="等线" panose="02010600030101010101" pitchFamily="2" charset="-122"/>
-                </a:rPr>
-                <a:t>${</a:t>
-              </a:r>
-              <a:r>
-                <a:rPr kumimoji="1" lang="en-US" altLang="zh-CN" sz="1200" dirty="0" err="1">
-                  <a:latin typeface="等线" panose="02010600030101010101" pitchFamily="2" charset="-122"/>
-                  <a:ea typeface="等线" panose="02010600030101010101" pitchFamily="2" charset="-122"/>
-                </a:rPr>
-                <a:t>startTime</a:t>
-              </a:r>
-              <a:r>
-                <a:rPr kumimoji="1" lang="en-US" altLang="zh-CN" sz="1200" dirty="0">
-                  <a:latin typeface="等线" panose="02010600030101010101" pitchFamily="2" charset="-122"/>
-                  <a:ea typeface="等线" panose="02010600030101010101" pitchFamily="2" charset="-122"/>
-                </a:rPr>
-                <a:t>}</a:t>
-              </a:r>
-            </a:p>
-            <a:p>
-              <a:r>
-                <a:rPr kumimoji="1" lang="en-US" altLang="zh-CN" sz="1200" b="1" dirty="0">
-                  <a:latin typeface="等线" panose="02010600030101010101" pitchFamily="2" charset="-122"/>
-                  <a:ea typeface="等线" panose="02010600030101010101" pitchFamily="2" charset="-122"/>
-                </a:rPr>
-                <a:t>edge1</a:t>
-              </a:r>
-              <a:r>
-                <a:rPr kumimoji="1" lang="en-US" altLang="zh-CN" sz="1200" dirty="0">
-                  <a:latin typeface="等线" panose="02010600030101010101" pitchFamily="2" charset="-122"/>
-                  <a:ea typeface="等线" panose="02010600030101010101" pitchFamily="2" charset="-122"/>
-                </a:rPr>
-                <a:t>.timestamp</a:t>
-              </a:r>
-              <a:r>
-                <a:rPr kumimoji="1" lang="zh-CN" altLang="en-US" sz="1200" dirty="0">
-                  <a:latin typeface="等线" panose="02010600030101010101" pitchFamily="2" charset="-122"/>
-                  <a:ea typeface="等线" panose="02010600030101010101" pitchFamily="2" charset="-122"/>
-                </a:rPr>
-                <a:t> </a:t>
-              </a:r>
-              <a:r>
-                <a:rPr kumimoji="1" lang="en-US" altLang="zh-CN" sz="1200" dirty="0">
-                  <a:latin typeface="等线" panose="02010600030101010101" pitchFamily="2" charset="-122"/>
-                  <a:ea typeface="等线" panose="02010600030101010101" pitchFamily="2" charset="-122"/>
-                </a:rPr>
-                <a:t>&lt;</a:t>
-              </a:r>
-              <a:r>
-                <a:rPr kumimoji="1" lang="zh-CN" altLang="en-US" sz="1200" dirty="0">
-                  <a:latin typeface="等线" panose="02010600030101010101" pitchFamily="2" charset="-122"/>
-                  <a:ea typeface="等线" panose="02010600030101010101" pitchFamily="2" charset="-122"/>
-                </a:rPr>
-                <a:t> </a:t>
-              </a:r>
-              <a:r>
-                <a:rPr kumimoji="1" lang="en-US" altLang="zh-CN" sz="1200" dirty="0">
-                  <a:latin typeface="等线" panose="02010600030101010101" pitchFamily="2" charset="-122"/>
-                  <a:ea typeface="等线" panose="02010600030101010101" pitchFamily="2" charset="-122"/>
-                </a:rPr>
-                <a:t>${</a:t>
-              </a:r>
-              <a:r>
-                <a:rPr kumimoji="1" lang="en-US" altLang="zh-CN" sz="1200" dirty="0" err="1">
-                  <a:latin typeface="等线" panose="02010600030101010101" pitchFamily="2" charset="-122"/>
-                  <a:ea typeface="等线" panose="02010600030101010101" pitchFamily="2" charset="-122"/>
-                </a:rPr>
-                <a:t>endTime</a:t>
-              </a:r>
-              <a:r>
-                <a:rPr kumimoji="1" lang="en-US" altLang="zh-CN" sz="1200" dirty="0">
-                  <a:latin typeface="等线" panose="02010600030101010101" pitchFamily="2" charset="-122"/>
-                  <a:ea typeface="等线" panose="02010600030101010101" pitchFamily="2" charset="-122"/>
-                </a:rPr>
-                <a:t>}</a:t>
-              </a:r>
-            </a:p>
-            <a:p>
-              <a:endParaRPr kumimoji="1" lang="en-US" altLang="zh-CN" sz="1200" b="1" dirty="0">
+              <a:endParaRPr kumimoji="1" lang="en-US" altLang="zh-CN" sz="1200" dirty="0">
                 <a:latin typeface="等线" panose="02010600030101010101" pitchFamily="2" charset="-122"/>
                 <a:ea typeface="等线" panose="02010600030101010101" pitchFamily="2" charset="-122"/>
               </a:endParaRPr>
@@ -30733,10 +31071,17 @@
                   <a:latin typeface="等线" panose="02010600030101010101" pitchFamily="2" charset="-122"/>
                   <a:ea typeface="等线" panose="02010600030101010101" pitchFamily="2" charset="-122"/>
                 </a:rPr>
-                <a:t>edge2:</a:t>
-              </a:r>
-              <a:r>
-                <a:rPr kumimoji="1" lang="zh-CN" altLang="en-US" sz="1200" b="1" dirty="0">
+                <a:t>edge1</a:t>
+              </a:r>
+              <a:r>
+                <a:rPr kumimoji="1" lang="en-US" altLang="zh-CN" sz="1200" dirty="0">
+                  <a:latin typeface="等线" panose="02010600030101010101" pitchFamily="2" charset="-122"/>
+                  <a:ea typeface="等线" panose="02010600030101010101" pitchFamily="2" charset="-122"/>
+                </a:rPr>
+                <a:t>.amount</a:t>
+              </a:r>
+              <a:r>
+                <a:rPr kumimoji="1" lang="zh-CN" altLang="en-US" sz="1200" dirty="0">
                   <a:latin typeface="等线" panose="02010600030101010101" pitchFamily="2" charset="-122"/>
                   <a:ea typeface="等线" panose="02010600030101010101" pitchFamily="2" charset="-122"/>
                 </a:rPr>
@@ -30747,8 +31092,26 @@
                   <a:latin typeface="等线" panose="02010600030101010101" pitchFamily="2" charset="-122"/>
                   <a:ea typeface="等线" panose="02010600030101010101" pitchFamily="2" charset="-122"/>
                 </a:rPr>
-                <a:t>repay</a:t>
-              </a:r>
+                <a:t>&gt;</a:t>
+              </a:r>
+              <a:r>
+                <a:rPr kumimoji="1" lang="zh-CN" altLang="en-US" sz="1200" dirty="0">
+                  <a:latin typeface="等线" panose="02010600030101010101" pitchFamily="2" charset="-122"/>
+                  <a:ea typeface="等线" panose="02010600030101010101" pitchFamily="2" charset="-122"/>
+                </a:rPr>
+                <a:t> </a:t>
+              </a:r>
+              <a:r>
+                <a:rPr kumimoji="1" lang="en-US" altLang="zh-CN" sz="1200" dirty="0">
+                  <a:latin typeface="等线" panose="02010600030101010101" pitchFamily="2" charset="-122"/>
+                  <a:ea typeface="等线" panose="02010600030101010101" pitchFamily="2" charset="-122"/>
+                </a:rPr>
+                <a:t>${threshold}</a:t>
+              </a:r>
+              <a:endParaRPr kumimoji="1" lang="en-US" altLang="zh-CN" sz="1200" dirty="0">
+                <a:latin typeface="等线" panose="02010600030101010101" pitchFamily="2" charset="-122"/>
+                <a:ea typeface="等线" panose="02010600030101010101" pitchFamily="2" charset="-122"/>
+              </a:endParaRPr>
             </a:p>
             <a:p>
               <a:r>
@@ -30756,14 +31119,14 @@
                   <a:latin typeface="等线" panose="02010600030101010101" pitchFamily="2" charset="-122"/>
                   <a:ea typeface="等线" panose="02010600030101010101" pitchFamily="2" charset="-122"/>
                 </a:rPr>
-                <a:t>edge2</a:t>
+                <a:t>edge1</a:t>
               </a:r>
               <a:r>
                 <a:rPr kumimoji="1" lang="en-US" altLang="zh-CN" sz="1200" dirty="0">
                   <a:latin typeface="等线" panose="02010600030101010101" pitchFamily="2" charset="-122"/>
                   <a:ea typeface="等线" panose="02010600030101010101" pitchFamily="2" charset="-122"/>
                 </a:rPr>
-                <a:t>.amount</a:t>
+                <a:t>.timestamp</a:t>
               </a:r>
               <a:r>
                 <a:rPr kumimoji="1" lang="zh-CN" altLang="en-US" sz="1200" dirty="0">
@@ -30791,8 +31154,26 @@
                   <a:latin typeface="等线" panose="02010600030101010101" pitchFamily="2" charset="-122"/>
                   <a:ea typeface="等线" panose="02010600030101010101" pitchFamily="2" charset="-122"/>
                 </a:rPr>
-                <a:t>${threshold}</a:t>
-              </a:r>
+                <a:t>${</a:t>
+              </a:r>
+              <a:r>
+                <a:rPr kumimoji="1" lang="en-US" altLang="zh-CN" sz="1200" dirty="0" err="1">
+                  <a:latin typeface="等线" panose="02010600030101010101" pitchFamily="2" charset="-122"/>
+                  <a:ea typeface="等线" panose="02010600030101010101" pitchFamily="2" charset="-122"/>
+                </a:rPr>
+                <a:t>startTime</a:t>
+              </a:r>
+              <a:r>
+                <a:rPr kumimoji="1" lang="en-US" altLang="zh-CN" sz="1200" dirty="0">
+                  <a:latin typeface="等线" panose="02010600030101010101" pitchFamily="2" charset="-122"/>
+                  <a:ea typeface="等线" panose="02010600030101010101" pitchFamily="2" charset="-122"/>
+                </a:rPr>
+                <a:t>}</a:t>
+              </a:r>
+              <a:endParaRPr kumimoji="1" lang="en-US" altLang="zh-CN" sz="1200" dirty="0">
+                <a:latin typeface="等线" panose="02010600030101010101" pitchFamily="2" charset="-122"/>
+                <a:ea typeface="等线" panose="02010600030101010101" pitchFamily="2" charset="-122"/>
+              </a:endParaRPr>
             </a:p>
             <a:p>
               <a:r>
@@ -30800,7 +31181,7 @@
                   <a:latin typeface="等线" panose="02010600030101010101" pitchFamily="2" charset="-122"/>
                   <a:ea typeface="等线" panose="02010600030101010101" pitchFamily="2" charset="-122"/>
                 </a:rPr>
-                <a:t>edge2</a:t>
+                <a:t>edge1</a:t>
               </a:r>
               <a:r>
                 <a:rPr kumimoji="1" lang="en-US" altLang="zh-CN" sz="1200" dirty="0">
@@ -30821,7 +31202,7 @@
                   <a:latin typeface="等线" panose="02010600030101010101" pitchFamily="2" charset="-122"/>
                   <a:ea typeface="等线" panose="02010600030101010101" pitchFamily="2" charset="-122"/>
                 </a:rPr>
-                <a:t>&gt;</a:t>
+                <a:t>&lt;</a:t>
               </a:r>
               <a:r>
                 <a:rPr kumimoji="1" lang="zh-CN" altLang="en-US" sz="1200" dirty="0">
@@ -30842,7 +31223,7 @@
                   <a:latin typeface="等线" panose="02010600030101010101" pitchFamily="2" charset="-122"/>
                   <a:ea typeface="等线" panose="02010600030101010101" pitchFamily="2" charset="-122"/>
                 </a:rPr>
-                <a:t>startTime</a:t>
+                <a:t>endTime</a:t>
               </a:r>
               <a:r>
                 <a:rPr kumimoji="1" lang="en-US" altLang="zh-CN" sz="1200" dirty="0">
@@ -30851,66 +31232,6 @@
                 </a:rPr>
                 <a:t>}</a:t>
               </a:r>
-            </a:p>
-            <a:p>
-              <a:r>
-                <a:rPr kumimoji="1" lang="en-US" altLang="zh-CN" sz="1200" b="1" dirty="0">
-                  <a:latin typeface="等线" panose="02010600030101010101" pitchFamily="2" charset="-122"/>
-                  <a:ea typeface="等线" panose="02010600030101010101" pitchFamily="2" charset="-122"/>
-                </a:rPr>
-                <a:t>edge2</a:t>
-              </a:r>
-              <a:r>
-                <a:rPr kumimoji="1" lang="en-US" altLang="zh-CN" sz="1200" dirty="0">
-                  <a:latin typeface="等线" panose="02010600030101010101" pitchFamily="2" charset="-122"/>
-                  <a:ea typeface="等线" panose="02010600030101010101" pitchFamily="2" charset="-122"/>
-                </a:rPr>
-                <a:t>.timestamp</a:t>
-              </a:r>
-              <a:r>
-                <a:rPr kumimoji="1" lang="zh-CN" altLang="en-US" sz="1200" dirty="0">
-                  <a:latin typeface="等线" panose="02010600030101010101" pitchFamily="2" charset="-122"/>
-                  <a:ea typeface="等线" panose="02010600030101010101" pitchFamily="2" charset="-122"/>
-                </a:rPr>
-                <a:t> </a:t>
-              </a:r>
-              <a:r>
-                <a:rPr kumimoji="1" lang="en-US" altLang="zh-CN" sz="1200" dirty="0">
-                  <a:latin typeface="等线" panose="02010600030101010101" pitchFamily="2" charset="-122"/>
-                  <a:ea typeface="等线" panose="02010600030101010101" pitchFamily="2" charset="-122"/>
-                </a:rPr>
-                <a:t>&lt;</a:t>
-              </a:r>
-              <a:r>
-                <a:rPr kumimoji="1" lang="zh-CN" altLang="en-US" sz="1200" dirty="0">
-                  <a:latin typeface="等线" panose="02010600030101010101" pitchFamily="2" charset="-122"/>
-                  <a:ea typeface="等线" panose="02010600030101010101" pitchFamily="2" charset="-122"/>
-                </a:rPr>
-                <a:t> </a:t>
-              </a:r>
-              <a:r>
-                <a:rPr kumimoji="1" lang="en-US" altLang="zh-CN" sz="1200" dirty="0">
-                  <a:latin typeface="等线" panose="02010600030101010101" pitchFamily="2" charset="-122"/>
-                  <a:ea typeface="等线" panose="02010600030101010101" pitchFamily="2" charset="-122"/>
-                </a:rPr>
-                <a:t>${</a:t>
-              </a:r>
-              <a:r>
-                <a:rPr kumimoji="1" lang="en-US" altLang="zh-CN" sz="1200" dirty="0" err="1">
-                  <a:latin typeface="等线" panose="02010600030101010101" pitchFamily="2" charset="-122"/>
-                  <a:ea typeface="等线" panose="02010600030101010101" pitchFamily="2" charset="-122"/>
-                </a:rPr>
-                <a:t>endTime</a:t>
-              </a:r>
-              <a:r>
-                <a:rPr kumimoji="1" lang="en-US" altLang="zh-CN" sz="1200" dirty="0">
-                  <a:latin typeface="等线" panose="02010600030101010101" pitchFamily="2" charset="-122"/>
-                  <a:ea typeface="等线" panose="02010600030101010101" pitchFamily="2" charset="-122"/>
-                </a:rPr>
-                <a:t>}</a:t>
-              </a:r>
-            </a:p>
-            <a:p>
               <a:endParaRPr kumimoji="1" lang="en-US" altLang="zh-CN" sz="1200" dirty="0">
                 <a:latin typeface="等线" panose="02010600030101010101" pitchFamily="2" charset="-122"/>
                 <a:ea typeface="等线" panose="02010600030101010101" pitchFamily="2" charset="-122"/>
@@ -30928,7 +31249,7 @@
                   <a:latin typeface="等线" panose="02010600030101010101" pitchFamily="2" charset="-122"/>
                   <a:ea typeface="等线" panose="02010600030101010101" pitchFamily="2" charset="-122"/>
                 </a:rPr>
-                <a:t>edge3:</a:t>
+                <a:t>edge2:</a:t>
               </a:r>
               <a:r>
                 <a:rPr kumimoji="1" lang="zh-CN" altLang="en-US" sz="1200" b="1" dirty="0">
@@ -30942,8 +31263,12 @@
                   <a:latin typeface="等线" panose="02010600030101010101" pitchFamily="2" charset="-122"/>
                   <a:ea typeface="等线" panose="02010600030101010101" pitchFamily="2" charset="-122"/>
                 </a:rPr>
-                <a:t>transfer</a:t>
-              </a:r>
+                <a:t>repay</a:t>
+              </a:r>
+              <a:endParaRPr kumimoji="1" lang="en-US" altLang="zh-CN" sz="1200" dirty="0">
+                <a:latin typeface="等线" panose="02010600030101010101" pitchFamily="2" charset="-122"/>
+                <a:ea typeface="等线" panose="02010600030101010101" pitchFamily="2" charset="-122"/>
+              </a:endParaRPr>
             </a:p>
             <a:p>
               <a:r>
@@ -30951,7 +31276,7 @@
                   <a:latin typeface="等线" panose="02010600030101010101" pitchFamily="2" charset="-122"/>
                   <a:ea typeface="等线" panose="02010600030101010101" pitchFamily="2" charset="-122"/>
                 </a:rPr>
-                <a:t>edge3</a:t>
+                <a:t>edge2</a:t>
               </a:r>
               <a:r>
                 <a:rPr kumimoji="1" lang="en-US" altLang="zh-CN" sz="1200" dirty="0">
@@ -30988,6 +31313,10 @@
                 </a:rPr>
                 <a:t>${threshold}</a:t>
               </a:r>
+              <a:endParaRPr kumimoji="1" lang="en-US" altLang="zh-CN" sz="1200" dirty="0">
+                <a:latin typeface="等线" panose="02010600030101010101" pitchFamily="2" charset="-122"/>
+                <a:ea typeface="等线" panose="02010600030101010101" pitchFamily="2" charset="-122"/>
+              </a:endParaRPr>
             </a:p>
             <a:p>
               <a:r>
@@ -30995,7 +31324,7 @@
                   <a:latin typeface="等线" panose="02010600030101010101" pitchFamily="2" charset="-122"/>
                   <a:ea typeface="等线" panose="02010600030101010101" pitchFamily="2" charset="-122"/>
                 </a:rPr>
-                <a:t>edge3</a:t>
+                <a:t>edge2</a:t>
               </a:r>
               <a:r>
                 <a:rPr kumimoji="1" lang="en-US" altLang="zh-CN" sz="1200" dirty="0">
@@ -31046,6 +31375,10 @@
                 </a:rPr>
                 <a:t>}</a:t>
               </a:r>
+              <a:endParaRPr kumimoji="1" lang="en-US" altLang="zh-CN" sz="1200" dirty="0">
+                <a:latin typeface="等线" panose="02010600030101010101" pitchFamily="2" charset="-122"/>
+                <a:ea typeface="等线" panose="02010600030101010101" pitchFamily="2" charset="-122"/>
+              </a:endParaRPr>
             </a:p>
             <a:p>
               <a:r>
@@ -31053,7 +31386,7 @@
                   <a:latin typeface="等线" panose="02010600030101010101" pitchFamily="2" charset="-122"/>
                   <a:ea typeface="等线" panose="02010600030101010101" pitchFamily="2" charset="-122"/>
                 </a:rPr>
-                <a:t>edge3</a:t>
+                <a:t>edge2</a:t>
               </a:r>
               <a:r>
                 <a:rPr kumimoji="1" lang="en-US" altLang="zh-CN" sz="1200" dirty="0">
@@ -31104,6 +31437,10 @@
                 </a:rPr>
                 <a:t>}</a:t>
               </a:r>
+              <a:endParaRPr kumimoji="1" lang="en-US" altLang="zh-CN" sz="1200" dirty="0">
+                <a:latin typeface="等线" panose="02010600030101010101" pitchFamily="2" charset="-122"/>
+                <a:ea typeface="等线" panose="02010600030101010101" pitchFamily="2" charset="-122"/>
+              </a:endParaRPr>
             </a:p>
             <a:p>
               <a:endParaRPr kumimoji="1" lang="en-US" altLang="zh-CN" sz="1200" dirty="0">
@@ -31112,27 +31449,10 @@
               </a:endParaRPr>
             </a:p>
             <a:p>
-              <a:r>
-                <a:rPr kumimoji="1" lang="en-US" altLang="zh-CN" sz="1200" b="1" dirty="0">
-                  <a:latin typeface="等线" panose="02010600030101010101" pitchFamily="2" charset="-122"/>
-                  <a:ea typeface="等线" panose="02010600030101010101" pitchFamily="2" charset="-122"/>
-                </a:rPr>
-                <a:t>edge4:</a:t>
-              </a:r>
-              <a:r>
-                <a:rPr kumimoji="1" lang="zh-CN" altLang="en-US" sz="1200" b="1" dirty="0">
-                  <a:latin typeface="等线" panose="02010600030101010101" pitchFamily="2" charset="-122"/>
-                  <a:ea typeface="等线" panose="02010600030101010101" pitchFamily="2" charset="-122"/>
-                </a:rPr>
-                <a:t> </a:t>
-              </a:r>
-              <a:r>
-                <a:rPr kumimoji="1" lang="en-US" altLang="zh-CN" sz="1200" dirty="0">
-                  <a:latin typeface="等线" panose="02010600030101010101" pitchFamily="2" charset="-122"/>
-                  <a:ea typeface="等线" panose="02010600030101010101" pitchFamily="2" charset="-122"/>
-                </a:rPr>
-                <a:t>transfer</a:t>
-              </a:r>
+              <a:endParaRPr kumimoji="1" lang="en-US" altLang="zh-CN" sz="1200" b="1" dirty="0">
+                <a:latin typeface="等线" panose="02010600030101010101" pitchFamily="2" charset="-122"/>
+                <a:ea typeface="等线" panose="02010600030101010101" pitchFamily="2" charset="-122"/>
+              </a:endParaRPr>
             </a:p>
             <a:p>
               <a:r>
@@ -31140,43 +31460,26 @@
                   <a:latin typeface="等线" panose="02010600030101010101" pitchFamily="2" charset="-122"/>
                   <a:ea typeface="等线" panose="02010600030101010101" pitchFamily="2" charset="-122"/>
                 </a:rPr>
-                <a:t>edge4</a:t>
+                <a:t>edge3:</a:t>
+              </a:r>
+              <a:r>
+                <a:rPr kumimoji="1" lang="zh-CN" altLang="en-US" sz="1200" b="1" dirty="0">
+                  <a:latin typeface="等线" panose="02010600030101010101" pitchFamily="2" charset="-122"/>
+                  <a:ea typeface="等线" panose="02010600030101010101" pitchFamily="2" charset="-122"/>
+                </a:rPr>
+                <a:t> </a:t>
               </a:r>
               <a:r>
                 <a:rPr kumimoji="1" lang="en-US" altLang="zh-CN" sz="1200" dirty="0">
                   <a:latin typeface="等线" panose="02010600030101010101" pitchFamily="2" charset="-122"/>
                   <a:ea typeface="等线" panose="02010600030101010101" pitchFamily="2" charset="-122"/>
                 </a:rPr>
-                <a:t>.amount</a:t>
-              </a:r>
-              <a:r>
-                <a:rPr kumimoji="1" lang="zh-CN" altLang="en-US" sz="1200" dirty="0">
-                  <a:latin typeface="等线" panose="02010600030101010101" pitchFamily="2" charset="-122"/>
-                  <a:ea typeface="等线" panose="02010600030101010101" pitchFamily="2" charset="-122"/>
-                </a:rPr>
-                <a:t> </a:t>
-              </a:r>
-              <a:r>
-                <a:rPr kumimoji="1" lang="en-US" altLang="zh-CN" sz="1200" dirty="0">
-                  <a:latin typeface="等线" panose="02010600030101010101" pitchFamily="2" charset="-122"/>
-                  <a:ea typeface="等线" panose="02010600030101010101" pitchFamily="2" charset="-122"/>
-                </a:rPr>
-                <a:t>&gt;</a:t>
-              </a:r>
-              <a:r>
-                <a:rPr kumimoji="1" lang="zh-CN" altLang="en-US" sz="1200" dirty="0">
-                  <a:latin typeface="等线" panose="02010600030101010101" pitchFamily="2" charset="-122"/>
-                  <a:ea typeface="等线" panose="02010600030101010101" pitchFamily="2" charset="-122"/>
-                </a:rPr>
-                <a:t> </a:t>
-              </a:r>
-              <a:r>
-                <a:rPr kumimoji="1" lang="en-US" altLang="zh-CN" sz="1200" dirty="0">
-                  <a:latin typeface="等线" panose="02010600030101010101" pitchFamily="2" charset="-122"/>
-                  <a:ea typeface="等线" panose="02010600030101010101" pitchFamily="2" charset="-122"/>
-                </a:rPr>
-                <a:t>${threshold}</a:t>
-              </a:r>
+                <a:t>transfer</a:t>
+              </a:r>
+              <a:endParaRPr kumimoji="1" lang="en-US" altLang="zh-CN" sz="1200" dirty="0">
+                <a:latin typeface="等线" panose="02010600030101010101" pitchFamily="2" charset="-122"/>
+                <a:ea typeface="等线" panose="02010600030101010101" pitchFamily="2" charset="-122"/>
+              </a:endParaRPr>
             </a:p>
             <a:p>
               <a:r>
@@ -31184,14 +31487,14 @@
                   <a:latin typeface="等线" panose="02010600030101010101" pitchFamily="2" charset="-122"/>
                   <a:ea typeface="等线" panose="02010600030101010101" pitchFamily="2" charset="-122"/>
                 </a:rPr>
-                <a:t>edge4</a:t>
+                <a:t>edge3</a:t>
               </a:r>
               <a:r>
                 <a:rPr kumimoji="1" lang="en-US" altLang="zh-CN" sz="1200" dirty="0">
                   <a:latin typeface="等线" panose="02010600030101010101" pitchFamily="2" charset="-122"/>
                   <a:ea typeface="等线" panose="02010600030101010101" pitchFamily="2" charset="-122"/>
                 </a:rPr>
-                <a:t>.timestamp</a:t>
+                <a:t>.amount</a:t>
               </a:r>
               <a:r>
                 <a:rPr kumimoji="1" lang="zh-CN" altLang="en-US" sz="1200" dirty="0">
@@ -31219,22 +31522,12 @@
                   <a:latin typeface="等线" panose="02010600030101010101" pitchFamily="2" charset="-122"/>
                   <a:ea typeface="等线" panose="02010600030101010101" pitchFamily="2" charset="-122"/>
                 </a:rPr>
-                <a:t>${</a:t>
-              </a:r>
-              <a:r>
-                <a:rPr kumimoji="1" lang="en-US" altLang="zh-CN" sz="1200" dirty="0" err="1">
-                  <a:latin typeface="等线" panose="02010600030101010101" pitchFamily="2" charset="-122"/>
-                  <a:ea typeface="等线" panose="02010600030101010101" pitchFamily="2" charset="-122"/>
-                </a:rPr>
-                <a:t>startTime</a:t>
-              </a:r>
-              <a:r>
-                <a:rPr kumimoji="1" lang="en-US" altLang="zh-CN" sz="1200" dirty="0">
-                  <a:latin typeface="等线" panose="02010600030101010101" pitchFamily="2" charset="-122"/>
-                  <a:ea typeface="等线" panose="02010600030101010101" pitchFamily="2" charset="-122"/>
-                </a:rPr>
-                <a:t>}</a:t>
-              </a:r>
+                <a:t>${threshold}</a:t>
+              </a:r>
+              <a:endParaRPr kumimoji="1" lang="en-US" altLang="zh-CN" sz="1200" dirty="0">
+                <a:latin typeface="等线" panose="02010600030101010101" pitchFamily="2" charset="-122"/>
+                <a:ea typeface="等线" panose="02010600030101010101" pitchFamily="2" charset="-122"/>
+              </a:endParaRPr>
             </a:p>
             <a:p>
               <a:r>
@@ -31242,6 +31535,163 @@
                   <a:latin typeface="等线" panose="02010600030101010101" pitchFamily="2" charset="-122"/>
                   <a:ea typeface="等线" panose="02010600030101010101" pitchFamily="2" charset="-122"/>
                 </a:rPr>
+                <a:t>edge3</a:t>
+              </a:r>
+              <a:r>
+                <a:rPr kumimoji="1" lang="en-US" altLang="zh-CN" sz="1200" dirty="0">
+                  <a:latin typeface="等线" panose="02010600030101010101" pitchFamily="2" charset="-122"/>
+                  <a:ea typeface="等线" panose="02010600030101010101" pitchFamily="2" charset="-122"/>
+                </a:rPr>
+                <a:t>.timestamp</a:t>
+              </a:r>
+              <a:r>
+                <a:rPr kumimoji="1" lang="zh-CN" altLang="en-US" sz="1200" dirty="0">
+                  <a:latin typeface="等线" panose="02010600030101010101" pitchFamily="2" charset="-122"/>
+                  <a:ea typeface="等线" panose="02010600030101010101" pitchFamily="2" charset="-122"/>
+                </a:rPr>
+                <a:t> </a:t>
+              </a:r>
+              <a:r>
+                <a:rPr kumimoji="1" lang="en-US" altLang="zh-CN" sz="1200" dirty="0">
+                  <a:latin typeface="等线" panose="02010600030101010101" pitchFamily="2" charset="-122"/>
+                  <a:ea typeface="等线" panose="02010600030101010101" pitchFamily="2" charset="-122"/>
+                </a:rPr>
+                <a:t>&gt;</a:t>
+              </a:r>
+              <a:r>
+                <a:rPr kumimoji="1" lang="zh-CN" altLang="en-US" sz="1200" dirty="0">
+                  <a:latin typeface="等线" panose="02010600030101010101" pitchFamily="2" charset="-122"/>
+                  <a:ea typeface="等线" panose="02010600030101010101" pitchFamily="2" charset="-122"/>
+                </a:rPr>
+                <a:t> </a:t>
+              </a:r>
+              <a:r>
+                <a:rPr kumimoji="1" lang="en-US" altLang="zh-CN" sz="1200" dirty="0">
+                  <a:latin typeface="等线" panose="02010600030101010101" pitchFamily="2" charset="-122"/>
+                  <a:ea typeface="等线" panose="02010600030101010101" pitchFamily="2" charset="-122"/>
+                </a:rPr>
+                <a:t>${</a:t>
+              </a:r>
+              <a:r>
+                <a:rPr kumimoji="1" lang="en-US" altLang="zh-CN" sz="1200" dirty="0" err="1">
+                  <a:latin typeface="等线" panose="02010600030101010101" pitchFamily="2" charset="-122"/>
+                  <a:ea typeface="等线" panose="02010600030101010101" pitchFamily="2" charset="-122"/>
+                </a:rPr>
+                <a:t>startTime</a:t>
+              </a:r>
+              <a:r>
+                <a:rPr kumimoji="1" lang="en-US" altLang="zh-CN" sz="1200" dirty="0">
+                  <a:latin typeface="等线" panose="02010600030101010101" pitchFamily="2" charset="-122"/>
+                  <a:ea typeface="等线" panose="02010600030101010101" pitchFamily="2" charset="-122"/>
+                </a:rPr>
+                <a:t>}</a:t>
+              </a:r>
+              <a:endParaRPr kumimoji="1" lang="en-US" altLang="zh-CN" sz="1200" dirty="0">
+                <a:latin typeface="等线" panose="02010600030101010101" pitchFamily="2" charset="-122"/>
+                <a:ea typeface="等线" panose="02010600030101010101" pitchFamily="2" charset="-122"/>
+              </a:endParaRPr>
+            </a:p>
+            <a:p>
+              <a:r>
+                <a:rPr kumimoji="1" lang="en-US" altLang="zh-CN" sz="1200" b="1" dirty="0">
+                  <a:latin typeface="等线" panose="02010600030101010101" pitchFamily="2" charset="-122"/>
+                  <a:ea typeface="等线" panose="02010600030101010101" pitchFamily="2" charset="-122"/>
+                </a:rPr>
+                <a:t>edge3</a:t>
+              </a:r>
+              <a:r>
+                <a:rPr kumimoji="1" lang="en-US" altLang="zh-CN" sz="1200" dirty="0">
+                  <a:latin typeface="等线" panose="02010600030101010101" pitchFamily="2" charset="-122"/>
+                  <a:ea typeface="等线" panose="02010600030101010101" pitchFamily="2" charset="-122"/>
+                </a:rPr>
+                <a:t>.timestamp</a:t>
+              </a:r>
+              <a:r>
+                <a:rPr kumimoji="1" lang="zh-CN" altLang="en-US" sz="1200" dirty="0">
+                  <a:latin typeface="等线" panose="02010600030101010101" pitchFamily="2" charset="-122"/>
+                  <a:ea typeface="等线" panose="02010600030101010101" pitchFamily="2" charset="-122"/>
+                </a:rPr>
+                <a:t> </a:t>
+              </a:r>
+              <a:r>
+                <a:rPr kumimoji="1" lang="en-US" altLang="zh-CN" sz="1200" dirty="0">
+                  <a:latin typeface="等线" panose="02010600030101010101" pitchFamily="2" charset="-122"/>
+                  <a:ea typeface="等线" panose="02010600030101010101" pitchFamily="2" charset="-122"/>
+                </a:rPr>
+                <a:t>&lt;</a:t>
+              </a:r>
+              <a:r>
+                <a:rPr kumimoji="1" lang="zh-CN" altLang="en-US" sz="1200" dirty="0">
+                  <a:latin typeface="等线" panose="02010600030101010101" pitchFamily="2" charset="-122"/>
+                  <a:ea typeface="等线" panose="02010600030101010101" pitchFamily="2" charset="-122"/>
+                </a:rPr>
+                <a:t> </a:t>
+              </a:r>
+              <a:r>
+                <a:rPr kumimoji="1" lang="en-US" altLang="zh-CN" sz="1200" dirty="0">
+                  <a:latin typeface="等线" panose="02010600030101010101" pitchFamily="2" charset="-122"/>
+                  <a:ea typeface="等线" panose="02010600030101010101" pitchFamily="2" charset="-122"/>
+                </a:rPr>
+                <a:t>${</a:t>
+              </a:r>
+              <a:r>
+                <a:rPr kumimoji="1" lang="en-US" altLang="zh-CN" sz="1200" dirty="0" err="1">
+                  <a:latin typeface="等线" panose="02010600030101010101" pitchFamily="2" charset="-122"/>
+                  <a:ea typeface="等线" panose="02010600030101010101" pitchFamily="2" charset="-122"/>
+                </a:rPr>
+                <a:t>endTime</a:t>
+              </a:r>
+              <a:r>
+                <a:rPr kumimoji="1" lang="en-US" altLang="zh-CN" sz="1200" dirty="0">
+                  <a:latin typeface="等线" panose="02010600030101010101" pitchFamily="2" charset="-122"/>
+                  <a:ea typeface="等线" panose="02010600030101010101" pitchFamily="2" charset="-122"/>
+                </a:rPr>
+                <a:t>}</a:t>
+              </a:r>
+              <a:endParaRPr kumimoji="1" lang="en-US" altLang="zh-CN" sz="1200" dirty="0">
+                <a:latin typeface="等线" panose="02010600030101010101" pitchFamily="2" charset="-122"/>
+                <a:ea typeface="等线" panose="02010600030101010101" pitchFamily="2" charset="-122"/>
+              </a:endParaRPr>
+            </a:p>
+            <a:p>
+              <a:endParaRPr kumimoji="1" lang="en-US" altLang="zh-CN" sz="1200" dirty="0">
+                <a:latin typeface="等线" panose="02010600030101010101" pitchFamily="2" charset="-122"/>
+                <a:ea typeface="等线" panose="02010600030101010101" pitchFamily="2" charset="-122"/>
+              </a:endParaRPr>
+            </a:p>
+            <a:p>
+              <a:r>
+                <a:rPr kumimoji="1" lang="en-US" altLang="zh-CN" sz="1200" b="1" dirty="0">
+                  <a:latin typeface="等线" panose="02010600030101010101" pitchFamily="2" charset="-122"/>
+                  <a:ea typeface="等线" panose="02010600030101010101" pitchFamily="2" charset="-122"/>
+                </a:rPr>
+                <a:t>edge4:</a:t>
+              </a:r>
+              <a:r>
+                <a:rPr kumimoji="1" lang="zh-CN" altLang="en-US" sz="1200" b="1" dirty="0">
+                  <a:latin typeface="等线" panose="02010600030101010101" pitchFamily="2" charset="-122"/>
+                  <a:ea typeface="等线" panose="02010600030101010101" pitchFamily="2" charset="-122"/>
+                </a:rPr>
+                <a:t> </a:t>
+              </a:r>
+              <a:r>
+                <a:rPr kumimoji="1" lang="en-US" altLang="zh-CN" sz="1200" dirty="0">
+                  <a:latin typeface="等线" panose="02010600030101010101" pitchFamily="2" charset="-122"/>
+                  <a:ea typeface="等线" panose="02010600030101010101" pitchFamily="2" charset="-122"/>
+                </a:rPr>
+                <a:t>transfer</a:t>
+              </a:r>
+              <a:endParaRPr kumimoji="1" lang="en-US" altLang="zh-CN" sz="1200" dirty="0">
+                <a:latin typeface="等线" panose="02010600030101010101" pitchFamily="2" charset="-122"/>
+                <a:ea typeface="等线" panose="02010600030101010101" pitchFamily="2" charset="-122"/>
+              </a:endParaRPr>
+            </a:p>
+            <a:p>
+              <a:r>
+                <a:rPr kumimoji="1" lang="en-US" altLang="zh-CN" sz="1200" b="1" dirty="0">
+                  <a:latin typeface="等线" panose="02010600030101010101" pitchFamily="2" charset="-122"/>
+                  <a:ea typeface="等线" panose="02010600030101010101" pitchFamily="2" charset="-122"/>
+                </a:rPr>
                 <a:t>edge4</a:t>
               </a:r>
               <a:r>
@@ -31249,6 +31699,54 @@
                   <a:latin typeface="等线" panose="02010600030101010101" pitchFamily="2" charset="-122"/>
                   <a:ea typeface="等线" panose="02010600030101010101" pitchFamily="2" charset="-122"/>
                 </a:rPr>
+                <a:t>.amount</a:t>
+              </a:r>
+              <a:r>
+                <a:rPr kumimoji="1" lang="zh-CN" altLang="en-US" sz="1200" dirty="0">
+                  <a:latin typeface="等线" panose="02010600030101010101" pitchFamily="2" charset="-122"/>
+                  <a:ea typeface="等线" panose="02010600030101010101" pitchFamily="2" charset="-122"/>
+                </a:rPr>
+                <a:t> </a:t>
+              </a:r>
+              <a:r>
+                <a:rPr kumimoji="1" lang="en-US" altLang="zh-CN" sz="1200" dirty="0">
+                  <a:latin typeface="等线" panose="02010600030101010101" pitchFamily="2" charset="-122"/>
+                  <a:ea typeface="等线" panose="02010600030101010101" pitchFamily="2" charset="-122"/>
+                </a:rPr>
+                <a:t>&gt;</a:t>
+              </a:r>
+              <a:r>
+                <a:rPr kumimoji="1" lang="zh-CN" altLang="en-US" sz="1200" dirty="0">
+                  <a:latin typeface="等线" panose="02010600030101010101" pitchFamily="2" charset="-122"/>
+                  <a:ea typeface="等线" panose="02010600030101010101" pitchFamily="2" charset="-122"/>
+                </a:rPr>
+                <a:t> </a:t>
+              </a:r>
+              <a:r>
+                <a:rPr kumimoji="1" lang="en-US" altLang="zh-CN" sz="1200" dirty="0">
+                  <a:latin typeface="等线" panose="02010600030101010101" pitchFamily="2" charset="-122"/>
+                  <a:ea typeface="等线" panose="02010600030101010101" pitchFamily="2" charset="-122"/>
+                </a:rPr>
+                <a:t>${threshold}</a:t>
+              </a:r>
+              <a:endParaRPr kumimoji="1" lang="en-US" altLang="zh-CN" sz="1200" dirty="0">
+                <a:latin typeface="等线" panose="02010600030101010101" pitchFamily="2" charset="-122"/>
+                <a:ea typeface="等线" panose="02010600030101010101" pitchFamily="2" charset="-122"/>
+              </a:endParaRPr>
+            </a:p>
+            <a:p>
+              <a:r>
+                <a:rPr kumimoji="1" lang="en-US" altLang="zh-CN" sz="1200" b="1" dirty="0">
+                  <a:latin typeface="等线" panose="02010600030101010101" pitchFamily="2" charset="-122"/>
+                  <a:ea typeface="等线" panose="02010600030101010101" pitchFamily="2" charset="-122"/>
+                </a:rPr>
+                <a:t>edge4</a:t>
+              </a:r>
+              <a:r>
+                <a:rPr kumimoji="1" lang="en-US" altLang="zh-CN" sz="1200" dirty="0">
+                  <a:latin typeface="等线" panose="02010600030101010101" pitchFamily="2" charset="-122"/>
+                  <a:ea typeface="等线" panose="02010600030101010101" pitchFamily="2" charset="-122"/>
+                </a:rPr>
                 <a:t>.timestamp</a:t>
               </a:r>
               <a:r>
@@ -31263,6 +31761,68 @@
                   <a:latin typeface="等线" panose="02010600030101010101" pitchFamily="2" charset="-122"/>
                   <a:ea typeface="等线" panose="02010600030101010101" pitchFamily="2" charset="-122"/>
                 </a:rPr>
+                <a:t>&gt;</a:t>
+              </a:r>
+              <a:r>
+                <a:rPr kumimoji="1" lang="zh-CN" altLang="en-US" sz="1200" dirty="0">
+                  <a:latin typeface="等线" panose="02010600030101010101" pitchFamily="2" charset="-122"/>
+                  <a:ea typeface="等线" panose="02010600030101010101" pitchFamily="2" charset="-122"/>
+                </a:rPr>
+                <a:t> </a:t>
+              </a:r>
+              <a:r>
+                <a:rPr kumimoji="1" lang="en-US" altLang="zh-CN" sz="1200" dirty="0">
+                  <a:latin typeface="等线" panose="02010600030101010101" pitchFamily="2" charset="-122"/>
+                  <a:ea typeface="等线" panose="02010600030101010101" pitchFamily="2" charset="-122"/>
+                </a:rPr>
+                <a:t>${</a:t>
+              </a:r>
+              <a:r>
+                <a:rPr kumimoji="1" lang="en-US" altLang="zh-CN" sz="1200" dirty="0" err="1">
+                  <a:latin typeface="等线" panose="02010600030101010101" pitchFamily="2" charset="-122"/>
+                  <a:ea typeface="等线" panose="02010600030101010101" pitchFamily="2" charset="-122"/>
+                </a:rPr>
+                <a:t>startTime</a:t>
+              </a:r>
+              <a:r>
+                <a:rPr kumimoji="1" lang="en-US" altLang="zh-CN" sz="1200" dirty="0">
+                  <a:latin typeface="等线" panose="02010600030101010101" pitchFamily="2" charset="-122"/>
+                  <a:ea typeface="等线" panose="02010600030101010101" pitchFamily="2" charset="-122"/>
+                </a:rPr>
+                <a:t>}</a:t>
+              </a:r>
+              <a:endParaRPr kumimoji="1" lang="en-US" altLang="zh-CN" sz="1200" dirty="0">
+                <a:latin typeface="等线" panose="02010600030101010101" pitchFamily="2" charset="-122"/>
+                <a:ea typeface="等线" panose="02010600030101010101" pitchFamily="2" charset="-122"/>
+              </a:endParaRPr>
+            </a:p>
+            <a:p>
+              <a:r>
+                <a:rPr kumimoji="1" lang="en-US" altLang="zh-CN" sz="1200" b="1" dirty="0">
+                  <a:latin typeface="等线" panose="02010600030101010101" pitchFamily="2" charset="-122"/>
+                  <a:ea typeface="等线" panose="02010600030101010101" pitchFamily="2" charset="-122"/>
+                </a:rPr>
+                <a:t>edge4</a:t>
+              </a:r>
+              <a:r>
+                <a:rPr kumimoji="1" lang="en-US" altLang="zh-CN" sz="1200" dirty="0">
+                  <a:latin typeface="等线" panose="02010600030101010101" pitchFamily="2" charset="-122"/>
+                  <a:ea typeface="等线" panose="02010600030101010101" pitchFamily="2" charset="-122"/>
+                </a:rPr>
+                <a:t>.timestamp</a:t>
+              </a:r>
+              <a:r>
+                <a:rPr kumimoji="1" lang="zh-CN" altLang="en-US" sz="1200" dirty="0">
+                  <a:latin typeface="等线" panose="02010600030101010101" pitchFamily="2" charset="-122"/>
+                  <a:ea typeface="等线" panose="02010600030101010101" pitchFamily="2" charset="-122"/>
+                </a:rPr>
+                <a:t> </a:t>
+              </a:r>
+              <a:r>
+                <a:rPr kumimoji="1" lang="en-US" altLang="zh-CN" sz="1200" dirty="0">
+                  <a:latin typeface="等线" panose="02010600030101010101" pitchFamily="2" charset="-122"/>
+                  <a:ea typeface="等线" panose="02010600030101010101" pitchFamily="2" charset="-122"/>
+                </a:rPr>
                 <a:t>&lt;</a:t>
               </a:r>
               <a:r>
@@ -31293,6 +31853,10 @@
                 </a:rPr>
                 <a:t>}</a:t>
               </a:r>
+              <a:endParaRPr kumimoji="1" lang="en-US" altLang="zh-CN" sz="1200" dirty="0">
+                <a:latin typeface="等线" panose="02010600030101010101" pitchFamily="2" charset="-122"/>
+                <a:ea typeface="等线" panose="02010600030101010101" pitchFamily="2" charset="-122"/>
+              </a:endParaRPr>
             </a:p>
           </p:txBody>
         </p:sp>
@@ -32258,7 +32822,7 @@
 </file>
 
 <file path=ppt/tags/tag1.xml><?xml version="1.0" encoding="utf-8"?>
-<p:tagLst xmlns:a="http://schemas.openxmlformats.org/drawingml/2006/main" xmlns:r="http://schemas.openxmlformats.org/officeDocument/2006/relationships" xmlns:p="http://schemas.openxmlformats.org/presentationml/2006/main">
+<p:tagLst xmlns:p="http://schemas.openxmlformats.org/presentationml/2006/main">
   <p:tag name="KSO_WPP_MARK_KEY" val="97fe4e2b-1432-4dd9-91f2-ca8df2796b94"/>
   <p:tag name="COMMONDATA" val="eyJoZGlkIjoiY2UzZmQ1NDYyMTk1MjkyNjAxNzY5ZmQ2ZjBmNmY2NWYifQ=="/>
 </p:tagLst>
@@ -32515,8 +33079,6 @@
       </a:bgFillStyleLst>
     </a:fmtScheme>
   </a:themeElements>
-  <a:objectDefaults/>
-  <a:extraClrSchemeLst/>
   <a:extLst>
     <a:ext uri="{05A4C25C-085E-4340-85A3-A5531E510DB2}">
       <thm15:themeFamily xmlns:thm15="http://schemas.microsoft.com/office/thememl/2012/main" name="Office Theme" id="{62F939B6-93AF-4DB8-9C6B-D6C7DFDC589F}" vid="{4A3C46E8-61CC-4603-A589-7422A47A8E4A}"/>
@@ -32776,8 +33338,6 @@
       </a:bgFillStyleLst>
     </a:fmtScheme>
   </a:themeElements>
-  <a:objectDefaults/>
-  <a:extraClrSchemeLst/>
   <a:extLst>
     <a:ext uri="{05A4C25C-085E-4340-85A3-A5531E510DB2}">
       <thm15:themeFamily xmlns:thm15="http://schemas.microsoft.com/office/thememl/2012/main" name="Office Theme" id="{62F939B6-93AF-4DB8-9C6B-D6C7DFDC589F}" vid="{4A3C46E8-61CC-4603-A589-7422A47A8E4A}"/>

</xml_diff>

<commit_message>
Refine read write query description (#79)
Co-authored-by: tongbing <tongbing@chuanglintech.com>
</commit_message>
<xml_diff>
--- a/patterns/transaction-complex-read.pptx
+++ b/patterns/transaction-complex-read.pptx
@@ -3594,7 +3594,7 @@
             <p:nvPr/>
           </p:nvGrpSpPr>
           <p:grpSpPr>
-            <a:xfrm rot="0">
+            <a:xfrm>
               <a:off x="2857" y="4268"/>
               <a:ext cx="2605" cy="1244"/>
               <a:chOff x="987328" y="2902427"/>
@@ -3816,7 +3816,7 @@
             <p:nvPr/>
           </p:nvGrpSpPr>
           <p:grpSpPr>
-            <a:xfrm rot="0">
+            <a:xfrm>
               <a:off x="12955" y="2338"/>
               <a:ext cx="3102" cy="1244"/>
               <a:chOff x="8972091" y="3120769"/>
@@ -4036,7 +4036,7 @@
             <p:nvPr/>
           </p:nvGrpSpPr>
           <p:grpSpPr>
-            <a:xfrm rot="0">
+            <a:xfrm>
               <a:off x="12955" y="3978"/>
               <a:ext cx="3102" cy="1244"/>
               <a:chOff x="8972091" y="3120769"/>
@@ -4256,7 +4256,7 @@
             <p:nvPr/>
           </p:nvGrpSpPr>
           <p:grpSpPr>
-            <a:xfrm rot="0">
+            <a:xfrm>
               <a:off x="12955" y="7268"/>
               <a:ext cx="3102" cy="1244"/>
               <a:chOff x="8972091" y="3120769"/>
@@ -8176,7 +8176,7 @@
           <p:nvPr/>
         </p:nvGrpSpPr>
         <p:grpSpPr>
-          <a:xfrm rot="0">
+          <a:xfrm>
             <a:off x="879475" y="1586865"/>
             <a:ext cx="1571625" cy="782320"/>
             <a:chOff x="1364974" y="1587060"/>
@@ -15555,7 +15555,7 @@
           <p:nvPr/>
         </p:nvGrpSpPr>
         <p:grpSpPr>
-          <a:xfrm rot="0">
+          <a:xfrm>
             <a:off x="880745" y="1577340"/>
             <a:ext cx="1391285" cy="848360"/>
             <a:chOff x="96259" y="2451234"/>
@@ -25594,7 +25594,7 @@
         <p:spPr>
           <a:xfrm>
             <a:off x="6096000" y="1268095"/>
-            <a:ext cx="2684780" cy="954405"/>
+            <a:ext cx="2684780" cy="953135"/>
           </a:xfrm>
           <a:prstGeom prst="rect">
             <a:avLst/>
@@ -25615,46 +25615,12 @@
               <a:t>edge2</a:t>
             </a:r>
             <a:r>
-              <a:rPr kumimoji="1" lang="zh-CN" altLang="en-US" sz="1400" b="1" dirty="0">
-                <a:latin typeface="等线" panose="02010600030101010101" pitchFamily="2" charset="-122"/>
-                <a:ea typeface="等线" panose="02010600030101010101" pitchFamily="2" charset="-122"/>
-              </a:rPr>
-              <a:t> </a:t>
-            </a:r>
-            <a:r>
               <a:rPr kumimoji="1" lang="en-US" altLang="zh-CN" sz="1400" dirty="0">
                 <a:latin typeface="等线" panose="02010600030101010101" pitchFamily="2" charset="-122"/>
                 <a:ea typeface="等线" panose="02010600030101010101" pitchFamily="2" charset="-122"/>
-              </a:rPr>
-              <a:t>in</a:t>
-            </a:r>
-            <a:r>
-              <a:rPr kumimoji="1" lang="zh-CN" altLang="en-US" sz="1400" dirty="0">
-                <a:latin typeface="等线" panose="02010600030101010101" pitchFamily="2" charset="-122"/>
-                <a:ea typeface="等线" panose="02010600030101010101" pitchFamily="2" charset="-122"/>
-              </a:rPr>
-              <a:t> </a:t>
-            </a:r>
-            <a:r>
-              <a:rPr kumimoji="1" lang="en-US" altLang="zh-CN" sz="1400" dirty="0">
-                <a:latin typeface="等线" panose="02010600030101010101" pitchFamily="2" charset="-122"/>
-                <a:ea typeface="等线" panose="02010600030101010101" pitchFamily="2" charset="-122"/>
-              </a:rPr>
-              <a:t>[transfer,</a:t>
-            </a:r>
-            <a:r>
-              <a:rPr kumimoji="1" lang="zh-CN" altLang="en-US" sz="1400" dirty="0">
-                <a:latin typeface="等线" panose="02010600030101010101" pitchFamily="2" charset="-122"/>
-                <a:ea typeface="等线" panose="02010600030101010101" pitchFamily="2" charset="-122"/>
-              </a:rPr>
-              <a:t> </a:t>
-            </a:r>
-            <a:r>
-              <a:rPr kumimoji="1" lang="en-US" altLang="zh-CN" sz="1400" dirty="0">
-                <a:latin typeface="等线" panose="02010600030101010101" pitchFamily="2" charset="-122"/>
-                <a:ea typeface="等线" panose="02010600030101010101" pitchFamily="2" charset="-122"/>
-              </a:rPr>
-              <a:t>withdraw]</a:t>
+                <a:sym typeface="+mn-ea"/>
+              </a:rPr>
+              <a:t>: transfer</a:t>
             </a:r>
             <a:endParaRPr kumimoji="1" lang="en-US" altLang="zh-CN" sz="1400" dirty="0">
               <a:latin typeface="等线" panose="02010600030101010101" pitchFamily="2" charset="-122"/>
@@ -26734,7 +26700,7 @@
         <p:spPr>
           <a:xfrm>
             <a:off x="3411220" y="1270000"/>
-            <a:ext cx="2727960" cy="954405"/>
+            <a:ext cx="2727960" cy="953135"/>
           </a:xfrm>
           <a:prstGeom prst="rect">
             <a:avLst/>
@@ -26755,46 +26721,11 @@
               <a:t>edge1</a:t>
             </a:r>
             <a:r>
-              <a:rPr kumimoji="1" lang="zh-CN" altLang="en-US" sz="1400" b="1" dirty="0">
-                <a:latin typeface="等线" panose="02010600030101010101" pitchFamily="2" charset="-122"/>
-                <a:ea typeface="等线" panose="02010600030101010101" pitchFamily="2" charset="-122"/>
-              </a:rPr>
-              <a:t> </a:t>
-            </a:r>
-            <a:r>
               <a:rPr kumimoji="1" lang="en-US" altLang="zh-CN" sz="1400" dirty="0">
                 <a:latin typeface="等线" panose="02010600030101010101" pitchFamily="2" charset="-122"/>
                 <a:ea typeface="等线" panose="02010600030101010101" pitchFamily="2" charset="-122"/>
               </a:rPr>
-              <a:t>in</a:t>
-            </a:r>
-            <a:r>
-              <a:rPr kumimoji="1" lang="zh-CN" altLang="en-US" sz="1400" b="1" dirty="0">
-                <a:latin typeface="等线" panose="02010600030101010101" pitchFamily="2" charset="-122"/>
-                <a:ea typeface="等线" panose="02010600030101010101" pitchFamily="2" charset="-122"/>
-              </a:rPr>
-              <a:t> </a:t>
-            </a:r>
-            <a:r>
-              <a:rPr kumimoji="1" lang="en-US" altLang="zh-CN" sz="1400" dirty="0">
-                <a:latin typeface="等线" panose="02010600030101010101" pitchFamily="2" charset="-122"/>
-                <a:ea typeface="等线" panose="02010600030101010101" pitchFamily="2" charset="-122"/>
-              </a:rPr>
-              <a:t>[transfer,</a:t>
-            </a:r>
-            <a:r>
-              <a:rPr kumimoji="1" lang="zh-CN" altLang="en-US" sz="1400" dirty="0">
-                <a:latin typeface="等线" panose="02010600030101010101" pitchFamily="2" charset="-122"/>
-                <a:ea typeface="等线" panose="02010600030101010101" pitchFamily="2" charset="-122"/>
-              </a:rPr>
-              <a:t> </a:t>
-            </a:r>
-            <a:r>
-              <a:rPr kumimoji="1" lang="en-US" altLang="zh-CN" sz="1400" dirty="0">
-                <a:latin typeface="等线" panose="02010600030101010101" pitchFamily="2" charset="-122"/>
-                <a:ea typeface="等线" panose="02010600030101010101" pitchFamily="2" charset="-122"/>
-              </a:rPr>
-              <a:t>withdraw]</a:t>
+              <a:t>: transfer</a:t>
             </a:r>
             <a:endParaRPr kumimoji="1" lang="en-US" altLang="zh-CN" sz="1400" dirty="0">
               <a:latin typeface="等线" panose="02010600030101010101" pitchFamily="2" charset="-122"/>
@@ -29297,7 +29228,7 @@
           <p:nvPr/>
         </p:nvGrpSpPr>
         <p:grpSpPr>
-          <a:xfrm rot="0">
+          <a:xfrm>
             <a:off x="680085" y="1485265"/>
             <a:ext cx="1271905" cy="840740"/>
             <a:chOff x="271963" y="2952479"/>
@@ -30122,27 +30053,7 @@
                 <a:latin typeface="等线" panose="02010600030101010101" pitchFamily="2" charset="-122"/>
                 <a:ea typeface="等线" panose="02010600030101010101" pitchFamily="2" charset="-122"/>
               </a:rPr>
-              <a:t>d</a:t>
-            </a:r>
-            <a:r>
-              <a:rPr kumimoji="1" lang="en-US" altLang="zh-CN" sz="1200" dirty="0">
-                <a:solidFill>
-                  <a:sysClr val="windowText" lastClr="000000"/>
-                </a:solidFill>
-                <a:latin typeface="等线" panose="02010600030101010101" pitchFamily="2" charset="-122"/>
-                <a:ea typeface="等线" panose="02010600030101010101" pitchFamily="2" charset="-122"/>
-              </a:rPr>
-              <a:t>st</a:t>
-            </a:r>
-            <a:r>
-              <a:rPr kumimoji="1" lang="en-US" altLang="zh-CN" sz="1200" dirty="0">
-                <a:solidFill>
-                  <a:sysClr val="windowText" lastClr="000000"/>
-                </a:solidFill>
-                <a:latin typeface="等线" panose="02010600030101010101" pitchFamily="2" charset="-122"/>
-                <a:ea typeface="等线" panose="02010600030101010101" pitchFamily="2" charset="-122"/>
-              </a:rPr>
-              <a:t>.id,</a:t>
+              <a:t>dst.id,</a:t>
             </a:r>
             <a:r>
               <a:rPr kumimoji="1" lang="zh-CN" altLang="en-US" sz="1200" dirty="0">
@@ -30377,1588 +30288,153 @@
           <a:chExt cx="0" cy="0"/>
         </a:xfrm>
       </p:grpSpPr>
-      <p:sp>
-        <p:nvSpPr>
-          <p:cNvPr id="36" name="矩形 13"/>
-          <p:cNvSpPr/>
-          <p:nvPr/>
-        </p:nvSpPr>
-        <p:spPr>
-          <a:xfrm>
-            <a:off x="1207475" y="1066802"/>
-            <a:ext cx="9601200" cy="4923690"/>
-          </a:xfrm>
-          <a:prstGeom prst="rect">
-            <a:avLst/>
-          </a:prstGeom>
-          <a:noFill/>
-          <a:ln w="25400">
-            <a:solidFill>
-              <a:schemeClr val="accent3"/>
-            </a:solidFill>
-            <a:prstDash val="dash"/>
-          </a:ln>
-        </p:spPr>
-        <p:style>
-          <a:lnRef idx="2">
-            <a:schemeClr val="accent2">
-              <a:shade val="50000"/>
-            </a:schemeClr>
-          </a:lnRef>
-          <a:fillRef idx="1">
-            <a:schemeClr val="accent2"/>
-          </a:fillRef>
-          <a:effectRef idx="0">
-            <a:schemeClr val="accent2"/>
-          </a:effectRef>
-          <a:fontRef idx="minor">
-            <a:schemeClr val="lt1"/>
-          </a:fontRef>
-        </p:style>
-        <p:txBody>
-          <a:bodyPr rtlCol="0" anchor="b"/>
-          <a:lstStyle/>
-          <a:p>
-            <a:pPr algn="r"/>
-            <a:r>
-              <a:rPr kumimoji="1" lang="en-US" altLang="zh-CN" sz="1200" b="1" dirty="0">
-                <a:solidFill>
-                  <a:srgbClr val="FF0000"/>
-                </a:solidFill>
-                <a:latin typeface="等线" panose="02010600030101010101" pitchFamily="2" charset="-122"/>
-                <a:ea typeface="等线" panose="02010600030101010101" pitchFamily="2" charset="-122"/>
-              </a:rPr>
-              <a:t>RESULT</a:t>
-            </a:r>
-            <a:endParaRPr kumimoji="1" lang="en-US" altLang="zh-CN" sz="1200" b="1" dirty="0">
-              <a:solidFill>
-                <a:schemeClr val="tx1"/>
-              </a:solidFill>
-              <a:latin typeface="等线" panose="02010600030101010101" pitchFamily="2" charset="-122"/>
-              <a:ea typeface="等线" panose="02010600030101010101" pitchFamily="2" charset="-122"/>
-            </a:endParaRPr>
-          </a:p>
-          <a:p>
-            <a:pPr algn="r"/>
-            <a:r>
-              <a:rPr kumimoji="1" lang="en-US" altLang="zh-CN" sz="1200" dirty="0">
-                <a:solidFill>
-                  <a:schemeClr val="tx1"/>
-                </a:solidFill>
-                <a:latin typeface="等线" panose="02010600030101010101" pitchFamily="2" charset="-122"/>
-                <a:ea typeface="等线" panose="02010600030101010101" pitchFamily="2" charset="-122"/>
-              </a:rPr>
-              <a:t>SUM(edge1.amount)/SUM(edge2.amount),</a:t>
-            </a:r>
-            <a:endParaRPr kumimoji="1" lang="en-US" altLang="zh-CN" sz="1200" dirty="0">
-              <a:solidFill>
-                <a:schemeClr val="tx1"/>
-              </a:solidFill>
-              <a:latin typeface="等线" panose="02010600030101010101" pitchFamily="2" charset="-122"/>
-              <a:ea typeface="等线" panose="02010600030101010101" pitchFamily="2" charset="-122"/>
-            </a:endParaRPr>
-          </a:p>
-          <a:p>
-            <a:pPr algn="r"/>
-            <a:r>
-              <a:rPr kumimoji="1" lang="en-US" altLang="zh-CN" sz="1200" dirty="0">
-                <a:solidFill>
-                  <a:schemeClr val="tx1"/>
-                </a:solidFill>
-                <a:latin typeface="等线" panose="02010600030101010101" pitchFamily="2" charset="-122"/>
-                <a:ea typeface="等线" panose="02010600030101010101" pitchFamily="2" charset="-122"/>
-              </a:rPr>
-              <a:t>SUM(edge1.amount)/SUM(edge4.amount),</a:t>
-            </a:r>
-            <a:endParaRPr kumimoji="1" lang="en-US" altLang="zh-CN" sz="1200" dirty="0">
-              <a:solidFill>
-                <a:schemeClr val="tx1"/>
-              </a:solidFill>
-              <a:latin typeface="等线" panose="02010600030101010101" pitchFamily="2" charset="-122"/>
-              <a:ea typeface="等线" panose="02010600030101010101" pitchFamily="2" charset="-122"/>
-            </a:endParaRPr>
-          </a:p>
-          <a:p>
-            <a:pPr algn="r"/>
-            <a:r>
-              <a:rPr kumimoji="1" lang="en-US" altLang="zh-CN" sz="1200" dirty="0">
-                <a:solidFill>
-                  <a:schemeClr val="tx1"/>
-                </a:solidFill>
-                <a:latin typeface="等线" panose="02010600030101010101" pitchFamily="2" charset="-122"/>
-                <a:ea typeface="等线" panose="02010600030101010101" pitchFamily="2" charset="-122"/>
-              </a:rPr>
-              <a:t>SUM(edge3.amount)/SUM(edge4.amount)</a:t>
-            </a:r>
-            <a:endParaRPr kumimoji="1" lang="en-US" altLang="zh-CN" sz="1200" dirty="0">
-              <a:solidFill>
-                <a:schemeClr val="tx1"/>
-              </a:solidFill>
-              <a:latin typeface="等线" panose="02010600030101010101" pitchFamily="2" charset="-122"/>
-              <a:ea typeface="等线" panose="02010600030101010101" pitchFamily="2" charset="-122"/>
-            </a:endParaRPr>
-          </a:p>
-        </p:txBody>
-      </p:sp>
-      <p:sp>
-        <p:nvSpPr>
-          <p:cNvPr id="48" name="矩形 14"/>
-          <p:cNvSpPr/>
-          <p:nvPr/>
-        </p:nvSpPr>
-        <p:spPr>
-          <a:xfrm>
-            <a:off x="5842981" y="1257377"/>
-            <a:ext cx="1176993" cy="505147"/>
-          </a:xfrm>
-          <a:prstGeom prst="rect">
-            <a:avLst/>
-          </a:prstGeom>
-          <a:solidFill>
-            <a:schemeClr val="accent5">
-              <a:lumMod val="60000"/>
-              <a:lumOff val="40000"/>
-            </a:schemeClr>
-          </a:solidFill>
-          <a:ln w="25400">
-            <a:solidFill>
-              <a:schemeClr val="tx1"/>
-            </a:solidFill>
-          </a:ln>
-        </p:spPr>
-        <p:style>
-          <a:lnRef idx="2">
-            <a:schemeClr val="accent2">
-              <a:shade val="50000"/>
-            </a:schemeClr>
-          </a:lnRef>
-          <a:fillRef idx="1">
-            <a:schemeClr val="accent2"/>
-          </a:fillRef>
-          <a:effectRef idx="0">
-            <a:schemeClr val="accent2"/>
-          </a:effectRef>
-          <a:fontRef idx="minor">
-            <a:schemeClr val="lt1"/>
-          </a:fontRef>
-        </p:style>
-        <p:txBody>
-          <a:bodyPr rtlCol="0" anchor="ctr"/>
-          <a:lstStyle/>
-          <a:p>
-            <a:pPr algn="ctr"/>
-            <a:r>
-              <a:rPr kumimoji="1" lang="en-US" altLang="zh-CN" sz="1200" b="1" dirty="0">
-                <a:solidFill>
-                  <a:sysClr val="windowText" lastClr="000000"/>
-                </a:solidFill>
-              </a:rPr>
-              <a:t>up2</a:t>
-            </a:r>
-            <a:r>
-              <a:rPr kumimoji="1" lang="zh-CN" altLang="en-US" sz="1200" dirty="0">
-                <a:solidFill>
-                  <a:sysClr val="windowText" lastClr="000000"/>
-                </a:solidFill>
-              </a:rPr>
-              <a:t> </a:t>
-            </a:r>
-            <a:r>
-              <a:rPr kumimoji="1" lang="en-US" altLang="zh-CN" sz="1200" dirty="0">
-                <a:solidFill>
-                  <a:sysClr val="windowText" lastClr="000000"/>
-                </a:solidFill>
-              </a:rPr>
-              <a:t>:</a:t>
-            </a:r>
-            <a:r>
-              <a:rPr kumimoji="1" lang="zh-CN" altLang="en-US" sz="1200" dirty="0">
-                <a:solidFill>
-                  <a:sysClr val="windowText" lastClr="000000"/>
-                </a:solidFill>
-              </a:rPr>
-              <a:t> </a:t>
-            </a:r>
-            <a:r>
-              <a:rPr kumimoji="1" lang="en-US" altLang="zh-CN" sz="1200" dirty="0">
-                <a:solidFill>
-                  <a:sysClr val="windowText" lastClr="000000"/>
-                </a:solidFill>
-              </a:rPr>
-              <a:t>Account</a:t>
-            </a:r>
-            <a:endParaRPr kumimoji="1" lang="zh-CN" altLang="en-US" sz="1200" dirty="0">
-              <a:solidFill>
-                <a:sysClr val="windowText" lastClr="000000"/>
-              </a:solidFill>
-            </a:endParaRPr>
-          </a:p>
-        </p:txBody>
-      </p:sp>
-      <p:sp>
-        <p:nvSpPr>
-          <p:cNvPr id="51" name="矩形 14"/>
-          <p:cNvSpPr/>
-          <p:nvPr/>
-        </p:nvSpPr>
-        <p:spPr>
-          <a:xfrm>
-            <a:off x="5780457" y="4605726"/>
-            <a:ext cx="1381173" cy="505147"/>
-          </a:xfrm>
-          <a:prstGeom prst="rect">
-            <a:avLst/>
-          </a:prstGeom>
-          <a:solidFill>
-            <a:schemeClr val="accent5">
-              <a:lumMod val="60000"/>
-              <a:lumOff val="40000"/>
-            </a:schemeClr>
-          </a:solidFill>
-          <a:ln w="25400">
-            <a:solidFill>
-              <a:schemeClr val="tx1"/>
-            </a:solidFill>
-          </a:ln>
-        </p:spPr>
-        <p:style>
-          <a:lnRef idx="2">
-            <a:schemeClr val="accent2">
-              <a:shade val="50000"/>
-            </a:schemeClr>
-          </a:lnRef>
-          <a:fillRef idx="1">
-            <a:schemeClr val="accent2"/>
-          </a:fillRef>
-          <a:effectRef idx="0">
-            <a:schemeClr val="accent2"/>
-          </a:effectRef>
-          <a:fontRef idx="minor">
-            <a:schemeClr val="lt1"/>
-          </a:fontRef>
-        </p:style>
-        <p:txBody>
-          <a:bodyPr rtlCol="0" anchor="ctr"/>
-          <a:lstStyle/>
-          <a:p>
-            <a:pPr algn="ctr"/>
-            <a:r>
-              <a:rPr kumimoji="1" lang="en-US" altLang="zh-CN" sz="1200" b="1" dirty="0">
-                <a:solidFill>
-                  <a:sysClr val="windowText" lastClr="000000"/>
-                </a:solidFill>
-              </a:rPr>
-              <a:t>down2</a:t>
-            </a:r>
-            <a:r>
-              <a:rPr kumimoji="1" lang="zh-CN" altLang="en-US" sz="1200" dirty="0">
-                <a:solidFill>
-                  <a:sysClr val="windowText" lastClr="000000"/>
-                </a:solidFill>
-              </a:rPr>
-              <a:t> </a:t>
-            </a:r>
-            <a:r>
-              <a:rPr kumimoji="1" lang="en-US" altLang="zh-CN" sz="1200" dirty="0">
-                <a:solidFill>
-                  <a:sysClr val="windowText" lastClr="000000"/>
-                </a:solidFill>
-              </a:rPr>
-              <a:t>:</a:t>
-            </a:r>
-            <a:r>
-              <a:rPr kumimoji="1" lang="zh-CN" altLang="en-US" sz="1200" dirty="0">
-                <a:solidFill>
-                  <a:sysClr val="windowText" lastClr="000000"/>
-                </a:solidFill>
-              </a:rPr>
-              <a:t> </a:t>
-            </a:r>
-            <a:r>
-              <a:rPr kumimoji="1" lang="en-US" altLang="zh-CN" sz="1200" dirty="0">
-                <a:solidFill>
-                  <a:sysClr val="windowText" lastClr="000000"/>
-                </a:solidFill>
-              </a:rPr>
-              <a:t>Account</a:t>
-            </a:r>
-            <a:endParaRPr kumimoji="1" lang="zh-CN" altLang="en-US" sz="1200" dirty="0">
-              <a:solidFill>
-                <a:sysClr val="windowText" lastClr="000000"/>
-              </a:solidFill>
-            </a:endParaRPr>
-          </a:p>
-        </p:txBody>
-      </p:sp>
-      <p:cxnSp>
-        <p:nvCxnSpPr>
-          <p:cNvPr id="54" name="直线箭头连接符 11" descr="jytjh"/>
-          <p:cNvCxnSpPr>
-            <a:stCxn id="48" idx="2"/>
-            <a:endCxn id="25" idx="0"/>
-          </p:cNvCxnSpPr>
-          <p:nvPr/>
-        </p:nvCxnSpPr>
-        <p:spPr>
-          <a:xfrm>
-            <a:off x="6431478" y="1762524"/>
-            <a:ext cx="1001411" cy="1113909"/>
-          </a:xfrm>
-          <a:prstGeom prst="straightConnector1">
-            <a:avLst/>
-          </a:prstGeom>
-          <a:ln w="19050">
-            <a:solidFill>
-              <a:schemeClr val="tx1"/>
-            </a:solidFill>
-            <a:headEnd type="none" w="lg" len="med"/>
-            <a:tailEnd type="arrow" w="sm" len="lg"/>
-          </a:ln>
-        </p:spPr>
-        <p:style>
-          <a:lnRef idx="1">
-            <a:schemeClr val="accent1"/>
-          </a:lnRef>
-          <a:fillRef idx="0">
-            <a:schemeClr val="accent1"/>
-          </a:fillRef>
-          <a:effectRef idx="0">
-            <a:schemeClr val="accent1"/>
-          </a:effectRef>
-          <a:fontRef idx="minor">
-            <a:schemeClr val="tx1"/>
-          </a:fontRef>
-        </p:style>
-      </p:cxnSp>
-      <p:cxnSp>
-        <p:nvCxnSpPr>
-          <p:cNvPr id="59" name="直线箭头连接符 11" descr="jytjh"/>
-          <p:cNvCxnSpPr>
-            <a:stCxn id="12" idx="2"/>
-            <a:endCxn id="51" idx="0"/>
-          </p:cNvCxnSpPr>
-          <p:nvPr/>
-        </p:nvCxnSpPr>
-        <p:spPr>
-          <a:xfrm flipH="1">
-            <a:off x="6471044" y="3564481"/>
-            <a:ext cx="960432" cy="1041245"/>
-          </a:xfrm>
-          <a:prstGeom prst="straightConnector1">
-            <a:avLst/>
-          </a:prstGeom>
-          <a:ln w="19050">
-            <a:solidFill>
-              <a:schemeClr val="tx1"/>
-            </a:solidFill>
-            <a:headEnd type="none" w="lg" len="med"/>
-            <a:tailEnd type="arrow" w="sm" len="lg"/>
-          </a:ln>
-        </p:spPr>
-        <p:style>
-          <a:lnRef idx="1">
-            <a:schemeClr val="accent1"/>
-          </a:lnRef>
-          <a:fillRef idx="0">
-            <a:schemeClr val="accent1"/>
-          </a:fillRef>
-          <a:effectRef idx="0">
-            <a:schemeClr val="accent1"/>
-          </a:effectRef>
-          <a:fontRef idx="minor">
-            <a:schemeClr val="tx1"/>
-          </a:fontRef>
-        </p:style>
-      </p:cxnSp>
-      <p:sp>
-        <p:nvSpPr>
-          <p:cNvPr id="28" name="矩形 13"/>
-          <p:cNvSpPr/>
-          <p:nvPr/>
-        </p:nvSpPr>
-        <p:spPr>
-          <a:xfrm>
-            <a:off x="4112467" y="2859843"/>
-            <a:ext cx="955159" cy="351258"/>
-          </a:xfrm>
-          <a:prstGeom prst="rect">
-            <a:avLst/>
-          </a:prstGeom>
-          <a:solidFill>
-            <a:schemeClr val="accent2">
-              <a:lumMod val="60000"/>
-              <a:lumOff val="40000"/>
-            </a:schemeClr>
-          </a:solidFill>
-          <a:ln w="25400">
-            <a:solidFill>
-              <a:schemeClr val="tx1"/>
-            </a:solidFill>
-          </a:ln>
-        </p:spPr>
-        <p:style>
-          <a:lnRef idx="2">
-            <a:schemeClr val="accent2">
-              <a:shade val="50000"/>
-            </a:schemeClr>
-          </a:lnRef>
-          <a:fillRef idx="1">
-            <a:schemeClr val="accent2"/>
-          </a:fillRef>
-          <a:effectRef idx="0">
-            <a:schemeClr val="accent2"/>
-          </a:effectRef>
-          <a:fontRef idx="minor">
-            <a:schemeClr val="lt1"/>
-          </a:fontRef>
-        </p:style>
-        <p:txBody>
-          <a:bodyPr rtlCol="0" anchor="ctr"/>
-          <a:lstStyle/>
-          <a:p>
-            <a:pPr algn="ctr"/>
-            <a:r>
-              <a:rPr kumimoji="1" lang="en-US" altLang="zh-CN" sz="1200" b="1" dirty="0">
-                <a:solidFill>
-                  <a:sysClr val="windowText" lastClr="000000"/>
-                </a:solidFill>
-              </a:rPr>
-              <a:t>loan</a:t>
-            </a:r>
-            <a:r>
-              <a:rPr kumimoji="1" lang="zh-CN" altLang="en-US" sz="1200" dirty="0">
-                <a:solidFill>
-                  <a:sysClr val="windowText" lastClr="000000"/>
-                </a:solidFill>
-              </a:rPr>
-              <a:t> </a:t>
-            </a:r>
-            <a:r>
-              <a:rPr kumimoji="1" lang="en-US" altLang="zh-CN" sz="1200" dirty="0">
-                <a:solidFill>
-                  <a:sysClr val="windowText" lastClr="000000"/>
-                </a:solidFill>
-              </a:rPr>
-              <a:t>:</a:t>
-            </a:r>
-            <a:r>
-              <a:rPr kumimoji="1" lang="zh-CN" altLang="en-US" sz="1200" dirty="0">
-                <a:solidFill>
-                  <a:sysClr val="windowText" lastClr="000000"/>
-                </a:solidFill>
-              </a:rPr>
-              <a:t> </a:t>
-            </a:r>
-            <a:r>
-              <a:rPr kumimoji="1" lang="en-US" altLang="zh-CN" sz="1200" dirty="0">
-                <a:solidFill>
-                  <a:sysClr val="windowText" lastClr="000000"/>
-                </a:solidFill>
-              </a:rPr>
-              <a:t>Loan</a:t>
-            </a:r>
-            <a:endParaRPr kumimoji="1" lang="zh-CN" altLang="en-US" sz="1200" dirty="0">
-              <a:solidFill>
-                <a:sysClr val="windowText" lastClr="000000"/>
-              </a:solidFill>
-            </a:endParaRPr>
-          </a:p>
-        </p:txBody>
-      </p:sp>
-      <p:sp>
-        <p:nvSpPr>
-          <p:cNvPr id="44" name="文本框 12"/>
-          <p:cNvSpPr txBox="1"/>
-          <p:nvPr/>
-        </p:nvSpPr>
-        <p:spPr>
-          <a:xfrm>
-            <a:off x="5356522" y="2733860"/>
-            <a:ext cx="889680" cy="307777"/>
-          </a:xfrm>
-          <a:prstGeom prst="rect">
-            <a:avLst/>
-          </a:prstGeom>
-          <a:noFill/>
-        </p:spPr>
-        <p:txBody>
-          <a:bodyPr wrap="square" rtlCol="0">
-            <a:spAutoFit/>
-          </a:bodyPr>
-          <a:lstStyle/>
-          <a:p>
-            <a:pPr algn="ctr"/>
-            <a:r>
-              <a:rPr kumimoji="1" lang="en-US" altLang="zh-CN" sz="1400" b="1" dirty="0">
-                <a:latin typeface="等线" panose="02010600030101010101" pitchFamily="2" charset="-122"/>
-                <a:ea typeface="等线" panose="02010600030101010101" pitchFamily="2" charset="-122"/>
-              </a:rPr>
-              <a:t>edge1</a:t>
-            </a:r>
-            <a:endParaRPr kumimoji="1" lang="en-US" altLang="zh-CN" sz="1400" dirty="0">
-              <a:latin typeface="等线" panose="02010600030101010101" pitchFamily="2" charset="-122"/>
-              <a:ea typeface="等线" panose="02010600030101010101" pitchFamily="2" charset="-122"/>
-            </a:endParaRPr>
-          </a:p>
-        </p:txBody>
-      </p:sp>
-      <p:cxnSp>
-        <p:nvCxnSpPr>
-          <p:cNvPr id="6" name="Elbow Connector 5"/>
-          <p:cNvCxnSpPr>
-            <a:stCxn id="12" idx="1"/>
-            <a:endCxn id="28" idx="2"/>
-          </p:cNvCxnSpPr>
-          <p:nvPr/>
-        </p:nvCxnSpPr>
-        <p:spPr>
-          <a:xfrm rot="10800000">
-            <a:off x="4590048" y="3211101"/>
-            <a:ext cx="2189895" cy="187098"/>
-          </a:xfrm>
-          <a:prstGeom prst="bentConnector2">
-            <a:avLst/>
-          </a:prstGeom>
-          <a:ln w="19050">
-            <a:solidFill>
-              <a:schemeClr val="tx1"/>
-            </a:solidFill>
-            <a:tailEnd type="arrow" w="sm" len="lg"/>
-          </a:ln>
-        </p:spPr>
-        <p:style>
-          <a:lnRef idx="1">
-            <a:schemeClr val="accent1"/>
-          </a:lnRef>
-          <a:fillRef idx="0">
-            <a:schemeClr val="accent1"/>
-          </a:fillRef>
-          <a:effectRef idx="0">
-            <a:schemeClr val="accent1"/>
-          </a:effectRef>
-          <a:fontRef idx="minor">
-            <a:schemeClr val="tx1"/>
-          </a:fontRef>
-        </p:style>
-      </p:cxnSp>
-      <p:sp>
-        <p:nvSpPr>
-          <p:cNvPr id="46" name="文本框 12"/>
-          <p:cNvSpPr txBox="1"/>
-          <p:nvPr/>
-        </p:nvSpPr>
-        <p:spPr>
-          <a:xfrm>
-            <a:off x="6892265" y="1992121"/>
-            <a:ext cx="998454" cy="307777"/>
-          </a:xfrm>
-          <a:prstGeom prst="rect">
-            <a:avLst/>
-          </a:prstGeom>
-          <a:noFill/>
-        </p:spPr>
-        <p:txBody>
-          <a:bodyPr wrap="square" rtlCol="0">
-            <a:spAutoFit/>
-          </a:bodyPr>
-          <a:lstStyle/>
-          <a:p>
-            <a:pPr algn="ctr"/>
-            <a:r>
-              <a:rPr kumimoji="1" lang="en-US" altLang="zh-CN" sz="1400" b="1" dirty="0">
-                <a:latin typeface="等线" panose="02010600030101010101" pitchFamily="2" charset="-122"/>
-                <a:ea typeface="等线" panose="02010600030101010101" pitchFamily="2" charset="-122"/>
-              </a:rPr>
-              <a:t>edge3</a:t>
-            </a:r>
-            <a:endParaRPr kumimoji="1" lang="en-US" altLang="zh-CN" sz="1400" dirty="0">
-              <a:latin typeface="等线" panose="02010600030101010101" pitchFamily="2" charset="-122"/>
-              <a:ea typeface="等线" panose="02010600030101010101" pitchFamily="2" charset="-122"/>
-            </a:endParaRPr>
-          </a:p>
-        </p:txBody>
-      </p:sp>
-      <p:sp>
-        <p:nvSpPr>
-          <p:cNvPr id="70" name="文本框 12"/>
-          <p:cNvSpPr txBox="1"/>
-          <p:nvPr/>
-        </p:nvSpPr>
-        <p:spPr>
-          <a:xfrm>
-            <a:off x="5375422" y="3403350"/>
-            <a:ext cx="889680" cy="307777"/>
-          </a:xfrm>
-          <a:prstGeom prst="rect">
-            <a:avLst/>
-          </a:prstGeom>
-          <a:noFill/>
-        </p:spPr>
-        <p:txBody>
-          <a:bodyPr wrap="square" rtlCol="0">
-            <a:spAutoFit/>
-          </a:bodyPr>
-          <a:lstStyle/>
-          <a:p>
-            <a:pPr algn="ctr"/>
-            <a:r>
-              <a:rPr kumimoji="1" lang="en-US" altLang="zh-CN" sz="1400" b="1" dirty="0">
-                <a:latin typeface="等线" panose="02010600030101010101" pitchFamily="2" charset="-122"/>
-                <a:ea typeface="等线" panose="02010600030101010101" pitchFamily="2" charset="-122"/>
-              </a:rPr>
-              <a:t>edge2</a:t>
-            </a:r>
-            <a:endParaRPr kumimoji="1" lang="en-US" altLang="zh-CN" sz="1400" dirty="0">
-              <a:latin typeface="等线" panose="02010600030101010101" pitchFamily="2" charset="-122"/>
-              <a:ea typeface="等线" panose="02010600030101010101" pitchFamily="2" charset="-122"/>
-            </a:endParaRPr>
-          </a:p>
-        </p:txBody>
-      </p:sp>
-      <p:sp>
-        <p:nvSpPr>
-          <p:cNvPr id="71" name="文本框 12"/>
-          <p:cNvSpPr txBox="1"/>
-          <p:nvPr/>
-        </p:nvSpPr>
-        <p:spPr>
-          <a:xfrm>
-            <a:off x="6892265" y="3961158"/>
-            <a:ext cx="996599" cy="307777"/>
-          </a:xfrm>
-          <a:prstGeom prst="rect">
-            <a:avLst/>
-          </a:prstGeom>
-          <a:noFill/>
-        </p:spPr>
-        <p:txBody>
-          <a:bodyPr wrap="square" rtlCol="0">
-            <a:spAutoFit/>
-          </a:bodyPr>
-          <a:lstStyle/>
-          <a:p>
-            <a:pPr algn="ctr"/>
-            <a:r>
-              <a:rPr kumimoji="1" lang="en-US" altLang="zh-CN" sz="1400" b="1" dirty="0">
-                <a:latin typeface="等线" panose="02010600030101010101" pitchFamily="2" charset="-122"/>
-                <a:ea typeface="等线" panose="02010600030101010101" pitchFamily="2" charset="-122"/>
-              </a:rPr>
-              <a:t>edge4</a:t>
-            </a:r>
-            <a:endParaRPr kumimoji="1" lang="en-US" altLang="zh-CN" sz="1400" dirty="0">
-              <a:latin typeface="等线" panose="02010600030101010101" pitchFamily="2" charset="-122"/>
-              <a:ea typeface="等线" panose="02010600030101010101" pitchFamily="2" charset="-122"/>
-            </a:endParaRPr>
-          </a:p>
-        </p:txBody>
-      </p:sp>
-      <p:cxnSp>
-        <p:nvCxnSpPr>
-          <p:cNvPr id="2" name="直线箭头连接符 11" descr="jytjh"/>
-          <p:cNvCxnSpPr>
-            <a:stCxn id="28" idx="3"/>
-            <a:endCxn id="25" idx="1"/>
-          </p:cNvCxnSpPr>
-          <p:nvPr/>
-        </p:nvCxnSpPr>
-        <p:spPr>
-          <a:xfrm>
-            <a:off x="5067626" y="3035472"/>
-            <a:ext cx="1715144" cy="16590"/>
-          </a:xfrm>
-          <a:prstGeom prst="straightConnector1">
-            <a:avLst/>
-          </a:prstGeom>
-          <a:ln w="19050">
-            <a:solidFill>
-              <a:schemeClr val="tx1"/>
-            </a:solidFill>
-            <a:headEnd type="none" w="lg" len="med"/>
-            <a:tailEnd type="arrow" w="sm" len="lg"/>
-          </a:ln>
-        </p:spPr>
-        <p:style>
-          <a:lnRef idx="1">
-            <a:schemeClr val="accent1"/>
-          </a:lnRef>
-          <a:fillRef idx="0">
-            <a:schemeClr val="accent1"/>
-          </a:fillRef>
-          <a:effectRef idx="0">
-            <a:schemeClr val="accent1"/>
-          </a:effectRef>
-          <a:fontRef idx="minor">
-            <a:schemeClr val="tx1"/>
-          </a:fontRef>
-        </p:style>
-      </p:cxnSp>
-      <p:sp>
-        <p:nvSpPr>
-          <p:cNvPr id="7" name="文本框 12"/>
-          <p:cNvSpPr txBox="1"/>
-          <p:nvPr/>
-        </p:nvSpPr>
-        <p:spPr>
-          <a:xfrm>
-            <a:off x="1301785" y="1066803"/>
-            <a:ext cx="2787069" cy="4923690"/>
-          </a:xfrm>
-          <a:prstGeom prst="rect">
-            <a:avLst/>
-          </a:prstGeom>
-          <a:noFill/>
-        </p:spPr>
-        <p:txBody>
-          <a:bodyPr wrap="square" lIns="90000" rtlCol="0" anchor="ctr">
-            <a:noAutofit/>
-          </a:bodyPr>
-          <a:lstStyle/>
-          <a:p>
-            <a:r>
-              <a:rPr kumimoji="1" lang="en-US" altLang="zh-CN" sz="1200" b="1" dirty="0">
-                <a:latin typeface="等线" panose="02010600030101010101" pitchFamily="2" charset="-122"/>
-                <a:ea typeface="等线" panose="02010600030101010101" pitchFamily="2" charset="-122"/>
-              </a:rPr>
-              <a:t>edge1:</a:t>
-            </a:r>
-            <a:r>
-              <a:rPr kumimoji="1" lang="zh-CN" altLang="en-US" sz="1200" b="1" dirty="0">
-                <a:latin typeface="等线" panose="02010600030101010101" pitchFamily="2" charset="-122"/>
-                <a:ea typeface="等线" panose="02010600030101010101" pitchFamily="2" charset="-122"/>
-              </a:rPr>
-              <a:t> </a:t>
-            </a:r>
-            <a:r>
-              <a:rPr kumimoji="1" lang="en-US" altLang="zh-CN" sz="1200" dirty="0">
-                <a:latin typeface="等线" panose="02010600030101010101" pitchFamily="2" charset="-122"/>
-                <a:ea typeface="等线" panose="02010600030101010101" pitchFamily="2" charset="-122"/>
-              </a:rPr>
-              <a:t>deposit</a:t>
-            </a:r>
-            <a:endParaRPr kumimoji="1" lang="en-US" altLang="zh-CN" sz="1200" dirty="0">
-              <a:latin typeface="等线" panose="02010600030101010101" pitchFamily="2" charset="-122"/>
-              <a:ea typeface="等线" panose="02010600030101010101" pitchFamily="2" charset="-122"/>
-            </a:endParaRPr>
-          </a:p>
-          <a:p>
-            <a:r>
-              <a:rPr kumimoji="1" lang="en-US" altLang="zh-CN" sz="1200" b="1" dirty="0">
-                <a:latin typeface="等线" panose="02010600030101010101" pitchFamily="2" charset="-122"/>
-                <a:ea typeface="等线" panose="02010600030101010101" pitchFamily="2" charset="-122"/>
-              </a:rPr>
-              <a:t>edge1</a:t>
-            </a:r>
-            <a:r>
-              <a:rPr kumimoji="1" lang="en-US" altLang="zh-CN" sz="1200" dirty="0">
-                <a:latin typeface="等线" panose="02010600030101010101" pitchFamily="2" charset="-122"/>
-                <a:ea typeface="等线" panose="02010600030101010101" pitchFamily="2" charset="-122"/>
-              </a:rPr>
-              <a:t>.amount</a:t>
-            </a:r>
-            <a:r>
-              <a:rPr kumimoji="1" lang="zh-CN" altLang="en-US" sz="1200" dirty="0">
-                <a:latin typeface="等线" panose="02010600030101010101" pitchFamily="2" charset="-122"/>
-                <a:ea typeface="等线" panose="02010600030101010101" pitchFamily="2" charset="-122"/>
-              </a:rPr>
-              <a:t> </a:t>
-            </a:r>
-            <a:r>
-              <a:rPr kumimoji="1" lang="en-US" altLang="zh-CN" sz="1200" dirty="0">
-                <a:latin typeface="等线" panose="02010600030101010101" pitchFamily="2" charset="-122"/>
-                <a:ea typeface="等线" panose="02010600030101010101" pitchFamily="2" charset="-122"/>
-              </a:rPr>
-              <a:t>&gt;</a:t>
-            </a:r>
-            <a:r>
-              <a:rPr kumimoji="1" lang="zh-CN" altLang="en-US" sz="1200" dirty="0">
-                <a:latin typeface="等线" panose="02010600030101010101" pitchFamily="2" charset="-122"/>
-                <a:ea typeface="等线" panose="02010600030101010101" pitchFamily="2" charset="-122"/>
-              </a:rPr>
-              <a:t> </a:t>
-            </a:r>
-            <a:r>
-              <a:rPr kumimoji="1" lang="en-US" altLang="zh-CN" sz="1200" dirty="0">
-                <a:latin typeface="等线" panose="02010600030101010101" pitchFamily="2" charset="-122"/>
-                <a:ea typeface="等线" panose="02010600030101010101" pitchFamily="2" charset="-122"/>
-              </a:rPr>
-              <a:t>${threshold}</a:t>
-            </a:r>
-            <a:endParaRPr kumimoji="1" lang="en-US" altLang="zh-CN" sz="1200" dirty="0">
-              <a:latin typeface="等线" panose="02010600030101010101" pitchFamily="2" charset="-122"/>
-              <a:ea typeface="等线" panose="02010600030101010101" pitchFamily="2" charset="-122"/>
-            </a:endParaRPr>
-          </a:p>
-          <a:p>
-            <a:r>
-              <a:rPr kumimoji="1" lang="en-US" altLang="zh-CN" sz="1200" b="1" dirty="0">
-                <a:latin typeface="等线" panose="02010600030101010101" pitchFamily="2" charset="-122"/>
-                <a:ea typeface="等线" panose="02010600030101010101" pitchFamily="2" charset="-122"/>
-              </a:rPr>
-              <a:t>edge1</a:t>
-            </a:r>
-            <a:r>
-              <a:rPr kumimoji="1" lang="en-US" altLang="zh-CN" sz="1200" dirty="0">
-                <a:latin typeface="等线" panose="02010600030101010101" pitchFamily="2" charset="-122"/>
-                <a:ea typeface="等线" panose="02010600030101010101" pitchFamily="2" charset="-122"/>
-              </a:rPr>
-              <a:t>.timestamp</a:t>
-            </a:r>
-            <a:r>
-              <a:rPr kumimoji="1" lang="zh-CN" altLang="en-US" sz="1200" dirty="0">
-                <a:latin typeface="等线" panose="02010600030101010101" pitchFamily="2" charset="-122"/>
-                <a:ea typeface="等线" panose="02010600030101010101" pitchFamily="2" charset="-122"/>
-              </a:rPr>
-              <a:t> </a:t>
-            </a:r>
-            <a:r>
-              <a:rPr kumimoji="1" lang="en-US" altLang="zh-CN" sz="1200" dirty="0">
-                <a:latin typeface="等线" panose="02010600030101010101" pitchFamily="2" charset="-122"/>
-                <a:ea typeface="等线" panose="02010600030101010101" pitchFamily="2" charset="-122"/>
-              </a:rPr>
-              <a:t>&gt;</a:t>
-            </a:r>
-            <a:r>
-              <a:rPr kumimoji="1" lang="zh-CN" altLang="en-US" sz="1200" dirty="0">
-                <a:latin typeface="等线" panose="02010600030101010101" pitchFamily="2" charset="-122"/>
-                <a:ea typeface="等线" panose="02010600030101010101" pitchFamily="2" charset="-122"/>
-              </a:rPr>
-              <a:t> </a:t>
-            </a:r>
-            <a:r>
-              <a:rPr kumimoji="1" lang="en-US" altLang="zh-CN" sz="1200" dirty="0">
-                <a:latin typeface="等线" panose="02010600030101010101" pitchFamily="2" charset="-122"/>
-                <a:ea typeface="等线" panose="02010600030101010101" pitchFamily="2" charset="-122"/>
-              </a:rPr>
-              <a:t>${</a:t>
-            </a:r>
-            <a:r>
-              <a:rPr kumimoji="1" lang="en-US" altLang="zh-CN" sz="1200" dirty="0" err="1">
-                <a:latin typeface="等线" panose="02010600030101010101" pitchFamily="2" charset="-122"/>
-                <a:ea typeface="等线" panose="02010600030101010101" pitchFamily="2" charset="-122"/>
-              </a:rPr>
-              <a:t>startTime</a:t>
-            </a:r>
-            <a:r>
-              <a:rPr kumimoji="1" lang="en-US" altLang="zh-CN" sz="1200" dirty="0">
-                <a:latin typeface="等线" panose="02010600030101010101" pitchFamily="2" charset="-122"/>
-                <a:ea typeface="等线" panose="02010600030101010101" pitchFamily="2" charset="-122"/>
-              </a:rPr>
-              <a:t>}</a:t>
-            </a:r>
-            <a:endParaRPr kumimoji="1" lang="en-US" altLang="zh-CN" sz="1200" dirty="0">
-              <a:latin typeface="等线" panose="02010600030101010101" pitchFamily="2" charset="-122"/>
-              <a:ea typeface="等线" panose="02010600030101010101" pitchFamily="2" charset="-122"/>
-            </a:endParaRPr>
-          </a:p>
-          <a:p>
-            <a:r>
-              <a:rPr kumimoji="1" lang="en-US" altLang="zh-CN" sz="1200" b="1" dirty="0">
-                <a:latin typeface="等线" panose="02010600030101010101" pitchFamily="2" charset="-122"/>
-                <a:ea typeface="等线" panose="02010600030101010101" pitchFamily="2" charset="-122"/>
-              </a:rPr>
-              <a:t>edge1</a:t>
-            </a:r>
-            <a:r>
-              <a:rPr kumimoji="1" lang="en-US" altLang="zh-CN" sz="1200" dirty="0">
-                <a:latin typeface="等线" panose="02010600030101010101" pitchFamily="2" charset="-122"/>
-                <a:ea typeface="等线" panose="02010600030101010101" pitchFamily="2" charset="-122"/>
-              </a:rPr>
-              <a:t>.timestamp</a:t>
-            </a:r>
-            <a:r>
-              <a:rPr kumimoji="1" lang="zh-CN" altLang="en-US" sz="1200" dirty="0">
-                <a:latin typeface="等线" panose="02010600030101010101" pitchFamily="2" charset="-122"/>
-                <a:ea typeface="等线" panose="02010600030101010101" pitchFamily="2" charset="-122"/>
-              </a:rPr>
-              <a:t> </a:t>
-            </a:r>
-            <a:r>
-              <a:rPr kumimoji="1" lang="en-US" altLang="zh-CN" sz="1200" dirty="0">
-                <a:latin typeface="等线" panose="02010600030101010101" pitchFamily="2" charset="-122"/>
-                <a:ea typeface="等线" panose="02010600030101010101" pitchFamily="2" charset="-122"/>
-              </a:rPr>
-              <a:t>&lt;</a:t>
-            </a:r>
-            <a:r>
-              <a:rPr kumimoji="1" lang="zh-CN" altLang="en-US" sz="1200" dirty="0">
-                <a:latin typeface="等线" panose="02010600030101010101" pitchFamily="2" charset="-122"/>
-                <a:ea typeface="等线" panose="02010600030101010101" pitchFamily="2" charset="-122"/>
-              </a:rPr>
-              <a:t> </a:t>
-            </a:r>
-            <a:r>
-              <a:rPr kumimoji="1" lang="en-US" altLang="zh-CN" sz="1200" dirty="0">
-                <a:latin typeface="等线" panose="02010600030101010101" pitchFamily="2" charset="-122"/>
-                <a:ea typeface="等线" panose="02010600030101010101" pitchFamily="2" charset="-122"/>
-              </a:rPr>
-              <a:t>${</a:t>
-            </a:r>
-            <a:r>
-              <a:rPr kumimoji="1" lang="en-US" altLang="zh-CN" sz="1200" dirty="0" err="1">
-                <a:latin typeface="等线" panose="02010600030101010101" pitchFamily="2" charset="-122"/>
-                <a:ea typeface="等线" panose="02010600030101010101" pitchFamily="2" charset="-122"/>
-              </a:rPr>
-              <a:t>endTime</a:t>
-            </a:r>
-            <a:r>
-              <a:rPr kumimoji="1" lang="en-US" altLang="zh-CN" sz="1200" dirty="0">
-                <a:latin typeface="等线" panose="02010600030101010101" pitchFamily="2" charset="-122"/>
-                <a:ea typeface="等线" panose="02010600030101010101" pitchFamily="2" charset="-122"/>
-              </a:rPr>
-              <a:t>}</a:t>
-            </a:r>
-            <a:endParaRPr kumimoji="1" lang="en-US" altLang="zh-CN" sz="1200" dirty="0">
-              <a:latin typeface="等线" panose="02010600030101010101" pitchFamily="2" charset="-122"/>
-              <a:ea typeface="等线" panose="02010600030101010101" pitchFamily="2" charset="-122"/>
-            </a:endParaRPr>
-          </a:p>
-          <a:p>
-            <a:endParaRPr kumimoji="1" lang="en-US" altLang="zh-CN" sz="1200" b="1" dirty="0">
-              <a:latin typeface="等线" panose="02010600030101010101" pitchFamily="2" charset="-122"/>
-              <a:ea typeface="等线" panose="02010600030101010101" pitchFamily="2" charset="-122"/>
-            </a:endParaRPr>
-          </a:p>
-          <a:p>
-            <a:r>
-              <a:rPr kumimoji="1" lang="en-US" altLang="zh-CN" sz="1200" b="1" dirty="0">
-                <a:latin typeface="等线" panose="02010600030101010101" pitchFamily="2" charset="-122"/>
-                <a:ea typeface="等线" panose="02010600030101010101" pitchFamily="2" charset="-122"/>
-              </a:rPr>
-              <a:t>edge2:</a:t>
-            </a:r>
-            <a:r>
-              <a:rPr kumimoji="1" lang="zh-CN" altLang="en-US" sz="1200" b="1" dirty="0">
-                <a:latin typeface="等线" panose="02010600030101010101" pitchFamily="2" charset="-122"/>
-                <a:ea typeface="等线" panose="02010600030101010101" pitchFamily="2" charset="-122"/>
-              </a:rPr>
-              <a:t> </a:t>
-            </a:r>
-            <a:r>
-              <a:rPr kumimoji="1" lang="en-US" altLang="zh-CN" sz="1200" dirty="0">
-                <a:latin typeface="等线" panose="02010600030101010101" pitchFamily="2" charset="-122"/>
-                <a:ea typeface="等线" panose="02010600030101010101" pitchFamily="2" charset="-122"/>
-              </a:rPr>
-              <a:t>repay</a:t>
-            </a:r>
-            <a:endParaRPr kumimoji="1" lang="en-US" altLang="zh-CN" sz="1200" dirty="0">
-              <a:latin typeface="等线" panose="02010600030101010101" pitchFamily="2" charset="-122"/>
-              <a:ea typeface="等线" panose="02010600030101010101" pitchFamily="2" charset="-122"/>
-            </a:endParaRPr>
-          </a:p>
-          <a:p>
-            <a:r>
-              <a:rPr kumimoji="1" lang="en-US" altLang="zh-CN" sz="1200" b="1" dirty="0">
-                <a:latin typeface="等线" panose="02010600030101010101" pitchFamily="2" charset="-122"/>
-                <a:ea typeface="等线" panose="02010600030101010101" pitchFamily="2" charset="-122"/>
-              </a:rPr>
-              <a:t>edge2</a:t>
-            </a:r>
-            <a:r>
-              <a:rPr kumimoji="1" lang="en-US" altLang="zh-CN" sz="1200" dirty="0">
-                <a:latin typeface="等线" panose="02010600030101010101" pitchFamily="2" charset="-122"/>
-                <a:ea typeface="等线" panose="02010600030101010101" pitchFamily="2" charset="-122"/>
-              </a:rPr>
-              <a:t>.amount</a:t>
-            </a:r>
-            <a:r>
-              <a:rPr kumimoji="1" lang="zh-CN" altLang="en-US" sz="1200" dirty="0">
-                <a:latin typeface="等线" panose="02010600030101010101" pitchFamily="2" charset="-122"/>
-                <a:ea typeface="等线" panose="02010600030101010101" pitchFamily="2" charset="-122"/>
-              </a:rPr>
-              <a:t> </a:t>
-            </a:r>
-            <a:r>
-              <a:rPr kumimoji="1" lang="en-US" altLang="zh-CN" sz="1200" dirty="0">
-                <a:latin typeface="等线" panose="02010600030101010101" pitchFamily="2" charset="-122"/>
-                <a:ea typeface="等线" panose="02010600030101010101" pitchFamily="2" charset="-122"/>
-              </a:rPr>
-              <a:t>&gt;</a:t>
-            </a:r>
-            <a:r>
-              <a:rPr kumimoji="1" lang="zh-CN" altLang="en-US" sz="1200" dirty="0">
-                <a:latin typeface="等线" panose="02010600030101010101" pitchFamily="2" charset="-122"/>
-                <a:ea typeface="等线" panose="02010600030101010101" pitchFamily="2" charset="-122"/>
-              </a:rPr>
-              <a:t> </a:t>
-            </a:r>
-            <a:r>
-              <a:rPr kumimoji="1" lang="en-US" altLang="zh-CN" sz="1200" dirty="0">
-                <a:latin typeface="等线" panose="02010600030101010101" pitchFamily="2" charset="-122"/>
-                <a:ea typeface="等线" panose="02010600030101010101" pitchFamily="2" charset="-122"/>
-              </a:rPr>
-              <a:t>${threshold}</a:t>
-            </a:r>
-            <a:endParaRPr kumimoji="1" lang="en-US" altLang="zh-CN" sz="1200" dirty="0">
-              <a:latin typeface="等线" panose="02010600030101010101" pitchFamily="2" charset="-122"/>
-              <a:ea typeface="等线" panose="02010600030101010101" pitchFamily="2" charset="-122"/>
-            </a:endParaRPr>
-          </a:p>
-          <a:p>
-            <a:r>
-              <a:rPr kumimoji="1" lang="en-US" altLang="zh-CN" sz="1200" b="1" dirty="0">
-                <a:latin typeface="等线" panose="02010600030101010101" pitchFamily="2" charset="-122"/>
-                <a:ea typeface="等线" panose="02010600030101010101" pitchFamily="2" charset="-122"/>
-              </a:rPr>
-              <a:t>edge2</a:t>
-            </a:r>
-            <a:r>
-              <a:rPr kumimoji="1" lang="en-US" altLang="zh-CN" sz="1200" dirty="0">
-                <a:latin typeface="等线" panose="02010600030101010101" pitchFamily="2" charset="-122"/>
-                <a:ea typeface="等线" panose="02010600030101010101" pitchFamily="2" charset="-122"/>
-              </a:rPr>
-              <a:t>.timestamp</a:t>
-            </a:r>
-            <a:r>
-              <a:rPr kumimoji="1" lang="zh-CN" altLang="en-US" sz="1200" dirty="0">
-                <a:latin typeface="等线" panose="02010600030101010101" pitchFamily="2" charset="-122"/>
-                <a:ea typeface="等线" panose="02010600030101010101" pitchFamily="2" charset="-122"/>
-              </a:rPr>
-              <a:t> </a:t>
-            </a:r>
-            <a:r>
-              <a:rPr kumimoji="1" lang="en-US" altLang="zh-CN" sz="1200" dirty="0">
-                <a:latin typeface="等线" panose="02010600030101010101" pitchFamily="2" charset="-122"/>
-                <a:ea typeface="等线" panose="02010600030101010101" pitchFamily="2" charset="-122"/>
-              </a:rPr>
-              <a:t>&gt;</a:t>
-            </a:r>
-            <a:r>
-              <a:rPr kumimoji="1" lang="zh-CN" altLang="en-US" sz="1200" dirty="0">
-                <a:latin typeface="等线" panose="02010600030101010101" pitchFamily="2" charset="-122"/>
-                <a:ea typeface="等线" panose="02010600030101010101" pitchFamily="2" charset="-122"/>
-              </a:rPr>
-              <a:t> </a:t>
-            </a:r>
-            <a:r>
-              <a:rPr kumimoji="1" lang="en-US" altLang="zh-CN" sz="1200" dirty="0">
-                <a:latin typeface="等线" panose="02010600030101010101" pitchFamily="2" charset="-122"/>
-                <a:ea typeface="等线" panose="02010600030101010101" pitchFamily="2" charset="-122"/>
-              </a:rPr>
-              <a:t>${</a:t>
-            </a:r>
-            <a:r>
-              <a:rPr kumimoji="1" lang="en-US" altLang="zh-CN" sz="1200" dirty="0" err="1">
-                <a:latin typeface="等线" panose="02010600030101010101" pitchFamily="2" charset="-122"/>
-                <a:ea typeface="等线" panose="02010600030101010101" pitchFamily="2" charset="-122"/>
-              </a:rPr>
-              <a:t>startTime</a:t>
-            </a:r>
-            <a:r>
-              <a:rPr kumimoji="1" lang="en-US" altLang="zh-CN" sz="1200" dirty="0">
-                <a:latin typeface="等线" panose="02010600030101010101" pitchFamily="2" charset="-122"/>
-                <a:ea typeface="等线" panose="02010600030101010101" pitchFamily="2" charset="-122"/>
-              </a:rPr>
-              <a:t>}</a:t>
-            </a:r>
-            <a:endParaRPr kumimoji="1" lang="en-US" altLang="zh-CN" sz="1200" dirty="0">
-              <a:latin typeface="等线" panose="02010600030101010101" pitchFamily="2" charset="-122"/>
-              <a:ea typeface="等线" panose="02010600030101010101" pitchFamily="2" charset="-122"/>
-            </a:endParaRPr>
-          </a:p>
-          <a:p>
-            <a:r>
-              <a:rPr kumimoji="1" lang="en-US" altLang="zh-CN" sz="1200" b="1" dirty="0">
-                <a:latin typeface="等线" panose="02010600030101010101" pitchFamily="2" charset="-122"/>
-                <a:ea typeface="等线" panose="02010600030101010101" pitchFamily="2" charset="-122"/>
-              </a:rPr>
-              <a:t>edge2</a:t>
-            </a:r>
-            <a:r>
-              <a:rPr kumimoji="1" lang="en-US" altLang="zh-CN" sz="1200" dirty="0">
-                <a:latin typeface="等线" panose="02010600030101010101" pitchFamily="2" charset="-122"/>
-                <a:ea typeface="等线" panose="02010600030101010101" pitchFamily="2" charset="-122"/>
-              </a:rPr>
-              <a:t>.timestamp</a:t>
-            </a:r>
-            <a:r>
-              <a:rPr kumimoji="1" lang="zh-CN" altLang="en-US" sz="1200" dirty="0">
-                <a:latin typeface="等线" panose="02010600030101010101" pitchFamily="2" charset="-122"/>
-                <a:ea typeface="等线" panose="02010600030101010101" pitchFamily="2" charset="-122"/>
-              </a:rPr>
-              <a:t> </a:t>
-            </a:r>
-            <a:r>
-              <a:rPr kumimoji="1" lang="en-US" altLang="zh-CN" sz="1200" dirty="0">
-                <a:latin typeface="等线" panose="02010600030101010101" pitchFamily="2" charset="-122"/>
-                <a:ea typeface="等线" panose="02010600030101010101" pitchFamily="2" charset="-122"/>
-              </a:rPr>
-              <a:t>&lt;</a:t>
-            </a:r>
-            <a:r>
-              <a:rPr kumimoji="1" lang="zh-CN" altLang="en-US" sz="1200" dirty="0">
-                <a:latin typeface="等线" panose="02010600030101010101" pitchFamily="2" charset="-122"/>
-                <a:ea typeface="等线" panose="02010600030101010101" pitchFamily="2" charset="-122"/>
-              </a:rPr>
-              <a:t> </a:t>
-            </a:r>
-            <a:r>
-              <a:rPr kumimoji="1" lang="en-US" altLang="zh-CN" sz="1200" dirty="0">
-                <a:latin typeface="等线" panose="02010600030101010101" pitchFamily="2" charset="-122"/>
-                <a:ea typeface="等线" panose="02010600030101010101" pitchFamily="2" charset="-122"/>
-              </a:rPr>
-              <a:t>${</a:t>
-            </a:r>
-            <a:r>
-              <a:rPr kumimoji="1" lang="en-US" altLang="zh-CN" sz="1200" dirty="0" err="1">
-                <a:latin typeface="等线" panose="02010600030101010101" pitchFamily="2" charset="-122"/>
-                <a:ea typeface="等线" panose="02010600030101010101" pitchFamily="2" charset="-122"/>
-              </a:rPr>
-              <a:t>endTime</a:t>
-            </a:r>
-            <a:r>
-              <a:rPr kumimoji="1" lang="en-US" altLang="zh-CN" sz="1200" dirty="0">
-                <a:latin typeface="等线" panose="02010600030101010101" pitchFamily="2" charset="-122"/>
-                <a:ea typeface="等线" panose="02010600030101010101" pitchFamily="2" charset="-122"/>
-              </a:rPr>
-              <a:t>}</a:t>
-            </a:r>
-            <a:endParaRPr kumimoji="1" lang="en-US" altLang="zh-CN" sz="1200" dirty="0">
-              <a:latin typeface="等线" panose="02010600030101010101" pitchFamily="2" charset="-122"/>
-              <a:ea typeface="等线" panose="02010600030101010101" pitchFamily="2" charset="-122"/>
-            </a:endParaRPr>
-          </a:p>
-          <a:p>
-            <a:endParaRPr kumimoji="1" lang="en-US" altLang="zh-CN" sz="1200" dirty="0">
-              <a:latin typeface="等线" panose="02010600030101010101" pitchFamily="2" charset="-122"/>
-              <a:ea typeface="等线" panose="02010600030101010101" pitchFamily="2" charset="-122"/>
-            </a:endParaRPr>
-          </a:p>
-          <a:p>
-            <a:endParaRPr kumimoji="1" lang="en-US" altLang="zh-CN" sz="1200" b="1" dirty="0">
-              <a:latin typeface="等线" panose="02010600030101010101" pitchFamily="2" charset="-122"/>
-              <a:ea typeface="等线" panose="02010600030101010101" pitchFamily="2" charset="-122"/>
-            </a:endParaRPr>
-          </a:p>
-          <a:p>
-            <a:r>
-              <a:rPr kumimoji="1" lang="en-US" altLang="zh-CN" sz="1200" b="1" dirty="0">
-                <a:latin typeface="等线" panose="02010600030101010101" pitchFamily="2" charset="-122"/>
-                <a:ea typeface="等线" panose="02010600030101010101" pitchFamily="2" charset="-122"/>
-              </a:rPr>
-              <a:t>edge3:</a:t>
-            </a:r>
-            <a:r>
-              <a:rPr kumimoji="1" lang="zh-CN" altLang="en-US" sz="1200" b="1" dirty="0">
-                <a:latin typeface="等线" panose="02010600030101010101" pitchFamily="2" charset="-122"/>
-                <a:ea typeface="等线" panose="02010600030101010101" pitchFamily="2" charset="-122"/>
-              </a:rPr>
-              <a:t> </a:t>
-            </a:r>
-            <a:r>
-              <a:rPr kumimoji="1" lang="en-US" altLang="zh-CN" sz="1200" dirty="0">
-                <a:latin typeface="等线" panose="02010600030101010101" pitchFamily="2" charset="-122"/>
-                <a:ea typeface="等线" panose="02010600030101010101" pitchFamily="2" charset="-122"/>
-              </a:rPr>
-              <a:t>transfer</a:t>
-            </a:r>
-            <a:endParaRPr kumimoji="1" lang="en-US" altLang="zh-CN" sz="1200" dirty="0">
-              <a:latin typeface="等线" panose="02010600030101010101" pitchFamily="2" charset="-122"/>
-              <a:ea typeface="等线" panose="02010600030101010101" pitchFamily="2" charset="-122"/>
-            </a:endParaRPr>
-          </a:p>
-          <a:p>
-            <a:r>
-              <a:rPr kumimoji="1" lang="en-US" altLang="zh-CN" sz="1200" b="1" dirty="0">
-                <a:latin typeface="等线" panose="02010600030101010101" pitchFamily="2" charset="-122"/>
-                <a:ea typeface="等线" panose="02010600030101010101" pitchFamily="2" charset="-122"/>
-              </a:rPr>
-              <a:t>edge3</a:t>
-            </a:r>
-            <a:r>
-              <a:rPr kumimoji="1" lang="en-US" altLang="zh-CN" sz="1200" dirty="0">
-                <a:latin typeface="等线" panose="02010600030101010101" pitchFamily="2" charset="-122"/>
-                <a:ea typeface="等线" panose="02010600030101010101" pitchFamily="2" charset="-122"/>
-              </a:rPr>
-              <a:t>.amount</a:t>
-            </a:r>
-            <a:r>
-              <a:rPr kumimoji="1" lang="zh-CN" altLang="en-US" sz="1200" dirty="0">
-                <a:latin typeface="等线" panose="02010600030101010101" pitchFamily="2" charset="-122"/>
-                <a:ea typeface="等线" panose="02010600030101010101" pitchFamily="2" charset="-122"/>
-              </a:rPr>
-              <a:t> </a:t>
-            </a:r>
-            <a:r>
-              <a:rPr kumimoji="1" lang="en-US" altLang="zh-CN" sz="1200" dirty="0">
-                <a:latin typeface="等线" panose="02010600030101010101" pitchFamily="2" charset="-122"/>
-                <a:ea typeface="等线" panose="02010600030101010101" pitchFamily="2" charset="-122"/>
-              </a:rPr>
-              <a:t>&gt;</a:t>
-            </a:r>
-            <a:r>
-              <a:rPr kumimoji="1" lang="zh-CN" altLang="en-US" sz="1200" dirty="0">
-                <a:latin typeface="等线" panose="02010600030101010101" pitchFamily="2" charset="-122"/>
-                <a:ea typeface="等线" panose="02010600030101010101" pitchFamily="2" charset="-122"/>
-              </a:rPr>
-              <a:t> </a:t>
-            </a:r>
-            <a:r>
-              <a:rPr kumimoji="1" lang="en-US" altLang="zh-CN" sz="1200" dirty="0">
-                <a:latin typeface="等线" panose="02010600030101010101" pitchFamily="2" charset="-122"/>
-                <a:ea typeface="等线" panose="02010600030101010101" pitchFamily="2" charset="-122"/>
-              </a:rPr>
-              <a:t>${threshold}</a:t>
-            </a:r>
-            <a:endParaRPr kumimoji="1" lang="en-US" altLang="zh-CN" sz="1200" dirty="0">
-              <a:latin typeface="等线" panose="02010600030101010101" pitchFamily="2" charset="-122"/>
-              <a:ea typeface="等线" panose="02010600030101010101" pitchFamily="2" charset="-122"/>
-            </a:endParaRPr>
-          </a:p>
-          <a:p>
-            <a:r>
-              <a:rPr kumimoji="1" lang="en-US" altLang="zh-CN" sz="1200" b="1" dirty="0">
-                <a:latin typeface="等线" panose="02010600030101010101" pitchFamily="2" charset="-122"/>
-                <a:ea typeface="等线" panose="02010600030101010101" pitchFamily="2" charset="-122"/>
-              </a:rPr>
-              <a:t>edge3</a:t>
-            </a:r>
-            <a:r>
-              <a:rPr kumimoji="1" lang="en-US" altLang="zh-CN" sz="1200" dirty="0">
-                <a:latin typeface="等线" panose="02010600030101010101" pitchFamily="2" charset="-122"/>
-                <a:ea typeface="等线" panose="02010600030101010101" pitchFamily="2" charset="-122"/>
-              </a:rPr>
-              <a:t>.timestamp</a:t>
-            </a:r>
-            <a:r>
-              <a:rPr kumimoji="1" lang="zh-CN" altLang="en-US" sz="1200" dirty="0">
-                <a:latin typeface="等线" panose="02010600030101010101" pitchFamily="2" charset="-122"/>
-                <a:ea typeface="等线" panose="02010600030101010101" pitchFamily="2" charset="-122"/>
-              </a:rPr>
-              <a:t> </a:t>
-            </a:r>
-            <a:r>
-              <a:rPr kumimoji="1" lang="en-US" altLang="zh-CN" sz="1200" dirty="0">
-                <a:latin typeface="等线" panose="02010600030101010101" pitchFamily="2" charset="-122"/>
-                <a:ea typeface="等线" panose="02010600030101010101" pitchFamily="2" charset="-122"/>
-              </a:rPr>
-              <a:t>&gt;</a:t>
-            </a:r>
-            <a:r>
-              <a:rPr kumimoji="1" lang="zh-CN" altLang="en-US" sz="1200" dirty="0">
-                <a:latin typeface="等线" panose="02010600030101010101" pitchFamily="2" charset="-122"/>
-                <a:ea typeface="等线" panose="02010600030101010101" pitchFamily="2" charset="-122"/>
-              </a:rPr>
-              <a:t> </a:t>
-            </a:r>
-            <a:r>
-              <a:rPr kumimoji="1" lang="en-US" altLang="zh-CN" sz="1200" dirty="0">
-                <a:latin typeface="等线" panose="02010600030101010101" pitchFamily="2" charset="-122"/>
-                <a:ea typeface="等线" panose="02010600030101010101" pitchFamily="2" charset="-122"/>
-              </a:rPr>
-              <a:t>${</a:t>
-            </a:r>
-            <a:r>
-              <a:rPr kumimoji="1" lang="en-US" altLang="zh-CN" sz="1200" dirty="0" err="1">
-                <a:latin typeface="等线" panose="02010600030101010101" pitchFamily="2" charset="-122"/>
-                <a:ea typeface="等线" panose="02010600030101010101" pitchFamily="2" charset="-122"/>
-              </a:rPr>
-              <a:t>startTime</a:t>
-            </a:r>
-            <a:r>
-              <a:rPr kumimoji="1" lang="en-US" altLang="zh-CN" sz="1200" dirty="0">
-                <a:latin typeface="等线" panose="02010600030101010101" pitchFamily="2" charset="-122"/>
-                <a:ea typeface="等线" panose="02010600030101010101" pitchFamily="2" charset="-122"/>
-              </a:rPr>
-              <a:t>}</a:t>
-            </a:r>
-            <a:endParaRPr kumimoji="1" lang="en-US" altLang="zh-CN" sz="1200" dirty="0">
-              <a:latin typeface="等线" panose="02010600030101010101" pitchFamily="2" charset="-122"/>
-              <a:ea typeface="等线" panose="02010600030101010101" pitchFamily="2" charset="-122"/>
-            </a:endParaRPr>
-          </a:p>
-          <a:p>
-            <a:r>
-              <a:rPr kumimoji="1" lang="en-US" altLang="zh-CN" sz="1200" b="1" dirty="0">
-                <a:latin typeface="等线" panose="02010600030101010101" pitchFamily="2" charset="-122"/>
-                <a:ea typeface="等线" panose="02010600030101010101" pitchFamily="2" charset="-122"/>
-              </a:rPr>
-              <a:t>edge3</a:t>
-            </a:r>
-            <a:r>
-              <a:rPr kumimoji="1" lang="en-US" altLang="zh-CN" sz="1200" dirty="0">
-                <a:latin typeface="等线" panose="02010600030101010101" pitchFamily="2" charset="-122"/>
-                <a:ea typeface="等线" panose="02010600030101010101" pitchFamily="2" charset="-122"/>
-              </a:rPr>
-              <a:t>.timestamp</a:t>
-            </a:r>
-            <a:r>
-              <a:rPr kumimoji="1" lang="zh-CN" altLang="en-US" sz="1200" dirty="0">
-                <a:latin typeface="等线" panose="02010600030101010101" pitchFamily="2" charset="-122"/>
-                <a:ea typeface="等线" panose="02010600030101010101" pitchFamily="2" charset="-122"/>
-              </a:rPr>
-              <a:t> </a:t>
-            </a:r>
-            <a:r>
-              <a:rPr kumimoji="1" lang="en-US" altLang="zh-CN" sz="1200" dirty="0">
-                <a:latin typeface="等线" panose="02010600030101010101" pitchFamily="2" charset="-122"/>
-                <a:ea typeface="等线" panose="02010600030101010101" pitchFamily="2" charset="-122"/>
-              </a:rPr>
-              <a:t>&lt;</a:t>
-            </a:r>
-            <a:r>
-              <a:rPr kumimoji="1" lang="zh-CN" altLang="en-US" sz="1200" dirty="0">
-                <a:latin typeface="等线" panose="02010600030101010101" pitchFamily="2" charset="-122"/>
-                <a:ea typeface="等线" panose="02010600030101010101" pitchFamily="2" charset="-122"/>
-              </a:rPr>
-              <a:t> </a:t>
-            </a:r>
-            <a:r>
-              <a:rPr kumimoji="1" lang="en-US" altLang="zh-CN" sz="1200" dirty="0">
-                <a:latin typeface="等线" panose="02010600030101010101" pitchFamily="2" charset="-122"/>
-                <a:ea typeface="等线" panose="02010600030101010101" pitchFamily="2" charset="-122"/>
-              </a:rPr>
-              <a:t>${</a:t>
-            </a:r>
-            <a:r>
-              <a:rPr kumimoji="1" lang="en-US" altLang="zh-CN" sz="1200" dirty="0" err="1">
-                <a:latin typeface="等线" panose="02010600030101010101" pitchFamily="2" charset="-122"/>
-                <a:ea typeface="等线" panose="02010600030101010101" pitchFamily="2" charset="-122"/>
-              </a:rPr>
-              <a:t>endTime</a:t>
-            </a:r>
-            <a:r>
-              <a:rPr kumimoji="1" lang="en-US" altLang="zh-CN" sz="1200" dirty="0">
-                <a:latin typeface="等线" panose="02010600030101010101" pitchFamily="2" charset="-122"/>
-                <a:ea typeface="等线" panose="02010600030101010101" pitchFamily="2" charset="-122"/>
-              </a:rPr>
-              <a:t>}</a:t>
-            </a:r>
-            <a:endParaRPr kumimoji="1" lang="en-US" altLang="zh-CN" sz="1200" dirty="0">
-              <a:latin typeface="等线" panose="02010600030101010101" pitchFamily="2" charset="-122"/>
-              <a:ea typeface="等线" panose="02010600030101010101" pitchFamily="2" charset="-122"/>
-            </a:endParaRPr>
-          </a:p>
-          <a:p>
-            <a:endParaRPr kumimoji="1" lang="en-US" altLang="zh-CN" sz="1200" dirty="0">
-              <a:latin typeface="等线" panose="02010600030101010101" pitchFamily="2" charset="-122"/>
-              <a:ea typeface="等线" panose="02010600030101010101" pitchFamily="2" charset="-122"/>
-            </a:endParaRPr>
-          </a:p>
-          <a:p>
-            <a:r>
-              <a:rPr kumimoji="1" lang="en-US" altLang="zh-CN" sz="1200" b="1" dirty="0">
-                <a:latin typeface="等线" panose="02010600030101010101" pitchFamily="2" charset="-122"/>
-                <a:ea typeface="等线" panose="02010600030101010101" pitchFamily="2" charset="-122"/>
-              </a:rPr>
-              <a:t>edge4:</a:t>
-            </a:r>
-            <a:r>
-              <a:rPr kumimoji="1" lang="zh-CN" altLang="en-US" sz="1200" b="1" dirty="0">
-                <a:latin typeface="等线" panose="02010600030101010101" pitchFamily="2" charset="-122"/>
-                <a:ea typeface="等线" panose="02010600030101010101" pitchFamily="2" charset="-122"/>
-              </a:rPr>
-              <a:t> </a:t>
-            </a:r>
-            <a:r>
-              <a:rPr kumimoji="1" lang="en-US" altLang="zh-CN" sz="1200" dirty="0">
-                <a:latin typeface="等线" panose="02010600030101010101" pitchFamily="2" charset="-122"/>
-                <a:ea typeface="等线" panose="02010600030101010101" pitchFamily="2" charset="-122"/>
-              </a:rPr>
-              <a:t>transfer</a:t>
-            </a:r>
-            <a:endParaRPr kumimoji="1" lang="en-US" altLang="zh-CN" sz="1200" dirty="0">
-              <a:latin typeface="等线" panose="02010600030101010101" pitchFamily="2" charset="-122"/>
-              <a:ea typeface="等线" panose="02010600030101010101" pitchFamily="2" charset="-122"/>
-            </a:endParaRPr>
-          </a:p>
-          <a:p>
-            <a:r>
-              <a:rPr kumimoji="1" lang="en-US" altLang="zh-CN" sz="1200" b="1" dirty="0">
-                <a:latin typeface="等线" panose="02010600030101010101" pitchFamily="2" charset="-122"/>
-                <a:ea typeface="等线" panose="02010600030101010101" pitchFamily="2" charset="-122"/>
-              </a:rPr>
-              <a:t>edge4</a:t>
-            </a:r>
-            <a:r>
-              <a:rPr kumimoji="1" lang="en-US" altLang="zh-CN" sz="1200" dirty="0">
-                <a:latin typeface="等线" panose="02010600030101010101" pitchFamily="2" charset="-122"/>
-                <a:ea typeface="等线" panose="02010600030101010101" pitchFamily="2" charset="-122"/>
-              </a:rPr>
-              <a:t>.amount</a:t>
-            </a:r>
-            <a:r>
-              <a:rPr kumimoji="1" lang="zh-CN" altLang="en-US" sz="1200" dirty="0">
-                <a:latin typeface="等线" panose="02010600030101010101" pitchFamily="2" charset="-122"/>
-                <a:ea typeface="等线" panose="02010600030101010101" pitchFamily="2" charset="-122"/>
-              </a:rPr>
-              <a:t> </a:t>
-            </a:r>
-            <a:r>
-              <a:rPr kumimoji="1" lang="en-US" altLang="zh-CN" sz="1200" dirty="0">
-                <a:latin typeface="等线" panose="02010600030101010101" pitchFamily="2" charset="-122"/>
-                <a:ea typeface="等线" panose="02010600030101010101" pitchFamily="2" charset="-122"/>
-              </a:rPr>
-              <a:t>&gt;</a:t>
-            </a:r>
-            <a:r>
-              <a:rPr kumimoji="1" lang="zh-CN" altLang="en-US" sz="1200" dirty="0">
-                <a:latin typeface="等线" panose="02010600030101010101" pitchFamily="2" charset="-122"/>
-                <a:ea typeface="等线" panose="02010600030101010101" pitchFamily="2" charset="-122"/>
-              </a:rPr>
-              <a:t> </a:t>
-            </a:r>
-            <a:r>
-              <a:rPr kumimoji="1" lang="en-US" altLang="zh-CN" sz="1200" dirty="0">
-                <a:latin typeface="等线" panose="02010600030101010101" pitchFamily="2" charset="-122"/>
-                <a:ea typeface="等线" panose="02010600030101010101" pitchFamily="2" charset="-122"/>
-              </a:rPr>
-              <a:t>${threshold}</a:t>
-            </a:r>
-            <a:endParaRPr kumimoji="1" lang="en-US" altLang="zh-CN" sz="1200" dirty="0">
-              <a:latin typeface="等线" panose="02010600030101010101" pitchFamily="2" charset="-122"/>
-              <a:ea typeface="等线" panose="02010600030101010101" pitchFamily="2" charset="-122"/>
-            </a:endParaRPr>
-          </a:p>
-          <a:p>
-            <a:r>
-              <a:rPr kumimoji="1" lang="en-US" altLang="zh-CN" sz="1200" b="1" dirty="0">
-                <a:latin typeface="等线" panose="02010600030101010101" pitchFamily="2" charset="-122"/>
-                <a:ea typeface="等线" panose="02010600030101010101" pitchFamily="2" charset="-122"/>
-              </a:rPr>
-              <a:t>edge4</a:t>
-            </a:r>
-            <a:r>
-              <a:rPr kumimoji="1" lang="en-US" altLang="zh-CN" sz="1200" dirty="0">
-                <a:latin typeface="等线" panose="02010600030101010101" pitchFamily="2" charset="-122"/>
-                <a:ea typeface="等线" panose="02010600030101010101" pitchFamily="2" charset="-122"/>
-              </a:rPr>
-              <a:t>.timestamp</a:t>
-            </a:r>
-            <a:r>
-              <a:rPr kumimoji="1" lang="zh-CN" altLang="en-US" sz="1200" dirty="0">
-                <a:latin typeface="等线" panose="02010600030101010101" pitchFamily="2" charset="-122"/>
-                <a:ea typeface="等线" panose="02010600030101010101" pitchFamily="2" charset="-122"/>
-              </a:rPr>
-              <a:t> </a:t>
-            </a:r>
-            <a:r>
-              <a:rPr kumimoji="1" lang="en-US" altLang="zh-CN" sz="1200" dirty="0">
-                <a:latin typeface="等线" panose="02010600030101010101" pitchFamily="2" charset="-122"/>
-                <a:ea typeface="等线" panose="02010600030101010101" pitchFamily="2" charset="-122"/>
-              </a:rPr>
-              <a:t>&gt;</a:t>
-            </a:r>
-            <a:r>
-              <a:rPr kumimoji="1" lang="zh-CN" altLang="en-US" sz="1200" dirty="0">
-                <a:latin typeface="等线" panose="02010600030101010101" pitchFamily="2" charset="-122"/>
-                <a:ea typeface="等线" panose="02010600030101010101" pitchFamily="2" charset="-122"/>
-              </a:rPr>
-              <a:t> </a:t>
-            </a:r>
-            <a:r>
-              <a:rPr kumimoji="1" lang="en-US" altLang="zh-CN" sz="1200" dirty="0">
-                <a:latin typeface="等线" panose="02010600030101010101" pitchFamily="2" charset="-122"/>
-                <a:ea typeface="等线" panose="02010600030101010101" pitchFamily="2" charset="-122"/>
-              </a:rPr>
-              <a:t>${</a:t>
-            </a:r>
-            <a:r>
-              <a:rPr kumimoji="1" lang="en-US" altLang="zh-CN" sz="1200" dirty="0" err="1">
-                <a:latin typeface="等线" panose="02010600030101010101" pitchFamily="2" charset="-122"/>
-                <a:ea typeface="等线" panose="02010600030101010101" pitchFamily="2" charset="-122"/>
-              </a:rPr>
-              <a:t>startTime</a:t>
-            </a:r>
-            <a:r>
-              <a:rPr kumimoji="1" lang="en-US" altLang="zh-CN" sz="1200" dirty="0">
-                <a:latin typeface="等线" panose="02010600030101010101" pitchFamily="2" charset="-122"/>
-                <a:ea typeface="等线" panose="02010600030101010101" pitchFamily="2" charset="-122"/>
-              </a:rPr>
-              <a:t>}</a:t>
-            </a:r>
-            <a:endParaRPr kumimoji="1" lang="en-US" altLang="zh-CN" sz="1200" dirty="0">
-              <a:latin typeface="等线" panose="02010600030101010101" pitchFamily="2" charset="-122"/>
-              <a:ea typeface="等线" panose="02010600030101010101" pitchFamily="2" charset="-122"/>
-            </a:endParaRPr>
-          </a:p>
-          <a:p>
-            <a:r>
-              <a:rPr kumimoji="1" lang="en-US" altLang="zh-CN" sz="1200" b="1" dirty="0">
-                <a:latin typeface="等线" panose="02010600030101010101" pitchFamily="2" charset="-122"/>
-                <a:ea typeface="等线" panose="02010600030101010101" pitchFamily="2" charset="-122"/>
-              </a:rPr>
-              <a:t>edge4</a:t>
-            </a:r>
-            <a:r>
-              <a:rPr kumimoji="1" lang="en-US" altLang="zh-CN" sz="1200" dirty="0">
-                <a:latin typeface="等线" panose="02010600030101010101" pitchFamily="2" charset="-122"/>
-                <a:ea typeface="等线" panose="02010600030101010101" pitchFamily="2" charset="-122"/>
-              </a:rPr>
-              <a:t>.timestamp</a:t>
-            </a:r>
-            <a:r>
-              <a:rPr kumimoji="1" lang="zh-CN" altLang="en-US" sz="1200" dirty="0">
-                <a:latin typeface="等线" panose="02010600030101010101" pitchFamily="2" charset="-122"/>
-                <a:ea typeface="等线" panose="02010600030101010101" pitchFamily="2" charset="-122"/>
-              </a:rPr>
-              <a:t> </a:t>
-            </a:r>
-            <a:r>
-              <a:rPr kumimoji="1" lang="en-US" altLang="zh-CN" sz="1200" dirty="0">
-                <a:latin typeface="等线" panose="02010600030101010101" pitchFamily="2" charset="-122"/>
-                <a:ea typeface="等线" panose="02010600030101010101" pitchFamily="2" charset="-122"/>
-              </a:rPr>
-              <a:t>&lt;</a:t>
-            </a:r>
-            <a:r>
-              <a:rPr kumimoji="1" lang="zh-CN" altLang="en-US" sz="1200" dirty="0">
-                <a:latin typeface="等线" panose="02010600030101010101" pitchFamily="2" charset="-122"/>
-                <a:ea typeface="等线" panose="02010600030101010101" pitchFamily="2" charset="-122"/>
-              </a:rPr>
-              <a:t> </a:t>
-            </a:r>
-            <a:r>
-              <a:rPr kumimoji="1" lang="en-US" altLang="zh-CN" sz="1200" dirty="0">
-                <a:latin typeface="等线" panose="02010600030101010101" pitchFamily="2" charset="-122"/>
-                <a:ea typeface="等线" panose="02010600030101010101" pitchFamily="2" charset="-122"/>
-              </a:rPr>
-              <a:t>${</a:t>
-            </a:r>
-            <a:r>
-              <a:rPr kumimoji="1" lang="en-US" altLang="zh-CN" sz="1200" dirty="0" err="1">
-                <a:latin typeface="等线" panose="02010600030101010101" pitchFamily="2" charset="-122"/>
-                <a:ea typeface="等线" panose="02010600030101010101" pitchFamily="2" charset="-122"/>
-              </a:rPr>
-              <a:t>endTime</a:t>
-            </a:r>
-            <a:r>
-              <a:rPr kumimoji="1" lang="en-US" altLang="zh-CN" sz="1200" dirty="0">
-                <a:latin typeface="等线" panose="02010600030101010101" pitchFamily="2" charset="-122"/>
-                <a:ea typeface="等线" panose="02010600030101010101" pitchFamily="2" charset="-122"/>
-              </a:rPr>
-              <a:t>}</a:t>
-            </a:r>
-            <a:endParaRPr kumimoji="1" lang="en-US" altLang="zh-CN" sz="1200" dirty="0">
-              <a:latin typeface="等线" panose="02010600030101010101" pitchFamily="2" charset="-122"/>
-              <a:ea typeface="等线" panose="02010600030101010101" pitchFamily="2" charset="-122"/>
-            </a:endParaRPr>
-          </a:p>
-        </p:txBody>
-      </p:sp>
       <p:grpSp>
         <p:nvGrpSpPr>
-          <p:cNvPr id="17" name="Group 16"/>
+          <p:cNvPr id="3" name="Group 2"/>
           <p:cNvGrpSpPr/>
           <p:nvPr/>
         </p:nvGrpSpPr>
         <p:grpSpPr>
           <a:xfrm>
-            <a:off x="6779942" y="2876433"/>
-            <a:ext cx="1303067" cy="688048"/>
-            <a:chOff x="5724872" y="3310184"/>
-            <a:chExt cx="1303067" cy="688048"/>
+            <a:off x="1207475" y="1066802"/>
+            <a:ext cx="9601200" cy="4923691"/>
+            <a:chOff x="1207475" y="1066802"/>
+            <a:chExt cx="9601200" cy="4923691"/>
           </a:xfrm>
         </p:grpSpPr>
         <p:sp>
           <p:nvSpPr>
-            <p:cNvPr id="25" name="矩形 9"/>
+            <p:cNvPr id="36" name="矩形 13"/>
             <p:cNvSpPr/>
             <p:nvPr/>
           </p:nvSpPr>
           <p:spPr>
             <a:xfrm>
-              <a:off x="5727700" y="3310184"/>
-              <a:ext cx="1300238" cy="351257"/>
+              <a:off x="1207475" y="1066802"/>
+              <a:ext cx="9601200" cy="4923690"/>
+            </a:xfrm>
+            <a:prstGeom prst="rect">
+              <a:avLst/>
+            </a:prstGeom>
+            <a:noFill/>
+            <a:ln w="25400">
+              <a:solidFill>
+                <a:schemeClr val="accent3"/>
+              </a:solidFill>
+              <a:prstDash val="dash"/>
+            </a:ln>
+          </p:spPr>
+          <p:style>
+            <a:lnRef idx="2">
+              <a:schemeClr val="accent2">
+                <a:shade val="50000"/>
+              </a:schemeClr>
+            </a:lnRef>
+            <a:fillRef idx="1">
+              <a:schemeClr val="accent2"/>
+            </a:fillRef>
+            <a:effectRef idx="0">
+              <a:schemeClr val="accent2"/>
+            </a:effectRef>
+            <a:fontRef idx="minor">
+              <a:schemeClr val="lt1"/>
+            </a:fontRef>
+          </p:style>
+          <p:txBody>
+            <a:bodyPr rtlCol="0" anchor="b"/>
+            <a:lstStyle/>
+            <a:p>
+              <a:pPr algn="r"/>
+              <a:r>
+                <a:rPr kumimoji="1" lang="en-US" altLang="zh-CN" sz="1200" b="1" dirty="0">
+                  <a:solidFill>
+                    <a:srgbClr val="FF0000"/>
+                  </a:solidFill>
+                  <a:latin typeface="等线" panose="02010600030101010101" pitchFamily="2" charset="-122"/>
+                  <a:ea typeface="等线" panose="02010600030101010101" pitchFamily="2" charset="-122"/>
+                </a:rPr>
+                <a:t>RESULT</a:t>
+              </a:r>
+              <a:endParaRPr kumimoji="1" lang="en-US" altLang="zh-CN" sz="1200" b="1" dirty="0">
+                <a:solidFill>
+                  <a:schemeClr val="tx1"/>
+                </a:solidFill>
+                <a:latin typeface="等线" panose="02010600030101010101" pitchFamily="2" charset="-122"/>
+                <a:ea typeface="等线" panose="02010600030101010101" pitchFamily="2" charset="-122"/>
+              </a:endParaRPr>
+            </a:p>
+            <a:p>
+              <a:pPr algn="r"/>
+              <a:r>
+                <a:rPr kumimoji="1" lang="en-US" altLang="zh-CN" sz="1200" dirty="0">
+                  <a:solidFill>
+                    <a:schemeClr val="tx1"/>
+                  </a:solidFill>
+                  <a:latin typeface="等线" panose="02010600030101010101" pitchFamily="2" charset="-122"/>
+                  <a:ea typeface="等线" panose="02010600030101010101" pitchFamily="2" charset="-122"/>
+                </a:rPr>
+                <a:t>SUM(edge1.amount)/SUM(edge2.amount),</a:t>
+              </a:r>
+              <a:endParaRPr kumimoji="1" lang="en-US" altLang="zh-CN" sz="1200" dirty="0">
+                <a:solidFill>
+                  <a:schemeClr val="tx1"/>
+                </a:solidFill>
+                <a:latin typeface="等线" panose="02010600030101010101" pitchFamily="2" charset="-122"/>
+                <a:ea typeface="等线" panose="02010600030101010101" pitchFamily="2" charset="-122"/>
+              </a:endParaRPr>
+            </a:p>
+            <a:p>
+              <a:pPr algn="r"/>
+              <a:r>
+                <a:rPr kumimoji="1" lang="en-US" altLang="zh-CN" sz="1200" dirty="0">
+                  <a:solidFill>
+                    <a:schemeClr val="tx1"/>
+                  </a:solidFill>
+                  <a:latin typeface="等线" panose="02010600030101010101" pitchFamily="2" charset="-122"/>
+                  <a:ea typeface="等线" panose="02010600030101010101" pitchFamily="2" charset="-122"/>
+                </a:rPr>
+                <a:t>SUM(edge1.amount)/SUM(edge4.amount),</a:t>
+              </a:r>
+              <a:endParaRPr kumimoji="1" lang="en-US" altLang="zh-CN" sz="1200" dirty="0">
+                <a:solidFill>
+                  <a:schemeClr val="tx1"/>
+                </a:solidFill>
+                <a:latin typeface="等线" panose="02010600030101010101" pitchFamily="2" charset="-122"/>
+                <a:ea typeface="等线" panose="02010600030101010101" pitchFamily="2" charset="-122"/>
+              </a:endParaRPr>
+            </a:p>
+            <a:p>
+              <a:pPr algn="r"/>
+              <a:r>
+                <a:rPr kumimoji="1" lang="en-US" altLang="zh-CN" sz="1200" dirty="0">
+                  <a:solidFill>
+                    <a:schemeClr val="tx1"/>
+                  </a:solidFill>
+                  <a:latin typeface="等线" panose="02010600030101010101" pitchFamily="2" charset="-122"/>
+                  <a:ea typeface="等线" panose="02010600030101010101" pitchFamily="2" charset="-122"/>
+                </a:rPr>
+                <a:t>SUM(edge3.amount)/SUM(edge4.amount)</a:t>
+              </a:r>
+              <a:endParaRPr kumimoji="1" lang="en-US" altLang="zh-CN" sz="1200" dirty="0">
+                <a:solidFill>
+                  <a:schemeClr val="tx1"/>
+                </a:solidFill>
+                <a:latin typeface="等线" panose="02010600030101010101" pitchFamily="2" charset="-122"/>
+                <a:ea typeface="等线" panose="02010600030101010101" pitchFamily="2" charset="-122"/>
+              </a:endParaRPr>
+            </a:p>
+          </p:txBody>
+        </p:sp>
+        <p:sp>
+          <p:nvSpPr>
+            <p:cNvPr id="48" name="矩形 14"/>
+            <p:cNvSpPr/>
+            <p:nvPr/>
+          </p:nvSpPr>
+          <p:spPr>
+            <a:xfrm>
+              <a:off x="5842981" y="1257377"/>
+              <a:ext cx="1176993" cy="505147"/>
             </a:xfrm>
             <a:prstGeom prst="rect">
               <a:avLst/>
@@ -32002,7 +30478,7 @@
                     <a:sysClr val="windowText" lastClr="000000"/>
                   </a:solidFill>
                 </a:rPr>
-                <a:t>mid</a:t>
+                <a:t>up2</a:t>
               </a:r>
               <a:r>
                 <a:rPr kumimoji="1" lang="zh-CN" altLang="en-US" sz="1200" dirty="0">
@@ -32046,19 +30522,24 @@
         </p:sp>
         <p:sp>
           <p:nvSpPr>
-            <p:cNvPr id="12" name="矩形 10"/>
+            <p:cNvPr id="51" name="矩形 14"/>
             <p:cNvSpPr/>
             <p:nvPr/>
           </p:nvSpPr>
           <p:spPr>
             <a:xfrm>
-              <a:off x="5724872" y="3665667"/>
-              <a:ext cx="1303067" cy="332565"/>
+              <a:off x="5780457" y="4605726"/>
+              <a:ext cx="1381173" cy="505147"/>
             </a:xfrm>
             <a:prstGeom prst="rect">
               <a:avLst/>
             </a:prstGeom>
-            <a:noFill/>
+            <a:solidFill>
+              <a:schemeClr val="accent5">
+                <a:lumMod val="60000"/>
+                <a:lumOff val="40000"/>
+              </a:schemeClr>
+            </a:solidFill>
             <a:ln w="25400">
               <a:solidFill>
                 <a:schemeClr val="tx1"/>
@@ -32087,30 +30568,34 @@
             <a:p>
               <a:pPr algn="ctr"/>
               <a:r>
-                <a:rPr kumimoji="1" lang="en-US" altLang="zh-CN" sz="1200" b="1" dirty="0" err="1">
+                <a:rPr kumimoji="1" lang="en-US" altLang="zh-CN" sz="1200" b="1" dirty="0">
                   <a:solidFill>
                     <a:sysClr val="windowText" lastClr="000000"/>
                   </a:solidFill>
                 </a:rPr>
-                <a:t>mid</a:t>
-              </a:r>
-              <a:r>
-                <a:rPr kumimoji="1" lang="en-US" altLang="zh-CN" sz="1200" dirty="0" err="1">
+                <a:t>down2</a:t>
+              </a:r>
+              <a:r>
+                <a:rPr kumimoji="1" lang="zh-CN" altLang="en-US" sz="1200" dirty="0">
                   <a:solidFill>
                     <a:sysClr val="windowText" lastClr="000000"/>
                   </a:solidFill>
-                  <a:latin typeface="等线" panose="02010600030101010101" pitchFamily="2" charset="-122"/>
-                  <a:ea typeface="等线" panose="02010600030101010101" pitchFamily="2" charset="-122"/>
-                </a:rPr>
-                <a:t>.id</a:t>
+                </a:rPr>
+                <a:t> </a:t>
+              </a:r>
+              <a:r>
+                <a:rPr kumimoji="1" lang="en-US" altLang="zh-CN" sz="1200" dirty="0">
+                  <a:solidFill>
+                    <a:sysClr val="windowText" lastClr="000000"/>
+                  </a:solidFill>
+                </a:rPr>
+                <a:t>:</a:t>
               </a:r>
               <a:r>
                 <a:rPr kumimoji="1" lang="zh-CN" altLang="en-US" sz="1200" dirty="0">
                   <a:solidFill>
                     <a:sysClr val="windowText" lastClr="000000"/>
                   </a:solidFill>
-                  <a:latin typeface="等线" panose="02010600030101010101" pitchFamily="2" charset="-122"/>
-                  <a:ea typeface="等线" panose="02010600030101010101" pitchFamily="2" charset="-122"/>
                 </a:rPr>
                 <a:t> </a:t>
               </a:r>
@@ -32119,774 +30604,2215 @@
                   <a:solidFill>
                     <a:sysClr val="windowText" lastClr="000000"/>
                   </a:solidFill>
-                  <a:latin typeface="等线" panose="02010600030101010101" pitchFamily="2" charset="-122"/>
-                  <a:ea typeface="等线" panose="02010600030101010101" pitchFamily="2" charset="-122"/>
-                </a:rPr>
-                <a:t>=</a:t>
-              </a:r>
-              <a:r>
-                <a:rPr kumimoji="1" lang="zh-CN" altLang="en-US" sz="1200" dirty="0">
-                  <a:solidFill>
-                    <a:sysClr val="windowText" lastClr="000000"/>
-                  </a:solidFill>
-                  <a:latin typeface="等线" panose="02010600030101010101" pitchFamily="2" charset="-122"/>
-                  <a:ea typeface="等线" panose="02010600030101010101" pitchFamily="2" charset="-122"/>
-                </a:rPr>
-                <a:t> </a:t>
-              </a:r>
-              <a:r>
-                <a:rPr kumimoji="1" lang="en-US" altLang="zh-CN" sz="1200" dirty="0">
-                  <a:solidFill>
-                    <a:sysClr val="windowText" lastClr="000000"/>
-                  </a:solidFill>
-                  <a:latin typeface="等线" panose="02010600030101010101" pitchFamily="2" charset="-122"/>
-                  <a:ea typeface="等线" panose="02010600030101010101" pitchFamily="2" charset="-122"/>
-                </a:rPr>
-                <a:t>${id}</a:t>
+                </a:rPr>
+                <a:t>Account</a:t>
               </a:r>
               <a:endParaRPr kumimoji="1" lang="zh-CN" altLang="en-US" sz="1200" dirty="0">
                 <a:solidFill>
                   <a:sysClr val="windowText" lastClr="000000"/>
                 </a:solidFill>
-                <a:latin typeface="等线" panose="02010600030101010101" pitchFamily="2" charset="-122"/>
-                <a:ea typeface="等线" panose="02010600030101010101" pitchFamily="2" charset="-122"/>
               </a:endParaRPr>
             </a:p>
           </p:txBody>
         </p:sp>
+        <p:cxnSp>
+          <p:nvCxnSpPr>
+            <p:cNvPr id="54" name="直线箭头连接符 11" descr="jytjh"/>
+            <p:cNvCxnSpPr>
+              <a:stCxn id="48" idx="2"/>
+              <a:endCxn id="25" idx="0"/>
+            </p:cNvCxnSpPr>
+            <p:nvPr/>
+          </p:nvCxnSpPr>
+          <p:spPr>
+            <a:xfrm>
+              <a:off x="6431478" y="1762524"/>
+              <a:ext cx="1001411" cy="1113909"/>
+            </a:xfrm>
+            <a:prstGeom prst="straightConnector1">
+              <a:avLst/>
+            </a:prstGeom>
+            <a:ln w="19050">
+              <a:solidFill>
+                <a:schemeClr val="tx1"/>
+              </a:solidFill>
+              <a:headEnd type="none" w="lg" len="med"/>
+              <a:tailEnd type="arrow" w="sm" len="lg"/>
+            </a:ln>
+          </p:spPr>
+          <p:style>
+            <a:lnRef idx="1">
+              <a:schemeClr val="accent1"/>
+            </a:lnRef>
+            <a:fillRef idx="0">
+              <a:schemeClr val="accent1"/>
+            </a:fillRef>
+            <a:effectRef idx="0">
+              <a:schemeClr val="accent1"/>
+            </a:effectRef>
+            <a:fontRef idx="minor">
+              <a:schemeClr val="tx1"/>
+            </a:fontRef>
+          </p:style>
+        </p:cxnSp>
+        <p:cxnSp>
+          <p:nvCxnSpPr>
+            <p:cNvPr id="59" name="直线箭头连接符 11" descr="jytjh"/>
+            <p:cNvCxnSpPr>
+              <a:stCxn id="12" idx="2"/>
+              <a:endCxn id="51" idx="0"/>
+            </p:cNvCxnSpPr>
+            <p:nvPr/>
+          </p:nvCxnSpPr>
+          <p:spPr>
+            <a:xfrm flipH="1">
+              <a:off x="6471044" y="3564481"/>
+              <a:ext cx="960432" cy="1041245"/>
+            </a:xfrm>
+            <a:prstGeom prst="straightConnector1">
+              <a:avLst/>
+            </a:prstGeom>
+            <a:ln w="19050">
+              <a:solidFill>
+                <a:schemeClr val="tx1"/>
+              </a:solidFill>
+              <a:headEnd type="none" w="lg" len="med"/>
+              <a:tailEnd type="arrow" w="sm" len="lg"/>
+            </a:ln>
+          </p:spPr>
+          <p:style>
+            <a:lnRef idx="1">
+              <a:schemeClr val="accent1"/>
+            </a:lnRef>
+            <a:fillRef idx="0">
+              <a:schemeClr val="accent1"/>
+            </a:fillRef>
+            <a:effectRef idx="0">
+              <a:schemeClr val="accent1"/>
+            </a:effectRef>
+            <a:fontRef idx="minor">
+              <a:schemeClr val="tx1"/>
+            </a:fontRef>
+          </p:style>
+        </p:cxnSp>
+        <p:sp>
+          <p:nvSpPr>
+            <p:cNvPr id="28" name="矩形 13"/>
+            <p:cNvSpPr/>
+            <p:nvPr/>
+          </p:nvSpPr>
+          <p:spPr>
+            <a:xfrm>
+              <a:off x="4112467" y="2859843"/>
+              <a:ext cx="955159" cy="351258"/>
+            </a:xfrm>
+            <a:prstGeom prst="rect">
+              <a:avLst/>
+            </a:prstGeom>
+            <a:solidFill>
+              <a:schemeClr val="accent2">
+                <a:lumMod val="60000"/>
+                <a:lumOff val="40000"/>
+              </a:schemeClr>
+            </a:solidFill>
+            <a:ln w="25400">
+              <a:solidFill>
+                <a:schemeClr val="tx1"/>
+              </a:solidFill>
+            </a:ln>
+          </p:spPr>
+          <p:style>
+            <a:lnRef idx="2">
+              <a:schemeClr val="accent2">
+                <a:shade val="50000"/>
+              </a:schemeClr>
+            </a:lnRef>
+            <a:fillRef idx="1">
+              <a:schemeClr val="accent2"/>
+            </a:fillRef>
+            <a:effectRef idx="0">
+              <a:schemeClr val="accent2"/>
+            </a:effectRef>
+            <a:fontRef idx="minor">
+              <a:schemeClr val="lt1"/>
+            </a:fontRef>
+          </p:style>
+          <p:txBody>
+            <a:bodyPr rtlCol="0" anchor="ctr"/>
+            <a:lstStyle/>
+            <a:p>
+              <a:pPr algn="ctr"/>
+              <a:r>
+                <a:rPr kumimoji="1" lang="en-US" altLang="zh-CN" sz="1200" b="1" dirty="0">
+                  <a:solidFill>
+                    <a:sysClr val="windowText" lastClr="000000"/>
+                  </a:solidFill>
+                </a:rPr>
+                <a:t>loan</a:t>
+              </a:r>
+              <a:r>
+                <a:rPr kumimoji="1" lang="zh-CN" altLang="en-US" sz="1200" dirty="0">
+                  <a:solidFill>
+                    <a:sysClr val="windowText" lastClr="000000"/>
+                  </a:solidFill>
+                </a:rPr>
+                <a:t> </a:t>
+              </a:r>
+              <a:r>
+                <a:rPr kumimoji="1" lang="en-US" altLang="zh-CN" sz="1200" dirty="0">
+                  <a:solidFill>
+                    <a:sysClr val="windowText" lastClr="000000"/>
+                  </a:solidFill>
+                </a:rPr>
+                <a:t>:</a:t>
+              </a:r>
+              <a:r>
+                <a:rPr kumimoji="1" lang="zh-CN" altLang="en-US" sz="1200" dirty="0">
+                  <a:solidFill>
+                    <a:sysClr val="windowText" lastClr="000000"/>
+                  </a:solidFill>
+                </a:rPr>
+                <a:t> </a:t>
+              </a:r>
+              <a:r>
+                <a:rPr kumimoji="1" lang="en-US" altLang="zh-CN" sz="1200" dirty="0">
+                  <a:solidFill>
+                    <a:sysClr val="windowText" lastClr="000000"/>
+                  </a:solidFill>
+                </a:rPr>
+                <a:t>Loan</a:t>
+              </a:r>
+              <a:endParaRPr kumimoji="1" lang="zh-CN" altLang="en-US" sz="1200" dirty="0">
+                <a:solidFill>
+                  <a:sysClr val="windowText" lastClr="000000"/>
+                </a:solidFill>
+              </a:endParaRPr>
+            </a:p>
+          </p:txBody>
+        </p:sp>
+        <p:sp>
+          <p:nvSpPr>
+            <p:cNvPr id="44" name="文本框 12"/>
+            <p:cNvSpPr txBox="1"/>
+            <p:nvPr/>
+          </p:nvSpPr>
+          <p:spPr>
+            <a:xfrm>
+              <a:off x="5356522" y="2733860"/>
+              <a:ext cx="889680" cy="307777"/>
+            </a:xfrm>
+            <a:prstGeom prst="rect">
+              <a:avLst/>
+            </a:prstGeom>
+            <a:noFill/>
+          </p:spPr>
+          <p:txBody>
+            <a:bodyPr wrap="square" rtlCol="0">
+              <a:spAutoFit/>
+            </a:bodyPr>
+            <a:lstStyle/>
+            <a:p>
+              <a:pPr algn="ctr"/>
+              <a:r>
+                <a:rPr kumimoji="1" lang="en-US" altLang="zh-CN" sz="1400" b="1" dirty="0">
+                  <a:latin typeface="等线" panose="02010600030101010101" pitchFamily="2" charset="-122"/>
+                  <a:ea typeface="等线" panose="02010600030101010101" pitchFamily="2" charset="-122"/>
+                </a:rPr>
+                <a:t>edge1</a:t>
+              </a:r>
+              <a:endParaRPr kumimoji="1" lang="en-US" altLang="zh-CN" sz="1400" dirty="0">
+                <a:latin typeface="等线" panose="02010600030101010101" pitchFamily="2" charset="-122"/>
+                <a:ea typeface="等线" panose="02010600030101010101" pitchFamily="2" charset="-122"/>
+              </a:endParaRPr>
+            </a:p>
+          </p:txBody>
+        </p:sp>
+        <p:cxnSp>
+          <p:nvCxnSpPr>
+            <p:cNvPr id="6" name="Elbow Connector 5"/>
+            <p:cNvCxnSpPr>
+              <a:stCxn id="12" idx="1"/>
+              <a:endCxn id="28" idx="2"/>
+            </p:cNvCxnSpPr>
+            <p:nvPr/>
+          </p:nvCxnSpPr>
+          <p:spPr>
+            <a:xfrm rot="10800000">
+              <a:off x="4590048" y="3211101"/>
+              <a:ext cx="2189895" cy="187098"/>
+            </a:xfrm>
+            <a:prstGeom prst="bentConnector2">
+              <a:avLst/>
+            </a:prstGeom>
+            <a:ln w="19050">
+              <a:solidFill>
+                <a:schemeClr val="tx1"/>
+              </a:solidFill>
+              <a:tailEnd type="arrow" w="sm" len="lg"/>
+            </a:ln>
+          </p:spPr>
+          <p:style>
+            <a:lnRef idx="1">
+              <a:schemeClr val="accent1"/>
+            </a:lnRef>
+            <a:fillRef idx="0">
+              <a:schemeClr val="accent1"/>
+            </a:fillRef>
+            <a:effectRef idx="0">
+              <a:schemeClr val="accent1"/>
+            </a:effectRef>
+            <a:fontRef idx="minor">
+              <a:schemeClr val="tx1"/>
+            </a:fontRef>
+          </p:style>
+        </p:cxnSp>
+        <p:sp>
+          <p:nvSpPr>
+            <p:cNvPr id="46" name="文本框 12"/>
+            <p:cNvSpPr txBox="1"/>
+            <p:nvPr/>
+          </p:nvSpPr>
+          <p:spPr>
+            <a:xfrm>
+              <a:off x="6892265" y="1992121"/>
+              <a:ext cx="998454" cy="307777"/>
+            </a:xfrm>
+            <a:prstGeom prst="rect">
+              <a:avLst/>
+            </a:prstGeom>
+            <a:noFill/>
+          </p:spPr>
+          <p:txBody>
+            <a:bodyPr wrap="square" rtlCol="0">
+              <a:spAutoFit/>
+            </a:bodyPr>
+            <a:lstStyle/>
+            <a:p>
+              <a:pPr algn="ctr"/>
+              <a:r>
+                <a:rPr kumimoji="1" lang="en-US" altLang="zh-CN" sz="1400" b="1" dirty="0">
+                  <a:latin typeface="等线" panose="02010600030101010101" pitchFamily="2" charset="-122"/>
+                  <a:ea typeface="等线" panose="02010600030101010101" pitchFamily="2" charset="-122"/>
+                </a:rPr>
+                <a:t>edge3</a:t>
+              </a:r>
+              <a:endParaRPr kumimoji="1" lang="en-US" altLang="zh-CN" sz="1400" dirty="0">
+                <a:latin typeface="等线" panose="02010600030101010101" pitchFamily="2" charset="-122"/>
+                <a:ea typeface="等线" panose="02010600030101010101" pitchFamily="2" charset="-122"/>
+              </a:endParaRPr>
+            </a:p>
+          </p:txBody>
+        </p:sp>
+        <p:sp>
+          <p:nvSpPr>
+            <p:cNvPr id="70" name="文本框 12"/>
+            <p:cNvSpPr txBox="1"/>
+            <p:nvPr/>
+          </p:nvSpPr>
+          <p:spPr>
+            <a:xfrm>
+              <a:off x="5375422" y="3403350"/>
+              <a:ext cx="889680" cy="307777"/>
+            </a:xfrm>
+            <a:prstGeom prst="rect">
+              <a:avLst/>
+            </a:prstGeom>
+            <a:noFill/>
+          </p:spPr>
+          <p:txBody>
+            <a:bodyPr wrap="square" rtlCol="0">
+              <a:spAutoFit/>
+            </a:bodyPr>
+            <a:lstStyle/>
+            <a:p>
+              <a:pPr algn="ctr"/>
+              <a:r>
+                <a:rPr kumimoji="1" lang="en-US" altLang="zh-CN" sz="1400" b="1" dirty="0">
+                  <a:latin typeface="等线" panose="02010600030101010101" pitchFamily="2" charset="-122"/>
+                  <a:ea typeface="等线" panose="02010600030101010101" pitchFamily="2" charset="-122"/>
+                </a:rPr>
+                <a:t>edge2</a:t>
+              </a:r>
+              <a:endParaRPr kumimoji="1" lang="en-US" altLang="zh-CN" sz="1400" dirty="0">
+                <a:latin typeface="等线" panose="02010600030101010101" pitchFamily="2" charset="-122"/>
+                <a:ea typeface="等线" panose="02010600030101010101" pitchFamily="2" charset="-122"/>
+              </a:endParaRPr>
+            </a:p>
+          </p:txBody>
+        </p:sp>
+        <p:sp>
+          <p:nvSpPr>
+            <p:cNvPr id="71" name="文本框 12"/>
+            <p:cNvSpPr txBox="1"/>
+            <p:nvPr/>
+          </p:nvSpPr>
+          <p:spPr>
+            <a:xfrm>
+              <a:off x="6892265" y="3961158"/>
+              <a:ext cx="996599" cy="307777"/>
+            </a:xfrm>
+            <a:prstGeom prst="rect">
+              <a:avLst/>
+            </a:prstGeom>
+            <a:noFill/>
+          </p:spPr>
+          <p:txBody>
+            <a:bodyPr wrap="square" rtlCol="0">
+              <a:spAutoFit/>
+            </a:bodyPr>
+            <a:lstStyle/>
+            <a:p>
+              <a:pPr algn="ctr"/>
+              <a:r>
+                <a:rPr kumimoji="1" lang="en-US" altLang="zh-CN" sz="1400" b="1" dirty="0">
+                  <a:latin typeface="等线" panose="02010600030101010101" pitchFamily="2" charset="-122"/>
+                  <a:ea typeface="等线" panose="02010600030101010101" pitchFamily="2" charset="-122"/>
+                </a:rPr>
+                <a:t>edge4</a:t>
+              </a:r>
+              <a:endParaRPr kumimoji="1" lang="en-US" altLang="zh-CN" sz="1400" dirty="0">
+                <a:latin typeface="等线" panose="02010600030101010101" pitchFamily="2" charset="-122"/>
+                <a:ea typeface="等线" panose="02010600030101010101" pitchFamily="2" charset="-122"/>
+              </a:endParaRPr>
+            </a:p>
+          </p:txBody>
+        </p:sp>
+        <p:cxnSp>
+          <p:nvCxnSpPr>
+            <p:cNvPr id="2" name="直线箭头连接符 11" descr="jytjh"/>
+            <p:cNvCxnSpPr>
+              <a:stCxn id="28" idx="3"/>
+              <a:endCxn id="25" idx="1"/>
+            </p:cNvCxnSpPr>
+            <p:nvPr/>
+          </p:nvCxnSpPr>
+          <p:spPr>
+            <a:xfrm>
+              <a:off x="5067626" y="3035472"/>
+              <a:ext cx="1715144" cy="16590"/>
+            </a:xfrm>
+            <a:prstGeom prst="straightConnector1">
+              <a:avLst/>
+            </a:prstGeom>
+            <a:ln w="19050">
+              <a:solidFill>
+                <a:schemeClr val="tx1"/>
+              </a:solidFill>
+              <a:headEnd type="none" w="lg" len="med"/>
+              <a:tailEnd type="arrow" w="sm" len="lg"/>
+            </a:ln>
+          </p:spPr>
+          <p:style>
+            <a:lnRef idx="1">
+              <a:schemeClr val="accent1"/>
+            </a:lnRef>
+            <a:fillRef idx="0">
+              <a:schemeClr val="accent1"/>
+            </a:fillRef>
+            <a:effectRef idx="0">
+              <a:schemeClr val="accent1"/>
+            </a:effectRef>
+            <a:fontRef idx="minor">
+              <a:schemeClr val="tx1"/>
+            </a:fontRef>
+          </p:style>
+        </p:cxnSp>
+        <p:sp>
+          <p:nvSpPr>
+            <p:cNvPr id="7" name="文本框 12"/>
+            <p:cNvSpPr txBox="1"/>
+            <p:nvPr/>
+          </p:nvSpPr>
+          <p:spPr>
+            <a:xfrm>
+              <a:off x="1301785" y="1066803"/>
+              <a:ext cx="2787069" cy="4923690"/>
+            </a:xfrm>
+            <a:prstGeom prst="rect">
+              <a:avLst/>
+            </a:prstGeom>
+            <a:noFill/>
+          </p:spPr>
+          <p:txBody>
+            <a:bodyPr wrap="square" lIns="90000" rtlCol="0" anchor="ctr">
+              <a:noAutofit/>
+            </a:bodyPr>
+            <a:lstStyle/>
+            <a:p>
+              <a:r>
+                <a:rPr kumimoji="1" lang="en-US" altLang="zh-CN" sz="1200" b="1" dirty="0">
+                  <a:latin typeface="等线" panose="02010600030101010101" pitchFamily="2" charset="-122"/>
+                  <a:ea typeface="等线" panose="02010600030101010101" pitchFamily="2" charset="-122"/>
+                </a:rPr>
+                <a:t>edge1:</a:t>
+              </a:r>
+              <a:r>
+                <a:rPr kumimoji="1" lang="zh-CN" altLang="en-US" sz="1200" b="1" dirty="0">
+                  <a:latin typeface="等线" panose="02010600030101010101" pitchFamily="2" charset="-122"/>
+                  <a:ea typeface="等线" panose="02010600030101010101" pitchFamily="2" charset="-122"/>
+                </a:rPr>
+                <a:t> </a:t>
+              </a:r>
+              <a:r>
+                <a:rPr kumimoji="1" lang="en-US" altLang="zh-CN" sz="1200" dirty="0">
+                  <a:latin typeface="等线" panose="02010600030101010101" pitchFamily="2" charset="-122"/>
+                  <a:ea typeface="等线" panose="02010600030101010101" pitchFamily="2" charset="-122"/>
+                </a:rPr>
+                <a:t>deposit</a:t>
+              </a:r>
+              <a:endParaRPr kumimoji="1" lang="en-US" altLang="zh-CN" sz="1200" dirty="0">
+                <a:latin typeface="等线" panose="02010600030101010101" pitchFamily="2" charset="-122"/>
+                <a:ea typeface="等线" panose="02010600030101010101" pitchFamily="2" charset="-122"/>
+              </a:endParaRPr>
+            </a:p>
+            <a:p>
+              <a:r>
+                <a:rPr kumimoji="1" lang="en-US" altLang="zh-CN" sz="1200" b="1" dirty="0">
+                  <a:latin typeface="等线" panose="02010600030101010101" pitchFamily="2" charset="-122"/>
+                  <a:ea typeface="等线" panose="02010600030101010101" pitchFamily="2" charset="-122"/>
+                </a:rPr>
+                <a:t>edge1</a:t>
+              </a:r>
+              <a:r>
+                <a:rPr kumimoji="1" lang="en-US" altLang="zh-CN" sz="1200" dirty="0">
+                  <a:latin typeface="等线" panose="02010600030101010101" pitchFamily="2" charset="-122"/>
+                  <a:ea typeface="等线" panose="02010600030101010101" pitchFamily="2" charset="-122"/>
+                </a:rPr>
+                <a:t>.amount</a:t>
+              </a:r>
+              <a:r>
+                <a:rPr kumimoji="1" lang="zh-CN" altLang="en-US" sz="1200" dirty="0">
+                  <a:latin typeface="等线" panose="02010600030101010101" pitchFamily="2" charset="-122"/>
+                  <a:ea typeface="等线" panose="02010600030101010101" pitchFamily="2" charset="-122"/>
+                </a:rPr>
+                <a:t> </a:t>
+              </a:r>
+              <a:r>
+                <a:rPr kumimoji="1" lang="en-US" altLang="zh-CN" sz="1200" dirty="0">
+                  <a:latin typeface="等线" panose="02010600030101010101" pitchFamily="2" charset="-122"/>
+                  <a:ea typeface="等线" panose="02010600030101010101" pitchFamily="2" charset="-122"/>
+                </a:rPr>
+                <a:t>&gt;</a:t>
+              </a:r>
+              <a:r>
+                <a:rPr kumimoji="1" lang="zh-CN" altLang="en-US" sz="1200" dirty="0">
+                  <a:latin typeface="等线" panose="02010600030101010101" pitchFamily="2" charset="-122"/>
+                  <a:ea typeface="等线" panose="02010600030101010101" pitchFamily="2" charset="-122"/>
+                </a:rPr>
+                <a:t> </a:t>
+              </a:r>
+              <a:r>
+                <a:rPr kumimoji="1" lang="en-US" altLang="zh-CN" sz="1200" dirty="0">
+                  <a:latin typeface="等线" panose="02010600030101010101" pitchFamily="2" charset="-122"/>
+                  <a:ea typeface="等线" panose="02010600030101010101" pitchFamily="2" charset="-122"/>
+                </a:rPr>
+                <a:t>${threshold}</a:t>
+              </a:r>
+              <a:endParaRPr kumimoji="1" lang="en-US" altLang="zh-CN" sz="1200" dirty="0">
+                <a:latin typeface="等线" panose="02010600030101010101" pitchFamily="2" charset="-122"/>
+                <a:ea typeface="等线" panose="02010600030101010101" pitchFamily="2" charset="-122"/>
+              </a:endParaRPr>
+            </a:p>
+            <a:p>
+              <a:r>
+                <a:rPr kumimoji="1" lang="en-US" altLang="zh-CN" sz="1200" b="1" dirty="0">
+                  <a:latin typeface="等线" panose="02010600030101010101" pitchFamily="2" charset="-122"/>
+                  <a:ea typeface="等线" panose="02010600030101010101" pitchFamily="2" charset="-122"/>
+                </a:rPr>
+                <a:t>edge1</a:t>
+              </a:r>
+              <a:r>
+                <a:rPr kumimoji="1" lang="en-US" altLang="zh-CN" sz="1200" dirty="0">
+                  <a:latin typeface="等线" panose="02010600030101010101" pitchFamily="2" charset="-122"/>
+                  <a:ea typeface="等线" panose="02010600030101010101" pitchFamily="2" charset="-122"/>
+                </a:rPr>
+                <a:t>.timestamp</a:t>
+              </a:r>
+              <a:r>
+                <a:rPr kumimoji="1" lang="zh-CN" altLang="en-US" sz="1200" dirty="0">
+                  <a:latin typeface="等线" panose="02010600030101010101" pitchFamily="2" charset="-122"/>
+                  <a:ea typeface="等线" panose="02010600030101010101" pitchFamily="2" charset="-122"/>
+                </a:rPr>
+                <a:t> </a:t>
+              </a:r>
+              <a:r>
+                <a:rPr kumimoji="1" lang="en-US" altLang="zh-CN" sz="1200" dirty="0">
+                  <a:latin typeface="等线" panose="02010600030101010101" pitchFamily="2" charset="-122"/>
+                  <a:ea typeface="等线" panose="02010600030101010101" pitchFamily="2" charset="-122"/>
+                </a:rPr>
+                <a:t>&gt;</a:t>
+              </a:r>
+              <a:r>
+                <a:rPr kumimoji="1" lang="zh-CN" altLang="en-US" sz="1200" dirty="0">
+                  <a:latin typeface="等线" panose="02010600030101010101" pitchFamily="2" charset="-122"/>
+                  <a:ea typeface="等线" panose="02010600030101010101" pitchFamily="2" charset="-122"/>
+                </a:rPr>
+                <a:t> </a:t>
+              </a:r>
+              <a:r>
+                <a:rPr kumimoji="1" lang="en-US" altLang="zh-CN" sz="1200" dirty="0">
+                  <a:latin typeface="等线" panose="02010600030101010101" pitchFamily="2" charset="-122"/>
+                  <a:ea typeface="等线" panose="02010600030101010101" pitchFamily="2" charset="-122"/>
+                </a:rPr>
+                <a:t>${</a:t>
+              </a:r>
+              <a:r>
+                <a:rPr kumimoji="1" lang="en-US" altLang="zh-CN" sz="1200" dirty="0" err="1">
+                  <a:latin typeface="等线" panose="02010600030101010101" pitchFamily="2" charset="-122"/>
+                  <a:ea typeface="等线" panose="02010600030101010101" pitchFamily="2" charset="-122"/>
+                </a:rPr>
+                <a:t>startTime</a:t>
+              </a:r>
+              <a:r>
+                <a:rPr kumimoji="1" lang="en-US" altLang="zh-CN" sz="1200" dirty="0">
+                  <a:latin typeface="等线" panose="02010600030101010101" pitchFamily="2" charset="-122"/>
+                  <a:ea typeface="等线" panose="02010600030101010101" pitchFamily="2" charset="-122"/>
+                </a:rPr>
+                <a:t>}</a:t>
+              </a:r>
+              <a:endParaRPr kumimoji="1" lang="en-US" altLang="zh-CN" sz="1200" dirty="0">
+                <a:latin typeface="等线" panose="02010600030101010101" pitchFamily="2" charset="-122"/>
+                <a:ea typeface="等线" panose="02010600030101010101" pitchFamily="2" charset="-122"/>
+              </a:endParaRPr>
+            </a:p>
+            <a:p>
+              <a:r>
+                <a:rPr kumimoji="1" lang="en-US" altLang="zh-CN" sz="1200" b="1" dirty="0">
+                  <a:latin typeface="等线" panose="02010600030101010101" pitchFamily="2" charset="-122"/>
+                  <a:ea typeface="等线" panose="02010600030101010101" pitchFamily="2" charset="-122"/>
+                </a:rPr>
+                <a:t>edge1</a:t>
+              </a:r>
+              <a:r>
+                <a:rPr kumimoji="1" lang="en-US" altLang="zh-CN" sz="1200" dirty="0">
+                  <a:latin typeface="等线" panose="02010600030101010101" pitchFamily="2" charset="-122"/>
+                  <a:ea typeface="等线" panose="02010600030101010101" pitchFamily="2" charset="-122"/>
+                </a:rPr>
+                <a:t>.timestamp</a:t>
+              </a:r>
+              <a:r>
+                <a:rPr kumimoji="1" lang="zh-CN" altLang="en-US" sz="1200" dirty="0">
+                  <a:latin typeface="等线" panose="02010600030101010101" pitchFamily="2" charset="-122"/>
+                  <a:ea typeface="等线" panose="02010600030101010101" pitchFamily="2" charset="-122"/>
+                </a:rPr>
+                <a:t> </a:t>
+              </a:r>
+              <a:r>
+                <a:rPr kumimoji="1" lang="en-US" altLang="zh-CN" sz="1200" dirty="0">
+                  <a:latin typeface="等线" panose="02010600030101010101" pitchFamily="2" charset="-122"/>
+                  <a:ea typeface="等线" panose="02010600030101010101" pitchFamily="2" charset="-122"/>
+                </a:rPr>
+                <a:t>&lt;</a:t>
+              </a:r>
+              <a:r>
+                <a:rPr kumimoji="1" lang="zh-CN" altLang="en-US" sz="1200" dirty="0">
+                  <a:latin typeface="等线" panose="02010600030101010101" pitchFamily="2" charset="-122"/>
+                  <a:ea typeface="等线" panose="02010600030101010101" pitchFamily="2" charset="-122"/>
+                </a:rPr>
+                <a:t> </a:t>
+              </a:r>
+              <a:r>
+                <a:rPr kumimoji="1" lang="en-US" altLang="zh-CN" sz="1200" dirty="0">
+                  <a:latin typeface="等线" panose="02010600030101010101" pitchFamily="2" charset="-122"/>
+                  <a:ea typeface="等线" panose="02010600030101010101" pitchFamily="2" charset="-122"/>
+                </a:rPr>
+                <a:t>${</a:t>
+              </a:r>
+              <a:r>
+                <a:rPr kumimoji="1" lang="en-US" altLang="zh-CN" sz="1200" dirty="0" err="1">
+                  <a:latin typeface="等线" panose="02010600030101010101" pitchFamily="2" charset="-122"/>
+                  <a:ea typeface="等线" panose="02010600030101010101" pitchFamily="2" charset="-122"/>
+                </a:rPr>
+                <a:t>endTime</a:t>
+              </a:r>
+              <a:r>
+                <a:rPr kumimoji="1" lang="en-US" altLang="zh-CN" sz="1200" dirty="0">
+                  <a:latin typeface="等线" panose="02010600030101010101" pitchFamily="2" charset="-122"/>
+                  <a:ea typeface="等线" panose="02010600030101010101" pitchFamily="2" charset="-122"/>
+                </a:rPr>
+                <a:t>}</a:t>
+              </a:r>
+              <a:endParaRPr kumimoji="1" lang="en-US" altLang="zh-CN" sz="1200" dirty="0">
+                <a:latin typeface="等线" panose="02010600030101010101" pitchFamily="2" charset="-122"/>
+                <a:ea typeface="等线" panose="02010600030101010101" pitchFamily="2" charset="-122"/>
+              </a:endParaRPr>
+            </a:p>
+            <a:p>
+              <a:endParaRPr kumimoji="1" lang="en-US" altLang="zh-CN" sz="1200" b="1" dirty="0">
+                <a:latin typeface="等线" panose="02010600030101010101" pitchFamily="2" charset="-122"/>
+                <a:ea typeface="等线" panose="02010600030101010101" pitchFamily="2" charset="-122"/>
+              </a:endParaRPr>
+            </a:p>
+            <a:p>
+              <a:r>
+                <a:rPr kumimoji="1" lang="en-US" altLang="zh-CN" sz="1200" b="1" dirty="0">
+                  <a:latin typeface="等线" panose="02010600030101010101" pitchFamily="2" charset="-122"/>
+                  <a:ea typeface="等线" panose="02010600030101010101" pitchFamily="2" charset="-122"/>
+                </a:rPr>
+                <a:t>edge2:</a:t>
+              </a:r>
+              <a:r>
+                <a:rPr kumimoji="1" lang="zh-CN" altLang="en-US" sz="1200" b="1" dirty="0">
+                  <a:latin typeface="等线" panose="02010600030101010101" pitchFamily="2" charset="-122"/>
+                  <a:ea typeface="等线" panose="02010600030101010101" pitchFamily="2" charset="-122"/>
+                </a:rPr>
+                <a:t> </a:t>
+              </a:r>
+              <a:r>
+                <a:rPr kumimoji="1" lang="en-US" altLang="zh-CN" sz="1200" dirty="0">
+                  <a:latin typeface="等线" panose="02010600030101010101" pitchFamily="2" charset="-122"/>
+                  <a:ea typeface="等线" panose="02010600030101010101" pitchFamily="2" charset="-122"/>
+                </a:rPr>
+                <a:t>repay</a:t>
+              </a:r>
+              <a:endParaRPr kumimoji="1" lang="en-US" altLang="zh-CN" sz="1200" dirty="0">
+                <a:latin typeface="等线" panose="02010600030101010101" pitchFamily="2" charset="-122"/>
+                <a:ea typeface="等线" panose="02010600030101010101" pitchFamily="2" charset="-122"/>
+              </a:endParaRPr>
+            </a:p>
+            <a:p>
+              <a:r>
+                <a:rPr kumimoji="1" lang="en-US" altLang="zh-CN" sz="1200" b="1" dirty="0">
+                  <a:latin typeface="等线" panose="02010600030101010101" pitchFamily="2" charset="-122"/>
+                  <a:ea typeface="等线" panose="02010600030101010101" pitchFamily="2" charset="-122"/>
+                </a:rPr>
+                <a:t>edge2</a:t>
+              </a:r>
+              <a:r>
+                <a:rPr kumimoji="1" lang="en-US" altLang="zh-CN" sz="1200" dirty="0">
+                  <a:latin typeface="等线" panose="02010600030101010101" pitchFamily="2" charset="-122"/>
+                  <a:ea typeface="等线" panose="02010600030101010101" pitchFamily="2" charset="-122"/>
+                </a:rPr>
+                <a:t>.amount</a:t>
+              </a:r>
+              <a:r>
+                <a:rPr kumimoji="1" lang="zh-CN" altLang="en-US" sz="1200" dirty="0">
+                  <a:latin typeface="等线" panose="02010600030101010101" pitchFamily="2" charset="-122"/>
+                  <a:ea typeface="等线" panose="02010600030101010101" pitchFamily="2" charset="-122"/>
+                </a:rPr>
+                <a:t> </a:t>
+              </a:r>
+              <a:r>
+                <a:rPr kumimoji="1" lang="en-US" altLang="zh-CN" sz="1200" dirty="0">
+                  <a:latin typeface="等线" panose="02010600030101010101" pitchFamily="2" charset="-122"/>
+                  <a:ea typeface="等线" panose="02010600030101010101" pitchFamily="2" charset="-122"/>
+                </a:rPr>
+                <a:t>&gt;</a:t>
+              </a:r>
+              <a:r>
+                <a:rPr kumimoji="1" lang="zh-CN" altLang="en-US" sz="1200" dirty="0">
+                  <a:latin typeface="等线" panose="02010600030101010101" pitchFamily="2" charset="-122"/>
+                  <a:ea typeface="等线" panose="02010600030101010101" pitchFamily="2" charset="-122"/>
+                </a:rPr>
+                <a:t> </a:t>
+              </a:r>
+              <a:r>
+                <a:rPr kumimoji="1" lang="en-US" altLang="zh-CN" sz="1200" dirty="0">
+                  <a:latin typeface="等线" panose="02010600030101010101" pitchFamily="2" charset="-122"/>
+                  <a:ea typeface="等线" panose="02010600030101010101" pitchFamily="2" charset="-122"/>
+                </a:rPr>
+                <a:t>${threshold}</a:t>
+              </a:r>
+              <a:endParaRPr kumimoji="1" lang="en-US" altLang="zh-CN" sz="1200" dirty="0">
+                <a:latin typeface="等线" panose="02010600030101010101" pitchFamily="2" charset="-122"/>
+                <a:ea typeface="等线" panose="02010600030101010101" pitchFamily="2" charset="-122"/>
+              </a:endParaRPr>
+            </a:p>
+            <a:p>
+              <a:r>
+                <a:rPr kumimoji="1" lang="en-US" altLang="zh-CN" sz="1200" b="1" dirty="0">
+                  <a:latin typeface="等线" panose="02010600030101010101" pitchFamily="2" charset="-122"/>
+                  <a:ea typeface="等线" panose="02010600030101010101" pitchFamily="2" charset="-122"/>
+                </a:rPr>
+                <a:t>edge2</a:t>
+              </a:r>
+              <a:r>
+                <a:rPr kumimoji="1" lang="en-US" altLang="zh-CN" sz="1200" dirty="0">
+                  <a:latin typeface="等线" panose="02010600030101010101" pitchFamily="2" charset="-122"/>
+                  <a:ea typeface="等线" panose="02010600030101010101" pitchFamily="2" charset="-122"/>
+                </a:rPr>
+                <a:t>.timestamp</a:t>
+              </a:r>
+              <a:r>
+                <a:rPr kumimoji="1" lang="zh-CN" altLang="en-US" sz="1200" dirty="0">
+                  <a:latin typeface="等线" panose="02010600030101010101" pitchFamily="2" charset="-122"/>
+                  <a:ea typeface="等线" panose="02010600030101010101" pitchFamily="2" charset="-122"/>
+                </a:rPr>
+                <a:t> </a:t>
+              </a:r>
+              <a:r>
+                <a:rPr kumimoji="1" lang="en-US" altLang="zh-CN" sz="1200" dirty="0">
+                  <a:latin typeface="等线" panose="02010600030101010101" pitchFamily="2" charset="-122"/>
+                  <a:ea typeface="等线" panose="02010600030101010101" pitchFamily="2" charset="-122"/>
+                </a:rPr>
+                <a:t>&gt;</a:t>
+              </a:r>
+              <a:r>
+                <a:rPr kumimoji="1" lang="zh-CN" altLang="en-US" sz="1200" dirty="0">
+                  <a:latin typeface="等线" panose="02010600030101010101" pitchFamily="2" charset="-122"/>
+                  <a:ea typeface="等线" panose="02010600030101010101" pitchFamily="2" charset="-122"/>
+                </a:rPr>
+                <a:t> </a:t>
+              </a:r>
+              <a:r>
+                <a:rPr kumimoji="1" lang="en-US" altLang="zh-CN" sz="1200" dirty="0">
+                  <a:latin typeface="等线" panose="02010600030101010101" pitchFamily="2" charset="-122"/>
+                  <a:ea typeface="等线" panose="02010600030101010101" pitchFamily="2" charset="-122"/>
+                </a:rPr>
+                <a:t>${</a:t>
+              </a:r>
+              <a:r>
+                <a:rPr kumimoji="1" lang="en-US" altLang="zh-CN" sz="1200" dirty="0" err="1">
+                  <a:latin typeface="等线" panose="02010600030101010101" pitchFamily="2" charset="-122"/>
+                  <a:ea typeface="等线" panose="02010600030101010101" pitchFamily="2" charset="-122"/>
+                </a:rPr>
+                <a:t>startTime</a:t>
+              </a:r>
+              <a:r>
+                <a:rPr kumimoji="1" lang="en-US" altLang="zh-CN" sz="1200" dirty="0">
+                  <a:latin typeface="等线" panose="02010600030101010101" pitchFamily="2" charset="-122"/>
+                  <a:ea typeface="等线" panose="02010600030101010101" pitchFamily="2" charset="-122"/>
+                </a:rPr>
+                <a:t>}</a:t>
+              </a:r>
+              <a:endParaRPr kumimoji="1" lang="en-US" altLang="zh-CN" sz="1200" dirty="0">
+                <a:latin typeface="等线" panose="02010600030101010101" pitchFamily="2" charset="-122"/>
+                <a:ea typeface="等线" panose="02010600030101010101" pitchFamily="2" charset="-122"/>
+              </a:endParaRPr>
+            </a:p>
+            <a:p>
+              <a:r>
+                <a:rPr kumimoji="1" lang="en-US" altLang="zh-CN" sz="1200" b="1" dirty="0">
+                  <a:latin typeface="等线" panose="02010600030101010101" pitchFamily="2" charset="-122"/>
+                  <a:ea typeface="等线" panose="02010600030101010101" pitchFamily="2" charset="-122"/>
+                </a:rPr>
+                <a:t>edge2</a:t>
+              </a:r>
+              <a:r>
+                <a:rPr kumimoji="1" lang="en-US" altLang="zh-CN" sz="1200" dirty="0">
+                  <a:latin typeface="等线" panose="02010600030101010101" pitchFamily="2" charset="-122"/>
+                  <a:ea typeface="等线" panose="02010600030101010101" pitchFamily="2" charset="-122"/>
+                </a:rPr>
+                <a:t>.timestamp</a:t>
+              </a:r>
+              <a:r>
+                <a:rPr kumimoji="1" lang="zh-CN" altLang="en-US" sz="1200" dirty="0">
+                  <a:latin typeface="等线" panose="02010600030101010101" pitchFamily="2" charset="-122"/>
+                  <a:ea typeface="等线" panose="02010600030101010101" pitchFamily="2" charset="-122"/>
+                </a:rPr>
+                <a:t> </a:t>
+              </a:r>
+              <a:r>
+                <a:rPr kumimoji="1" lang="en-US" altLang="zh-CN" sz="1200" dirty="0">
+                  <a:latin typeface="等线" panose="02010600030101010101" pitchFamily="2" charset="-122"/>
+                  <a:ea typeface="等线" panose="02010600030101010101" pitchFamily="2" charset="-122"/>
+                </a:rPr>
+                <a:t>&lt;</a:t>
+              </a:r>
+              <a:r>
+                <a:rPr kumimoji="1" lang="zh-CN" altLang="en-US" sz="1200" dirty="0">
+                  <a:latin typeface="等线" panose="02010600030101010101" pitchFamily="2" charset="-122"/>
+                  <a:ea typeface="等线" panose="02010600030101010101" pitchFamily="2" charset="-122"/>
+                </a:rPr>
+                <a:t> </a:t>
+              </a:r>
+              <a:r>
+                <a:rPr kumimoji="1" lang="en-US" altLang="zh-CN" sz="1200" dirty="0">
+                  <a:latin typeface="等线" panose="02010600030101010101" pitchFamily="2" charset="-122"/>
+                  <a:ea typeface="等线" panose="02010600030101010101" pitchFamily="2" charset="-122"/>
+                </a:rPr>
+                <a:t>${</a:t>
+              </a:r>
+              <a:r>
+                <a:rPr kumimoji="1" lang="en-US" altLang="zh-CN" sz="1200" dirty="0" err="1">
+                  <a:latin typeface="等线" panose="02010600030101010101" pitchFamily="2" charset="-122"/>
+                  <a:ea typeface="等线" panose="02010600030101010101" pitchFamily="2" charset="-122"/>
+                </a:rPr>
+                <a:t>endTime</a:t>
+              </a:r>
+              <a:r>
+                <a:rPr kumimoji="1" lang="en-US" altLang="zh-CN" sz="1200" dirty="0">
+                  <a:latin typeface="等线" panose="02010600030101010101" pitchFamily="2" charset="-122"/>
+                  <a:ea typeface="等线" panose="02010600030101010101" pitchFamily="2" charset="-122"/>
+                </a:rPr>
+                <a:t>}</a:t>
+              </a:r>
+              <a:endParaRPr kumimoji="1" lang="en-US" altLang="zh-CN" sz="1200" dirty="0">
+                <a:latin typeface="等线" panose="02010600030101010101" pitchFamily="2" charset="-122"/>
+                <a:ea typeface="等线" panose="02010600030101010101" pitchFamily="2" charset="-122"/>
+              </a:endParaRPr>
+            </a:p>
+            <a:p>
+              <a:endParaRPr kumimoji="1" lang="en-US" altLang="zh-CN" sz="1200" dirty="0">
+                <a:latin typeface="等线" panose="02010600030101010101" pitchFamily="2" charset="-122"/>
+                <a:ea typeface="等线" panose="02010600030101010101" pitchFamily="2" charset="-122"/>
+              </a:endParaRPr>
+            </a:p>
+            <a:p>
+              <a:endParaRPr kumimoji="1" lang="en-US" altLang="zh-CN" sz="1200" b="1" dirty="0">
+                <a:latin typeface="等线" panose="02010600030101010101" pitchFamily="2" charset="-122"/>
+                <a:ea typeface="等线" panose="02010600030101010101" pitchFamily="2" charset="-122"/>
+              </a:endParaRPr>
+            </a:p>
+            <a:p>
+              <a:r>
+                <a:rPr kumimoji="1" lang="en-US" altLang="zh-CN" sz="1200" b="1" dirty="0">
+                  <a:latin typeface="等线" panose="02010600030101010101" pitchFamily="2" charset="-122"/>
+                  <a:ea typeface="等线" panose="02010600030101010101" pitchFamily="2" charset="-122"/>
+                </a:rPr>
+                <a:t>edge3:</a:t>
+              </a:r>
+              <a:r>
+                <a:rPr kumimoji="1" lang="zh-CN" altLang="en-US" sz="1200" b="1" dirty="0">
+                  <a:latin typeface="等线" panose="02010600030101010101" pitchFamily="2" charset="-122"/>
+                  <a:ea typeface="等线" panose="02010600030101010101" pitchFamily="2" charset="-122"/>
+                </a:rPr>
+                <a:t> </a:t>
+              </a:r>
+              <a:r>
+                <a:rPr kumimoji="1" lang="en-US" altLang="zh-CN" sz="1200" dirty="0">
+                  <a:latin typeface="等线" panose="02010600030101010101" pitchFamily="2" charset="-122"/>
+                  <a:ea typeface="等线" panose="02010600030101010101" pitchFamily="2" charset="-122"/>
+                </a:rPr>
+                <a:t>transfer</a:t>
+              </a:r>
+              <a:endParaRPr kumimoji="1" lang="en-US" altLang="zh-CN" sz="1200" dirty="0">
+                <a:latin typeface="等线" panose="02010600030101010101" pitchFamily="2" charset="-122"/>
+                <a:ea typeface="等线" panose="02010600030101010101" pitchFamily="2" charset="-122"/>
+              </a:endParaRPr>
+            </a:p>
+            <a:p>
+              <a:r>
+                <a:rPr kumimoji="1" lang="en-US" altLang="zh-CN" sz="1200" b="1" dirty="0">
+                  <a:latin typeface="等线" panose="02010600030101010101" pitchFamily="2" charset="-122"/>
+                  <a:ea typeface="等线" panose="02010600030101010101" pitchFamily="2" charset="-122"/>
+                </a:rPr>
+                <a:t>edge3</a:t>
+              </a:r>
+              <a:r>
+                <a:rPr kumimoji="1" lang="en-US" altLang="zh-CN" sz="1200" dirty="0">
+                  <a:latin typeface="等线" panose="02010600030101010101" pitchFamily="2" charset="-122"/>
+                  <a:ea typeface="等线" panose="02010600030101010101" pitchFamily="2" charset="-122"/>
+                </a:rPr>
+                <a:t>.amount</a:t>
+              </a:r>
+              <a:r>
+                <a:rPr kumimoji="1" lang="zh-CN" altLang="en-US" sz="1200" dirty="0">
+                  <a:latin typeface="等线" panose="02010600030101010101" pitchFamily="2" charset="-122"/>
+                  <a:ea typeface="等线" panose="02010600030101010101" pitchFamily="2" charset="-122"/>
+                </a:rPr>
+                <a:t> </a:t>
+              </a:r>
+              <a:r>
+                <a:rPr kumimoji="1" lang="en-US" altLang="zh-CN" sz="1200" dirty="0">
+                  <a:latin typeface="等线" panose="02010600030101010101" pitchFamily="2" charset="-122"/>
+                  <a:ea typeface="等线" panose="02010600030101010101" pitchFamily="2" charset="-122"/>
+                </a:rPr>
+                <a:t>&gt;</a:t>
+              </a:r>
+              <a:r>
+                <a:rPr kumimoji="1" lang="zh-CN" altLang="en-US" sz="1200" dirty="0">
+                  <a:latin typeface="等线" panose="02010600030101010101" pitchFamily="2" charset="-122"/>
+                  <a:ea typeface="等线" panose="02010600030101010101" pitchFamily="2" charset="-122"/>
+                </a:rPr>
+                <a:t> </a:t>
+              </a:r>
+              <a:r>
+                <a:rPr kumimoji="1" lang="en-US" altLang="zh-CN" sz="1200" dirty="0">
+                  <a:latin typeface="等线" panose="02010600030101010101" pitchFamily="2" charset="-122"/>
+                  <a:ea typeface="等线" panose="02010600030101010101" pitchFamily="2" charset="-122"/>
+                </a:rPr>
+                <a:t>${threshold}</a:t>
+              </a:r>
+              <a:endParaRPr kumimoji="1" lang="en-US" altLang="zh-CN" sz="1200" dirty="0">
+                <a:latin typeface="等线" panose="02010600030101010101" pitchFamily="2" charset="-122"/>
+                <a:ea typeface="等线" panose="02010600030101010101" pitchFamily="2" charset="-122"/>
+              </a:endParaRPr>
+            </a:p>
+            <a:p>
+              <a:r>
+                <a:rPr kumimoji="1" lang="en-US" altLang="zh-CN" sz="1200" b="1" dirty="0">
+                  <a:latin typeface="等线" panose="02010600030101010101" pitchFamily="2" charset="-122"/>
+                  <a:ea typeface="等线" panose="02010600030101010101" pitchFamily="2" charset="-122"/>
+                </a:rPr>
+                <a:t>edge3</a:t>
+              </a:r>
+              <a:r>
+                <a:rPr kumimoji="1" lang="en-US" altLang="zh-CN" sz="1200" dirty="0">
+                  <a:latin typeface="等线" panose="02010600030101010101" pitchFamily="2" charset="-122"/>
+                  <a:ea typeface="等线" panose="02010600030101010101" pitchFamily="2" charset="-122"/>
+                </a:rPr>
+                <a:t>.timestamp</a:t>
+              </a:r>
+              <a:r>
+                <a:rPr kumimoji="1" lang="zh-CN" altLang="en-US" sz="1200" dirty="0">
+                  <a:latin typeface="等线" panose="02010600030101010101" pitchFamily="2" charset="-122"/>
+                  <a:ea typeface="等线" panose="02010600030101010101" pitchFamily="2" charset="-122"/>
+                </a:rPr>
+                <a:t> </a:t>
+              </a:r>
+              <a:r>
+                <a:rPr kumimoji="1" lang="en-US" altLang="zh-CN" sz="1200" dirty="0">
+                  <a:latin typeface="等线" panose="02010600030101010101" pitchFamily="2" charset="-122"/>
+                  <a:ea typeface="等线" panose="02010600030101010101" pitchFamily="2" charset="-122"/>
+                </a:rPr>
+                <a:t>&gt;</a:t>
+              </a:r>
+              <a:r>
+                <a:rPr kumimoji="1" lang="zh-CN" altLang="en-US" sz="1200" dirty="0">
+                  <a:latin typeface="等线" panose="02010600030101010101" pitchFamily="2" charset="-122"/>
+                  <a:ea typeface="等线" panose="02010600030101010101" pitchFamily="2" charset="-122"/>
+                </a:rPr>
+                <a:t> </a:t>
+              </a:r>
+              <a:r>
+                <a:rPr kumimoji="1" lang="en-US" altLang="zh-CN" sz="1200" dirty="0">
+                  <a:latin typeface="等线" panose="02010600030101010101" pitchFamily="2" charset="-122"/>
+                  <a:ea typeface="等线" panose="02010600030101010101" pitchFamily="2" charset="-122"/>
+                </a:rPr>
+                <a:t>${</a:t>
+              </a:r>
+              <a:r>
+                <a:rPr kumimoji="1" lang="en-US" altLang="zh-CN" sz="1200" dirty="0" err="1">
+                  <a:latin typeface="等线" panose="02010600030101010101" pitchFamily="2" charset="-122"/>
+                  <a:ea typeface="等线" panose="02010600030101010101" pitchFamily="2" charset="-122"/>
+                </a:rPr>
+                <a:t>startTime</a:t>
+              </a:r>
+              <a:r>
+                <a:rPr kumimoji="1" lang="en-US" altLang="zh-CN" sz="1200" dirty="0">
+                  <a:latin typeface="等线" panose="02010600030101010101" pitchFamily="2" charset="-122"/>
+                  <a:ea typeface="等线" panose="02010600030101010101" pitchFamily="2" charset="-122"/>
+                </a:rPr>
+                <a:t>}</a:t>
+              </a:r>
+              <a:endParaRPr kumimoji="1" lang="en-US" altLang="zh-CN" sz="1200" dirty="0">
+                <a:latin typeface="等线" panose="02010600030101010101" pitchFamily="2" charset="-122"/>
+                <a:ea typeface="等线" panose="02010600030101010101" pitchFamily="2" charset="-122"/>
+              </a:endParaRPr>
+            </a:p>
+            <a:p>
+              <a:r>
+                <a:rPr kumimoji="1" lang="en-US" altLang="zh-CN" sz="1200" b="1" dirty="0">
+                  <a:latin typeface="等线" panose="02010600030101010101" pitchFamily="2" charset="-122"/>
+                  <a:ea typeface="等线" panose="02010600030101010101" pitchFamily="2" charset="-122"/>
+                </a:rPr>
+                <a:t>edge3</a:t>
+              </a:r>
+              <a:r>
+                <a:rPr kumimoji="1" lang="en-US" altLang="zh-CN" sz="1200" dirty="0">
+                  <a:latin typeface="等线" panose="02010600030101010101" pitchFamily="2" charset="-122"/>
+                  <a:ea typeface="等线" panose="02010600030101010101" pitchFamily="2" charset="-122"/>
+                </a:rPr>
+                <a:t>.timestamp</a:t>
+              </a:r>
+              <a:r>
+                <a:rPr kumimoji="1" lang="zh-CN" altLang="en-US" sz="1200" dirty="0">
+                  <a:latin typeface="等线" panose="02010600030101010101" pitchFamily="2" charset="-122"/>
+                  <a:ea typeface="等线" panose="02010600030101010101" pitchFamily="2" charset="-122"/>
+                </a:rPr>
+                <a:t> </a:t>
+              </a:r>
+              <a:r>
+                <a:rPr kumimoji="1" lang="en-US" altLang="zh-CN" sz="1200" dirty="0">
+                  <a:latin typeface="等线" panose="02010600030101010101" pitchFamily="2" charset="-122"/>
+                  <a:ea typeface="等线" panose="02010600030101010101" pitchFamily="2" charset="-122"/>
+                </a:rPr>
+                <a:t>&lt;</a:t>
+              </a:r>
+              <a:r>
+                <a:rPr kumimoji="1" lang="zh-CN" altLang="en-US" sz="1200" dirty="0">
+                  <a:latin typeface="等线" panose="02010600030101010101" pitchFamily="2" charset="-122"/>
+                  <a:ea typeface="等线" panose="02010600030101010101" pitchFamily="2" charset="-122"/>
+                </a:rPr>
+                <a:t> </a:t>
+              </a:r>
+              <a:r>
+                <a:rPr kumimoji="1" lang="en-US" altLang="zh-CN" sz="1200" dirty="0">
+                  <a:latin typeface="等线" panose="02010600030101010101" pitchFamily="2" charset="-122"/>
+                  <a:ea typeface="等线" panose="02010600030101010101" pitchFamily="2" charset="-122"/>
+                </a:rPr>
+                <a:t>${</a:t>
+              </a:r>
+              <a:r>
+                <a:rPr kumimoji="1" lang="en-US" altLang="zh-CN" sz="1200" dirty="0" err="1">
+                  <a:latin typeface="等线" panose="02010600030101010101" pitchFamily="2" charset="-122"/>
+                  <a:ea typeface="等线" panose="02010600030101010101" pitchFamily="2" charset="-122"/>
+                </a:rPr>
+                <a:t>endTime</a:t>
+              </a:r>
+              <a:r>
+                <a:rPr kumimoji="1" lang="en-US" altLang="zh-CN" sz="1200" dirty="0">
+                  <a:latin typeface="等线" panose="02010600030101010101" pitchFamily="2" charset="-122"/>
+                  <a:ea typeface="等线" panose="02010600030101010101" pitchFamily="2" charset="-122"/>
+                </a:rPr>
+                <a:t>}</a:t>
+              </a:r>
+              <a:endParaRPr kumimoji="1" lang="en-US" altLang="zh-CN" sz="1200" dirty="0">
+                <a:latin typeface="等线" panose="02010600030101010101" pitchFamily="2" charset="-122"/>
+                <a:ea typeface="等线" panose="02010600030101010101" pitchFamily="2" charset="-122"/>
+              </a:endParaRPr>
+            </a:p>
+            <a:p>
+              <a:endParaRPr kumimoji="1" lang="en-US" altLang="zh-CN" sz="1200" dirty="0">
+                <a:latin typeface="等线" panose="02010600030101010101" pitchFamily="2" charset="-122"/>
+                <a:ea typeface="等线" panose="02010600030101010101" pitchFamily="2" charset="-122"/>
+              </a:endParaRPr>
+            </a:p>
+            <a:p>
+              <a:r>
+                <a:rPr kumimoji="1" lang="en-US" altLang="zh-CN" sz="1200" b="1" dirty="0">
+                  <a:latin typeface="等线" panose="02010600030101010101" pitchFamily="2" charset="-122"/>
+                  <a:ea typeface="等线" panose="02010600030101010101" pitchFamily="2" charset="-122"/>
+                </a:rPr>
+                <a:t>edge4:</a:t>
+              </a:r>
+              <a:r>
+                <a:rPr kumimoji="1" lang="zh-CN" altLang="en-US" sz="1200" b="1" dirty="0">
+                  <a:latin typeface="等线" panose="02010600030101010101" pitchFamily="2" charset="-122"/>
+                  <a:ea typeface="等线" panose="02010600030101010101" pitchFamily="2" charset="-122"/>
+                </a:rPr>
+                <a:t> </a:t>
+              </a:r>
+              <a:r>
+                <a:rPr kumimoji="1" lang="en-US" altLang="zh-CN" sz="1200" dirty="0">
+                  <a:latin typeface="等线" panose="02010600030101010101" pitchFamily="2" charset="-122"/>
+                  <a:ea typeface="等线" panose="02010600030101010101" pitchFamily="2" charset="-122"/>
+                </a:rPr>
+                <a:t>transfer</a:t>
+              </a:r>
+              <a:endParaRPr kumimoji="1" lang="en-US" altLang="zh-CN" sz="1200" dirty="0">
+                <a:latin typeface="等线" panose="02010600030101010101" pitchFamily="2" charset="-122"/>
+                <a:ea typeface="等线" panose="02010600030101010101" pitchFamily="2" charset="-122"/>
+              </a:endParaRPr>
+            </a:p>
+            <a:p>
+              <a:r>
+                <a:rPr kumimoji="1" lang="en-US" altLang="zh-CN" sz="1200" b="1" dirty="0">
+                  <a:latin typeface="等线" panose="02010600030101010101" pitchFamily="2" charset="-122"/>
+                  <a:ea typeface="等线" panose="02010600030101010101" pitchFamily="2" charset="-122"/>
+                </a:rPr>
+                <a:t>edge4</a:t>
+              </a:r>
+              <a:r>
+                <a:rPr kumimoji="1" lang="en-US" altLang="zh-CN" sz="1200" dirty="0">
+                  <a:latin typeface="等线" panose="02010600030101010101" pitchFamily="2" charset="-122"/>
+                  <a:ea typeface="等线" panose="02010600030101010101" pitchFamily="2" charset="-122"/>
+                </a:rPr>
+                <a:t>.amount</a:t>
+              </a:r>
+              <a:r>
+                <a:rPr kumimoji="1" lang="zh-CN" altLang="en-US" sz="1200" dirty="0">
+                  <a:latin typeface="等线" panose="02010600030101010101" pitchFamily="2" charset="-122"/>
+                  <a:ea typeface="等线" panose="02010600030101010101" pitchFamily="2" charset="-122"/>
+                </a:rPr>
+                <a:t> </a:t>
+              </a:r>
+              <a:r>
+                <a:rPr kumimoji="1" lang="en-US" altLang="zh-CN" sz="1200" dirty="0">
+                  <a:latin typeface="等线" panose="02010600030101010101" pitchFamily="2" charset="-122"/>
+                  <a:ea typeface="等线" panose="02010600030101010101" pitchFamily="2" charset="-122"/>
+                </a:rPr>
+                <a:t>&gt;</a:t>
+              </a:r>
+              <a:r>
+                <a:rPr kumimoji="1" lang="zh-CN" altLang="en-US" sz="1200" dirty="0">
+                  <a:latin typeface="等线" panose="02010600030101010101" pitchFamily="2" charset="-122"/>
+                  <a:ea typeface="等线" panose="02010600030101010101" pitchFamily="2" charset="-122"/>
+                </a:rPr>
+                <a:t> </a:t>
+              </a:r>
+              <a:r>
+                <a:rPr kumimoji="1" lang="en-US" altLang="zh-CN" sz="1200" dirty="0">
+                  <a:latin typeface="等线" panose="02010600030101010101" pitchFamily="2" charset="-122"/>
+                  <a:ea typeface="等线" panose="02010600030101010101" pitchFamily="2" charset="-122"/>
+                </a:rPr>
+                <a:t>${threshold}</a:t>
+              </a:r>
+              <a:endParaRPr kumimoji="1" lang="en-US" altLang="zh-CN" sz="1200" dirty="0">
+                <a:latin typeface="等线" panose="02010600030101010101" pitchFamily="2" charset="-122"/>
+                <a:ea typeface="等线" panose="02010600030101010101" pitchFamily="2" charset="-122"/>
+              </a:endParaRPr>
+            </a:p>
+            <a:p>
+              <a:r>
+                <a:rPr kumimoji="1" lang="en-US" altLang="zh-CN" sz="1200" b="1" dirty="0">
+                  <a:latin typeface="等线" panose="02010600030101010101" pitchFamily="2" charset="-122"/>
+                  <a:ea typeface="等线" panose="02010600030101010101" pitchFamily="2" charset="-122"/>
+                </a:rPr>
+                <a:t>edge4</a:t>
+              </a:r>
+              <a:r>
+                <a:rPr kumimoji="1" lang="en-US" altLang="zh-CN" sz="1200" dirty="0">
+                  <a:latin typeface="等线" panose="02010600030101010101" pitchFamily="2" charset="-122"/>
+                  <a:ea typeface="等线" panose="02010600030101010101" pitchFamily="2" charset="-122"/>
+                </a:rPr>
+                <a:t>.timestamp</a:t>
+              </a:r>
+              <a:r>
+                <a:rPr kumimoji="1" lang="zh-CN" altLang="en-US" sz="1200" dirty="0">
+                  <a:latin typeface="等线" panose="02010600030101010101" pitchFamily="2" charset="-122"/>
+                  <a:ea typeface="等线" panose="02010600030101010101" pitchFamily="2" charset="-122"/>
+                </a:rPr>
+                <a:t> </a:t>
+              </a:r>
+              <a:r>
+                <a:rPr kumimoji="1" lang="en-US" altLang="zh-CN" sz="1200" dirty="0">
+                  <a:latin typeface="等线" panose="02010600030101010101" pitchFamily="2" charset="-122"/>
+                  <a:ea typeface="等线" panose="02010600030101010101" pitchFamily="2" charset="-122"/>
+                </a:rPr>
+                <a:t>&gt;</a:t>
+              </a:r>
+              <a:r>
+                <a:rPr kumimoji="1" lang="zh-CN" altLang="en-US" sz="1200" dirty="0">
+                  <a:latin typeface="等线" panose="02010600030101010101" pitchFamily="2" charset="-122"/>
+                  <a:ea typeface="等线" panose="02010600030101010101" pitchFamily="2" charset="-122"/>
+                </a:rPr>
+                <a:t> </a:t>
+              </a:r>
+              <a:r>
+                <a:rPr kumimoji="1" lang="en-US" altLang="zh-CN" sz="1200" dirty="0">
+                  <a:latin typeface="等线" panose="02010600030101010101" pitchFamily="2" charset="-122"/>
+                  <a:ea typeface="等线" panose="02010600030101010101" pitchFamily="2" charset="-122"/>
+                </a:rPr>
+                <a:t>${</a:t>
+              </a:r>
+              <a:r>
+                <a:rPr kumimoji="1" lang="en-US" altLang="zh-CN" sz="1200" dirty="0" err="1">
+                  <a:latin typeface="等线" panose="02010600030101010101" pitchFamily="2" charset="-122"/>
+                  <a:ea typeface="等线" panose="02010600030101010101" pitchFamily="2" charset="-122"/>
+                </a:rPr>
+                <a:t>startTime</a:t>
+              </a:r>
+              <a:r>
+                <a:rPr kumimoji="1" lang="en-US" altLang="zh-CN" sz="1200" dirty="0">
+                  <a:latin typeface="等线" panose="02010600030101010101" pitchFamily="2" charset="-122"/>
+                  <a:ea typeface="等线" panose="02010600030101010101" pitchFamily="2" charset="-122"/>
+                </a:rPr>
+                <a:t>}</a:t>
+              </a:r>
+              <a:endParaRPr kumimoji="1" lang="en-US" altLang="zh-CN" sz="1200" dirty="0">
+                <a:latin typeface="等线" panose="02010600030101010101" pitchFamily="2" charset="-122"/>
+                <a:ea typeface="等线" panose="02010600030101010101" pitchFamily="2" charset="-122"/>
+              </a:endParaRPr>
+            </a:p>
+            <a:p>
+              <a:r>
+                <a:rPr kumimoji="1" lang="en-US" altLang="zh-CN" sz="1200" b="1" dirty="0">
+                  <a:latin typeface="等线" panose="02010600030101010101" pitchFamily="2" charset="-122"/>
+                  <a:ea typeface="等线" panose="02010600030101010101" pitchFamily="2" charset="-122"/>
+                </a:rPr>
+                <a:t>edge4</a:t>
+              </a:r>
+              <a:r>
+                <a:rPr kumimoji="1" lang="en-US" altLang="zh-CN" sz="1200" dirty="0">
+                  <a:latin typeface="等线" panose="02010600030101010101" pitchFamily="2" charset="-122"/>
+                  <a:ea typeface="等线" panose="02010600030101010101" pitchFamily="2" charset="-122"/>
+                </a:rPr>
+                <a:t>.timestamp</a:t>
+              </a:r>
+              <a:r>
+                <a:rPr kumimoji="1" lang="zh-CN" altLang="en-US" sz="1200" dirty="0">
+                  <a:latin typeface="等线" panose="02010600030101010101" pitchFamily="2" charset="-122"/>
+                  <a:ea typeface="等线" panose="02010600030101010101" pitchFamily="2" charset="-122"/>
+                </a:rPr>
+                <a:t> </a:t>
+              </a:r>
+              <a:r>
+                <a:rPr kumimoji="1" lang="en-US" altLang="zh-CN" sz="1200" dirty="0">
+                  <a:latin typeface="等线" panose="02010600030101010101" pitchFamily="2" charset="-122"/>
+                  <a:ea typeface="等线" panose="02010600030101010101" pitchFamily="2" charset="-122"/>
+                </a:rPr>
+                <a:t>&lt;</a:t>
+              </a:r>
+              <a:r>
+                <a:rPr kumimoji="1" lang="zh-CN" altLang="en-US" sz="1200" dirty="0">
+                  <a:latin typeface="等线" panose="02010600030101010101" pitchFamily="2" charset="-122"/>
+                  <a:ea typeface="等线" panose="02010600030101010101" pitchFamily="2" charset="-122"/>
+                </a:rPr>
+                <a:t> </a:t>
+              </a:r>
+              <a:r>
+                <a:rPr kumimoji="1" lang="en-US" altLang="zh-CN" sz="1200" dirty="0">
+                  <a:latin typeface="等线" panose="02010600030101010101" pitchFamily="2" charset="-122"/>
+                  <a:ea typeface="等线" panose="02010600030101010101" pitchFamily="2" charset="-122"/>
+                </a:rPr>
+                <a:t>${</a:t>
+              </a:r>
+              <a:r>
+                <a:rPr kumimoji="1" lang="en-US" altLang="zh-CN" sz="1200" dirty="0" err="1">
+                  <a:latin typeface="等线" panose="02010600030101010101" pitchFamily="2" charset="-122"/>
+                  <a:ea typeface="等线" panose="02010600030101010101" pitchFamily="2" charset="-122"/>
+                </a:rPr>
+                <a:t>endTime</a:t>
+              </a:r>
+              <a:r>
+                <a:rPr kumimoji="1" lang="en-US" altLang="zh-CN" sz="1200" dirty="0">
+                  <a:latin typeface="等线" panose="02010600030101010101" pitchFamily="2" charset="-122"/>
+                  <a:ea typeface="等线" panose="02010600030101010101" pitchFamily="2" charset="-122"/>
+                </a:rPr>
+                <a:t>}</a:t>
+              </a:r>
+              <a:endParaRPr kumimoji="1" lang="en-US" altLang="zh-CN" sz="1200" dirty="0">
+                <a:latin typeface="等线" panose="02010600030101010101" pitchFamily="2" charset="-122"/>
+                <a:ea typeface="等线" panose="02010600030101010101" pitchFamily="2" charset="-122"/>
+              </a:endParaRPr>
+            </a:p>
+          </p:txBody>
+        </p:sp>
+        <p:grpSp>
+          <p:nvGrpSpPr>
+            <p:cNvPr id="17" name="Group 16"/>
+            <p:cNvGrpSpPr/>
+            <p:nvPr/>
+          </p:nvGrpSpPr>
+          <p:grpSpPr>
+            <a:xfrm>
+              <a:off x="6779942" y="2876433"/>
+              <a:ext cx="1303067" cy="688048"/>
+              <a:chOff x="5724872" y="3310184"/>
+              <a:chExt cx="1303067" cy="688048"/>
+            </a:xfrm>
+          </p:grpSpPr>
+          <p:sp>
+            <p:nvSpPr>
+              <p:cNvPr id="25" name="矩形 9"/>
+              <p:cNvSpPr/>
+              <p:nvPr/>
+            </p:nvSpPr>
+            <p:spPr>
+              <a:xfrm>
+                <a:off x="5727700" y="3310184"/>
+                <a:ext cx="1300238" cy="351257"/>
+              </a:xfrm>
+              <a:prstGeom prst="rect">
+                <a:avLst/>
+              </a:prstGeom>
+              <a:solidFill>
+                <a:schemeClr val="accent5">
+                  <a:lumMod val="60000"/>
+                  <a:lumOff val="40000"/>
+                </a:schemeClr>
+              </a:solidFill>
+              <a:ln w="25400">
+                <a:solidFill>
+                  <a:schemeClr val="tx1"/>
+                </a:solidFill>
+              </a:ln>
+            </p:spPr>
+            <p:style>
+              <a:lnRef idx="2">
+                <a:schemeClr val="accent2">
+                  <a:shade val="50000"/>
+                </a:schemeClr>
+              </a:lnRef>
+              <a:fillRef idx="1">
+                <a:schemeClr val="accent2"/>
+              </a:fillRef>
+              <a:effectRef idx="0">
+                <a:schemeClr val="accent2"/>
+              </a:effectRef>
+              <a:fontRef idx="minor">
+                <a:schemeClr val="lt1"/>
+              </a:fontRef>
+            </p:style>
+            <p:txBody>
+              <a:bodyPr rtlCol="0" anchor="ctr"/>
+              <a:lstStyle/>
+              <a:p>
+                <a:pPr algn="ctr"/>
+                <a:r>
+                  <a:rPr kumimoji="1" lang="en-US" altLang="zh-CN" sz="1200" b="1" dirty="0">
+                    <a:solidFill>
+                      <a:sysClr val="windowText" lastClr="000000"/>
+                    </a:solidFill>
+                  </a:rPr>
+                  <a:t>mid</a:t>
+                </a:r>
+                <a:r>
+                  <a:rPr kumimoji="1" lang="zh-CN" altLang="en-US" sz="1200" dirty="0">
+                    <a:solidFill>
+                      <a:sysClr val="windowText" lastClr="000000"/>
+                    </a:solidFill>
+                  </a:rPr>
+                  <a:t> </a:t>
+                </a:r>
+                <a:r>
+                  <a:rPr kumimoji="1" lang="en-US" altLang="zh-CN" sz="1200" dirty="0">
+                    <a:solidFill>
+                      <a:sysClr val="windowText" lastClr="000000"/>
+                    </a:solidFill>
+                  </a:rPr>
+                  <a:t>:</a:t>
+                </a:r>
+                <a:r>
+                  <a:rPr kumimoji="1" lang="zh-CN" altLang="en-US" sz="1200" dirty="0">
+                    <a:solidFill>
+                      <a:sysClr val="windowText" lastClr="000000"/>
+                    </a:solidFill>
+                  </a:rPr>
+                  <a:t> </a:t>
+                </a:r>
+                <a:r>
+                  <a:rPr kumimoji="1" lang="en-US" altLang="zh-CN" sz="1200" dirty="0">
+                    <a:solidFill>
+                      <a:sysClr val="windowText" lastClr="000000"/>
+                    </a:solidFill>
+                  </a:rPr>
+                  <a:t>Account</a:t>
+                </a:r>
+                <a:endParaRPr kumimoji="1" lang="zh-CN" altLang="en-US" sz="1200" dirty="0">
+                  <a:solidFill>
+                    <a:sysClr val="windowText" lastClr="000000"/>
+                  </a:solidFill>
+                </a:endParaRPr>
+              </a:p>
+            </p:txBody>
+          </p:sp>
+          <p:sp>
+            <p:nvSpPr>
+              <p:cNvPr id="12" name="矩形 10"/>
+              <p:cNvSpPr/>
+              <p:nvPr/>
+            </p:nvSpPr>
+            <p:spPr>
+              <a:xfrm>
+                <a:off x="5724872" y="3665667"/>
+                <a:ext cx="1303067" cy="332565"/>
+              </a:xfrm>
+              <a:prstGeom prst="rect">
+                <a:avLst/>
+              </a:prstGeom>
+              <a:noFill/>
+              <a:ln w="25400">
+                <a:solidFill>
+                  <a:schemeClr val="tx1"/>
+                </a:solidFill>
+              </a:ln>
+            </p:spPr>
+            <p:style>
+              <a:lnRef idx="2">
+                <a:schemeClr val="accent2">
+                  <a:shade val="50000"/>
+                </a:schemeClr>
+              </a:lnRef>
+              <a:fillRef idx="1">
+                <a:schemeClr val="accent2"/>
+              </a:fillRef>
+              <a:effectRef idx="0">
+                <a:schemeClr val="accent2"/>
+              </a:effectRef>
+              <a:fontRef idx="minor">
+                <a:schemeClr val="lt1"/>
+              </a:fontRef>
+            </p:style>
+            <p:txBody>
+              <a:bodyPr rtlCol="0" anchor="ctr"/>
+              <a:lstStyle/>
+              <a:p>
+                <a:pPr algn="ctr"/>
+                <a:r>
+                  <a:rPr kumimoji="1" lang="en-US" altLang="zh-CN" sz="1200" b="1" dirty="0" err="1">
+                    <a:solidFill>
+                      <a:sysClr val="windowText" lastClr="000000"/>
+                    </a:solidFill>
+                  </a:rPr>
+                  <a:t>mid</a:t>
+                </a:r>
+                <a:r>
+                  <a:rPr kumimoji="1" lang="en-US" altLang="zh-CN" sz="1200" dirty="0" err="1">
+                    <a:solidFill>
+                      <a:sysClr val="windowText" lastClr="000000"/>
+                    </a:solidFill>
+                    <a:latin typeface="等线" panose="02010600030101010101" pitchFamily="2" charset="-122"/>
+                    <a:ea typeface="等线" panose="02010600030101010101" pitchFamily="2" charset="-122"/>
+                  </a:rPr>
+                  <a:t>.id</a:t>
+                </a:r>
+                <a:r>
+                  <a:rPr kumimoji="1" lang="zh-CN" altLang="en-US" sz="1200" dirty="0">
+                    <a:solidFill>
+                      <a:sysClr val="windowText" lastClr="000000"/>
+                    </a:solidFill>
+                    <a:latin typeface="等线" panose="02010600030101010101" pitchFamily="2" charset="-122"/>
+                    <a:ea typeface="等线" panose="02010600030101010101" pitchFamily="2" charset="-122"/>
+                  </a:rPr>
+                  <a:t> </a:t>
+                </a:r>
+                <a:r>
+                  <a:rPr kumimoji="1" lang="en-US" altLang="zh-CN" sz="1200" dirty="0">
+                    <a:solidFill>
+                      <a:sysClr val="windowText" lastClr="000000"/>
+                    </a:solidFill>
+                    <a:latin typeface="等线" panose="02010600030101010101" pitchFamily="2" charset="-122"/>
+                    <a:ea typeface="等线" panose="02010600030101010101" pitchFamily="2" charset="-122"/>
+                  </a:rPr>
+                  <a:t>=</a:t>
+                </a:r>
+                <a:r>
+                  <a:rPr kumimoji="1" lang="zh-CN" altLang="en-US" sz="1200" dirty="0">
+                    <a:solidFill>
+                      <a:sysClr val="windowText" lastClr="000000"/>
+                    </a:solidFill>
+                    <a:latin typeface="等线" panose="02010600030101010101" pitchFamily="2" charset="-122"/>
+                    <a:ea typeface="等线" panose="02010600030101010101" pitchFamily="2" charset="-122"/>
+                  </a:rPr>
+                  <a:t> </a:t>
+                </a:r>
+                <a:r>
+                  <a:rPr kumimoji="1" lang="en-US" altLang="zh-CN" sz="1200" dirty="0">
+                    <a:solidFill>
+                      <a:sysClr val="windowText" lastClr="000000"/>
+                    </a:solidFill>
+                    <a:latin typeface="等线" panose="02010600030101010101" pitchFamily="2" charset="-122"/>
+                    <a:ea typeface="等线" panose="02010600030101010101" pitchFamily="2" charset="-122"/>
+                  </a:rPr>
+                  <a:t>${id}</a:t>
+                </a:r>
+                <a:endParaRPr kumimoji="1" lang="zh-CN" altLang="en-US" sz="1200" dirty="0">
+                  <a:solidFill>
+                    <a:sysClr val="windowText" lastClr="000000"/>
+                  </a:solidFill>
+                  <a:latin typeface="等线" panose="02010600030101010101" pitchFamily="2" charset="-122"/>
+                  <a:ea typeface="等线" panose="02010600030101010101" pitchFamily="2" charset="-122"/>
+                </a:endParaRPr>
+              </a:p>
+            </p:txBody>
+          </p:sp>
+        </p:grpSp>
+        <p:sp>
+          <p:nvSpPr>
+            <p:cNvPr id="21" name="矩形 14"/>
+            <p:cNvSpPr/>
+            <p:nvPr/>
+          </p:nvSpPr>
+          <p:spPr>
+            <a:xfrm>
+              <a:off x="9338606" y="1257377"/>
+              <a:ext cx="1176993" cy="505147"/>
+            </a:xfrm>
+            <a:prstGeom prst="rect">
+              <a:avLst/>
+            </a:prstGeom>
+            <a:solidFill>
+              <a:schemeClr val="accent5">
+                <a:lumMod val="60000"/>
+                <a:lumOff val="40000"/>
+              </a:schemeClr>
+            </a:solidFill>
+            <a:ln w="25400">
+              <a:solidFill>
+                <a:schemeClr val="tx1"/>
+              </a:solidFill>
+            </a:ln>
+          </p:spPr>
+          <p:style>
+            <a:lnRef idx="2">
+              <a:schemeClr val="accent2">
+                <a:shade val="50000"/>
+              </a:schemeClr>
+            </a:lnRef>
+            <a:fillRef idx="1">
+              <a:schemeClr val="accent2"/>
+            </a:fillRef>
+            <a:effectRef idx="0">
+              <a:schemeClr val="accent2"/>
+            </a:effectRef>
+            <a:fontRef idx="minor">
+              <a:schemeClr val="lt1"/>
+            </a:fontRef>
+          </p:style>
+          <p:txBody>
+            <a:bodyPr rtlCol="0" anchor="ctr"/>
+            <a:lstStyle/>
+            <a:p>
+              <a:pPr algn="ctr"/>
+              <a:r>
+                <a:rPr kumimoji="1" lang="en-US" altLang="zh-CN" sz="1200" b="1" dirty="0">
+                  <a:solidFill>
+                    <a:sysClr val="windowText" lastClr="000000"/>
+                  </a:solidFill>
+                </a:rPr>
+                <a:t>up3</a:t>
+              </a:r>
+              <a:r>
+                <a:rPr kumimoji="1" lang="zh-CN" altLang="en-US" sz="1200" dirty="0">
+                  <a:solidFill>
+                    <a:sysClr val="windowText" lastClr="000000"/>
+                  </a:solidFill>
+                </a:rPr>
+                <a:t> </a:t>
+              </a:r>
+              <a:r>
+                <a:rPr kumimoji="1" lang="en-US" altLang="zh-CN" sz="1200" dirty="0">
+                  <a:solidFill>
+                    <a:sysClr val="windowText" lastClr="000000"/>
+                  </a:solidFill>
+                </a:rPr>
+                <a:t>:</a:t>
+              </a:r>
+              <a:r>
+                <a:rPr kumimoji="1" lang="zh-CN" altLang="en-US" sz="1200" dirty="0">
+                  <a:solidFill>
+                    <a:sysClr val="windowText" lastClr="000000"/>
+                  </a:solidFill>
+                </a:rPr>
+                <a:t> </a:t>
+              </a:r>
+              <a:r>
+                <a:rPr kumimoji="1" lang="en-US" altLang="zh-CN" sz="1200" dirty="0">
+                  <a:solidFill>
+                    <a:sysClr val="windowText" lastClr="000000"/>
+                  </a:solidFill>
+                </a:rPr>
+                <a:t>Account</a:t>
+              </a:r>
+              <a:endParaRPr kumimoji="1" lang="zh-CN" altLang="en-US" sz="1200" dirty="0">
+                <a:solidFill>
+                  <a:sysClr val="windowText" lastClr="000000"/>
+                </a:solidFill>
+              </a:endParaRPr>
+            </a:p>
+          </p:txBody>
+        </p:sp>
+        <p:sp>
+          <p:nvSpPr>
+            <p:cNvPr id="22" name="矩形 14"/>
+            <p:cNvSpPr/>
+            <p:nvPr/>
+          </p:nvSpPr>
+          <p:spPr>
+            <a:xfrm>
+              <a:off x="4087066" y="1257377"/>
+              <a:ext cx="1176993" cy="505147"/>
+            </a:xfrm>
+            <a:prstGeom prst="rect">
+              <a:avLst/>
+            </a:prstGeom>
+            <a:solidFill>
+              <a:schemeClr val="accent5">
+                <a:lumMod val="60000"/>
+                <a:lumOff val="40000"/>
+              </a:schemeClr>
+            </a:solidFill>
+            <a:ln w="25400">
+              <a:solidFill>
+                <a:schemeClr val="tx1"/>
+              </a:solidFill>
+            </a:ln>
+          </p:spPr>
+          <p:style>
+            <a:lnRef idx="2">
+              <a:schemeClr val="accent2">
+                <a:shade val="50000"/>
+              </a:schemeClr>
+            </a:lnRef>
+            <a:fillRef idx="1">
+              <a:schemeClr val="accent2"/>
+            </a:fillRef>
+            <a:effectRef idx="0">
+              <a:schemeClr val="accent2"/>
+            </a:effectRef>
+            <a:fontRef idx="minor">
+              <a:schemeClr val="lt1"/>
+            </a:fontRef>
+          </p:style>
+          <p:txBody>
+            <a:bodyPr rtlCol="0" anchor="ctr"/>
+            <a:lstStyle/>
+            <a:p>
+              <a:pPr algn="ctr"/>
+              <a:r>
+                <a:rPr kumimoji="1" lang="en-US" altLang="zh-CN" sz="1200" b="1" dirty="0">
+                  <a:solidFill>
+                    <a:sysClr val="windowText" lastClr="000000"/>
+                  </a:solidFill>
+                </a:rPr>
+                <a:t>up1</a:t>
+              </a:r>
+              <a:r>
+                <a:rPr kumimoji="1" lang="zh-CN" altLang="en-US" sz="1200" dirty="0">
+                  <a:solidFill>
+                    <a:sysClr val="windowText" lastClr="000000"/>
+                  </a:solidFill>
+                </a:rPr>
+                <a:t> </a:t>
+              </a:r>
+              <a:r>
+                <a:rPr kumimoji="1" lang="en-US" altLang="zh-CN" sz="1200" dirty="0">
+                  <a:solidFill>
+                    <a:sysClr val="windowText" lastClr="000000"/>
+                  </a:solidFill>
+                </a:rPr>
+                <a:t>:</a:t>
+              </a:r>
+              <a:r>
+                <a:rPr kumimoji="1" lang="zh-CN" altLang="en-US" sz="1200" dirty="0">
+                  <a:solidFill>
+                    <a:sysClr val="windowText" lastClr="000000"/>
+                  </a:solidFill>
+                </a:rPr>
+                <a:t> </a:t>
+              </a:r>
+              <a:r>
+                <a:rPr kumimoji="1" lang="en-US" altLang="zh-CN" sz="1200" dirty="0">
+                  <a:solidFill>
+                    <a:sysClr val="windowText" lastClr="000000"/>
+                  </a:solidFill>
+                </a:rPr>
+                <a:t>Account</a:t>
+              </a:r>
+              <a:endParaRPr kumimoji="1" lang="zh-CN" altLang="en-US" sz="1200" dirty="0">
+                <a:solidFill>
+                  <a:sysClr val="windowText" lastClr="000000"/>
+                </a:solidFill>
+              </a:endParaRPr>
+            </a:p>
+          </p:txBody>
+        </p:sp>
+        <p:cxnSp>
+          <p:nvCxnSpPr>
+            <p:cNvPr id="24" name="直线箭头连接符 11" descr="jytjh"/>
+            <p:cNvCxnSpPr>
+              <a:stCxn id="22" idx="2"/>
+              <a:endCxn id="25" idx="0"/>
+            </p:cNvCxnSpPr>
+            <p:nvPr/>
+          </p:nvCxnSpPr>
+          <p:spPr>
+            <a:xfrm>
+              <a:off x="4675563" y="1762524"/>
+              <a:ext cx="2757326" cy="1113909"/>
+            </a:xfrm>
+            <a:prstGeom prst="straightConnector1">
+              <a:avLst/>
+            </a:prstGeom>
+            <a:ln w="19050">
+              <a:solidFill>
+                <a:schemeClr val="tx1"/>
+              </a:solidFill>
+              <a:headEnd type="none" w="lg" len="med"/>
+              <a:tailEnd type="arrow" w="sm" len="lg"/>
+            </a:ln>
+          </p:spPr>
+          <p:style>
+            <a:lnRef idx="1">
+              <a:schemeClr val="accent1"/>
+            </a:lnRef>
+            <a:fillRef idx="0">
+              <a:schemeClr val="accent1"/>
+            </a:fillRef>
+            <a:effectRef idx="0">
+              <a:schemeClr val="accent1"/>
+            </a:effectRef>
+            <a:fontRef idx="minor">
+              <a:schemeClr val="tx1"/>
+            </a:fontRef>
+          </p:style>
+        </p:cxnSp>
+        <p:cxnSp>
+          <p:nvCxnSpPr>
+            <p:cNvPr id="29" name="直线箭头连接符 11" descr="jytjh"/>
+            <p:cNvCxnSpPr>
+              <a:stCxn id="21" idx="2"/>
+              <a:endCxn id="25" idx="0"/>
+            </p:cNvCxnSpPr>
+            <p:nvPr/>
+          </p:nvCxnSpPr>
+          <p:spPr>
+            <a:xfrm flipH="1">
+              <a:off x="7432889" y="1762524"/>
+              <a:ext cx="2494214" cy="1113909"/>
+            </a:xfrm>
+            <a:prstGeom prst="straightConnector1">
+              <a:avLst/>
+            </a:prstGeom>
+            <a:ln w="19050">
+              <a:solidFill>
+                <a:schemeClr val="tx1"/>
+              </a:solidFill>
+              <a:headEnd type="none" w="lg" len="med"/>
+              <a:tailEnd type="arrow" w="sm" len="lg"/>
+            </a:ln>
+          </p:spPr>
+          <p:style>
+            <a:lnRef idx="1">
+              <a:schemeClr val="accent1"/>
+            </a:lnRef>
+            <a:fillRef idx="0">
+              <a:schemeClr val="accent1"/>
+            </a:fillRef>
+            <a:effectRef idx="0">
+              <a:schemeClr val="accent1"/>
+            </a:effectRef>
+            <a:fontRef idx="minor">
+              <a:schemeClr val="tx1"/>
+            </a:fontRef>
+          </p:style>
+        </p:cxnSp>
+        <p:sp>
+          <p:nvSpPr>
+            <p:cNvPr id="37" name="矩形 14"/>
+            <p:cNvSpPr/>
+            <p:nvPr/>
+          </p:nvSpPr>
+          <p:spPr>
+            <a:xfrm>
+              <a:off x="7616194" y="1257377"/>
+              <a:ext cx="1081249" cy="505147"/>
+            </a:xfrm>
+            <a:prstGeom prst="rect">
+              <a:avLst/>
+            </a:prstGeom>
+            <a:noFill/>
+            <a:ln w="25400">
+              <a:noFill/>
+            </a:ln>
+          </p:spPr>
+          <p:style>
+            <a:lnRef idx="2">
+              <a:schemeClr val="accent2">
+                <a:shade val="50000"/>
+              </a:schemeClr>
+            </a:lnRef>
+            <a:fillRef idx="1">
+              <a:schemeClr val="accent2"/>
+            </a:fillRef>
+            <a:effectRef idx="0">
+              <a:schemeClr val="accent2"/>
+            </a:effectRef>
+            <a:fontRef idx="minor">
+              <a:schemeClr val="lt1"/>
+            </a:fontRef>
+          </p:style>
+          <p:txBody>
+            <a:bodyPr rtlCol="0" anchor="ctr"/>
+            <a:lstStyle/>
+            <a:p>
+              <a:pPr algn="ctr"/>
+              <a:r>
+                <a:rPr kumimoji="1" lang="en-US" altLang="zh-CN" sz="1400" b="1" dirty="0">
+                  <a:solidFill>
+                    <a:sysClr val="windowText" lastClr="000000"/>
+                  </a:solidFill>
+                </a:rPr>
+                <a:t>…</a:t>
+              </a:r>
+              <a:endParaRPr kumimoji="1" lang="zh-CN" altLang="en-US" sz="1400" dirty="0">
+                <a:solidFill>
+                  <a:sysClr val="windowText" lastClr="000000"/>
+                </a:solidFill>
+              </a:endParaRPr>
+            </a:p>
+          </p:txBody>
+        </p:sp>
+        <p:cxnSp>
+          <p:nvCxnSpPr>
+            <p:cNvPr id="41" name="直线箭头连接符 11" descr="jytjh"/>
+            <p:cNvCxnSpPr>
+              <a:stCxn id="37" idx="2"/>
+              <a:endCxn id="25" idx="0"/>
+            </p:cNvCxnSpPr>
+            <p:nvPr/>
+          </p:nvCxnSpPr>
+          <p:spPr>
+            <a:xfrm flipH="1">
+              <a:off x="7432889" y="1762524"/>
+              <a:ext cx="723930" cy="1113909"/>
+            </a:xfrm>
+            <a:prstGeom prst="straightConnector1">
+              <a:avLst/>
+            </a:prstGeom>
+            <a:ln w="19050">
+              <a:solidFill>
+                <a:schemeClr val="tx1"/>
+              </a:solidFill>
+              <a:headEnd type="none" w="lg" len="med"/>
+              <a:tailEnd type="arrow" w="sm" len="lg"/>
+            </a:ln>
+          </p:spPr>
+          <p:style>
+            <a:lnRef idx="1">
+              <a:schemeClr val="accent1"/>
+            </a:lnRef>
+            <a:fillRef idx="0">
+              <a:schemeClr val="accent1"/>
+            </a:fillRef>
+            <a:effectRef idx="0">
+              <a:schemeClr val="accent1"/>
+            </a:effectRef>
+            <a:fontRef idx="minor">
+              <a:schemeClr val="tx1"/>
+            </a:fontRef>
+          </p:style>
+        </p:cxnSp>
+        <p:sp>
+          <p:nvSpPr>
+            <p:cNvPr id="52" name="矩形 14"/>
+            <p:cNvSpPr/>
+            <p:nvPr/>
+          </p:nvSpPr>
+          <p:spPr>
+            <a:xfrm>
+              <a:off x="4095168" y="4609374"/>
+              <a:ext cx="1381173" cy="505147"/>
+            </a:xfrm>
+            <a:prstGeom prst="rect">
+              <a:avLst/>
+            </a:prstGeom>
+            <a:solidFill>
+              <a:schemeClr val="accent5">
+                <a:lumMod val="60000"/>
+                <a:lumOff val="40000"/>
+              </a:schemeClr>
+            </a:solidFill>
+            <a:ln w="25400">
+              <a:solidFill>
+                <a:schemeClr val="tx1"/>
+              </a:solidFill>
+            </a:ln>
+          </p:spPr>
+          <p:style>
+            <a:lnRef idx="2">
+              <a:schemeClr val="accent2">
+                <a:shade val="50000"/>
+              </a:schemeClr>
+            </a:lnRef>
+            <a:fillRef idx="1">
+              <a:schemeClr val="accent2"/>
+            </a:fillRef>
+            <a:effectRef idx="0">
+              <a:schemeClr val="accent2"/>
+            </a:effectRef>
+            <a:fontRef idx="minor">
+              <a:schemeClr val="lt1"/>
+            </a:fontRef>
+          </p:style>
+          <p:txBody>
+            <a:bodyPr rtlCol="0" anchor="ctr"/>
+            <a:lstStyle/>
+            <a:p>
+              <a:pPr algn="ctr"/>
+              <a:r>
+                <a:rPr kumimoji="1" lang="en-US" altLang="zh-CN" sz="1200" b="1" dirty="0">
+                  <a:solidFill>
+                    <a:sysClr val="windowText" lastClr="000000"/>
+                  </a:solidFill>
+                </a:rPr>
+                <a:t>down1</a:t>
+              </a:r>
+              <a:r>
+                <a:rPr kumimoji="1" lang="zh-CN" altLang="en-US" sz="1200" dirty="0">
+                  <a:solidFill>
+                    <a:sysClr val="windowText" lastClr="000000"/>
+                  </a:solidFill>
+                </a:rPr>
+                <a:t> </a:t>
+              </a:r>
+              <a:r>
+                <a:rPr kumimoji="1" lang="en-US" altLang="zh-CN" sz="1200" dirty="0">
+                  <a:solidFill>
+                    <a:sysClr val="windowText" lastClr="000000"/>
+                  </a:solidFill>
+                </a:rPr>
+                <a:t>:</a:t>
+              </a:r>
+              <a:r>
+                <a:rPr kumimoji="1" lang="zh-CN" altLang="en-US" sz="1200" dirty="0">
+                  <a:solidFill>
+                    <a:sysClr val="windowText" lastClr="000000"/>
+                  </a:solidFill>
+                </a:rPr>
+                <a:t> </a:t>
+              </a:r>
+              <a:r>
+                <a:rPr kumimoji="1" lang="en-US" altLang="zh-CN" sz="1200" dirty="0">
+                  <a:solidFill>
+                    <a:sysClr val="windowText" lastClr="000000"/>
+                  </a:solidFill>
+                </a:rPr>
+                <a:t>Account</a:t>
+              </a:r>
+              <a:endParaRPr kumimoji="1" lang="zh-CN" altLang="en-US" sz="1200" dirty="0">
+                <a:solidFill>
+                  <a:sysClr val="windowText" lastClr="000000"/>
+                </a:solidFill>
+              </a:endParaRPr>
+            </a:p>
+          </p:txBody>
+        </p:sp>
+        <p:sp>
+          <p:nvSpPr>
+            <p:cNvPr id="53" name="矩形 14"/>
+            <p:cNvSpPr/>
+            <p:nvPr/>
+          </p:nvSpPr>
+          <p:spPr>
+            <a:xfrm>
+              <a:off x="9151034" y="4605726"/>
+              <a:ext cx="1381173" cy="505147"/>
+            </a:xfrm>
+            <a:prstGeom prst="rect">
+              <a:avLst/>
+            </a:prstGeom>
+            <a:solidFill>
+              <a:schemeClr val="accent5">
+                <a:lumMod val="60000"/>
+                <a:lumOff val="40000"/>
+              </a:schemeClr>
+            </a:solidFill>
+            <a:ln w="25400">
+              <a:solidFill>
+                <a:schemeClr val="tx1"/>
+              </a:solidFill>
+            </a:ln>
+          </p:spPr>
+          <p:style>
+            <a:lnRef idx="2">
+              <a:schemeClr val="accent2">
+                <a:shade val="50000"/>
+              </a:schemeClr>
+            </a:lnRef>
+            <a:fillRef idx="1">
+              <a:schemeClr val="accent2"/>
+            </a:fillRef>
+            <a:effectRef idx="0">
+              <a:schemeClr val="accent2"/>
+            </a:effectRef>
+            <a:fontRef idx="minor">
+              <a:schemeClr val="lt1"/>
+            </a:fontRef>
+          </p:style>
+          <p:txBody>
+            <a:bodyPr rtlCol="0" anchor="ctr"/>
+            <a:lstStyle/>
+            <a:p>
+              <a:pPr algn="ctr"/>
+              <a:r>
+                <a:rPr kumimoji="1" lang="en-US" altLang="zh-CN" sz="1200" b="1" dirty="0">
+                  <a:solidFill>
+                    <a:sysClr val="windowText" lastClr="000000"/>
+                  </a:solidFill>
+                </a:rPr>
+                <a:t>down3</a:t>
+              </a:r>
+              <a:r>
+                <a:rPr kumimoji="1" lang="zh-CN" altLang="en-US" sz="1200" dirty="0">
+                  <a:solidFill>
+                    <a:sysClr val="windowText" lastClr="000000"/>
+                  </a:solidFill>
+                </a:rPr>
+                <a:t> </a:t>
+              </a:r>
+              <a:r>
+                <a:rPr kumimoji="1" lang="en-US" altLang="zh-CN" sz="1200" dirty="0">
+                  <a:solidFill>
+                    <a:sysClr val="windowText" lastClr="000000"/>
+                  </a:solidFill>
+                </a:rPr>
+                <a:t>:</a:t>
+              </a:r>
+              <a:r>
+                <a:rPr kumimoji="1" lang="zh-CN" altLang="en-US" sz="1200" dirty="0">
+                  <a:solidFill>
+                    <a:sysClr val="windowText" lastClr="000000"/>
+                  </a:solidFill>
+                </a:rPr>
+                <a:t> </a:t>
+              </a:r>
+              <a:r>
+                <a:rPr kumimoji="1" lang="en-US" altLang="zh-CN" sz="1200" dirty="0">
+                  <a:solidFill>
+                    <a:sysClr val="windowText" lastClr="000000"/>
+                  </a:solidFill>
+                </a:rPr>
+                <a:t>Account</a:t>
+              </a:r>
+              <a:endParaRPr kumimoji="1" lang="zh-CN" altLang="en-US" sz="1200" dirty="0">
+                <a:solidFill>
+                  <a:sysClr val="windowText" lastClr="000000"/>
+                </a:solidFill>
+              </a:endParaRPr>
+            </a:p>
+          </p:txBody>
+        </p:sp>
+        <p:sp>
+          <p:nvSpPr>
+            <p:cNvPr id="55" name="矩形 14"/>
+            <p:cNvSpPr/>
+            <p:nvPr/>
+          </p:nvSpPr>
+          <p:spPr>
+            <a:xfrm>
+              <a:off x="7491148" y="4605725"/>
+              <a:ext cx="1268820" cy="505147"/>
+            </a:xfrm>
+            <a:prstGeom prst="rect">
+              <a:avLst/>
+            </a:prstGeom>
+            <a:noFill/>
+            <a:ln w="25400">
+              <a:noFill/>
+            </a:ln>
+          </p:spPr>
+          <p:style>
+            <a:lnRef idx="2">
+              <a:schemeClr val="accent2">
+                <a:shade val="50000"/>
+              </a:schemeClr>
+            </a:lnRef>
+            <a:fillRef idx="1">
+              <a:schemeClr val="accent2"/>
+            </a:fillRef>
+            <a:effectRef idx="0">
+              <a:schemeClr val="accent2"/>
+            </a:effectRef>
+            <a:fontRef idx="minor">
+              <a:schemeClr val="lt1"/>
+            </a:fontRef>
+          </p:style>
+          <p:txBody>
+            <a:bodyPr rtlCol="0" anchor="ctr"/>
+            <a:lstStyle/>
+            <a:p>
+              <a:pPr algn="ctr"/>
+              <a:r>
+                <a:rPr kumimoji="1" lang="en-US" altLang="zh-CN" sz="1600" b="1" dirty="0">
+                  <a:solidFill>
+                    <a:sysClr val="windowText" lastClr="000000"/>
+                  </a:solidFill>
+                </a:rPr>
+                <a:t>…</a:t>
+              </a:r>
+              <a:endParaRPr kumimoji="1" lang="zh-CN" altLang="en-US" sz="1600" dirty="0">
+                <a:solidFill>
+                  <a:sysClr val="windowText" lastClr="000000"/>
+                </a:solidFill>
+              </a:endParaRPr>
+            </a:p>
+          </p:txBody>
+        </p:sp>
+        <p:cxnSp>
+          <p:nvCxnSpPr>
+            <p:cNvPr id="57" name="直线箭头连接符 11" descr="jytjh"/>
+            <p:cNvCxnSpPr>
+              <a:stCxn id="12" idx="2"/>
+              <a:endCxn id="52" idx="0"/>
+            </p:cNvCxnSpPr>
+            <p:nvPr/>
+          </p:nvCxnSpPr>
+          <p:spPr>
+            <a:xfrm flipH="1">
+              <a:off x="4785755" y="3564481"/>
+              <a:ext cx="2645721" cy="1044893"/>
+            </a:xfrm>
+            <a:prstGeom prst="straightConnector1">
+              <a:avLst/>
+            </a:prstGeom>
+            <a:ln w="19050">
+              <a:solidFill>
+                <a:schemeClr val="tx1"/>
+              </a:solidFill>
+              <a:headEnd type="none" w="lg" len="med"/>
+              <a:tailEnd type="arrow" w="sm" len="lg"/>
+            </a:ln>
+          </p:spPr>
+          <p:style>
+            <a:lnRef idx="1">
+              <a:schemeClr val="accent1"/>
+            </a:lnRef>
+            <a:fillRef idx="0">
+              <a:schemeClr val="accent1"/>
+            </a:fillRef>
+            <a:effectRef idx="0">
+              <a:schemeClr val="accent1"/>
+            </a:effectRef>
+            <a:fontRef idx="minor">
+              <a:schemeClr val="tx1"/>
+            </a:fontRef>
+          </p:style>
+        </p:cxnSp>
+        <p:cxnSp>
+          <p:nvCxnSpPr>
+            <p:cNvPr id="61" name="直线箭头连接符 11" descr="jytjh"/>
+            <p:cNvCxnSpPr>
+              <a:stCxn id="12" idx="2"/>
+              <a:endCxn id="55" idx="0"/>
+            </p:cNvCxnSpPr>
+            <p:nvPr/>
+          </p:nvCxnSpPr>
+          <p:spPr>
+            <a:xfrm>
+              <a:off x="7431476" y="3564481"/>
+              <a:ext cx="694082" cy="1041244"/>
+            </a:xfrm>
+            <a:prstGeom prst="straightConnector1">
+              <a:avLst/>
+            </a:prstGeom>
+            <a:ln w="19050">
+              <a:solidFill>
+                <a:schemeClr val="tx1"/>
+              </a:solidFill>
+              <a:headEnd type="none" w="lg" len="med"/>
+              <a:tailEnd type="arrow" w="sm" len="lg"/>
+            </a:ln>
+          </p:spPr>
+          <p:style>
+            <a:lnRef idx="1">
+              <a:schemeClr val="accent1"/>
+            </a:lnRef>
+            <a:fillRef idx="0">
+              <a:schemeClr val="accent1"/>
+            </a:fillRef>
+            <a:effectRef idx="0">
+              <a:schemeClr val="accent1"/>
+            </a:effectRef>
+            <a:fontRef idx="minor">
+              <a:schemeClr val="tx1"/>
+            </a:fontRef>
+          </p:style>
+        </p:cxnSp>
+        <p:cxnSp>
+          <p:nvCxnSpPr>
+            <p:cNvPr id="64" name="直线箭头连接符 11" descr="jytjh"/>
+            <p:cNvCxnSpPr>
+              <a:stCxn id="12" idx="2"/>
+              <a:endCxn id="53" idx="0"/>
+            </p:cNvCxnSpPr>
+            <p:nvPr/>
+          </p:nvCxnSpPr>
+          <p:spPr>
+            <a:xfrm>
+              <a:off x="7431476" y="3564481"/>
+              <a:ext cx="2410145" cy="1041245"/>
+            </a:xfrm>
+            <a:prstGeom prst="straightConnector1">
+              <a:avLst/>
+            </a:prstGeom>
+            <a:ln w="19050">
+              <a:solidFill>
+                <a:schemeClr val="tx1"/>
+              </a:solidFill>
+              <a:headEnd type="none" w="lg" len="med"/>
+              <a:tailEnd type="arrow" w="sm" len="lg"/>
+            </a:ln>
+          </p:spPr>
+          <p:style>
+            <a:lnRef idx="1">
+              <a:schemeClr val="accent1"/>
+            </a:lnRef>
+            <a:fillRef idx="0">
+              <a:schemeClr val="accent1"/>
+            </a:fillRef>
+            <a:effectRef idx="0">
+              <a:schemeClr val="accent1"/>
+            </a:effectRef>
+            <a:fontRef idx="minor">
+              <a:schemeClr val="tx1"/>
+            </a:fontRef>
+          </p:style>
+        </p:cxnSp>
       </p:grpSp>
-      <p:sp>
-        <p:nvSpPr>
-          <p:cNvPr id="21" name="矩形 14"/>
-          <p:cNvSpPr/>
-          <p:nvPr/>
-        </p:nvSpPr>
-        <p:spPr>
-          <a:xfrm>
-            <a:off x="9338606" y="1257377"/>
-            <a:ext cx="1176993" cy="505147"/>
-          </a:xfrm>
-          <a:prstGeom prst="rect">
-            <a:avLst/>
-          </a:prstGeom>
-          <a:solidFill>
-            <a:schemeClr val="accent5">
-              <a:lumMod val="60000"/>
-              <a:lumOff val="40000"/>
-            </a:schemeClr>
-          </a:solidFill>
-          <a:ln w="25400">
-            <a:solidFill>
-              <a:schemeClr val="tx1"/>
-            </a:solidFill>
-          </a:ln>
-        </p:spPr>
-        <p:style>
-          <a:lnRef idx="2">
-            <a:schemeClr val="accent2">
-              <a:shade val="50000"/>
-            </a:schemeClr>
-          </a:lnRef>
-          <a:fillRef idx="1">
-            <a:schemeClr val="accent2"/>
-          </a:fillRef>
-          <a:effectRef idx="0">
-            <a:schemeClr val="accent2"/>
-          </a:effectRef>
-          <a:fontRef idx="minor">
-            <a:schemeClr val="lt1"/>
-          </a:fontRef>
-        </p:style>
-        <p:txBody>
-          <a:bodyPr rtlCol="0" anchor="ctr"/>
-          <a:lstStyle/>
-          <a:p>
-            <a:pPr algn="ctr"/>
-            <a:r>
-              <a:rPr kumimoji="1" lang="en-US" altLang="zh-CN" sz="1200" b="1" dirty="0">
-                <a:solidFill>
-                  <a:sysClr val="windowText" lastClr="000000"/>
-                </a:solidFill>
-              </a:rPr>
-              <a:t>up3</a:t>
-            </a:r>
-            <a:r>
-              <a:rPr kumimoji="1" lang="zh-CN" altLang="en-US" sz="1200" dirty="0">
-                <a:solidFill>
-                  <a:sysClr val="windowText" lastClr="000000"/>
-                </a:solidFill>
-              </a:rPr>
-              <a:t> </a:t>
-            </a:r>
-            <a:r>
-              <a:rPr kumimoji="1" lang="en-US" altLang="zh-CN" sz="1200" dirty="0">
-                <a:solidFill>
-                  <a:sysClr val="windowText" lastClr="000000"/>
-                </a:solidFill>
-              </a:rPr>
-              <a:t>:</a:t>
-            </a:r>
-            <a:r>
-              <a:rPr kumimoji="1" lang="zh-CN" altLang="en-US" sz="1200" dirty="0">
-                <a:solidFill>
-                  <a:sysClr val="windowText" lastClr="000000"/>
-                </a:solidFill>
-              </a:rPr>
-              <a:t> </a:t>
-            </a:r>
-            <a:r>
-              <a:rPr kumimoji="1" lang="en-US" altLang="zh-CN" sz="1200" dirty="0">
-                <a:solidFill>
-                  <a:sysClr val="windowText" lastClr="000000"/>
-                </a:solidFill>
-              </a:rPr>
-              <a:t>Account</a:t>
-            </a:r>
-            <a:endParaRPr kumimoji="1" lang="zh-CN" altLang="en-US" sz="1200" dirty="0">
-              <a:solidFill>
-                <a:sysClr val="windowText" lastClr="000000"/>
-              </a:solidFill>
-            </a:endParaRPr>
-          </a:p>
-        </p:txBody>
-      </p:sp>
-      <p:sp>
-        <p:nvSpPr>
-          <p:cNvPr id="22" name="矩形 14"/>
-          <p:cNvSpPr/>
-          <p:nvPr/>
-        </p:nvSpPr>
-        <p:spPr>
-          <a:xfrm>
-            <a:off x="4087066" y="1257377"/>
-            <a:ext cx="1176993" cy="505147"/>
-          </a:xfrm>
-          <a:prstGeom prst="rect">
-            <a:avLst/>
-          </a:prstGeom>
-          <a:solidFill>
-            <a:schemeClr val="accent5">
-              <a:lumMod val="60000"/>
-              <a:lumOff val="40000"/>
-            </a:schemeClr>
-          </a:solidFill>
-          <a:ln w="25400">
-            <a:solidFill>
-              <a:schemeClr val="tx1"/>
-            </a:solidFill>
-          </a:ln>
-        </p:spPr>
-        <p:style>
-          <a:lnRef idx="2">
-            <a:schemeClr val="accent2">
-              <a:shade val="50000"/>
-            </a:schemeClr>
-          </a:lnRef>
-          <a:fillRef idx="1">
-            <a:schemeClr val="accent2"/>
-          </a:fillRef>
-          <a:effectRef idx="0">
-            <a:schemeClr val="accent2"/>
-          </a:effectRef>
-          <a:fontRef idx="minor">
-            <a:schemeClr val="lt1"/>
-          </a:fontRef>
-        </p:style>
-        <p:txBody>
-          <a:bodyPr rtlCol="0" anchor="ctr"/>
-          <a:lstStyle/>
-          <a:p>
-            <a:pPr algn="ctr"/>
-            <a:r>
-              <a:rPr kumimoji="1" lang="en-US" altLang="zh-CN" sz="1200" b="1" dirty="0">
-                <a:solidFill>
-                  <a:sysClr val="windowText" lastClr="000000"/>
-                </a:solidFill>
-              </a:rPr>
-              <a:t>up1</a:t>
-            </a:r>
-            <a:r>
-              <a:rPr kumimoji="1" lang="zh-CN" altLang="en-US" sz="1200" dirty="0">
-                <a:solidFill>
-                  <a:sysClr val="windowText" lastClr="000000"/>
-                </a:solidFill>
-              </a:rPr>
-              <a:t> </a:t>
-            </a:r>
-            <a:r>
-              <a:rPr kumimoji="1" lang="en-US" altLang="zh-CN" sz="1200" dirty="0">
-                <a:solidFill>
-                  <a:sysClr val="windowText" lastClr="000000"/>
-                </a:solidFill>
-              </a:rPr>
-              <a:t>:</a:t>
-            </a:r>
-            <a:r>
-              <a:rPr kumimoji="1" lang="zh-CN" altLang="en-US" sz="1200" dirty="0">
-                <a:solidFill>
-                  <a:sysClr val="windowText" lastClr="000000"/>
-                </a:solidFill>
-              </a:rPr>
-              <a:t> </a:t>
-            </a:r>
-            <a:r>
-              <a:rPr kumimoji="1" lang="en-US" altLang="zh-CN" sz="1200" dirty="0">
-                <a:solidFill>
-                  <a:sysClr val="windowText" lastClr="000000"/>
-                </a:solidFill>
-              </a:rPr>
-              <a:t>Account</a:t>
-            </a:r>
-            <a:endParaRPr kumimoji="1" lang="zh-CN" altLang="en-US" sz="1200" dirty="0">
-              <a:solidFill>
-                <a:sysClr val="windowText" lastClr="000000"/>
-              </a:solidFill>
-            </a:endParaRPr>
-          </a:p>
-        </p:txBody>
-      </p:sp>
-      <p:cxnSp>
-        <p:nvCxnSpPr>
-          <p:cNvPr id="24" name="直线箭头连接符 11" descr="jytjh"/>
-          <p:cNvCxnSpPr>
-            <a:stCxn id="22" idx="2"/>
-            <a:endCxn id="25" idx="0"/>
-          </p:cNvCxnSpPr>
-          <p:nvPr/>
-        </p:nvCxnSpPr>
-        <p:spPr>
-          <a:xfrm>
-            <a:off x="4675563" y="1762524"/>
-            <a:ext cx="2757326" cy="1113909"/>
-          </a:xfrm>
-          <a:prstGeom prst="straightConnector1">
-            <a:avLst/>
-          </a:prstGeom>
-          <a:ln w="19050">
-            <a:solidFill>
-              <a:schemeClr val="tx1"/>
-            </a:solidFill>
-            <a:headEnd type="none" w="lg" len="med"/>
-            <a:tailEnd type="arrow" w="sm" len="lg"/>
-          </a:ln>
-        </p:spPr>
-        <p:style>
-          <a:lnRef idx="1">
-            <a:schemeClr val="accent1"/>
-          </a:lnRef>
-          <a:fillRef idx="0">
-            <a:schemeClr val="accent1"/>
-          </a:fillRef>
-          <a:effectRef idx="0">
-            <a:schemeClr val="accent1"/>
-          </a:effectRef>
-          <a:fontRef idx="minor">
-            <a:schemeClr val="tx1"/>
-          </a:fontRef>
-        </p:style>
-      </p:cxnSp>
-      <p:cxnSp>
-        <p:nvCxnSpPr>
-          <p:cNvPr id="29" name="直线箭头连接符 11" descr="jytjh"/>
-          <p:cNvCxnSpPr>
-            <a:stCxn id="21" idx="2"/>
-            <a:endCxn id="25" idx="0"/>
-          </p:cNvCxnSpPr>
-          <p:nvPr/>
-        </p:nvCxnSpPr>
-        <p:spPr>
-          <a:xfrm flipH="1">
-            <a:off x="7432889" y="1762524"/>
-            <a:ext cx="2494214" cy="1113909"/>
-          </a:xfrm>
-          <a:prstGeom prst="straightConnector1">
-            <a:avLst/>
-          </a:prstGeom>
-          <a:ln w="19050">
-            <a:solidFill>
-              <a:schemeClr val="tx1"/>
-            </a:solidFill>
-            <a:headEnd type="none" w="lg" len="med"/>
-            <a:tailEnd type="arrow" w="sm" len="lg"/>
-          </a:ln>
-        </p:spPr>
-        <p:style>
-          <a:lnRef idx="1">
-            <a:schemeClr val="accent1"/>
-          </a:lnRef>
-          <a:fillRef idx="0">
-            <a:schemeClr val="accent1"/>
-          </a:fillRef>
-          <a:effectRef idx="0">
-            <a:schemeClr val="accent1"/>
-          </a:effectRef>
-          <a:fontRef idx="minor">
-            <a:schemeClr val="tx1"/>
-          </a:fontRef>
-        </p:style>
-      </p:cxnSp>
-      <p:sp>
-        <p:nvSpPr>
-          <p:cNvPr id="37" name="矩形 14"/>
-          <p:cNvSpPr/>
-          <p:nvPr/>
-        </p:nvSpPr>
-        <p:spPr>
-          <a:xfrm>
-            <a:off x="7616194" y="1257377"/>
-            <a:ext cx="1081249" cy="505147"/>
-          </a:xfrm>
-          <a:prstGeom prst="rect">
-            <a:avLst/>
-          </a:prstGeom>
-          <a:noFill/>
-          <a:ln w="25400">
-            <a:noFill/>
-          </a:ln>
-        </p:spPr>
-        <p:style>
-          <a:lnRef idx="2">
-            <a:schemeClr val="accent2">
-              <a:shade val="50000"/>
-            </a:schemeClr>
-          </a:lnRef>
-          <a:fillRef idx="1">
-            <a:schemeClr val="accent2"/>
-          </a:fillRef>
-          <a:effectRef idx="0">
-            <a:schemeClr val="accent2"/>
-          </a:effectRef>
-          <a:fontRef idx="minor">
-            <a:schemeClr val="lt1"/>
-          </a:fontRef>
-        </p:style>
-        <p:txBody>
-          <a:bodyPr rtlCol="0" anchor="ctr"/>
-          <a:lstStyle/>
-          <a:p>
-            <a:pPr algn="ctr"/>
-            <a:r>
-              <a:rPr kumimoji="1" lang="en-US" altLang="zh-CN" sz="1400" b="1" dirty="0">
-                <a:solidFill>
-                  <a:sysClr val="windowText" lastClr="000000"/>
-                </a:solidFill>
-              </a:rPr>
-              <a:t>…</a:t>
-            </a:r>
-            <a:endParaRPr kumimoji="1" lang="zh-CN" altLang="en-US" sz="1400" dirty="0">
-              <a:solidFill>
-                <a:sysClr val="windowText" lastClr="000000"/>
-              </a:solidFill>
-            </a:endParaRPr>
-          </a:p>
-        </p:txBody>
-      </p:sp>
-      <p:cxnSp>
-        <p:nvCxnSpPr>
-          <p:cNvPr id="41" name="直线箭头连接符 11" descr="jytjh"/>
-          <p:cNvCxnSpPr>
-            <a:stCxn id="37" idx="2"/>
-            <a:endCxn id="25" idx="0"/>
-          </p:cNvCxnSpPr>
-          <p:nvPr/>
-        </p:nvCxnSpPr>
-        <p:spPr>
-          <a:xfrm flipH="1">
-            <a:off x="7432889" y="1762524"/>
-            <a:ext cx="723930" cy="1113909"/>
-          </a:xfrm>
-          <a:prstGeom prst="straightConnector1">
-            <a:avLst/>
-          </a:prstGeom>
-          <a:ln w="19050">
-            <a:solidFill>
-              <a:schemeClr val="tx1"/>
-            </a:solidFill>
-            <a:headEnd type="none" w="lg" len="med"/>
-            <a:tailEnd type="arrow" w="sm" len="lg"/>
-          </a:ln>
-        </p:spPr>
-        <p:style>
-          <a:lnRef idx="1">
-            <a:schemeClr val="accent1"/>
-          </a:lnRef>
-          <a:fillRef idx="0">
-            <a:schemeClr val="accent1"/>
-          </a:fillRef>
-          <a:effectRef idx="0">
-            <a:schemeClr val="accent1"/>
-          </a:effectRef>
-          <a:fontRef idx="minor">
-            <a:schemeClr val="tx1"/>
-          </a:fontRef>
-        </p:style>
-      </p:cxnSp>
-      <p:sp>
-        <p:nvSpPr>
-          <p:cNvPr id="52" name="矩形 14"/>
-          <p:cNvSpPr/>
-          <p:nvPr/>
-        </p:nvSpPr>
-        <p:spPr>
-          <a:xfrm>
-            <a:off x="4095168" y="4609374"/>
-            <a:ext cx="1381173" cy="505147"/>
-          </a:xfrm>
-          <a:prstGeom prst="rect">
-            <a:avLst/>
-          </a:prstGeom>
-          <a:solidFill>
-            <a:schemeClr val="accent5">
-              <a:lumMod val="60000"/>
-              <a:lumOff val="40000"/>
-            </a:schemeClr>
-          </a:solidFill>
-          <a:ln w="25400">
-            <a:solidFill>
-              <a:schemeClr val="tx1"/>
-            </a:solidFill>
-          </a:ln>
-        </p:spPr>
-        <p:style>
-          <a:lnRef idx="2">
-            <a:schemeClr val="accent2">
-              <a:shade val="50000"/>
-            </a:schemeClr>
-          </a:lnRef>
-          <a:fillRef idx="1">
-            <a:schemeClr val="accent2"/>
-          </a:fillRef>
-          <a:effectRef idx="0">
-            <a:schemeClr val="accent2"/>
-          </a:effectRef>
-          <a:fontRef idx="minor">
-            <a:schemeClr val="lt1"/>
-          </a:fontRef>
-        </p:style>
-        <p:txBody>
-          <a:bodyPr rtlCol="0" anchor="ctr"/>
-          <a:lstStyle/>
-          <a:p>
-            <a:pPr algn="ctr"/>
-            <a:r>
-              <a:rPr kumimoji="1" lang="en-US" altLang="zh-CN" sz="1200" b="1" dirty="0">
-                <a:solidFill>
-                  <a:sysClr val="windowText" lastClr="000000"/>
-                </a:solidFill>
-              </a:rPr>
-              <a:t>down1</a:t>
-            </a:r>
-            <a:r>
-              <a:rPr kumimoji="1" lang="zh-CN" altLang="en-US" sz="1200" dirty="0">
-                <a:solidFill>
-                  <a:sysClr val="windowText" lastClr="000000"/>
-                </a:solidFill>
-              </a:rPr>
-              <a:t> </a:t>
-            </a:r>
-            <a:r>
-              <a:rPr kumimoji="1" lang="en-US" altLang="zh-CN" sz="1200" dirty="0">
-                <a:solidFill>
-                  <a:sysClr val="windowText" lastClr="000000"/>
-                </a:solidFill>
-              </a:rPr>
-              <a:t>:</a:t>
-            </a:r>
-            <a:r>
-              <a:rPr kumimoji="1" lang="zh-CN" altLang="en-US" sz="1200" dirty="0">
-                <a:solidFill>
-                  <a:sysClr val="windowText" lastClr="000000"/>
-                </a:solidFill>
-              </a:rPr>
-              <a:t> </a:t>
-            </a:r>
-            <a:r>
-              <a:rPr kumimoji="1" lang="en-US" altLang="zh-CN" sz="1200" dirty="0">
-                <a:solidFill>
-                  <a:sysClr val="windowText" lastClr="000000"/>
-                </a:solidFill>
-              </a:rPr>
-              <a:t>Account</a:t>
-            </a:r>
-            <a:endParaRPr kumimoji="1" lang="zh-CN" altLang="en-US" sz="1200" dirty="0">
-              <a:solidFill>
-                <a:sysClr val="windowText" lastClr="000000"/>
-              </a:solidFill>
-            </a:endParaRPr>
-          </a:p>
-        </p:txBody>
-      </p:sp>
-      <p:sp>
-        <p:nvSpPr>
-          <p:cNvPr id="53" name="矩形 14"/>
-          <p:cNvSpPr/>
-          <p:nvPr/>
-        </p:nvSpPr>
-        <p:spPr>
-          <a:xfrm>
-            <a:off x="9151034" y="4605726"/>
-            <a:ext cx="1381173" cy="505147"/>
-          </a:xfrm>
-          <a:prstGeom prst="rect">
-            <a:avLst/>
-          </a:prstGeom>
-          <a:solidFill>
-            <a:schemeClr val="accent5">
-              <a:lumMod val="60000"/>
-              <a:lumOff val="40000"/>
-            </a:schemeClr>
-          </a:solidFill>
-          <a:ln w="25400">
-            <a:solidFill>
-              <a:schemeClr val="tx1"/>
-            </a:solidFill>
-          </a:ln>
-        </p:spPr>
-        <p:style>
-          <a:lnRef idx="2">
-            <a:schemeClr val="accent2">
-              <a:shade val="50000"/>
-            </a:schemeClr>
-          </a:lnRef>
-          <a:fillRef idx="1">
-            <a:schemeClr val="accent2"/>
-          </a:fillRef>
-          <a:effectRef idx="0">
-            <a:schemeClr val="accent2"/>
-          </a:effectRef>
-          <a:fontRef idx="minor">
-            <a:schemeClr val="lt1"/>
-          </a:fontRef>
-        </p:style>
-        <p:txBody>
-          <a:bodyPr rtlCol="0" anchor="ctr"/>
-          <a:lstStyle/>
-          <a:p>
-            <a:pPr algn="ctr"/>
-            <a:r>
-              <a:rPr kumimoji="1" lang="en-US" altLang="zh-CN" sz="1200" b="1" dirty="0">
-                <a:solidFill>
-                  <a:sysClr val="windowText" lastClr="000000"/>
-                </a:solidFill>
-              </a:rPr>
-              <a:t>down3</a:t>
-            </a:r>
-            <a:r>
-              <a:rPr kumimoji="1" lang="zh-CN" altLang="en-US" sz="1200" dirty="0">
-                <a:solidFill>
-                  <a:sysClr val="windowText" lastClr="000000"/>
-                </a:solidFill>
-              </a:rPr>
-              <a:t> </a:t>
-            </a:r>
-            <a:r>
-              <a:rPr kumimoji="1" lang="en-US" altLang="zh-CN" sz="1200" dirty="0">
-                <a:solidFill>
-                  <a:sysClr val="windowText" lastClr="000000"/>
-                </a:solidFill>
-              </a:rPr>
-              <a:t>:</a:t>
-            </a:r>
-            <a:r>
-              <a:rPr kumimoji="1" lang="zh-CN" altLang="en-US" sz="1200" dirty="0">
-                <a:solidFill>
-                  <a:sysClr val="windowText" lastClr="000000"/>
-                </a:solidFill>
-              </a:rPr>
-              <a:t> </a:t>
-            </a:r>
-            <a:r>
-              <a:rPr kumimoji="1" lang="en-US" altLang="zh-CN" sz="1200" dirty="0">
-                <a:solidFill>
-                  <a:sysClr val="windowText" lastClr="000000"/>
-                </a:solidFill>
-              </a:rPr>
-              <a:t>Account</a:t>
-            </a:r>
-            <a:endParaRPr kumimoji="1" lang="zh-CN" altLang="en-US" sz="1200" dirty="0">
-              <a:solidFill>
-                <a:sysClr val="windowText" lastClr="000000"/>
-              </a:solidFill>
-            </a:endParaRPr>
-          </a:p>
-        </p:txBody>
-      </p:sp>
-      <p:sp>
-        <p:nvSpPr>
-          <p:cNvPr id="55" name="矩形 14"/>
-          <p:cNvSpPr/>
-          <p:nvPr/>
-        </p:nvSpPr>
-        <p:spPr>
-          <a:xfrm>
-            <a:off x="7491148" y="4605725"/>
-            <a:ext cx="1268820" cy="505147"/>
-          </a:xfrm>
-          <a:prstGeom prst="rect">
-            <a:avLst/>
-          </a:prstGeom>
-          <a:noFill/>
-          <a:ln w="25400">
-            <a:noFill/>
-          </a:ln>
-        </p:spPr>
-        <p:style>
-          <a:lnRef idx="2">
-            <a:schemeClr val="accent2">
-              <a:shade val="50000"/>
-            </a:schemeClr>
-          </a:lnRef>
-          <a:fillRef idx="1">
-            <a:schemeClr val="accent2"/>
-          </a:fillRef>
-          <a:effectRef idx="0">
-            <a:schemeClr val="accent2"/>
-          </a:effectRef>
-          <a:fontRef idx="minor">
-            <a:schemeClr val="lt1"/>
-          </a:fontRef>
-        </p:style>
-        <p:txBody>
-          <a:bodyPr rtlCol="0" anchor="ctr"/>
-          <a:lstStyle/>
-          <a:p>
-            <a:pPr algn="ctr"/>
-            <a:r>
-              <a:rPr kumimoji="1" lang="en-US" altLang="zh-CN" sz="1600" b="1" dirty="0">
-                <a:solidFill>
-                  <a:sysClr val="windowText" lastClr="000000"/>
-                </a:solidFill>
-              </a:rPr>
-              <a:t>…</a:t>
-            </a:r>
-            <a:endParaRPr kumimoji="1" lang="zh-CN" altLang="en-US" sz="1600" dirty="0">
-              <a:solidFill>
-                <a:sysClr val="windowText" lastClr="000000"/>
-              </a:solidFill>
-            </a:endParaRPr>
-          </a:p>
-        </p:txBody>
-      </p:sp>
-      <p:cxnSp>
-        <p:nvCxnSpPr>
-          <p:cNvPr id="57" name="直线箭头连接符 11" descr="jytjh"/>
-          <p:cNvCxnSpPr>
-            <a:stCxn id="12" idx="2"/>
-            <a:endCxn id="52" idx="0"/>
-          </p:cNvCxnSpPr>
-          <p:nvPr/>
-        </p:nvCxnSpPr>
-        <p:spPr>
-          <a:xfrm flipH="1">
-            <a:off x="4785755" y="3564481"/>
-            <a:ext cx="2645721" cy="1044893"/>
-          </a:xfrm>
-          <a:prstGeom prst="straightConnector1">
-            <a:avLst/>
-          </a:prstGeom>
-          <a:ln w="19050">
-            <a:solidFill>
-              <a:schemeClr val="tx1"/>
-            </a:solidFill>
-            <a:headEnd type="none" w="lg" len="med"/>
-            <a:tailEnd type="arrow" w="sm" len="lg"/>
-          </a:ln>
-        </p:spPr>
-        <p:style>
-          <a:lnRef idx="1">
-            <a:schemeClr val="accent1"/>
-          </a:lnRef>
-          <a:fillRef idx="0">
-            <a:schemeClr val="accent1"/>
-          </a:fillRef>
-          <a:effectRef idx="0">
-            <a:schemeClr val="accent1"/>
-          </a:effectRef>
-          <a:fontRef idx="minor">
-            <a:schemeClr val="tx1"/>
-          </a:fontRef>
-        </p:style>
-      </p:cxnSp>
-      <p:cxnSp>
-        <p:nvCxnSpPr>
-          <p:cNvPr id="61" name="直线箭头连接符 11" descr="jytjh"/>
-          <p:cNvCxnSpPr>
-            <a:stCxn id="12" idx="2"/>
-            <a:endCxn id="55" idx="0"/>
-          </p:cNvCxnSpPr>
-          <p:nvPr/>
-        </p:nvCxnSpPr>
-        <p:spPr>
-          <a:xfrm>
-            <a:off x="7431476" y="3564481"/>
-            <a:ext cx="694082" cy="1041244"/>
-          </a:xfrm>
-          <a:prstGeom prst="straightConnector1">
-            <a:avLst/>
-          </a:prstGeom>
-          <a:ln w="19050">
-            <a:solidFill>
-              <a:schemeClr val="tx1"/>
-            </a:solidFill>
-            <a:headEnd type="none" w="lg" len="med"/>
-            <a:tailEnd type="arrow" w="sm" len="lg"/>
-          </a:ln>
-        </p:spPr>
-        <p:style>
-          <a:lnRef idx="1">
-            <a:schemeClr val="accent1"/>
-          </a:lnRef>
-          <a:fillRef idx="0">
-            <a:schemeClr val="accent1"/>
-          </a:fillRef>
-          <a:effectRef idx="0">
-            <a:schemeClr val="accent1"/>
-          </a:effectRef>
-          <a:fontRef idx="minor">
-            <a:schemeClr val="tx1"/>
-          </a:fontRef>
-        </p:style>
-      </p:cxnSp>
-      <p:cxnSp>
-        <p:nvCxnSpPr>
-          <p:cNvPr id="64" name="直线箭头连接符 11" descr="jytjh"/>
-          <p:cNvCxnSpPr>
-            <a:stCxn id="12" idx="2"/>
-            <a:endCxn id="53" idx="0"/>
-          </p:cNvCxnSpPr>
-          <p:nvPr/>
-        </p:nvCxnSpPr>
-        <p:spPr>
-          <a:xfrm>
-            <a:off x="7431476" y="3564481"/>
-            <a:ext cx="2410145" cy="1041245"/>
-          </a:xfrm>
-          <a:prstGeom prst="straightConnector1">
-            <a:avLst/>
-          </a:prstGeom>
-          <a:ln w="19050">
-            <a:solidFill>
-              <a:schemeClr val="tx1"/>
-            </a:solidFill>
-            <a:headEnd type="none" w="lg" len="med"/>
-            <a:tailEnd type="arrow" w="sm" len="lg"/>
-          </a:ln>
-        </p:spPr>
-        <p:style>
-          <a:lnRef idx="1">
-            <a:schemeClr val="accent1"/>
-          </a:lnRef>
-          <a:fillRef idx="0">
-            <a:schemeClr val="accent1"/>
-          </a:fillRef>
-          <a:effectRef idx="0">
-            <a:schemeClr val="accent1"/>
-          </a:effectRef>
-          <a:fontRef idx="minor">
-            <a:schemeClr val="tx1"/>
-          </a:fontRef>
-        </p:style>
-      </p:cxnSp>
     </p:spTree>
   </p:cSld>
   <p:clrMapOvr>

</xml_diff>